<commit_message>
Deploy website Fri Feb  9 16:43:13 PST 2024
</commit_message>
<xml_diff>
--- a/assets/slides/sp24/07-HOFs_Environments.pptx
+++ b/assets/slides/sp24/07-HOFs_Environments.pptx
@@ -5,7 +5,7 @@
     <p:sldMasterId id="2147483703" r:id="rId1"/>
   </p:sldMasterIdLst>
   <p:notesMasterIdLst>
-    <p:notesMasterId r:id="rId24"/>
+    <p:notesMasterId r:id="rId25"/>
   </p:notesMasterIdLst>
   <p:sldIdLst>
     <p:sldId id="256" r:id="rId2"/>
@@ -13,23 +13,24 @@
     <p:sldId id="391" r:id="rId4"/>
     <p:sldId id="392" r:id="rId5"/>
     <p:sldId id="396" r:id="rId6"/>
-    <p:sldId id="397" r:id="rId7"/>
-    <p:sldId id="398" r:id="rId8"/>
-    <p:sldId id="399" r:id="rId9"/>
-    <p:sldId id="286" r:id="rId10"/>
-    <p:sldId id="291" r:id="rId11"/>
-    <p:sldId id="285" r:id="rId12"/>
-    <p:sldId id="268" r:id="rId13"/>
-    <p:sldId id="287" r:id="rId14"/>
-    <p:sldId id="401" r:id="rId15"/>
-    <p:sldId id="289" r:id="rId16"/>
-    <p:sldId id="265" r:id="rId17"/>
-    <p:sldId id="390" r:id="rId18"/>
-    <p:sldId id="389" r:id="rId19"/>
-    <p:sldId id="387" r:id="rId20"/>
-    <p:sldId id="388" r:id="rId21"/>
-    <p:sldId id="288" r:id="rId22"/>
-    <p:sldId id="400" r:id="rId23"/>
+    <p:sldId id="402" r:id="rId7"/>
+    <p:sldId id="397" r:id="rId8"/>
+    <p:sldId id="398" r:id="rId9"/>
+    <p:sldId id="399" r:id="rId10"/>
+    <p:sldId id="286" r:id="rId11"/>
+    <p:sldId id="291" r:id="rId12"/>
+    <p:sldId id="285" r:id="rId13"/>
+    <p:sldId id="268" r:id="rId14"/>
+    <p:sldId id="287" r:id="rId15"/>
+    <p:sldId id="401" r:id="rId16"/>
+    <p:sldId id="289" r:id="rId17"/>
+    <p:sldId id="265" r:id="rId18"/>
+    <p:sldId id="390" r:id="rId19"/>
+    <p:sldId id="389" r:id="rId20"/>
+    <p:sldId id="387" r:id="rId21"/>
+    <p:sldId id="388" r:id="rId22"/>
+    <p:sldId id="288" r:id="rId23"/>
+    <p:sldId id="400" r:id="rId24"/>
   </p:sldIdLst>
   <p:sldSz cx="12192000" cy="6858000"/>
   <p:notesSz cx="6997700" cy="9194800"/>
@@ -796,7 +797,7 @@
                 <a:latin typeface="Times New Roman"/>
                 <a:ea typeface="ＭＳ Ｐゴシック"/>
               </a:rPr>
-              <a:t>9</a:t>
+              <a:t>10</a:t>
             </a:fld>
             <a:endParaRPr lang="en-US" sz="2400" b="0" strike="noStrike" spc="-1">
               <a:solidFill>
@@ -920,7 +921,7 @@
                 <a:latin typeface="Times New Roman"/>
                 <a:ea typeface="ＭＳ Ｐゴシック"/>
               </a:rPr>
-              <a:t>13</a:t>
+              <a:t>14</a:t>
             </a:fld>
             <a:endParaRPr lang="en-US" sz="2400" b="0" strike="noStrike" spc="-1">
               <a:solidFill>
@@ -1076,7 +1077,7 @@
                 </a:uFill>
                 <a:latin typeface="Times New Roman"/>
               </a:rPr>
-              <a:t>16</a:t>
+              <a:t>17</a:t>
             </a:fld>
             <a:endParaRPr lang="en-US" sz="1400" b="0" strike="noStrike" spc="-1">
               <a:solidFill>
@@ -1195,7 +1196,7 @@
                 </a:uFill>
                 <a:latin typeface="Times New Roman"/>
               </a:rPr>
-              <a:t>19</a:t>
+              <a:t>20</a:t>
             </a:fld>
             <a:endParaRPr lang="en-US" sz="1400" b="0" strike="noStrike" spc="-1">
               <a:solidFill>
@@ -1314,7 +1315,7 @@
                 </a:uFill>
                 <a:latin typeface="Times New Roman"/>
               </a:rPr>
-              <a:t>21</a:t>
+              <a:t>22</a:t>
             </a:fld>
             <a:endParaRPr lang="en-US" sz="1400" b="0" strike="noStrike" spc="-1">
               <a:solidFill>
@@ -9515,7 +9516,7 @@
           <p:cNvPr id="2" name="Title 1">
             <a:extLst>
               <a:ext uri="{FF2B5EF4-FFF2-40B4-BE49-F238E27FC236}">
-                <a16:creationId xmlns:a16="http://schemas.microsoft.com/office/drawing/2014/main" id="{100B1421-7577-D94A-A03F-9746321D9D5E}"/>
+                <a16:creationId xmlns:a16="http://schemas.microsoft.com/office/drawing/2014/main" id="{D2340843-39A8-4E4A-A923-FEDC64A7AE32}"/>
               </a:ext>
             </a:extLst>
           </p:cNvPr>
@@ -9523,7 +9524,7 @@
             <a:spLocks noGrp="1"/>
           </p:cNvSpPr>
           <p:nvPr>
-            <p:ph type="title"/>
+            <p:ph type="ctrTitle"/>
           </p:nvPr>
         </p:nvSpPr>
         <p:spPr/>
@@ -9533,86 +9534,7 @@
           <a:p>
             <a:r>
               <a:rPr lang="en-US" dirty="0"/>
-              <a:t>Learning Objectives</a:t>
-            </a:r>
-          </a:p>
-        </p:txBody>
-      </p:sp>
-      <p:sp>
-        <p:nvSpPr>
-          <p:cNvPr id="3" name="Content Placeholder 2">
-            <a:extLst>
-              <a:ext uri="{FF2B5EF4-FFF2-40B4-BE49-F238E27FC236}">
-                <a16:creationId xmlns:a16="http://schemas.microsoft.com/office/drawing/2014/main" id="{86019B6B-B854-7643-924E-9BF51C8B86D3}"/>
-              </a:ext>
-            </a:extLst>
-          </p:cNvPr>
-          <p:cNvSpPr>
-            <a:spLocks noGrp="1"/>
-          </p:cNvSpPr>
-          <p:nvPr>
-            <p:ph idx="1"/>
-          </p:nvPr>
-        </p:nvSpPr>
-        <p:spPr/>
-        <p:txBody>
-          <a:bodyPr/>
-          <a:lstStyle/>
-          <a:p>
-            <a:r>
-              <a:rPr lang="en-US" dirty="0"/>
-              <a:t>Learn how to use and create higher order functions:</a:t>
-            </a:r>
-          </a:p>
-          <a:p>
-            <a:r>
-              <a:rPr lang="en-US" dirty="0"/>
-              <a:t>Functions can be used as data</a:t>
-            </a:r>
-          </a:p>
-          <a:p>
-            <a:r>
-              <a:rPr lang="en-US" dirty="0"/>
-              <a:t>Functions can accept a function as an argument</a:t>
-            </a:r>
-          </a:p>
-          <a:p>
-            <a:r>
-              <a:rPr lang="en-US" b="1" dirty="0"/>
-              <a:t>Functions can return a new function</a:t>
-            </a:r>
-          </a:p>
-        </p:txBody>
-      </p:sp>
-      <p:sp>
-        <p:nvSpPr>
-          <p:cNvPr id="5" name="Footer Placeholder 3">
-            <a:extLst>
-              <a:ext uri="{FF2B5EF4-FFF2-40B4-BE49-F238E27FC236}">
-                <a16:creationId xmlns:a16="http://schemas.microsoft.com/office/drawing/2014/main" id="{0AB8D426-819A-7542-8C8B-D59D3E625434}"/>
-              </a:ext>
-            </a:extLst>
-          </p:cNvPr>
-          <p:cNvSpPr>
-            <a:spLocks noGrp="1"/>
-          </p:cNvSpPr>
-          <p:nvPr>
-            <p:ph type="ftr" sz="quarter" idx="10"/>
-          </p:nvPr>
-        </p:nvSpPr>
-        <p:spPr>
-          <a:xfrm>
-            <a:off x="4038599" y="6356350"/>
-            <a:ext cx="4348655" cy="365125"/>
-          </a:xfrm>
-        </p:spPr>
-        <p:txBody>
-          <a:bodyPr/>
-          <a:lstStyle/>
-          <a:p>
-            <a:r>
-              <a:rPr lang="en-US" dirty="0"/>
-              <a:t>Michael Ball | UC Berkeley | https://c88c.org | © CC BY-NC-SA</a:t>
+              <a:t>Functions That Return Functions</a:t>
             </a:r>
           </a:p>
         </p:txBody>
@@ -9620,13 +9542,40 @@
     </p:spTree>
     <p:extLst>
       <p:ext uri="{BB962C8B-B14F-4D97-AF65-F5344CB8AC3E}">
-        <p14:creationId xmlns:p14="http://schemas.microsoft.com/office/powerpoint/2010/main" val="1593238648"/>
+        <p14:creationId xmlns:p14="http://schemas.microsoft.com/office/powerpoint/2010/main" val="4264810558"/>
       </p:ext>
     </p:extLst>
   </p:cSld>
   <p:clrMapOvr>
     <a:masterClrMapping/>
   </p:clrMapOvr>
+  <p:timing>
+    <p:tnLst>
+      <p:par>
+        <p:cTn id="1" dur="indefinite" restart="never" nodeType="tmRoot">
+          <p:childTnLst>
+            <p:seq>
+              <p:cTn id="2" nodeType="mainSeq"/>
+              <p:prevCondLst>
+                <p:cond evt="onPrev" delay="0">
+                  <p:tgtEl>
+                    <p:sldTgt/>
+                  </p:tgtEl>
+                </p:cond>
+              </p:prevCondLst>
+              <p:nextCondLst>
+                <p:cond evt="onNext" delay="0">
+                  <p:tgtEl>
+                    <p:sldTgt/>
+                  </p:tgtEl>
+                </p:cond>
+              </p:nextCondLst>
+            </p:seq>
+          </p:childTnLst>
+        </p:cTn>
+      </p:par>
+    </p:tnLst>
+  </p:timing>
 </p:sld>
 </file>
 
@@ -9652,6 +9601,143 @@
           <p:cNvPr id="2" name="Title 1">
             <a:extLst>
               <a:ext uri="{FF2B5EF4-FFF2-40B4-BE49-F238E27FC236}">
+                <a16:creationId xmlns:a16="http://schemas.microsoft.com/office/drawing/2014/main" id="{100B1421-7577-D94A-A03F-9746321D9D5E}"/>
+              </a:ext>
+            </a:extLst>
+          </p:cNvPr>
+          <p:cNvSpPr>
+            <a:spLocks noGrp="1"/>
+          </p:cNvSpPr>
+          <p:nvPr>
+            <p:ph type="title"/>
+          </p:nvPr>
+        </p:nvSpPr>
+        <p:spPr/>
+        <p:txBody>
+          <a:bodyPr/>
+          <a:lstStyle/>
+          <a:p>
+            <a:r>
+              <a:rPr lang="en-US" dirty="0"/>
+              <a:t>Learning Objectives</a:t>
+            </a:r>
+          </a:p>
+        </p:txBody>
+      </p:sp>
+      <p:sp>
+        <p:nvSpPr>
+          <p:cNvPr id="3" name="Content Placeholder 2">
+            <a:extLst>
+              <a:ext uri="{FF2B5EF4-FFF2-40B4-BE49-F238E27FC236}">
+                <a16:creationId xmlns:a16="http://schemas.microsoft.com/office/drawing/2014/main" id="{86019B6B-B854-7643-924E-9BF51C8B86D3}"/>
+              </a:ext>
+            </a:extLst>
+          </p:cNvPr>
+          <p:cNvSpPr>
+            <a:spLocks noGrp="1"/>
+          </p:cNvSpPr>
+          <p:nvPr>
+            <p:ph idx="1"/>
+          </p:nvPr>
+        </p:nvSpPr>
+        <p:spPr/>
+        <p:txBody>
+          <a:bodyPr/>
+          <a:lstStyle/>
+          <a:p>
+            <a:r>
+              <a:rPr lang="en-US" dirty="0"/>
+              <a:t>Learn how to use and create higher order functions:</a:t>
+            </a:r>
+          </a:p>
+          <a:p>
+            <a:r>
+              <a:rPr lang="en-US" dirty="0"/>
+              <a:t>Functions can be used as data</a:t>
+            </a:r>
+          </a:p>
+          <a:p>
+            <a:r>
+              <a:rPr lang="en-US" dirty="0"/>
+              <a:t>Functions can accept a function as an argument</a:t>
+            </a:r>
+          </a:p>
+          <a:p>
+            <a:r>
+              <a:rPr lang="en-US" b="1" dirty="0"/>
+              <a:t>Functions can return a new function</a:t>
+            </a:r>
+          </a:p>
+        </p:txBody>
+      </p:sp>
+      <p:sp>
+        <p:nvSpPr>
+          <p:cNvPr id="5" name="Footer Placeholder 3">
+            <a:extLst>
+              <a:ext uri="{FF2B5EF4-FFF2-40B4-BE49-F238E27FC236}">
+                <a16:creationId xmlns:a16="http://schemas.microsoft.com/office/drawing/2014/main" id="{0AB8D426-819A-7542-8C8B-D59D3E625434}"/>
+              </a:ext>
+            </a:extLst>
+          </p:cNvPr>
+          <p:cNvSpPr>
+            <a:spLocks noGrp="1"/>
+          </p:cNvSpPr>
+          <p:nvPr>
+            <p:ph type="ftr" sz="quarter" idx="10"/>
+          </p:nvPr>
+        </p:nvSpPr>
+        <p:spPr>
+          <a:xfrm>
+            <a:off x="4038599" y="6356350"/>
+            <a:ext cx="4348655" cy="365125"/>
+          </a:xfrm>
+        </p:spPr>
+        <p:txBody>
+          <a:bodyPr/>
+          <a:lstStyle/>
+          <a:p>
+            <a:r>
+              <a:rPr lang="en-US" dirty="0"/>
+              <a:t>Michael Ball | UC Berkeley | https://c88c.org | © CC BY-NC-SA</a:t>
+            </a:r>
+          </a:p>
+        </p:txBody>
+      </p:sp>
+    </p:spTree>
+    <p:extLst>
+      <p:ext uri="{BB962C8B-B14F-4D97-AF65-F5344CB8AC3E}">
+        <p14:creationId xmlns:p14="http://schemas.microsoft.com/office/powerpoint/2010/main" val="1593238648"/>
+      </p:ext>
+    </p:extLst>
+  </p:cSld>
+  <p:clrMapOvr>
+    <a:masterClrMapping/>
+  </p:clrMapOvr>
+</p:sld>
+</file>
+
+<file path=ppt/slides/slide12.xml><?xml version="1.0" encoding="utf-8"?>
+<p:sld xmlns:a="http://schemas.openxmlformats.org/drawingml/2006/main" xmlns:r="http://schemas.openxmlformats.org/officeDocument/2006/relationships" xmlns:p="http://schemas.openxmlformats.org/presentationml/2006/main">
+  <p:cSld>
+    <p:spTree>
+      <p:nvGrpSpPr>
+        <p:cNvPr id="1" name=""/>
+        <p:cNvGrpSpPr/>
+        <p:nvPr/>
+      </p:nvGrpSpPr>
+      <p:grpSpPr>
+        <a:xfrm>
+          <a:off x="0" y="0"/>
+          <a:ext cx="0" cy="0"/>
+          <a:chOff x="0" y="0"/>
+          <a:chExt cx="0" cy="0"/>
+        </a:xfrm>
+      </p:grpSpPr>
+      <p:sp>
+        <p:nvSpPr>
+          <p:cNvPr id="2" name="Title 1">
+            <a:extLst>
+              <a:ext uri="{FF2B5EF4-FFF2-40B4-BE49-F238E27FC236}">
                 <a16:creationId xmlns:a16="http://schemas.microsoft.com/office/drawing/2014/main" id="{E6F99501-F0C7-EC42-A944-CAC24ED1FA0A}"/>
               </a:ext>
             </a:extLst>
@@ -9771,7 +9857,7 @@
 </p:sld>
 </file>
 
-<file path=ppt/slides/slide12.xml><?xml version="1.0" encoding="utf-8"?>
+<file path=ppt/slides/slide13.xml><?xml version="1.0" encoding="utf-8"?>
 <p:sld xmlns:a="http://schemas.openxmlformats.org/drawingml/2006/main" xmlns:r="http://schemas.openxmlformats.org/officeDocument/2006/relationships" xmlns:p="http://schemas.openxmlformats.org/presentationml/2006/main">
   <p:cSld>
     <p:spTree>
@@ -10733,7 +10819,7 @@
 </p:sld>
 </file>
 
-<file path=ppt/slides/slide13.xml><?xml version="1.0" encoding="utf-8"?>
+<file path=ppt/slides/slide14.xml><?xml version="1.0" encoding="utf-8"?>
 <p:sld xmlns:a="http://schemas.openxmlformats.org/drawingml/2006/main" xmlns:r="http://schemas.openxmlformats.org/officeDocument/2006/relationships" xmlns:p="http://schemas.openxmlformats.org/presentationml/2006/main">
   <p:cSld>
     <p:spTree>
@@ -10818,7 +10904,7 @@
 </p:sld>
 </file>
 
-<file path=ppt/slides/slide14.xml><?xml version="1.0" encoding="utf-8"?>
+<file path=ppt/slides/slide15.xml><?xml version="1.0" encoding="utf-8"?>
 <p:sld xmlns:a="http://schemas.openxmlformats.org/drawingml/2006/main" xmlns:r="http://schemas.openxmlformats.org/officeDocument/2006/relationships" xmlns:p="http://schemas.openxmlformats.org/presentationml/2006/main">
   <p:cSld>
     <p:spTree>
@@ -10935,6 +11021,19 @@
               <a:t> Every programming language is a bit different, but these rules are quite common</a:t>
             </a:r>
           </a:p>
+          <a:p>
+            <a:r>
+              <a:rPr lang="en-US" dirty="0"/>
+              <a:t> I understand if you don't like them now. </a:t>
+            </a:r>
+            <a:r>
+              <a:rPr lang="en-US" dirty="0">
+                <a:sym typeface="Wingdings" pitchFamily="2" charset="2"/>
+              </a:rPr>
+              <a:t></a:t>
+            </a:r>
+            <a:endParaRPr lang="en-US" dirty="0"/>
+          </a:p>
         </p:txBody>
       </p:sp>
       <p:sp>
@@ -10979,7 +11078,7 @@
 </p:sld>
 </file>
 
-<file path=ppt/slides/slide15.xml><?xml version="1.0" encoding="utf-8"?>
+<file path=ppt/slides/slide16.xml><?xml version="1.0" encoding="utf-8"?>
 <p:sld xmlns:a="http://schemas.openxmlformats.org/drawingml/2006/main" xmlns:r="http://schemas.openxmlformats.org/officeDocument/2006/relationships" xmlns:p="http://schemas.openxmlformats.org/presentationml/2006/main">
   <p:cSld>
     <p:spTree>
@@ -11562,7 +11661,7 @@
 </p:sld>
 </file>
 
-<file path=ppt/slides/slide16.xml><?xml version="1.0" encoding="utf-8"?>
+<file path=ppt/slides/slide17.xml><?xml version="1.0" encoding="utf-8"?>
 <p:sld xmlns:a="http://schemas.openxmlformats.org/drawingml/2006/main" xmlns:r="http://schemas.openxmlformats.org/officeDocument/2006/relationships" xmlns:p="http://schemas.openxmlformats.org/presentationml/2006/main">
   <p:cSld>
     <p:spTree>
@@ -12248,254 +12347,6 @@
 </p:sld>
 </file>
 
-<file path=ppt/slides/slide17.xml><?xml version="1.0" encoding="utf-8"?>
-<p:sld xmlns:a="http://schemas.openxmlformats.org/drawingml/2006/main" xmlns:r="http://schemas.openxmlformats.org/officeDocument/2006/relationships" xmlns:p="http://schemas.openxmlformats.org/presentationml/2006/main">
-  <p:cSld>
-    <p:spTree>
-      <p:nvGrpSpPr>
-        <p:cNvPr id="1" name=""/>
-        <p:cNvGrpSpPr/>
-        <p:nvPr/>
-      </p:nvGrpSpPr>
-      <p:grpSpPr>
-        <a:xfrm>
-          <a:off x="0" y="0"/>
-          <a:ext cx="0" cy="0"/>
-          <a:chOff x="0" y="0"/>
-          <a:chExt cx="0" cy="0"/>
-        </a:xfrm>
-      </p:grpSpPr>
-      <p:sp>
-        <p:nvSpPr>
-          <p:cNvPr id="2" name="Title 1">
-            <a:extLst>
-              <a:ext uri="{FF2B5EF4-FFF2-40B4-BE49-F238E27FC236}">
-                <a16:creationId xmlns:a16="http://schemas.microsoft.com/office/drawing/2014/main" id="{3240DA3F-5262-644A-8A04-EDF80650B9C2}"/>
-              </a:ext>
-            </a:extLst>
-          </p:cNvPr>
-          <p:cNvSpPr>
-            <a:spLocks noGrp="1"/>
-          </p:cNvSpPr>
-          <p:nvPr>
-            <p:ph type="title"/>
-          </p:nvPr>
-        </p:nvSpPr>
-        <p:spPr/>
-        <p:txBody>
-          <a:bodyPr/>
-          <a:lstStyle/>
-          <a:p>
-            <a:r>
-              <a:rPr lang="en-US" dirty="0"/>
-              <a:t>Python Tutor Example #1</a:t>
-            </a:r>
-          </a:p>
-        </p:txBody>
-      </p:sp>
-      <p:sp>
-        <p:nvSpPr>
-          <p:cNvPr id="3" name="Content Placeholder 2">
-            <a:extLst>
-              <a:ext uri="{FF2B5EF4-FFF2-40B4-BE49-F238E27FC236}">
-                <a16:creationId xmlns:a16="http://schemas.microsoft.com/office/drawing/2014/main" id="{284F9A36-1B36-EA49-B322-395902ACCA87}"/>
-              </a:ext>
-            </a:extLst>
-          </p:cNvPr>
-          <p:cNvSpPr>
-            <a:spLocks noGrp="1"/>
-          </p:cNvSpPr>
-          <p:nvPr>
-            <p:ph idx="1"/>
-          </p:nvPr>
-        </p:nvSpPr>
-        <p:spPr>
-          <a:xfrm>
-            <a:off x="533399" y="1066800"/>
-            <a:ext cx="11225011" cy="5257800"/>
-          </a:xfrm>
-        </p:spPr>
-        <p:txBody>
-          <a:bodyPr/>
-          <a:lstStyle/>
-          <a:p>
-            <a:pPr marL="0" indent="0">
-              <a:buNone/>
-            </a:pPr>
-            <a:r>
-              <a:rPr lang="en-US" sz="2200" dirty="0">
-                <a:latin typeface="Source Code Pro" panose="020B0509030403020204" pitchFamily="49" charset="0"/>
-                <a:ea typeface="Source Code Pro" panose="020B0509030403020204" pitchFamily="49" charset="0"/>
-              </a:rPr>
-              <a:t>def </a:t>
-            </a:r>
-            <a:r>
-              <a:rPr lang="en-US" sz="2200" dirty="0" err="1">
-                <a:latin typeface="Source Code Pro" panose="020B0509030403020204" pitchFamily="49" charset="0"/>
-                <a:ea typeface="Source Code Pro" panose="020B0509030403020204" pitchFamily="49" charset="0"/>
-              </a:rPr>
-              <a:t>make_adder</a:t>
-            </a:r>
-            <a:r>
-              <a:rPr lang="en-US" sz="2200" dirty="0">
-                <a:latin typeface="Source Code Pro" panose="020B0509030403020204" pitchFamily="49" charset="0"/>
-                <a:ea typeface="Source Code Pro" panose="020B0509030403020204" pitchFamily="49" charset="0"/>
-              </a:rPr>
-              <a:t>(n):</a:t>
-            </a:r>
-          </a:p>
-          <a:p>
-            <a:pPr marL="0" indent="0">
-              <a:buNone/>
-            </a:pPr>
-            <a:r>
-              <a:rPr lang="en-US" sz="2200" dirty="0">
-                <a:latin typeface="Source Code Pro" panose="020B0509030403020204" pitchFamily="49" charset="0"/>
-                <a:ea typeface="Source Code Pro" panose="020B0509030403020204" pitchFamily="49" charset="0"/>
-              </a:rPr>
-              <a:t>    def adder(k):</a:t>
-            </a:r>
-          </a:p>
-          <a:p>
-            <a:pPr marL="0" indent="0">
-              <a:buNone/>
-            </a:pPr>
-            <a:r>
-              <a:rPr lang="en-US" sz="2200" dirty="0">
-                <a:latin typeface="Source Code Pro" panose="020B0509030403020204" pitchFamily="49" charset="0"/>
-                <a:ea typeface="Source Code Pro" panose="020B0509030403020204" pitchFamily="49" charset="0"/>
-              </a:rPr>
-              <a:t>        return k + n</a:t>
-            </a:r>
-          </a:p>
-          <a:p>
-            <a:pPr marL="0" indent="0">
-              <a:buNone/>
-            </a:pPr>
-            <a:r>
-              <a:rPr lang="en-US" sz="2200" dirty="0">
-                <a:latin typeface="Source Code Pro" panose="020B0509030403020204" pitchFamily="49" charset="0"/>
-                <a:ea typeface="Source Code Pro" panose="020B0509030403020204" pitchFamily="49" charset="0"/>
-              </a:rPr>
-              <a:t>    return adder</a:t>
-            </a:r>
-          </a:p>
-          <a:p>
-            <a:pPr marL="0" indent="0">
-              <a:buNone/>
-            </a:pPr>
-            <a:endParaRPr lang="en-US" sz="2200" dirty="0">
-              <a:latin typeface="Source Code Pro" panose="020B0509030403020204" pitchFamily="49" charset="0"/>
-              <a:ea typeface="Source Code Pro" panose="020B0509030403020204" pitchFamily="49" charset="0"/>
-            </a:endParaRPr>
-          </a:p>
-          <a:p>
-            <a:pPr marL="0" indent="0">
-              <a:buNone/>
-            </a:pPr>
-            <a:r>
-              <a:rPr lang="en-US" sz="2200" dirty="0">
-                <a:latin typeface="Source Code Pro" panose="020B0509030403020204" pitchFamily="49" charset="0"/>
-                <a:ea typeface="Source Code Pro" panose="020B0509030403020204" pitchFamily="49" charset="0"/>
-              </a:rPr>
-              <a:t>n = 10    </a:t>
-            </a:r>
-          </a:p>
-          <a:p>
-            <a:pPr marL="0" indent="0">
-              <a:buNone/>
-            </a:pPr>
-            <a:r>
-              <a:rPr lang="en-US" sz="2200" dirty="0">
-                <a:latin typeface="Source Code Pro" panose="020B0509030403020204" pitchFamily="49" charset="0"/>
-                <a:ea typeface="Source Code Pro" panose="020B0509030403020204" pitchFamily="49" charset="0"/>
-              </a:rPr>
-              <a:t>add_2 = </a:t>
-            </a:r>
-            <a:r>
-              <a:rPr lang="en-US" sz="2200" dirty="0" err="1">
-                <a:latin typeface="Source Code Pro" panose="020B0509030403020204" pitchFamily="49" charset="0"/>
-                <a:ea typeface="Source Code Pro" panose="020B0509030403020204" pitchFamily="49" charset="0"/>
-              </a:rPr>
-              <a:t>make_adder</a:t>
-            </a:r>
-            <a:r>
-              <a:rPr lang="en-US" sz="2200" dirty="0">
-                <a:latin typeface="Source Code Pro" panose="020B0509030403020204" pitchFamily="49" charset="0"/>
-                <a:ea typeface="Source Code Pro" panose="020B0509030403020204" pitchFamily="49" charset="0"/>
-              </a:rPr>
-              <a:t>(2)</a:t>
-            </a:r>
-          </a:p>
-          <a:p>
-            <a:pPr marL="0" indent="0">
-              <a:buNone/>
-            </a:pPr>
-            <a:r>
-              <a:rPr lang="en-US" sz="2200" dirty="0">
-                <a:latin typeface="Source Code Pro" panose="020B0509030403020204" pitchFamily="49" charset="0"/>
-                <a:ea typeface="Source Code Pro" panose="020B0509030403020204" pitchFamily="49" charset="0"/>
-              </a:rPr>
-              <a:t>x = add_2(5)</a:t>
-            </a:r>
-            <a:endParaRPr lang="en-US" sz="2200" dirty="0">
-              <a:solidFill>
-                <a:schemeClr val="bg1">
-                  <a:lumMod val="50000"/>
-                </a:schemeClr>
-              </a:solidFill>
-              <a:latin typeface="Source Code Pro" panose="020B0509030403020204" pitchFamily="49" charset="0"/>
-              <a:ea typeface="Source Code Pro" panose="020B0509030403020204" pitchFamily="49" charset="0"/>
-            </a:endParaRPr>
-          </a:p>
-        </p:txBody>
-      </p:sp>
-      <p:sp>
-        <p:nvSpPr>
-          <p:cNvPr id="5" name="Footer Placeholder 3">
-            <a:extLst>
-              <a:ext uri="{FF2B5EF4-FFF2-40B4-BE49-F238E27FC236}">
-                <a16:creationId xmlns:a16="http://schemas.microsoft.com/office/drawing/2014/main" id="{677B590B-530D-43F7-EACB-A4315211A94E}"/>
-              </a:ext>
-            </a:extLst>
-          </p:cNvPr>
-          <p:cNvSpPr>
-            <a:spLocks noGrp="1"/>
-          </p:cNvSpPr>
-          <p:nvPr>
-            <p:ph type="ftr" sz="quarter" idx="10"/>
-          </p:nvPr>
-        </p:nvSpPr>
-        <p:spPr>
-          <a:xfrm>
-            <a:off x="4038599" y="6356350"/>
-            <a:ext cx="4348655" cy="365125"/>
-          </a:xfrm>
-        </p:spPr>
-        <p:txBody>
-          <a:bodyPr/>
-          <a:lstStyle/>
-          <a:p>
-            <a:r>
-              <a:rPr lang="en-US" dirty="0"/>
-              <a:t>Michael Ball | UC Berkeley | https://c88c.org | © CC BY-NC-SA</a:t>
-            </a:r>
-          </a:p>
-        </p:txBody>
-      </p:sp>
-    </p:spTree>
-    <p:extLst>
-      <p:ext uri="{BB962C8B-B14F-4D97-AF65-F5344CB8AC3E}">
-        <p14:creationId xmlns:p14="http://schemas.microsoft.com/office/powerpoint/2010/main" val="1613526114"/>
-      </p:ext>
-    </p:extLst>
-  </p:cSld>
-  <p:clrMapOvr>
-    <a:masterClrMapping/>
-  </p:clrMapOvr>
-</p:sld>
-</file>
-
 <file path=ppt/slides/slide18.xml><?xml version="1.0" encoding="utf-8"?>
 <p:sld xmlns:a="http://schemas.openxmlformats.org/drawingml/2006/main" xmlns:r="http://schemas.openxmlformats.org/officeDocument/2006/relationships" xmlns:p="http://schemas.openxmlformats.org/presentationml/2006/main">
   <p:cSld>
@@ -12536,7 +12387,7 @@
           <a:p>
             <a:r>
               <a:rPr lang="en-US" dirty="0"/>
-              <a:t>Python Tutor Example #2</a:t>
+              <a:t>Python Tutor Example #1</a:t>
             </a:r>
           </a:p>
         </p:txBody>
@@ -12557,7 +12408,12 @@
             <p:ph idx="1"/>
           </p:nvPr>
         </p:nvSpPr>
-        <p:spPr/>
+        <p:spPr>
+          <a:xfrm>
+            <a:off x="533399" y="1066800"/>
+            <a:ext cx="11225011" cy="5257800"/>
+          </a:xfrm>
+        </p:spPr>
         <p:txBody>
           <a:bodyPr/>
           <a:lstStyle/>
@@ -12570,19 +12426,21 @@
                 <a:latin typeface="Source Code Pro" panose="020B0509030403020204" pitchFamily="49" charset="0"/>
                 <a:ea typeface="Source Code Pro" panose="020B0509030403020204" pitchFamily="49" charset="0"/>
               </a:rPr>
-              <a:t>a = "chipotle"</a:t>
-            </a:r>
-          </a:p>
-          <a:p>
-            <a:pPr marL="0" indent="0">
-              <a:buNone/>
-            </a:pPr>
+              <a:t>def </a:t>
+            </a:r>
+            <a:r>
+              <a:rPr lang="en-US" sz="2200" dirty="0" err="1">
+                <a:latin typeface="Source Code Pro" panose="020B0509030403020204" pitchFamily="49" charset="0"/>
+                <a:ea typeface="Source Code Pro" panose="020B0509030403020204" pitchFamily="49" charset="0"/>
+              </a:rPr>
+              <a:t>make_adder</a:t>
+            </a:r>
             <a:r>
               <a:rPr lang="en-US" sz="2200" dirty="0">
                 <a:latin typeface="Source Code Pro" panose="020B0509030403020204" pitchFamily="49" charset="0"/>
                 <a:ea typeface="Source Code Pro" panose="020B0509030403020204" pitchFamily="49" charset="0"/>
               </a:rPr>
-              <a:t>b = 5 &gt; 3</a:t>
+              <a:t>(n):</a:t>
             </a:r>
           </a:p>
           <a:p>
@@ -12594,7 +12452,31 @@
                 <a:latin typeface="Source Code Pro" panose="020B0509030403020204" pitchFamily="49" charset="0"/>
                 <a:ea typeface="Source Code Pro" panose="020B0509030403020204" pitchFamily="49" charset="0"/>
               </a:rPr>
-              <a:t>c = 8</a:t>
+              <a:t>    def adder(k):</a:t>
+            </a:r>
+          </a:p>
+          <a:p>
+            <a:pPr marL="0" indent="0">
+              <a:buNone/>
+            </a:pPr>
+            <a:r>
+              <a:rPr lang="en-US" sz="2200" dirty="0">
+                <a:latin typeface="Source Code Pro" panose="020B0509030403020204" pitchFamily="49" charset="0"/>
+                <a:ea typeface="Source Code Pro" panose="020B0509030403020204" pitchFamily="49" charset="0"/>
+              </a:rPr>
+              <a:t>        return k + n</a:t>
+            </a:r>
+          </a:p>
+          <a:p>
+            <a:pPr marL="0" indent="0">
+              <a:buNone/>
+            </a:pPr>
+            <a:r>
+              <a:rPr lang="en-US" sz="2200" dirty="0">
+                <a:latin typeface="Source Code Pro" panose="020B0509030403020204" pitchFamily="49" charset="0"/>
+                <a:ea typeface="Source Code Pro" panose="020B0509030403020204" pitchFamily="49" charset="0"/>
+              </a:rPr>
+              <a:t>    return adder</a:t>
             </a:r>
           </a:p>
           <a:p>
@@ -12615,7 +12497,7 @@
                 <a:latin typeface="Source Code Pro" panose="020B0509030403020204" pitchFamily="49" charset="0"/>
                 <a:ea typeface="Source Code Pro" panose="020B0509030403020204" pitchFamily="49" charset="0"/>
               </a:rPr>
-              <a:t>def foo(c):</a:t>
+              <a:t>n = 10    </a:t>
             </a:r>
           </a:p>
           <a:p>
@@ -12627,28 +12509,21 @@
                 <a:latin typeface="Source Code Pro" panose="020B0509030403020204" pitchFamily="49" charset="0"/>
                 <a:ea typeface="Source Code Pro" panose="020B0509030403020204" pitchFamily="49" charset="0"/>
               </a:rPr>
-              <a:t>    return c - 5</a:t>
-            </a:r>
-          </a:p>
-          <a:p>
-            <a:pPr marL="0" indent="0">
-              <a:buNone/>
-            </a:pPr>
-            <a:endParaRPr lang="en-US" sz="2200" dirty="0">
-              <a:latin typeface="Source Code Pro" panose="020B0509030403020204" pitchFamily="49" charset="0"/>
-              <a:ea typeface="Source Code Pro" panose="020B0509030403020204" pitchFamily="49" charset="0"/>
-            </a:endParaRPr>
-          </a:p>
-          <a:p>
-            <a:pPr marL="0" indent="0">
-              <a:buNone/>
-            </a:pPr>
+              <a:t>add_2 = </a:t>
+            </a:r>
+            <a:r>
+              <a:rPr lang="en-US" sz="2200" dirty="0" err="1">
+                <a:latin typeface="Source Code Pro" panose="020B0509030403020204" pitchFamily="49" charset="0"/>
+                <a:ea typeface="Source Code Pro" panose="020B0509030403020204" pitchFamily="49" charset="0"/>
+              </a:rPr>
+              <a:t>make_adder</a:t>
+            </a:r>
             <a:r>
               <a:rPr lang="en-US" sz="2200" dirty="0">
                 <a:latin typeface="Source Code Pro" panose="020B0509030403020204" pitchFamily="49" charset="0"/>
                 <a:ea typeface="Source Code Pro" panose="020B0509030403020204" pitchFamily="49" charset="0"/>
               </a:rPr>
-              <a:t>def bar():</a:t>
+              <a:t>(2)</a:t>
             </a:r>
           </a:p>
           <a:p>
@@ -12660,54 +12535,18 @@
                 <a:latin typeface="Source Code Pro" panose="020B0509030403020204" pitchFamily="49" charset="0"/>
                 <a:ea typeface="Source Code Pro" panose="020B0509030403020204" pitchFamily="49" charset="0"/>
               </a:rPr>
-              <a:t>    if b:</a:t>
-            </a:r>
-          </a:p>
-          <a:p>
-            <a:pPr marL="0" indent="0">
-              <a:buNone/>
-            </a:pPr>
-            <a:r>
-              <a:rPr lang="en-US" sz="2200" dirty="0">
-                <a:latin typeface="Source Code Pro" panose="020B0509030403020204" pitchFamily="49" charset="0"/>
-                <a:ea typeface="Source Code Pro" panose="020B0509030403020204" pitchFamily="49" charset="0"/>
-              </a:rPr>
-              <a:t>        a = "taco bell"</a:t>
-            </a:r>
-          </a:p>
-          <a:p>
-            <a:pPr marL="0" indent="0">
-              <a:buNone/>
-            </a:pPr>
+              <a:t>x = add_2(5)</a:t>
+            </a:r>
             <a:endParaRPr lang="en-US" sz="2200" dirty="0">
+              <a:solidFill>
+                <a:schemeClr val="bg1">
+                  <a:lumMod val="50000"/>
+                </a:schemeClr>
+              </a:solidFill>
               <a:latin typeface="Source Code Pro" panose="020B0509030403020204" pitchFamily="49" charset="0"/>
               <a:ea typeface="Source Code Pro" panose="020B0509030403020204" pitchFamily="49" charset="0"/>
             </a:endParaRPr>
           </a:p>
-          <a:p>
-            <a:pPr marL="0" indent="0">
-              <a:buNone/>
-            </a:pPr>
-            <a:r>
-              <a:rPr lang="en-US" sz="2200" dirty="0">
-                <a:latin typeface="Source Code Pro" panose="020B0509030403020204" pitchFamily="49" charset="0"/>
-                <a:ea typeface="Source Code Pro" panose="020B0509030403020204" pitchFamily="49" charset="0"/>
-              </a:rPr>
-              <a:t>result1 = foo(10)</a:t>
-            </a:r>
-          </a:p>
-          <a:p>
-            <a:pPr marL="0" indent="0">
-              <a:buNone/>
-            </a:pPr>
-            <a:r>
-              <a:rPr lang="en-US" sz="2200" dirty="0">
-                <a:latin typeface="Source Code Pro" panose="020B0509030403020204" pitchFamily="49" charset="0"/>
-                <a:ea typeface="Source Code Pro" panose="020B0509030403020204" pitchFamily="49" charset="0"/>
-              </a:rPr>
-              <a:t>result2 = bar()</a:t>
-            </a:r>
-          </a:p>
         </p:txBody>
       </p:sp>
       <p:sp>
@@ -12715,7 +12554,7 @@
           <p:cNvPr id="5" name="Footer Placeholder 3">
             <a:extLst>
               <a:ext uri="{FF2B5EF4-FFF2-40B4-BE49-F238E27FC236}">
-                <a16:creationId xmlns:a16="http://schemas.microsoft.com/office/drawing/2014/main" id="{063CC9AD-AB85-ED1A-8BBF-11586ADBA2A7}"/>
+                <a16:creationId xmlns:a16="http://schemas.microsoft.com/office/drawing/2014/main" id="{677B590B-530D-43F7-EACB-A4315211A94E}"/>
               </a:ext>
             </a:extLst>
           </p:cNvPr>
@@ -12746,7 +12585,7 @@
     </p:spTree>
     <p:extLst>
       <p:ext uri="{BB962C8B-B14F-4D97-AF65-F5344CB8AC3E}">
-        <p14:creationId xmlns:p14="http://schemas.microsoft.com/office/powerpoint/2010/main" val="3096584794"/>
+        <p14:creationId xmlns:p14="http://schemas.microsoft.com/office/powerpoint/2010/main" val="1613526114"/>
       </p:ext>
     </p:extLst>
   </p:cSld>
@@ -12778,7 +12617,7 @@
           <p:cNvPr id="2" name="Title 1">
             <a:extLst>
               <a:ext uri="{FF2B5EF4-FFF2-40B4-BE49-F238E27FC236}">
-                <a16:creationId xmlns:a16="http://schemas.microsoft.com/office/drawing/2014/main" id="{80893AED-AB1E-9F40-BE86-23A4ED91A56E}"/>
+                <a16:creationId xmlns:a16="http://schemas.microsoft.com/office/drawing/2014/main" id="{3240DA3F-5262-644A-8A04-EDF80650B9C2}"/>
               </a:ext>
             </a:extLst>
           </p:cNvPr>
@@ -12796,7 +12635,7 @@
           <a:p>
             <a:r>
               <a:rPr lang="en-US" dirty="0"/>
-              <a:t>Python Tutor Example #3</a:t>
+              <a:t>Python Tutor Example #2</a:t>
             </a:r>
           </a:p>
         </p:txBody>
@@ -12806,7 +12645,7 @@
           <p:cNvPr id="3" name="Content Placeholder 2">
             <a:extLst>
               <a:ext uri="{FF2B5EF4-FFF2-40B4-BE49-F238E27FC236}">
-                <a16:creationId xmlns:a16="http://schemas.microsoft.com/office/drawing/2014/main" id="{96930B3E-847A-CF45-BFCB-5C129A38C53F}"/>
+                <a16:creationId xmlns:a16="http://schemas.microsoft.com/office/drawing/2014/main" id="{284F9A36-1B36-EA49-B322-395902ACCA87}"/>
               </a:ext>
             </a:extLst>
           </p:cNvPr>
@@ -12826,53 +12665,122 @@
               <a:buNone/>
             </a:pPr>
             <a:r>
-              <a:rPr lang="en-US" dirty="0">
-                <a:latin typeface="Source Code Pro" panose="020B0509030403020204" pitchFamily="49" charset="77"/>
+              <a:rPr lang="en-US" sz="2200" dirty="0">
+                <a:latin typeface="Source Code Pro" panose="020B0509030403020204" pitchFamily="49" charset="0"/>
+                <a:ea typeface="Source Code Pro" panose="020B0509030403020204" pitchFamily="49" charset="0"/>
               </a:rPr>
-              <a:t>add_2 = </a:t>
-            </a:r>
-            <a:r>
-              <a:rPr lang="en-US" dirty="0" err="1">
-                <a:latin typeface="Source Code Pro" panose="020B0509030403020204" pitchFamily="49" charset="77"/>
+              <a:t>a = "chipotle"</a:t>
+            </a:r>
+          </a:p>
+          <a:p>
+            <a:pPr marL="0" indent="0">
+              <a:buNone/>
+            </a:pPr>
+            <a:r>
+              <a:rPr lang="en-US" sz="2200" dirty="0">
+                <a:latin typeface="Source Code Pro" panose="020B0509030403020204" pitchFamily="49" charset="0"/>
+                <a:ea typeface="Source Code Pro" panose="020B0509030403020204" pitchFamily="49" charset="0"/>
               </a:rPr>
-              <a:t>make_adder</a:t>
-            </a:r>
-            <a:r>
-              <a:rPr lang="en-US" dirty="0">
-                <a:latin typeface="Source Code Pro" panose="020B0509030403020204" pitchFamily="49" charset="77"/>
+              <a:t>b = 5 &gt; 3</a:t>
+            </a:r>
+          </a:p>
+          <a:p>
+            <a:pPr marL="0" indent="0">
+              <a:buNone/>
+            </a:pPr>
+            <a:r>
+              <a:rPr lang="en-US" sz="2200" dirty="0">
+                <a:latin typeface="Source Code Pro" panose="020B0509030403020204" pitchFamily="49" charset="0"/>
+                <a:ea typeface="Source Code Pro" panose="020B0509030403020204" pitchFamily="49" charset="0"/>
               </a:rPr>
-              <a:t>(2)</a:t>
+              <a:t>c = 8</a:t>
             </a:r>
           </a:p>
           <a:p>
             <a:pPr marL="0" indent="0">
               <a:buNone/>
             </a:pPr>
-            <a:r>
-              <a:rPr lang="en-US" dirty="0">
-                <a:latin typeface="Source Code Pro" panose="020B0509030403020204" pitchFamily="49" charset="77"/>
+            <a:endParaRPr lang="en-US" sz="2200" dirty="0">
+              <a:latin typeface="Source Code Pro" panose="020B0509030403020204" pitchFamily="49" charset="0"/>
+              <a:ea typeface="Source Code Pro" panose="020B0509030403020204" pitchFamily="49" charset="0"/>
+            </a:endParaRPr>
+          </a:p>
+          <a:p>
+            <a:pPr marL="0" indent="0">
+              <a:buNone/>
+            </a:pPr>
+            <a:r>
+              <a:rPr lang="en-US" sz="2200" dirty="0">
+                <a:latin typeface="Source Code Pro" panose="020B0509030403020204" pitchFamily="49" charset="0"/>
+                <a:ea typeface="Source Code Pro" panose="020B0509030403020204" pitchFamily="49" charset="0"/>
               </a:rPr>
-              <a:t>add_3 = </a:t>
-            </a:r>
-            <a:r>
-              <a:rPr lang="en-US" dirty="0" err="1">
-                <a:latin typeface="Source Code Pro" panose="020B0509030403020204" pitchFamily="49" charset="77"/>
+              <a:t>def foo(c):</a:t>
+            </a:r>
+          </a:p>
+          <a:p>
+            <a:pPr marL="0" indent="0">
+              <a:buNone/>
+            </a:pPr>
+            <a:r>
+              <a:rPr lang="en-US" sz="2200" dirty="0">
+                <a:latin typeface="Source Code Pro" panose="020B0509030403020204" pitchFamily="49" charset="0"/>
+                <a:ea typeface="Source Code Pro" panose="020B0509030403020204" pitchFamily="49" charset="0"/>
               </a:rPr>
-              <a:t>make_adder</a:t>
-            </a:r>
-            <a:r>
-              <a:rPr lang="en-US" dirty="0">
-                <a:latin typeface="Source Code Pro" panose="020B0509030403020204" pitchFamily="49" charset="77"/>
+              <a:t>    return c - 5</a:t>
+            </a:r>
+          </a:p>
+          <a:p>
+            <a:pPr marL="0" indent="0">
+              <a:buNone/>
+            </a:pPr>
+            <a:endParaRPr lang="en-US" sz="2200" dirty="0">
+              <a:latin typeface="Source Code Pro" panose="020B0509030403020204" pitchFamily="49" charset="0"/>
+              <a:ea typeface="Source Code Pro" panose="020B0509030403020204" pitchFamily="49" charset="0"/>
+            </a:endParaRPr>
+          </a:p>
+          <a:p>
+            <a:pPr marL="0" indent="0">
+              <a:buNone/>
+            </a:pPr>
+            <a:r>
+              <a:rPr lang="en-US" sz="2200" dirty="0">
+                <a:latin typeface="Source Code Pro" panose="020B0509030403020204" pitchFamily="49" charset="0"/>
+                <a:ea typeface="Source Code Pro" panose="020B0509030403020204" pitchFamily="49" charset="0"/>
               </a:rPr>
-              <a:t>(3)</a:t>
+              <a:t>def bar():</a:t>
             </a:r>
           </a:p>
           <a:p>
             <a:pPr marL="0" indent="0">
               <a:buNone/>
             </a:pPr>
-            <a:endParaRPr lang="en-US" dirty="0">
-              <a:latin typeface="Source Code Pro" panose="020B0509030403020204" pitchFamily="49" charset="77"/>
+            <a:r>
+              <a:rPr lang="en-US" sz="2200" dirty="0">
+                <a:latin typeface="Source Code Pro" panose="020B0509030403020204" pitchFamily="49" charset="0"/>
+                <a:ea typeface="Source Code Pro" panose="020B0509030403020204" pitchFamily="49" charset="0"/>
+              </a:rPr>
+              <a:t>    if b:</a:t>
+            </a:r>
+          </a:p>
+          <a:p>
+            <a:pPr marL="0" indent="0">
+              <a:buNone/>
+            </a:pPr>
+            <a:r>
+              <a:rPr lang="en-US" sz="2200" dirty="0">
+                <a:latin typeface="Source Code Pro" panose="020B0509030403020204" pitchFamily="49" charset="0"/>
+                <a:ea typeface="Source Code Pro" panose="020B0509030403020204" pitchFamily="49" charset="0"/>
+              </a:rPr>
+              <a:t>        a = "taco bell"</a:t>
+            </a:r>
+          </a:p>
+          <a:p>
+            <a:pPr marL="0" indent="0">
+              <a:buNone/>
+            </a:pPr>
+            <a:endParaRPr lang="en-US" sz="2200" dirty="0">
+              <a:latin typeface="Source Code Pro" panose="020B0509030403020204" pitchFamily="49" charset="0"/>
+              <a:ea typeface="Source Code Pro" panose="020B0509030403020204" pitchFamily="49" charset="0"/>
             </a:endParaRPr>
           </a:p>
           <a:p>
@@ -12880,10 +12788,11 @@
               <a:buNone/>
             </a:pPr>
             <a:r>
-              <a:rPr lang="en-US" dirty="0">
-                <a:latin typeface="Source Code Pro" panose="020B0509030403020204" pitchFamily="49" charset="77"/>
+              <a:rPr lang="en-US" sz="2200" dirty="0">
+                <a:latin typeface="Source Code Pro" panose="020B0509030403020204" pitchFamily="49" charset="0"/>
+                <a:ea typeface="Source Code Pro" panose="020B0509030403020204" pitchFamily="49" charset="0"/>
               </a:rPr>
-              <a:t>x = add_2(2)</a:t>
+              <a:t>result1 = foo(10)</a:t>
             </a:r>
           </a:p>
           <a:p>
@@ -12891,65 +12800,11 @@
               <a:buNone/>
             </a:pPr>
             <a:r>
-              <a:rPr lang="en-US" dirty="0">
-                <a:latin typeface="Source Code Pro" panose="020B0509030403020204" pitchFamily="49" charset="77"/>
+              <a:rPr lang="en-US" sz="2200" dirty="0">
+                <a:latin typeface="Source Code Pro" panose="020B0509030403020204" pitchFamily="49" charset="0"/>
+                <a:ea typeface="Source Code Pro" panose="020B0509030403020204" pitchFamily="49" charset="0"/>
               </a:rPr>
-              <a:t>def compose(f, g):</a:t>
-            </a:r>
-          </a:p>
-          <a:p>
-            <a:pPr marL="0" indent="0">
-              <a:buNone/>
-            </a:pPr>
-            <a:r>
-              <a:rPr lang="en-US" dirty="0">
-                <a:latin typeface="Source Code Pro" panose="020B0509030403020204" pitchFamily="49" charset="77"/>
-              </a:rPr>
-              <a:t>    def h(x):</a:t>
-            </a:r>
-          </a:p>
-          <a:p>
-            <a:pPr marL="0" indent="0">
-              <a:buNone/>
-            </a:pPr>
-            <a:r>
-              <a:rPr lang="en-US" dirty="0">
-                <a:latin typeface="Source Code Pro" panose="020B0509030403020204" pitchFamily="49" charset="77"/>
-              </a:rPr>
-              <a:t>        return f(g(x))</a:t>
-            </a:r>
-          </a:p>
-          <a:p>
-            <a:pPr marL="0" indent="0">
-              <a:buNone/>
-            </a:pPr>
-            <a:r>
-              <a:rPr lang="en-US" dirty="0">
-                <a:latin typeface="Source Code Pro" panose="020B0509030403020204" pitchFamily="49" charset="77"/>
-              </a:rPr>
-              <a:t>    return h</a:t>
-            </a:r>
-          </a:p>
-          <a:p>
-            <a:pPr marL="0" indent="0">
-              <a:buNone/>
-            </a:pPr>
-            <a:r>
-              <a:rPr lang="en-US" dirty="0">
-                <a:latin typeface="Source Code Pro" panose="020B0509030403020204" pitchFamily="49" charset="77"/>
-              </a:rPr>
-              <a:t>add_5 = compose(add_2, add_3)</a:t>
-            </a:r>
-          </a:p>
-          <a:p>
-            <a:pPr marL="0" indent="0">
-              <a:buNone/>
-            </a:pPr>
-            <a:r>
-              <a:rPr lang="en-US" dirty="0">
-                <a:latin typeface="Source Code Pro" panose="020B0509030403020204" pitchFamily="49" charset="77"/>
-              </a:rPr>
-              <a:t>z = add_5(x)</a:t>
+              <a:t>result2 = bar()</a:t>
             </a:r>
           </a:p>
         </p:txBody>
@@ -12959,7 +12814,7 @@
           <p:cNvPr id="5" name="Footer Placeholder 3">
             <a:extLst>
               <a:ext uri="{FF2B5EF4-FFF2-40B4-BE49-F238E27FC236}">
-                <a16:creationId xmlns:a16="http://schemas.microsoft.com/office/drawing/2014/main" id="{3AF96BFF-6AF9-AFF8-E585-7AA7162824BC}"/>
+                <a16:creationId xmlns:a16="http://schemas.microsoft.com/office/drawing/2014/main" id="{063CC9AD-AB85-ED1A-8BBF-11586ADBA2A7}"/>
               </a:ext>
             </a:extLst>
           </p:cNvPr>
@@ -12990,7 +12845,7 @@
     </p:spTree>
     <p:extLst>
       <p:ext uri="{BB962C8B-B14F-4D97-AF65-F5344CB8AC3E}">
-        <p14:creationId xmlns:p14="http://schemas.microsoft.com/office/powerpoint/2010/main" val="3318854379"/>
+        <p14:creationId xmlns:p14="http://schemas.microsoft.com/office/powerpoint/2010/main" val="3096584794"/>
       </p:ext>
     </p:extLst>
   </p:cSld>
@@ -13263,7 +13118,7 @@
           <p:cNvPr id="2" name="Title 1">
             <a:extLst>
               <a:ext uri="{FF2B5EF4-FFF2-40B4-BE49-F238E27FC236}">
-                <a16:creationId xmlns:a16="http://schemas.microsoft.com/office/drawing/2014/main" id="{3240DA3F-5262-644A-8A04-EDF80650B9C2}"/>
+                <a16:creationId xmlns:a16="http://schemas.microsoft.com/office/drawing/2014/main" id="{80893AED-AB1E-9F40-BE86-23A4ED91A56E}"/>
               </a:ext>
             </a:extLst>
           </p:cNvPr>
@@ -13281,7 +13136,7 @@
           <a:p>
             <a:r>
               <a:rPr lang="en-US" dirty="0"/>
-              <a:t>Demo</a:t>
+              <a:t>Python Tutor Example #3</a:t>
             </a:r>
           </a:p>
         </p:txBody>
@@ -13291,7 +13146,7 @@
           <p:cNvPr id="3" name="Content Placeholder 2">
             <a:extLst>
               <a:ext uri="{FF2B5EF4-FFF2-40B4-BE49-F238E27FC236}">
-                <a16:creationId xmlns:a16="http://schemas.microsoft.com/office/drawing/2014/main" id="{284F9A36-1B36-EA49-B322-395902ACCA87}"/>
+                <a16:creationId xmlns:a16="http://schemas.microsoft.com/office/drawing/2014/main" id="{96930B3E-847A-CF45-BFCB-5C129A38C53F}"/>
               </a:ext>
             </a:extLst>
           </p:cNvPr>
@@ -13302,12 +13157,7 @@
             <p:ph idx="1"/>
           </p:nvPr>
         </p:nvSpPr>
-        <p:spPr>
-          <a:xfrm>
-            <a:off x="533399" y="1066800"/>
-            <a:ext cx="11225011" cy="5257800"/>
-          </a:xfrm>
-        </p:spPr>
+        <p:spPr/>
         <p:txBody>
           <a:bodyPr/>
           <a:lstStyle/>
@@ -13316,19 +13166,53 @@
               <a:buNone/>
             </a:pPr>
             <a:r>
-              <a:rPr lang="en-US" sz="2400" dirty="0"/>
-              <a:t>Example 1:</a:t>
-            </a:r>
-          </a:p>
-          <a:p>
-            <a:r>
-              <a:rPr lang="en-US" sz="2400" dirty="0">
-                <a:hlinkClick r:id="rId2"/>
+              <a:rPr lang="en-US" dirty="0">
+                <a:latin typeface="Source Code Pro" panose="020B0509030403020204" pitchFamily="49" charset="77"/>
               </a:rPr>
-              <a:t>make_adder Higher Order Function: Environment Diagram Python Tutor Link</a:t>
-            </a:r>
-            <a:endParaRPr lang="en-US" sz="2400" dirty="0">
-              <a:hlinkClick r:id="rId3"/>
+              <a:t>add_2 = </a:t>
+            </a:r>
+            <a:r>
+              <a:rPr lang="en-US" dirty="0" err="1">
+                <a:latin typeface="Source Code Pro" panose="020B0509030403020204" pitchFamily="49" charset="77"/>
+              </a:rPr>
+              <a:t>make_adder</a:t>
+            </a:r>
+            <a:r>
+              <a:rPr lang="en-US" dirty="0">
+                <a:latin typeface="Source Code Pro" panose="020B0509030403020204" pitchFamily="49" charset="77"/>
+              </a:rPr>
+              <a:t>(2)</a:t>
+            </a:r>
+          </a:p>
+          <a:p>
+            <a:pPr marL="0" indent="0">
+              <a:buNone/>
+            </a:pPr>
+            <a:r>
+              <a:rPr lang="en-US" dirty="0">
+                <a:latin typeface="Source Code Pro" panose="020B0509030403020204" pitchFamily="49" charset="77"/>
+              </a:rPr>
+              <a:t>add_3 = </a:t>
+            </a:r>
+            <a:r>
+              <a:rPr lang="en-US" dirty="0" err="1">
+                <a:latin typeface="Source Code Pro" panose="020B0509030403020204" pitchFamily="49" charset="77"/>
+              </a:rPr>
+              <a:t>make_adder</a:t>
+            </a:r>
+            <a:r>
+              <a:rPr lang="en-US" dirty="0">
+                <a:latin typeface="Source Code Pro" panose="020B0509030403020204" pitchFamily="49" charset="77"/>
+              </a:rPr>
+              <a:t>(3)</a:t>
+            </a:r>
+          </a:p>
+          <a:p>
+            <a:pPr marL="0" indent="0">
+              <a:buNone/>
+            </a:pPr>
+            <a:endParaRPr lang="en-US" dirty="0">
+              <a:latin typeface="Source Code Pro" panose="020B0509030403020204" pitchFamily="49" charset="77"/>
             </a:endParaRPr>
           </a:p>
           <a:p>
@@ -13336,60 +13220,86 @@
               <a:buNone/>
             </a:pPr>
             <a:r>
-              <a:rPr lang="en-US" sz="2400" dirty="0"/>
-              <a:t>Example 2:</a:t>
-            </a:r>
-            <a:endParaRPr lang="en-US" sz="2400" dirty="0">
-              <a:hlinkClick r:id="rId3"/>
-            </a:endParaRPr>
-          </a:p>
-          <a:p>
-            <a:r>
-              <a:rPr lang="en-US" sz="2400" dirty="0">
-                <a:solidFill>
-                  <a:schemeClr val="tx1">
-                    <a:lumMod val="95000"/>
-                    <a:lumOff val="5000"/>
-                  </a:schemeClr>
-                </a:solidFill>
-                <a:hlinkClick r:id="rId4"/>
+              <a:rPr lang="en-US" dirty="0">
+                <a:latin typeface="Source Code Pro" panose="020B0509030403020204" pitchFamily="49" charset="77"/>
               </a:rPr>
-              <a:t>Primitives and Functions: Environment Diagram Python Tutor</a:t>
-            </a:r>
-            <a:r>
-              <a:rPr lang="en-US" sz="2400" dirty="0">
-                <a:hlinkClick r:id="rId4"/>
+              <a:t>x = add_2(2)</a:t>
+            </a:r>
+          </a:p>
+          <a:p>
+            <a:pPr marL="0" indent="0">
+              <a:buNone/>
+            </a:pPr>
+            <a:r>
+              <a:rPr lang="en-US" dirty="0">
+                <a:latin typeface="Source Code Pro" panose="020B0509030403020204" pitchFamily="49" charset="77"/>
               </a:rPr>
-              <a:t>:</a:t>
-            </a:r>
-            <a:endParaRPr lang="en-US" sz="2400" dirty="0"/>
+              <a:t>def compose(f, g):</a:t>
+            </a:r>
           </a:p>
           <a:p>
             <a:pPr marL="0" indent="0">
               <a:buNone/>
             </a:pPr>
             <a:r>
-              <a:rPr lang="en-US" sz="2400" dirty="0"/>
-              <a:t>Example 3:</a:t>
-            </a:r>
-          </a:p>
-          <a:p>
-            <a:r>
-              <a:rPr lang="en-US" sz="2400" dirty="0">
-                <a:hlinkClick r:id="rId5"/>
+              <a:rPr lang="en-US" dirty="0">
+                <a:latin typeface="Source Code Pro" panose="020B0509030403020204" pitchFamily="49" charset="77"/>
               </a:rPr>
-              <a:t>Compose Python Tutor Link</a:t>
-            </a:r>
-            <a:endParaRPr lang="en-US" sz="2400" dirty="0"/>
-          </a:p>
-        </p:txBody>
-      </p:sp>
-      <p:sp>
-        <p:nvSpPr>
-          <p:cNvPr id="4" name="Footer Placeholder 3">
+              <a:t>    def h(x):</a:t>
+            </a:r>
+          </a:p>
+          <a:p>
+            <a:pPr marL="0" indent="0">
+              <a:buNone/>
+            </a:pPr>
+            <a:r>
+              <a:rPr lang="en-US" dirty="0">
+                <a:latin typeface="Source Code Pro" panose="020B0509030403020204" pitchFamily="49" charset="77"/>
+              </a:rPr>
+              <a:t>        return f(g(x))</a:t>
+            </a:r>
+          </a:p>
+          <a:p>
+            <a:pPr marL="0" indent="0">
+              <a:buNone/>
+            </a:pPr>
+            <a:r>
+              <a:rPr lang="en-US" dirty="0">
+                <a:latin typeface="Source Code Pro" panose="020B0509030403020204" pitchFamily="49" charset="77"/>
+              </a:rPr>
+              <a:t>    return h</a:t>
+            </a:r>
+          </a:p>
+          <a:p>
+            <a:pPr marL="0" indent="0">
+              <a:buNone/>
+            </a:pPr>
+            <a:r>
+              <a:rPr lang="en-US" dirty="0">
+                <a:latin typeface="Source Code Pro" panose="020B0509030403020204" pitchFamily="49" charset="77"/>
+              </a:rPr>
+              <a:t>add_5 = compose(add_2, add_3)</a:t>
+            </a:r>
+          </a:p>
+          <a:p>
+            <a:pPr marL="0" indent="0">
+              <a:buNone/>
+            </a:pPr>
+            <a:r>
+              <a:rPr lang="en-US" dirty="0">
+                <a:latin typeface="Source Code Pro" panose="020B0509030403020204" pitchFamily="49" charset="77"/>
+              </a:rPr>
+              <a:t>z = add_5(x)</a:t>
+            </a:r>
+          </a:p>
+        </p:txBody>
+      </p:sp>
+      <p:sp>
+        <p:nvSpPr>
+          <p:cNvPr id="5" name="Footer Placeholder 3">
             <a:extLst>
               <a:ext uri="{FF2B5EF4-FFF2-40B4-BE49-F238E27FC236}">
-                <a16:creationId xmlns:a16="http://schemas.microsoft.com/office/drawing/2014/main" id="{F98321EF-8CA7-4B88-C14F-0290A39B3BC4}"/>
+                <a16:creationId xmlns:a16="http://schemas.microsoft.com/office/drawing/2014/main" id="{3AF96BFF-6AF9-AFF8-E585-7AA7162824BC}"/>
               </a:ext>
             </a:extLst>
           </p:cNvPr>
@@ -13420,7 +13330,7 @@
     </p:spTree>
     <p:extLst>
       <p:ext uri="{BB962C8B-B14F-4D97-AF65-F5344CB8AC3E}">
-        <p14:creationId xmlns:p14="http://schemas.microsoft.com/office/powerpoint/2010/main" val="776121693"/>
+        <p14:creationId xmlns:p14="http://schemas.microsoft.com/office/powerpoint/2010/main" val="3318854379"/>
       </p:ext>
     </p:extLst>
   </p:cSld>
@@ -13452,6 +13362,195 @@
           <p:cNvPr id="2" name="Title 1">
             <a:extLst>
               <a:ext uri="{FF2B5EF4-FFF2-40B4-BE49-F238E27FC236}">
+                <a16:creationId xmlns:a16="http://schemas.microsoft.com/office/drawing/2014/main" id="{3240DA3F-5262-644A-8A04-EDF80650B9C2}"/>
+              </a:ext>
+            </a:extLst>
+          </p:cNvPr>
+          <p:cNvSpPr>
+            <a:spLocks noGrp="1"/>
+          </p:cNvSpPr>
+          <p:nvPr>
+            <p:ph type="title"/>
+          </p:nvPr>
+        </p:nvSpPr>
+        <p:spPr/>
+        <p:txBody>
+          <a:bodyPr/>
+          <a:lstStyle/>
+          <a:p>
+            <a:r>
+              <a:rPr lang="en-US" dirty="0"/>
+              <a:t>Demo</a:t>
+            </a:r>
+          </a:p>
+        </p:txBody>
+      </p:sp>
+      <p:sp>
+        <p:nvSpPr>
+          <p:cNvPr id="3" name="Content Placeholder 2">
+            <a:extLst>
+              <a:ext uri="{FF2B5EF4-FFF2-40B4-BE49-F238E27FC236}">
+                <a16:creationId xmlns:a16="http://schemas.microsoft.com/office/drawing/2014/main" id="{284F9A36-1B36-EA49-B322-395902ACCA87}"/>
+              </a:ext>
+            </a:extLst>
+          </p:cNvPr>
+          <p:cNvSpPr>
+            <a:spLocks noGrp="1"/>
+          </p:cNvSpPr>
+          <p:nvPr>
+            <p:ph idx="1"/>
+          </p:nvPr>
+        </p:nvSpPr>
+        <p:spPr>
+          <a:xfrm>
+            <a:off x="533399" y="1066800"/>
+            <a:ext cx="11225011" cy="5257800"/>
+          </a:xfrm>
+        </p:spPr>
+        <p:txBody>
+          <a:bodyPr/>
+          <a:lstStyle/>
+          <a:p>
+            <a:pPr marL="0" indent="0">
+              <a:buNone/>
+            </a:pPr>
+            <a:r>
+              <a:rPr lang="en-US" sz="2400" dirty="0"/>
+              <a:t>Example 1:</a:t>
+            </a:r>
+          </a:p>
+          <a:p>
+            <a:r>
+              <a:rPr lang="en-US" sz="2400" dirty="0">
+                <a:hlinkClick r:id="rId2"/>
+              </a:rPr>
+              <a:t>make_adder Higher Order Function: Environment Diagram Python Tutor Link</a:t>
+            </a:r>
+            <a:endParaRPr lang="en-US" sz="2400" dirty="0">
+              <a:hlinkClick r:id="rId3"/>
+            </a:endParaRPr>
+          </a:p>
+          <a:p>
+            <a:pPr marL="0" indent="0">
+              <a:buNone/>
+            </a:pPr>
+            <a:r>
+              <a:rPr lang="en-US" sz="2400" dirty="0"/>
+              <a:t>Example 2:</a:t>
+            </a:r>
+            <a:endParaRPr lang="en-US" sz="2400" dirty="0">
+              <a:hlinkClick r:id="rId3"/>
+            </a:endParaRPr>
+          </a:p>
+          <a:p>
+            <a:r>
+              <a:rPr lang="en-US" sz="2400" dirty="0">
+                <a:solidFill>
+                  <a:schemeClr val="tx1">
+                    <a:lumMod val="95000"/>
+                    <a:lumOff val="5000"/>
+                  </a:schemeClr>
+                </a:solidFill>
+                <a:hlinkClick r:id="rId4"/>
+              </a:rPr>
+              <a:t>Primitives and Functions: Environment Diagram Python Tutor</a:t>
+            </a:r>
+            <a:r>
+              <a:rPr lang="en-US" sz="2400" dirty="0">
+                <a:hlinkClick r:id="rId4"/>
+              </a:rPr>
+              <a:t>:</a:t>
+            </a:r>
+            <a:endParaRPr lang="en-US" sz="2400" dirty="0"/>
+          </a:p>
+          <a:p>
+            <a:pPr marL="0" indent="0">
+              <a:buNone/>
+            </a:pPr>
+            <a:r>
+              <a:rPr lang="en-US" sz="2400" dirty="0"/>
+              <a:t>Example 3:</a:t>
+            </a:r>
+          </a:p>
+          <a:p>
+            <a:r>
+              <a:rPr lang="en-US" sz="2400" dirty="0">
+                <a:hlinkClick r:id="rId5"/>
+              </a:rPr>
+              <a:t>Compose Python Tutor Link</a:t>
+            </a:r>
+            <a:endParaRPr lang="en-US" sz="2400" dirty="0"/>
+          </a:p>
+        </p:txBody>
+      </p:sp>
+      <p:sp>
+        <p:nvSpPr>
+          <p:cNvPr id="4" name="Footer Placeholder 3">
+            <a:extLst>
+              <a:ext uri="{FF2B5EF4-FFF2-40B4-BE49-F238E27FC236}">
+                <a16:creationId xmlns:a16="http://schemas.microsoft.com/office/drawing/2014/main" id="{F98321EF-8CA7-4B88-C14F-0290A39B3BC4}"/>
+              </a:ext>
+            </a:extLst>
+          </p:cNvPr>
+          <p:cNvSpPr>
+            <a:spLocks noGrp="1"/>
+          </p:cNvSpPr>
+          <p:nvPr>
+            <p:ph type="ftr" sz="quarter" idx="10"/>
+          </p:nvPr>
+        </p:nvSpPr>
+        <p:spPr>
+          <a:xfrm>
+            <a:off x="4038599" y="6356350"/>
+            <a:ext cx="4348655" cy="365125"/>
+          </a:xfrm>
+        </p:spPr>
+        <p:txBody>
+          <a:bodyPr/>
+          <a:lstStyle/>
+          <a:p>
+            <a:r>
+              <a:rPr lang="en-US" dirty="0"/>
+              <a:t>Michael Ball | UC Berkeley | https://c88c.org | © CC BY-NC-SA</a:t>
+            </a:r>
+          </a:p>
+        </p:txBody>
+      </p:sp>
+    </p:spTree>
+    <p:extLst>
+      <p:ext uri="{BB962C8B-B14F-4D97-AF65-F5344CB8AC3E}">
+        <p14:creationId xmlns:p14="http://schemas.microsoft.com/office/powerpoint/2010/main" val="776121693"/>
+      </p:ext>
+    </p:extLst>
+  </p:cSld>
+  <p:clrMapOvr>
+    <a:masterClrMapping/>
+  </p:clrMapOvr>
+</p:sld>
+</file>
+
+<file path=ppt/slides/slide22.xml><?xml version="1.0" encoding="utf-8"?>
+<p:sld xmlns:a="http://schemas.openxmlformats.org/drawingml/2006/main" xmlns:r="http://schemas.openxmlformats.org/officeDocument/2006/relationships" xmlns:p="http://schemas.openxmlformats.org/presentationml/2006/main">
+  <p:cSld>
+    <p:spTree>
+      <p:nvGrpSpPr>
+        <p:cNvPr id="1" name=""/>
+        <p:cNvGrpSpPr/>
+        <p:nvPr/>
+      </p:nvGrpSpPr>
+      <p:grpSpPr>
+        <a:xfrm>
+          <a:off x="0" y="0"/>
+          <a:ext cx="0" cy="0"/>
+          <a:chOff x="0" y="0"/>
+          <a:chExt cx="0" cy="0"/>
+        </a:xfrm>
+      </p:grpSpPr>
+      <p:sp>
+        <p:nvSpPr>
+          <p:cNvPr id="2" name="Title 1">
+            <a:extLst>
+              <a:ext uri="{FF2B5EF4-FFF2-40B4-BE49-F238E27FC236}">
                 <a16:creationId xmlns:a16="http://schemas.microsoft.com/office/drawing/2014/main" id="{3D058CAE-0705-B045-AD80-3D6241BFCD42}"/>
               </a:ext>
             </a:extLst>
@@ -13609,7 +13708,7 @@
 </p:sld>
 </file>
 
-<file path=ppt/slides/slide22.xml><?xml version="1.0" encoding="utf-8"?>
+<file path=ppt/slides/slide23.xml><?xml version="1.0" encoding="utf-8"?>
 <p:sld xmlns:a="http://schemas.openxmlformats.org/drawingml/2006/main" xmlns:r="http://schemas.openxmlformats.org/officeDocument/2006/relationships" xmlns:p="http://schemas.openxmlformats.org/presentationml/2006/main">
   <p:cSld>
     <p:spTree>
@@ -14286,7 +14385,13 @@
   <p:cSld>
     <p:spTree>
       <p:nvGrpSpPr>
-        <p:cNvPr id="1" name=""/>
+        <p:cNvPr id="1" name="">
+          <a:extLst>
+            <a:ext uri="{FF2B5EF4-FFF2-40B4-BE49-F238E27FC236}">
+              <a16:creationId xmlns:a16="http://schemas.microsoft.com/office/drawing/2014/main" id="{A768A0B0-EAEB-7905-1F60-F9148C696D49}"/>
+            </a:ext>
+          </a:extLst>
+        </p:cNvPr>
         <p:cNvGrpSpPr/>
         <p:nvPr/>
       </p:nvGrpSpPr>
@@ -14303,7 +14408,7 @@
           <p:cNvPr id="2" name="Title 1">
             <a:extLst>
               <a:ext uri="{FF2B5EF4-FFF2-40B4-BE49-F238E27FC236}">
-                <a16:creationId xmlns:a16="http://schemas.microsoft.com/office/drawing/2014/main" id="{D78DEC67-149D-7747-87F3-D940F8EF2C93}"/>
+                <a16:creationId xmlns:a16="http://schemas.microsoft.com/office/drawing/2014/main" id="{36BF7D64-DB76-409A-E65C-17B3CCF92268}"/>
               </a:ext>
             </a:extLst>
           </p:cNvPr>
@@ -14321,17 +14426,80 @@
           <a:p>
             <a:r>
               <a:rPr lang="en-US" dirty="0"/>
-              <a:t>Today’s Task: Acronym</a:t>
-            </a:r>
-          </a:p>
-        </p:txBody>
-      </p:sp>
-      <p:sp>
-        <p:nvSpPr>
-          <p:cNvPr id="3" name="Footer Placeholder 3">
+              <a:t>Functional Sequence (List) Operations</a:t>
+            </a:r>
+          </a:p>
+        </p:txBody>
+      </p:sp>
+      <p:sp>
+        <p:nvSpPr>
+          <p:cNvPr id="3" name="Content Placeholder 2">
             <a:extLst>
               <a:ext uri="{FF2B5EF4-FFF2-40B4-BE49-F238E27FC236}">
-                <a16:creationId xmlns:a16="http://schemas.microsoft.com/office/drawing/2014/main" id="{945EF9C5-F59D-F53F-E807-CF0E2DF60EA6}"/>
+                <a16:creationId xmlns:a16="http://schemas.microsoft.com/office/drawing/2014/main" id="{B836C9F3-5112-45B6-9876-1752CAE15704}"/>
+              </a:ext>
+            </a:extLst>
+          </p:cNvPr>
+          <p:cNvSpPr>
+            <a:spLocks noGrp="1"/>
+          </p:cNvSpPr>
+          <p:nvPr>
+            <p:ph idx="1"/>
+          </p:nvPr>
+        </p:nvSpPr>
+        <p:spPr/>
+        <p:txBody>
+          <a:bodyPr/>
+          <a:lstStyle/>
+          <a:p>
+            <a:r>
+              <a:rPr lang="en-US" dirty="0"/>
+              <a:t>Goal: Transform a</a:t>
+            </a:r>
+            <a:r>
+              <a:rPr lang="en-US" i="1" dirty="0"/>
+              <a:t> sequence</a:t>
+            </a:r>
+            <a:r>
+              <a:rPr lang="en-US" dirty="0"/>
+              <a:t>, and return a new result</a:t>
+            </a:r>
+          </a:p>
+          <a:p>
+            <a:r>
+              <a:rPr lang="en-US" dirty="0"/>
+              <a:t>We'll use 3 functions that are hallmarks of functional programming</a:t>
+            </a:r>
+          </a:p>
+          <a:p>
+            <a:r>
+              <a:rPr lang="en-US" dirty="0"/>
+              <a:t>Each of these takes in a function and a sequence as arguments</a:t>
+            </a:r>
+          </a:p>
+          <a:p>
+            <a:endParaRPr lang="en-US" dirty="0"/>
+          </a:p>
+          <a:p>
+            <a:pPr marL="0" indent="0">
+              <a:buNone/>
+            </a:pPr>
+            <a:endParaRPr lang="en-US" dirty="0"/>
+          </a:p>
+          <a:p>
+            <a:pPr marL="0" indent="0">
+              <a:buNone/>
+            </a:pPr>
+            <a:endParaRPr lang="en-US" dirty="0"/>
+          </a:p>
+        </p:txBody>
+      </p:sp>
+      <p:sp>
+        <p:nvSpPr>
+          <p:cNvPr id="4" name="Footer Placeholder 3">
+            <a:extLst>
+              <a:ext uri="{FF2B5EF4-FFF2-40B4-BE49-F238E27FC236}">
+                <a16:creationId xmlns:a16="http://schemas.microsoft.com/office/drawing/2014/main" id="{A21AAC4B-C44F-89FB-3123-25DB3F2EB1F9}"/>
               </a:ext>
             </a:extLst>
           </p:cNvPr>
@@ -14359,451 +14527,467 @@
           </a:p>
         </p:txBody>
       </p:sp>
-      <p:sp>
-        <p:nvSpPr>
-          <p:cNvPr id="5" name="Rectangle 4">
+      <p:graphicFrame>
+        <p:nvGraphicFramePr>
+          <p:cNvPr id="6" name="Table 6">
             <a:extLst>
               <a:ext uri="{FF2B5EF4-FFF2-40B4-BE49-F238E27FC236}">
-                <a16:creationId xmlns:a16="http://schemas.microsoft.com/office/drawing/2014/main" id="{F4E01054-B4B8-BC41-8667-60CEB7A01846}"/>
+                <a16:creationId xmlns:a16="http://schemas.microsoft.com/office/drawing/2014/main" id="{5B4FF11E-2961-9E2C-C8D0-496E51F1AE5E}"/>
               </a:ext>
             </a:extLst>
           </p:cNvPr>
-          <p:cNvSpPr/>
+          <p:cNvGraphicFramePr>
+            <a:graphicFrameLocks noGrp="1"/>
+          </p:cNvGraphicFramePr>
           <p:nvPr/>
-        </p:nvSpPr>
-        <p:spPr>
-          <a:xfrm>
-            <a:off x="533400" y="1081668"/>
-            <a:ext cx="8610600" cy="3139321"/>
-          </a:xfrm>
-          <a:prstGeom prst="rect">
-            <a:avLst/>
-          </a:prstGeom>
-        </p:spPr>
-        <p:txBody>
-          <a:bodyPr wrap="square">
-            <a:spAutoFit/>
-          </a:bodyPr>
-          <a:lstStyle/>
-          <a:p>
-            <a:pPr>
-              <a:lnSpc>
-                <a:spcPct val="100000"/>
-              </a:lnSpc>
-            </a:pPr>
-            <a:endParaRPr lang="en-US" spc="-1" dirty="0">
-              <a:solidFill>
-                <a:srgbClr val="000000"/>
-              </a:solidFill>
-              <a:uFill>
-                <a:solidFill>
-                  <a:srgbClr val="FFFFFF"/>
-                </a:solidFill>
-              </a:uFill>
-              <a:latin typeface="Source Code Pro" panose="020B0509030403020204" pitchFamily="49" charset="77"/>
-            </a:endParaRPr>
-          </a:p>
-          <a:p>
-            <a:pPr>
-              <a:lnSpc>
-                <a:spcPct val="100000"/>
-              </a:lnSpc>
-            </a:pPr>
-            <a:r>
-              <a:rPr lang="en-US" spc="-1" dirty="0">
-                <a:solidFill>
-                  <a:srgbClr val="000000"/>
-                </a:solidFill>
-                <a:uFill>
-                  <a:solidFill>
-                    <a:srgbClr val="FFFFFF"/>
-                  </a:solidFill>
-                </a:uFill>
-                <a:latin typeface="Source Code Pro" panose="020B0509030403020204" pitchFamily="49" charset="77"/>
-              </a:rPr>
-              <a:t>Input: "The University of California at Berkeley"</a:t>
-            </a:r>
-          </a:p>
-          <a:p>
-            <a:pPr>
-              <a:lnSpc>
-                <a:spcPct val="100000"/>
-              </a:lnSpc>
-            </a:pPr>
-            <a:endParaRPr lang="en-US" spc="-1" dirty="0">
-              <a:solidFill>
-                <a:srgbClr val="000000"/>
-              </a:solidFill>
-              <a:uFill>
-                <a:solidFill>
-                  <a:srgbClr val="FFFFFF"/>
-                </a:solidFill>
-              </a:uFill>
-              <a:latin typeface="Source Code Pro" panose="020B0509030403020204" pitchFamily="49" charset="77"/>
-            </a:endParaRPr>
-          </a:p>
-          <a:p>
-            <a:pPr>
-              <a:lnSpc>
-                <a:spcPct val="100000"/>
-              </a:lnSpc>
-            </a:pPr>
-            <a:r>
-              <a:rPr lang="en-US" spc="-1" dirty="0">
-                <a:solidFill>
-                  <a:srgbClr val="000000"/>
-                </a:solidFill>
-                <a:uFill>
-                  <a:solidFill>
-                    <a:srgbClr val="FFFFFF"/>
-                  </a:solidFill>
-                </a:uFill>
-                <a:latin typeface="Source Code Pro" panose="020B0509030403020204" pitchFamily="49" charset="77"/>
-              </a:rPr>
-              <a:t>Output: "UCB"</a:t>
-            </a:r>
-          </a:p>
-          <a:p>
-            <a:pPr>
-              <a:lnSpc>
-                <a:spcPct val="100000"/>
-              </a:lnSpc>
-            </a:pPr>
-            <a:r>
-              <a:rPr lang="en-US" spc="-1" dirty="0">
-                <a:solidFill>
-                  <a:srgbClr val="000000"/>
-                </a:solidFill>
-                <a:uFill>
-                  <a:solidFill>
-                    <a:srgbClr val="FFFFFF"/>
-                  </a:solidFill>
-                </a:uFill>
-                <a:latin typeface="Source Code Pro" panose="020B0509030403020204" pitchFamily="49" charset="77"/>
-              </a:rPr>
-              <a:t>def acronym(sentence):</a:t>
-            </a:r>
-          </a:p>
-          <a:p>
-            <a:pPr>
-              <a:lnSpc>
-                <a:spcPct val="100000"/>
-              </a:lnSpc>
-            </a:pPr>
-            <a:r>
-              <a:rPr lang="en-US" spc="-1" dirty="0">
-                <a:solidFill>
-                  <a:srgbClr val="000000"/>
-                </a:solidFill>
-                <a:uFill>
-                  <a:solidFill>
-                    <a:srgbClr val="FFFFFF"/>
-                  </a:solidFill>
-                </a:uFill>
-                <a:latin typeface="Source Code Pro" panose="020B0509030403020204" pitchFamily="49" charset="77"/>
-              </a:rPr>
-              <a:t>    """ (Some </a:t>
-            </a:r>
-            <a:r>
-              <a:rPr lang="en-US" spc="-1" dirty="0" err="1">
-                <a:solidFill>
-                  <a:srgbClr val="000000"/>
-                </a:solidFill>
-                <a:uFill>
-                  <a:solidFill>
-                    <a:srgbClr val="FFFFFF"/>
-                  </a:solidFill>
-                </a:uFill>
-                <a:latin typeface="Source Code Pro" panose="020B0509030403020204" pitchFamily="49" charset="77"/>
-              </a:rPr>
-              <a:t>doctests</a:t>
-            </a:r>
-            <a:r>
-              <a:rPr lang="en-US" spc="-1" dirty="0">
-                <a:solidFill>
-                  <a:srgbClr val="000000"/>
-                </a:solidFill>
-                <a:uFill>
-                  <a:solidFill>
-                    <a:srgbClr val="FFFFFF"/>
-                  </a:solidFill>
-                </a:uFill>
-                <a:latin typeface="Source Code Pro" panose="020B0509030403020204" pitchFamily="49" charset="77"/>
-              </a:rPr>
-              <a:t>)</a:t>
-            </a:r>
-          </a:p>
-          <a:p>
-            <a:pPr>
-              <a:lnSpc>
-                <a:spcPct val="100000"/>
-              </a:lnSpc>
-            </a:pPr>
-            <a:r>
-              <a:rPr lang="en-US" spc="-1" dirty="0">
-                <a:solidFill>
-                  <a:srgbClr val="000000"/>
-                </a:solidFill>
-                <a:uFill>
-                  <a:solidFill>
-                    <a:srgbClr val="FFFFFF"/>
-                  </a:solidFill>
-                </a:uFill>
-                <a:latin typeface="Source Code Pro" panose="020B0509030403020204" pitchFamily="49" charset="77"/>
-              </a:rPr>
-              <a:t>    """</a:t>
-            </a:r>
-          </a:p>
-          <a:p>
-            <a:pPr>
-              <a:lnSpc>
-                <a:spcPct val="100000"/>
-              </a:lnSpc>
-            </a:pPr>
-            <a:r>
-              <a:rPr lang="en-US" spc="-1" dirty="0">
-                <a:solidFill>
-                  <a:srgbClr val="000000"/>
-                </a:solidFill>
-                <a:uFill>
-                  <a:solidFill>
-                    <a:srgbClr val="FFFFFF"/>
-                  </a:solidFill>
-                </a:uFill>
-                <a:latin typeface="Source Code Pro" panose="020B0509030403020204" pitchFamily="49" charset="77"/>
-              </a:rPr>
-              <a:t>    words = </a:t>
-            </a:r>
-            <a:r>
-              <a:rPr lang="en-US" spc="-1" dirty="0" err="1">
-                <a:solidFill>
-                  <a:srgbClr val="000000"/>
-                </a:solidFill>
-                <a:uFill>
-                  <a:solidFill>
-                    <a:srgbClr val="FFFFFF"/>
-                  </a:solidFill>
-                </a:uFill>
-                <a:latin typeface="Source Code Pro" panose="020B0509030403020204" pitchFamily="49" charset="77"/>
-              </a:rPr>
-              <a:t>sentence.split</a:t>
-            </a:r>
-            <a:r>
-              <a:rPr lang="en-US" spc="-1" dirty="0">
-                <a:solidFill>
-                  <a:srgbClr val="000000"/>
-                </a:solidFill>
-                <a:uFill>
-                  <a:solidFill>
-                    <a:srgbClr val="FFFFFF"/>
-                  </a:solidFill>
-                </a:uFill>
-                <a:latin typeface="Source Code Pro" panose="020B0509030403020204" pitchFamily="49" charset="77"/>
-              </a:rPr>
-              <a:t>()</a:t>
-            </a:r>
-          </a:p>
-          <a:p>
-            <a:pPr>
-              <a:lnSpc>
-                <a:spcPct val="100000"/>
-              </a:lnSpc>
-            </a:pPr>
-            <a:r>
-              <a:rPr lang="en-US" spc="-1" dirty="0">
-                <a:solidFill>
-                  <a:srgbClr val="000000"/>
-                </a:solidFill>
-                <a:uFill>
-                  <a:solidFill>
-                    <a:srgbClr val="FFFFFF"/>
-                  </a:solidFill>
-                </a:uFill>
-                <a:latin typeface="Source Code Pro" panose="020B0509030403020204" pitchFamily="49" charset="77"/>
-              </a:rPr>
-              <a:t>    return reduce(add, map(</a:t>
-            </a:r>
-            <a:r>
-              <a:rPr lang="en-US" spc="-1" dirty="0" err="1">
-                <a:solidFill>
-                  <a:srgbClr val="000000"/>
-                </a:solidFill>
-                <a:uFill>
-                  <a:solidFill>
-                    <a:srgbClr val="FFFFFF"/>
-                  </a:solidFill>
-                </a:uFill>
-                <a:latin typeface="Source Code Pro" panose="020B0509030403020204" pitchFamily="49" charset="77"/>
-              </a:rPr>
-              <a:t>first_letter</a:t>
-            </a:r>
-            <a:r>
-              <a:rPr lang="en-US" spc="-1" dirty="0">
-                <a:solidFill>
-                  <a:srgbClr val="000000"/>
-                </a:solidFill>
-                <a:uFill>
-                  <a:solidFill>
-                    <a:srgbClr val="FFFFFF"/>
-                  </a:solidFill>
-                </a:uFill>
-                <a:latin typeface="Source Code Pro" panose="020B0509030403020204" pitchFamily="49" charset="77"/>
-              </a:rPr>
-              <a:t>, filter(</a:t>
-            </a:r>
-            <a:r>
-              <a:rPr lang="en-US" spc="-1" dirty="0" err="1">
-                <a:solidFill>
-                  <a:srgbClr val="000000"/>
-                </a:solidFill>
-                <a:uFill>
-                  <a:solidFill>
-                    <a:srgbClr val="FFFFFF"/>
-                  </a:solidFill>
-                </a:uFill>
-                <a:latin typeface="Source Code Pro" panose="020B0509030403020204" pitchFamily="49" charset="77"/>
-              </a:rPr>
-              <a:t>long_word</a:t>
-            </a:r>
-            <a:r>
-              <a:rPr lang="en-US" spc="-1" dirty="0">
-                <a:solidFill>
-                  <a:srgbClr val="000000"/>
-                </a:solidFill>
-                <a:uFill>
-                  <a:solidFill>
-                    <a:srgbClr val="FFFFFF"/>
-                  </a:solidFill>
-                </a:uFill>
-                <a:latin typeface="Source Code Pro" panose="020B0509030403020204" pitchFamily="49" charset="77"/>
-              </a:rPr>
-              <a:t>, words)))</a:t>
-            </a:r>
-          </a:p>
-          <a:p>
-            <a:pPr>
-              <a:lnSpc>
-                <a:spcPct val="100000"/>
-              </a:lnSpc>
-            </a:pPr>
-            <a:endParaRPr lang="en-US" spc="-1" dirty="0">
-              <a:solidFill>
-                <a:srgbClr val="000000"/>
-              </a:solidFill>
-              <a:uFill>
-                <a:solidFill>
-                  <a:srgbClr val="FFFFFF"/>
-                </a:solidFill>
-              </a:uFill>
-              <a:latin typeface="Source Code Pro" panose="020B0509030403020204" pitchFamily="49" charset="77"/>
-            </a:endParaRPr>
-          </a:p>
-        </p:txBody>
-      </p:sp>
-      <p:sp>
-        <p:nvSpPr>
-          <p:cNvPr id="7" name="TextShape 11">
-            <a:extLst>
-              <a:ext uri="{FF2B5EF4-FFF2-40B4-BE49-F238E27FC236}">
-                <a16:creationId xmlns:a16="http://schemas.microsoft.com/office/drawing/2014/main" id="{55609106-671F-E84E-8744-3B2453668F27}"/>
-              </a:ext>
-            </a:extLst>
-          </p:cNvPr>
-          <p:cNvSpPr txBox="1"/>
-          <p:nvPr/>
-        </p:nvSpPr>
-        <p:spPr>
-          <a:xfrm>
-            <a:off x="2281080" y="5012456"/>
-            <a:ext cx="7171560" cy="602280"/>
-          </a:xfrm>
-          <a:prstGeom prst="rect">
-            <a:avLst/>
-          </a:prstGeom>
-          <a:noFill/>
-          <a:ln>
-            <a:noFill/>
-          </a:ln>
-        </p:spPr>
-        <p:txBody>
-          <a:bodyPr lIns="90000" tIns="45000" rIns="90000" bIns="45000"/>
-          <a:lstStyle/>
-          <a:p>
-            <a:r>
-              <a:rPr lang="en-US" spc="-1" dirty="0">
-                <a:solidFill>
-                  <a:srgbClr val="000000"/>
-                </a:solidFill>
-                <a:uFill>
-                  <a:solidFill>
-                    <a:srgbClr val="FFFFFF"/>
-                  </a:solidFill>
-                </a:uFill>
-                <a:latin typeface="Arial"/>
-              </a:rPr>
-              <a:t>P.S. Pedantry alert: This is really an </a:t>
-            </a:r>
-            <a:r>
-              <a:rPr lang="en-US" i="1" spc="-1" dirty="0">
-                <a:solidFill>
-                  <a:srgbClr val="000000"/>
-                </a:solidFill>
-                <a:uFill>
-                  <a:solidFill>
-                    <a:srgbClr val="FFFFFF"/>
-                  </a:solidFill>
-                </a:uFill>
-                <a:latin typeface="Arial"/>
-              </a:rPr>
-              <a:t>initialism</a:t>
-            </a:r>
-            <a:r>
-              <a:rPr lang="en-US" spc="-1" dirty="0">
-                <a:solidFill>
-                  <a:srgbClr val="000000"/>
-                </a:solidFill>
-                <a:uFill>
-                  <a:solidFill>
-                    <a:srgbClr val="FFFFFF"/>
-                  </a:solidFill>
-                </a:uFill>
-                <a:latin typeface="Arial"/>
-              </a:rPr>
-              <a:t> but that's rather annoying to say and type. </a:t>
-            </a:r>
-            <a:r>
-              <a:rPr lang="en-US" spc="-1" dirty="0">
-                <a:solidFill>
-                  <a:srgbClr val="000000"/>
-                </a:solidFill>
-                <a:uFill>
-                  <a:solidFill>
-                    <a:srgbClr val="FFFFFF"/>
-                  </a:solidFill>
-                </a:uFill>
-                <a:latin typeface="Arial"/>
-                <a:sym typeface="Wingdings" pitchFamily="2" charset="2"/>
-              </a:rPr>
-              <a:t> (However, the code we write is the same, the difference is in how you pronounce the result.) The more you know!</a:t>
-            </a:r>
-            <a:endParaRPr lang="en-US" spc="-1" dirty="0">
-              <a:solidFill>
-                <a:srgbClr val="000000"/>
-              </a:solidFill>
-              <a:uFill>
-                <a:solidFill>
-                  <a:srgbClr val="FFFFFF"/>
-                </a:solidFill>
-              </a:uFill>
-              <a:latin typeface="Arial"/>
-            </a:endParaRPr>
-          </a:p>
-        </p:txBody>
-      </p:sp>
+        </p:nvGraphicFramePr>
+        <p:xfrm>
+          <a:off x="420415" y="2792760"/>
+          <a:ext cx="10594426" cy="3421927"/>
+        </p:xfrm>
+        <a:graphic>
+          <a:graphicData uri="http://schemas.openxmlformats.org/drawingml/2006/table">
+            <a:tbl>
+              <a:tblPr firstRow="1" bandRow="1">
+                <a:tableStyleId>{5C22544A-7EE6-4342-B048-85BDC9FD1C3A}</a:tableStyleId>
+              </a:tblPr>
+              <a:tblGrid>
+                <a:gridCol w="1692164">
+                  <a:extLst>
+                    <a:ext uri="{9D8B030D-6E8A-4147-A177-3AD203B41FA5}">
+                      <a16:colId xmlns:a16="http://schemas.microsoft.com/office/drawing/2014/main" val="2059777158"/>
+                    </a:ext>
+                  </a:extLst>
+                </a:gridCol>
+                <a:gridCol w="2333297">
+                  <a:extLst>
+                    <a:ext uri="{9D8B030D-6E8A-4147-A177-3AD203B41FA5}">
+                      <a16:colId xmlns:a16="http://schemas.microsoft.com/office/drawing/2014/main" val="2894650286"/>
+                    </a:ext>
+                  </a:extLst>
+                </a:gridCol>
+                <a:gridCol w="2280745">
+                  <a:extLst>
+                    <a:ext uri="{9D8B030D-6E8A-4147-A177-3AD203B41FA5}">
+                      <a16:colId xmlns:a16="http://schemas.microsoft.com/office/drawing/2014/main" val="3290081916"/>
+                    </a:ext>
+                  </a:extLst>
+                </a:gridCol>
+                <a:gridCol w="2007476">
+                  <a:extLst>
+                    <a:ext uri="{9D8B030D-6E8A-4147-A177-3AD203B41FA5}">
+                      <a16:colId xmlns:a16="http://schemas.microsoft.com/office/drawing/2014/main" val="2002986398"/>
+                    </a:ext>
+                  </a:extLst>
+                </a:gridCol>
+                <a:gridCol w="2280744">
+                  <a:extLst>
+                    <a:ext uri="{9D8B030D-6E8A-4147-A177-3AD203B41FA5}">
+                      <a16:colId xmlns:a16="http://schemas.microsoft.com/office/drawing/2014/main" val="756374945"/>
+                    </a:ext>
+                  </a:extLst>
+                </a:gridCol>
+              </a:tblGrid>
+              <a:tr h="678727">
+                <a:tc>
+                  <a:txBody>
+                    <a:bodyPr/>
+                    <a:lstStyle/>
+                    <a:p>
+                      <a:pPr algn="ctr"/>
+                      <a:r>
+                        <a:rPr lang="en-US" sz="2000" b="1" dirty="0">
+                          <a:latin typeface="FreightSans Pro Book" panose="02000606030000020004" pitchFamily="2" charset="0"/>
+                        </a:rPr>
+                        <a:t>Function</a:t>
+                      </a:r>
+                    </a:p>
+                  </a:txBody>
+                  <a:tcPr anchor="ctr"/>
+                </a:tc>
+                <a:tc>
+                  <a:txBody>
+                    <a:bodyPr/>
+                    <a:lstStyle/>
+                    <a:p>
+                      <a:pPr algn="ctr"/>
+                      <a:r>
+                        <a:rPr lang="en-US" sz="2000" dirty="0">
+                          <a:latin typeface="FreightSans Pro Book" panose="02000606030000020004" pitchFamily="2" charset="0"/>
+                        </a:rPr>
+                        <a:t>Action</a:t>
+                      </a:r>
+                    </a:p>
+                  </a:txBody>
+                  <a:tcPr anchor="ctr"/>
+                </a:tc>
+                <a:tc>
+                  <a:txBody>
+                    <a:bodyPr/>
+                    <a:lstStyle/>
+                    <a:p>
+                      <a:pPr algn="ctr"/>
+                      <a:r>
+                        <a:rPr lang="en-US" sz="2000" dirty="0">
+                          <a:latin typeface="FreightSans Pro Book" panose="02000606030000020004" pitchFamily="2" charset="0"/>
+                        </a:rPr>
+                        <a:t>Input arguments</a:t>
+                      </a:r>
+                    </a:p>
+                  </a:txBody>
+                  <a:tcPr anchor="ctr"/>
+                </a:tc>
+                <a:tc>
+                  <a:txBody>
+                    <a:bodyPr/>
+                    <a:lstStyle/>
+                    <a:p>
+                      <a:pPr algn="ctr"/>
+                      <a:r>
+                        <a:rPr lang="en-US" sz="2000" dirty="0">
+                          <a:latin typeface="FreightSans Pro Book" panose="02000606030000020004" pitchFamily="2" charset="0"/>
+                        </a:rPr>
+                        <a:t>Input Fn. Returns</a:t>
+                      </a:r>
+                    </a:p>
+                  </a:txBody>
+                  <a:tcPr anchor="ctr"/>
+                </a:tc>
+                <a:tc>
+                  <a:txBody>
+                    <a:bodyPr/>
+                    <a:lstStyle/>
+                    <a:p>
+                      <a:pPr marL="0" marR="0" lvl="0" indent="0" algn="ctr" defTabSz="342900" rtl="0" eaLnBrk="1" fontAlgn="auto" latinLnBrk="0" hangingPunct="1">
+                        <a:lnSpc>
+                          <a:spcPct val="100000"/>
+                        </a:lnSpc>
+                        <a:spcBef>
+                          <a:spcPts val="0"/>
+                        </a:spcBef>
+                        <a:spcAft>
+                          <a:spcPts val="0"/>
+                        </a:spcAft>
+                        <a:buClrTx/>
+                        <a:buSzTx/>
+                        <a:buFontTx/>
+                        <a:buNone/>
+                        <a:tabLst/>
+                        <a:defRPr/>
+                      </a:pPr>
+                      <a:r>
+                        <a:rPr lang="en-US" sz="2000" dirty="0">
+                          <a:latin typeface="FreightSans Pro Book" panose="02000606030000020004" pitchFamily="2" charset="0"/>
+                        </a:rPr>
+                        <a:t>Output</a:t>
+                      </a:r>
+                    </a:p>
+                  </a:txBody>
+                  <a:tcPr anchor="ctr"/>
+                </a:tc>
+                <a:extLst>
+                  <a:ext uri="{0D108BD9-81ED-4DB2-BD59-A6C34878D82A}">
+                    <a16:rowId xmlns:a16="http://schemas.microsoft.com/office/drawing/2014/main" val="1140645906"/>
+                  </a:ext>
+                </a:extLst>
+              </a:tr>
+              <a:tr h="678727">
+                <a:tc>
+                  <a:txBody>
+                    <a:bodyPr/>
+                    <a:lstStyle/>
+                    <a:p>
+                      <a:pPr algn="ctr"/>
+                      <a:r>
+                        <a:rPr lang="en-US" sz="1800" b="1" dirty="0">
+                          <a:latin typeface="Source Code Pro" panose="020B0509030403020204" pitchFamily="49" charset="77"/>
+                        </a:rPr>
+                        <a:t>map</a:t>
+                      </a:r>
+                    </a:p>
+                  </a:txBody>
+                  <a:tcPr anchor="ctr"/>
+                </a:tc>
+                <a:tc>
+                  <a:txBody>
+                    <a:bodyPr/>
+                    <a:lstStyle/>
+                    <a:p>
+                      <a:r>
+                        <a:rPr lang="en-US" sz="1800" b="0" i="0" dirty="0">
+                          <a:latin typeface="Open Sans Light" panose="020B0606030504020204" pitchFamily="34" charset="0"/>
+                          <a:ea typeface="Open Sans Light" panose="020B0606030504020204" pitchFamily="34" charset="0"/>
+                          <a:cs typeface="Open Sans Light" panose="020B0606030504020204" pitchFamily="34" charset="0"/>
+                        </a:rPr>
+                        <a:t>Transform every item</a:t>
+                      </a:r>
+                    </a:p>
+                  </a:txBody>
+                  <a:tcPr anchor="ctr"/>
+                </a:tc>
+                <a:tc>
+                  <a:txBody>
+                    <a:bodyPr/>
+                    <a:lstStyle/>
+                    <a:p>
+                      <a:r>
+                        <a:rPr lang="en-US" sz="1800" b="0" i="0" dirty="0">
+                          <a:latin typeface="Open Sans Light" panose="020B0606030504020204" pitchFamily="34" charset="0"/>
+                          <a:ea typeface="Open Sans Light" panose="020B0606030504020204" pitchFamily="34" charset="0"/>
+                          <a:cs typeface="Open Sans Light" panose="020B0606030504020204" pitchFamily="34" charset="0"/>
+                        </a:rPr>
+                        <a:t>1 (each item)</a:t>
+                      </a:r>
+                    </a:p>
+                  </a:txBody>
+                  <a:tcPr anchor="ctr"/>
+                </a:tc>
+                <a:tc>
+                  <a:txBody>
+                    <a:bodyPr/>
+                    <a:lstStyle/>
+                    <a:p>
+                      <a:r>
+                        <a:rPr lang="en-US" sz="1800" b="0" i="0" dirty="0">
+                          <a:latin typeface="Open Sans Light" panose="020B0606030504020204" pitchFamily="34" charset="0"/>
+                          <a:ea typeface="Open Sans Light" panose="020B0606030504020204" pitchFamily="34" charset="0"/>
+                          <a:cs typeface="Open Sans Light" panose="020B0606030504020204" pitchFamily="34" charset="0"/>
+                        </a:rPr>
+                        <a:t>"Anything", a new item</a:t>
+                      </a:r>
+                    </a:p>
+                  </a:txBody>
+                  <a:tcPr anchor="ctr"/>
+                </a:tc>
+                <a:tc>
+                  <a:txBody>
+                    <a:bodyPr/>
+                    <a:lstStyle/>
+                    <a:p>
+                      <a:r>
+                        <a:rPr lang="en-US" sz="1800" b="1" i="0" dirty="0">
+                          <a:latin typeface="Open Sans ExtraBold" panose="020B0606030504020204" pitchFamily="34" charset="0"/>
+                          <a:ea typeface="Open Sans ExtraBold" panose="020B0606030504020204" pitchFamily="34" charset="0"/>
+                          <a:cs typeface="Open Sans ExtraBold" panose="020B0606030504020204" pitchFamily="34" charset="0"/>
+                        </a:rPr>
+                        <a:t>List</a:t>
+                      </a:r>
+                      <a:r>
+                        <a:rPr lang="en-US" sz="1800" b="0" i="0" dirty="0">
+                          <a:latin typeface="Open Sans Light" panose="020B0606030504020204" pitchFamily="34" charset="0"/>
+                          <a:ea typeface="Open Sans Light" panose="020B0606030504020204" pitchFamily="34" charset="0"/>
+                          <a:cs typeface="Open Sans Light" panose="020B0606030504020204" pitchFamily="34" charset="0"/>
+                        </a:rPr>
+                        <a:t>: same length, but possibly new values</a:t>
+                      </a:r>
+                    </a:p>
+                  </a:txBody>
+                  <a:tcPr anchor="ctr"/>
+                </a:tc>
+                <a:extLst>
+                  <a:ext uri="{0D108BD9-81ED-4DB2-BD59-A6C34878D82A}">
+                    <a16:rowId xmlns:a16="http://schemas.microsoft.com/office/drawing/2014/main" val="1601251051"/>
+                  </a:ext>
+                </a:extLst>
+              </a:tr>
+              <a:tr h="678727">
+                <a:tc>
+                  <a:txBody>
+                    <a:bodyPr/>
+                    <a:lstStyle/>
+                    <a:p>
+                      <a:pPr algn="ctr"/>
+                      <a:r>
+                        <a:rPr lang="en-US" sz="1800" b="1" dirty="0">
+                          <a:latin typeface="Source Code Pro" panose="020B0509030403020204" pitchFamily="49" charset="77"/>
+                        </a:rPr>
+                        <a:t>filter</a:t>
+                      </a:r>
+                    </a:p>
+                  </a:txBody>
+                  <a:tcPr anchor="ctr"/>
+                </a:tc>
+                <a:tc>
+                  <a:txBody>
+                    <a:bodyPr/>
+                    <a:lstStyle/>
+                    <a:p>
+                      <a:r>
+                        <a:rPr lang="en-US" sz="1800" b="0" i="0" dirty="0">
+                          <a:latin typeface="Open Sans Light" panose="020B0606030504020204" pitchFamily="34" charset="0"/>
+                          <a:ea typeface="Open Sans Light" panose="020B0606030504020204" pitchFamily="34" charset="0"/>
+                          <a:cs typeface="Open Sans Light" panose="020B0606030504020204" pitchFamily="34" charset="0"/>
+                        </a:rPr>
+                        <a:t>Return a list with fewer items</a:t>
+                      </a:r>
+                    </a:p>
+                  </a:txBody>
+                  <a:tcPr anchor="ctr"/>
+                </a:tc>
+                <a:tc>
+                  <a:txBody>
+                    <a:bodyPr/>
+                    <a:lstStyle/>
+                    <a:p>
+                      <a:r>
+                        <a:rPr lang="en-US" sz="1800" b="0" i="0" dirty="0">
+                          <a:latin typeface="Open Sans Light" panose="020B0606030504020204" pitchFamily="34" charset="0"/>
+                          <a:ea typeface="Open Sans Light" panose="020B0606030504020204" pitchFamily="34" charset="0"/>
+                          <a:cs typeface="Open Sans Light" panose="020B0606030504020204" pitchFamily="34" charset="0"/>
+                        </a:rPr>
+                        <a:t>1 (each item)</a:t>
+                      </a:r>
+                    </a:p>
+                  </a:txBody>
+                  <a:tcPr anchor="ctr"/>
+                </a:tc>
+                <a:tc>
+                  <a:txBody>
+                    <a:bodyPr/>
+                    <a:lstStyle/>
+                    <a:p>
+                      <a:r>
+                        <a:rPr lang="en-US" sz="1800" b="0" i="0" dirty="0">
+                          <a:latin typeface="Open Sans Light" panose="020B0606030504020204" pitchFamily="34" charset="0"/>
+                          <a:ea typeface="Open Sans Light" panose="020B0606030504020204" pitchFamily="34" charset="0"/>
+                          <a:cs typeface="Open Sans Light" panose="020B0606030504020204" pitchFamily="34" charset="0"/>
+                        </a:rPr>
+                        <a:t>A Boolean</a:t>
+                      </a:r>
+                    </a:p>
+                  </a:txBody>
+                  <a:tcPr anchor="ctr"/>
+                </a:tc>
+                <a:tc>
+                  <a:txBody>
+                    <a:bodyPr/>
+                    <a:lstStyle/>
+                    <a:p>
+                      <a:r>
+                        <a:rPr lang="en-US" sz="1800" b="1" i="0" dirty="0">
+                          <a:latin typeface="Open Sans ExtraBold" panose="020B0606030504020204" pitchFamily="34" charset="0"/>
+                          <a:ea typeface="Open Sans ExtraBold" panose="020B0606030504020204" pitchFamily="34" charset="0"/>
+                          <a:cs typeface="Open Sans ExtraBold" panose="020B0606030504020204" pitchFamily="34" charset="0"/>
+                        </a:rPr>
+                        <a:t>List: </a:t>
+                      </a:r>
+                      <a:r>
+                        <a:rPr lang="en-US" sz="1800" b="0" i="0" dirty="0">
+                          <a:latin typeface="Open Sans Light" panose="020B0606030504020204" pitchFamily="34" charset="0"/>
+                          <a:ea typeface="Open Sans Light" panose="020B0606030504020204" pitchFamily="34" charset="0"/>
+                          <a:cs typeface="Open Sans Light" panose="020B0606030504020204" pitchFamily="34" charset="0"/>
+                        </a:rPr>
+                        <a:t>possibly fewer items, values are the same</a:t>
+                      </a:r>
+                    </a:p>
+                  </a:txBody>
+                  <a:tcPr anchor="ctr"/>
+                </a:tc>
+                <a:extLst>
+                  <a:ext uri="{0D108BD9-81ED-4DB2-BD59-A6C34878D82A}">
+                    <a16:rowId xmlns:a16="http://schemas.microsoft.com/office/drawing/2014/main" val="1639889719"/>
+                  </a:ext>
+                </a:extLst>
+              </a:tr>
+              <a:tr h="678727">
+                <a:tc>
+                  <a:txBody>
+                    <a:bodyPr/>
+                    <a:lstStyle/>
+                    <a:p>
+                      <a:pPr algn="ctr"/>
+                      <a:r>
+                        <a:rPr lang="en-US" sz="1800" b="1" dirty="0">
+                          <a:latin typeface="Source Code Pro" panose="020B0509030403020204" pitchFamily="49" charset="77"/>
+                        </a:rPr>
+                        <a:t>reduce</a:t>
+                      </a:r>
+                    </a:p>
+                  </a:txBody>
+                  <a:tcPr anchor="ctr"/>
+                </a:tc>
+                <a:tc>
+                  <a:txBody>
+                    <a:bodyPr/>
+                    <a:lstStyle/>
+                    <a:p>
+                      <a:r>
+                        <a:rPr lang="en-US" sz="1800" b="0" i="0" dirty="0">
+                          <a:latin typeface="Open Sans Light" panose="020B0606030504020204" pitchFamily="34" charset="0"/>
+                          <a:ea typeface="Open Sans Light" panose="020B0606030504020204" pitchFamily="34" charset="0"/>
+                          <a:cs typeface="Open Sans Light" panose="020B0606030504020204" pitchFamily="34" charset="0"/>
+                        </a:rPr>
+                        <a:t>"Combine" items together</a:t>
+                      </a:r>
+                    </a:p>
+                  </a:txBody>
+                  <a:tcPr anchor="ctr"/>
+                </a:tc>
+                <a:tc>
+                  <a:txBody>
+                    <a:bodyPr/>
+                    <a:lstStyle/>
+                    <a:p>
+                      <a:r>
+                        <a:rPr lang="en-US" sz="1800" b="0" i="0" dirty="0">
+                          <a:latin typeface="Open Sans Light" panose="020B0606030504020204" pitchFamily="34" charset="0"/>
+                          <a:ea typeface="Open Sans Light" panose="020B0606030504020204" pitchFamily="34" charset="0"/>
+                          <a:cs typeface="Open Sans Light" panose="020B0606030504020204" pitchFamily="34" charset="0"/>
+                        </a:rPr>
+                        <a:t>2 (current item, and the previous result)</a:t>
+                      </a:r>
+                    </a:p>
+                  </a:txBody>
+                  <a:tcPr anchor="ctr"/>
+                </a:tc>
+                <a:tc>
+                  <a:txBody>
+                    <a:bodyPr/>
+                    <a:lstStyle/>
+                    <a:p>
+                      <a:r>
+                        <a:rPr lang="en-US" sz="1800" b="0" i="0" dirty="0">
+                          <a:latin typeface="Open Sans Light" panose="020B0606030504020204" pitchFamily="34" charset="0"/>
+                          <a:ea typeface="Open Sans Light" panose="020B0606030504020204" pitchFamily="34" charset="0"/>
+                          <a:cs typeface="Open Sans Light" panose="020B0606030504020204" pitchFamily="34" charset="0"/>
+                        </a:rPr>
+                        <a:t>Type should match the type each item</a:t>
+                      </a:r>
+                    </a:p>
+                  </a:txBody>
+                  <a:tcPr anchor="ctr"/>
+                </a:tc>
+                <a:tc>
+                  <a:txBody>
+                    <a:bodyPr/>
+                    <a:lstStyle/>
+                    <a:p>
+                      <a:r>
+                        <a:rPr lang="en-US" sz="1800" b="0" i="0" dirty="0">
+                          <a:latin typeface="Open Sans Light" panose="020B0606030504020204" pitchFamily="34" charset="0"/>
+                          <a:ea typeface="Open Sans Light" panose="020B0606030504020204" pitchFamily="34" charset="0"/>
+                          <a:cs typeface="Open Sans Light" panose="020B0606030504020204" pitchFamily="34" charset="0"/>
+                        </a:rPr>
+                        <a:t>A "single" item</a:t>
+                      </a:r>
+                    </a:p>
+                  </a:txBody>
+                  <a:tcPr anchor="ctr"/>
+                </a:tc>
+                <a:extLst>
+                  <a:ext uri="{0D108BD9-81ED-4DB2-BD59-A6C34878D82A}">
+                    <a16:rowId xmlns:a16="http://schemas.microsoft.com/office/drawing/2014/main" val="2091545836"/>
+                  </a:ext>
+                </a:extLst>
+              </a:tr>
+            </a:tbl>
+          </a:graphicData>
+        </a:graphic>
+      </p:graphicFrame>
     </p:spTree>
     <p:extLst>
       <p:ext uri="{BB962C8B-B14F-4D97-AF65-F5344CB8AC3E}">
-        <p14:creationId xmlns:p14="http://schemas.microsoft.com/office/powerpoint/2010/main" val="3338411237"/>
+        <p14:creationId xmlns:p14="http://schemas.microsoft.com/office/powerpoint/2010/main" val="2357725955"/>
       </p:ext>
     </p:extLst>
   </p:cSld>
@@ -14835,6 +15019,538 @@
           <p:cNvPr id="2" name="Title 1">
             <a:extLst>
               <a:ext uri="{FF2B5EF4-FFF2-40B4-BE49-F238E27FC236}">
+                <a16:creationId xmlns:a16="http://schemas.microsoft.com/office/drawing/2014/main" id="{D78DEC67-149D-7747-87F3-D940F8EF2C93}"/>
+              </a:ext>
+            </a:extLst>
+          </p:cNvPr>
+          <p:cNvSpPr>
+            <a:spLocks noGrp="1"/>
+          </p:cNvSpPr>
+          <p:nvPr>
+            <p:ph type="title"/>
+          </p:nvPr>
+        </p:nvSpPr>
+        <p:spPr/>
+        <p:txBody>
+          <a:bodyPr/>
+          <a:lstStyle/>
+          <a:p>
+            <a:r>
+              <a:rPr lang="en-US" dirty="0"/>
+              <a:t>Today’s Task: Acronym</a:t>
+            </a:r>
+          </a:p>
+        </p:txBody>
+      </p:sp>
+      <p:sp>
+        <p:nvSpPr>
+          <p:cNvPr id="3" name="Footer Placeholder 3">
+            <a:extLst>
+              <a:ext uri="{FF2B5EF4-FFF2-40B4-BE49-F238E27FC236}">
+                <a16:creationId xmlns:a16="http://schemas.microsoft.com/office/drawing/2014/main" id="{945EF9C5-F59D-F53F-E807-CF0E2DF60EA6}"/>
+              </a:ext>
+            </a:extLst>
+          </p:cNvPr>
+          <p:cNvSpPr>
+            <a:spLocks noGrp="1"/>
+          </p:cNvSpPr>
+          <p:nvPr>
+            <p:ph type="ftr" sz="quarter" idx="10"/>
+          </p:nvPr>
+        </p:nvSpPr>
+        <p:spPr>
+          <a:xfrm>
+            <a:off x="4038599" y="6356350"/>
+            <a:ext cx="4348655" cy="365125"/>
+          </a:xfrm>
+        </p:spPr>
+        <p:txBody>
+          <a:bodyPr/>
+          <a:lstStyle/>
+          <a:p>
+            <a:r>
+              <a:rPr lang="en-US" dirty="0"/>
+              <a:t>Michael Ball | UC Berkeley | https://c88c.org | © CC BY-NC-SA</a:t>
+            </a:r>
+          </a:p>
+        </p:txBody>
+      </p:sp>
+      <p:sp>
+        <p:nvSpPr>
+          <p:cNvPr id="5" name="Rectangle 4">
+            <a:extLst>
+              <a:ext uri="{FF2B5EF4-FFF2-40B4-BE49-F238E27FC236}">
+                <a16:creationId xmlns:a16="http://schemas.microsoft.com/office/drawing/2014/main" id="{F4E01054-B4B8-BC41-8667-60CEB7A01846}"/>
+              </a:ext>
+            </a:extLst>
+          </p:cNvPr>
+          <p:cNvSpPr/>
+          <p:nvPr/>
+        </p:nvSpPr>
+        <p:spPr>
+          <a:xfrm>
+            <a:off x="533400" y="1081668"/>
+            <a:ext cx="8610600" cy="3139321"/>
+          </a:xfrm>
+          <a:prstGeom prst="rect">
+            <a:avLst/>
+          </a:prstGeom>
+        </p:spPr>
+        <p:txBody>
+          <a:bodyPr wrap="square">
+            <a:spAutoFit/>
+          </a:bodyPr>
+          <a:lstStyle/>
+          <a:p>
+            <a:pPr>
+              <a:lnSpc>
+                <a:spcPct val="100000"/>
+              </a:lnSpc>
+            </a:pPr>
+            <a:endParaRPr lang="en-US" spc="-1" dirty="0">
+              <a:solidFill>
+                <a:srgbClr val="000000"/>
+              </a:solidFill>
+              <a:uFill>
+                <a:solidFill>
+                  <a:srgbClr val="FFFFFF"/>
+                </a:solidFill>
+              </a:uFill>
+              <a:latin typeface="Source Code Pro" panose="020B0509030403020204" pitchFamily="49" charset="77"/>
+            </a:endParaRPr>
+          </a:p>
+          <a:p>
+            <a:pPr>
+              <a:lnSpc>
+                <a:spcPct val="100000"/>
+              </a:lnSpc>
+            </a:pPr>
+            <a:r>
+              <a:rPr lang="en-US" spc="-1" dirty="0">
+                <a:solidFill>
+                  <a:srgbClr val="000000"/>
+                </a:solidFill>
+                <a:uFill>
+                  <a:solidFill>
+                    <a:srgbClr val="FFFFFF"/>
+                  </a:solidFill>
+                </a:uFill>
+                <a:latin typeface="Source Code Pro" panose="020B0509030403020204" pitchFamily="49" charset="77"/>
+              </a:rPr>
+              <a:t>Input: "The University of California at Berkeley"</a:t>
+            </a:r>
+          </a:p>
+          <a:p>
+            <a:pPr>
+              <a:lnSpc>
+                <a:spcPct val="100000"/>
+              </a:lnSpc>
+            </a:pPr>
+            <a:endParaRPr lang="en-US" spc="-1" dirty="0">
+              <a:solidFill>
+                <a:srgbClr val="000000"/>
+              </a:solidFill>
+              <a:uFill>
+                <a:solidFill>
+                  <a:srgbClr val="FFFFFF"/>
+                </a:solidFill>
+              </a:uFill>
+              <a:latin typeface="Source Code Pro" panose="020B0509030403020204" pitchFamily="49" charset="77"/>
+            </a:endParaRPr>
+          </a:p>
+          <a:p>
+            <a:pPr>
+              <a:lnSpc>
+                <a:spcPct val="100000"/>
+              </a:lnSpc>
+            </a:pPr>
+            <a:r>
+              <a:rPr lang="en-US" spc="-1" dirty="0">
+                <a:solidFill>
+                  <a:srgbClr val="000000"/>
+                </a:solidFill>
+                <a:uFill>
+                  <a:solidFill>
+                    <a:srgbClr val="FFFFFF"/>
+                  </a:solidFill>
+                </a:uFill>
+                <a:latin typeface="Source Code Pro" panose="020B0509030403020204" pitchFamily="49" charset="77"/>
+              </a:rPr>
+              <a:t>Output: "UCB"</a:t>
+            </a:r>
+          </a:p>
+          <a:p>
+            <a:pPr>
+              <a:lnSpc>
+                <a:spcPct val="100000"/>
+              </a:lnSpc>
+            </a:pPr>
+            <a:r>
+              <a:rPr lang="en-US" spc="-1" dirty="0">
+                <a:solidFill>
+                  <a:srgbClr val="000000"/>
+                </a:solidFill>
+                <a:uFill>
+                  <a:solidFill>
+                    <a:srgbClr val="FFFFFF"/>
+                  </a:solidFill>
+                </a:uFill>
+                <a:latin typeface="Source Code Pro" panose="020B0509030403020204" pitchFamily="49" charset="77"/>
+              </a:rPr>
+              <a:t>def acronym(sentence):</a:t>
+            </a:r>
+          </a:p>
+          <a:p>
+            <a:pPr>
+              <a:lnSpc>
+                <a:spcPct val="100000"/>
+              </a:lnSpc>
+            </a:pPr>
+            <a:r>
+              <a:rPr lang="en-US" spc="-1" dirty="0">
+                <a:solidFill>
+                  <a:srgbClr val="000000"/>
+                </a:solidFill>
+                <a:uFill>
+                  <a:solidFill>
+                    <a:srgbClr val="FFFFFF"/>
+                  </a:solidFill>
+                </a:uFill>
+                <a:latin typeface="Source Code Pro" panose="020B0509030403020204" pitchFamily="49" charset="77"/>
+              </a:rPr>
+              <a:t>    """ (Some </a:t>
+            </a:r>
+            <a:r>
+              <a:rPr lang="en-US" spc="-1" dirty="0" err="1">
+                <a:solidFill>
+                  <a:srgbClr val="000000"/>
+                </a:solidFill>
+                <a:uFill>
+                  <a:solidFill>
+                    <a:srgbClr val="FFFFFF"/>
+                  </a:solidFill>
+                </a:uFill>
+                <a:latin typeface="Source Code Pro" panose="020B0509030403020204" pitchFamily="49" charset="77"/>
+              </a:rPr>
+              <a:t>doctests</a:t>
+            </a:r>
+            <a:r>
+              <a:rPr lang="en-US" spc="-1" dirty="0">
+                <a:solidFill>
+                  <a:srgbClr val="000000"/>
+                </a:solidFill>
+                <a:uFill>
+                  <a:solidFill>
+                    <a:srgbClr val="FFFFFF"/>
+                  </a:solidFill>
+                </a:uFill>
+                <a:latin typeface="Source Code Pro" panose="020B0509030403020204" pitchFamily="49" charset="77"/>
+              </a:rPr>
+              <a:t>)</a:t>
+            </a:r>
+          </a:p>
+          <a:p>
+            <a:pPr>
+              <a:lnSpc>
+                <a:spcPct val="100000"/>
+              </a:lnSpc>
+            </a:pPr>
+            <a:r>
+              <a:rPr lang="en-US" spc="-1" dirty="0">
+                <a:solidFill>
+                  <a:srgbClr val="000000"/>
+                </a:solidFill>
+                <a:uFill>
+                  <a:solidFill>
+                    <a:srgbClr val="FFFFFF"/>
+                  </a:solidFill>
+                </a:uFill>
+                <a:latin typeface="Source Code Pro" panose="020B0509030403020204" pitchFamily="49" charset="77"/>
+              </a:rPr>
+              <a:t>    """</a:t>
+            </a:r>
+          </a:p>
+          <a:p>
+            <a:pPr>
+              <a:lnSpc>
+                <a:spcPct val="100000"/>
+              </a:lnSpc>
+            </a:pPr>
+            <a:r>
+              <a:rPr lang="en-US" spc="-1" dirty="0">
+                <a:solidFill>
+                  <a:srgbClr val="000000"/>
+                </a:solidFill>
+                <a:uFill>
+                  <a:solidFill>
+                    <a:srgbClr val="FFFFFF"/>
+                  </a:solidFill>
+                </a:uFill>
+                <a:latin typeface="Source Code Pro" panose="020B0509030403020204" pitchFamily="49" charset="77"/>
+              </a:rPr>
+              <a:t>    words = </a:t>
+            </a:r>
+            <a:r>
+              <a:rPr lang="en-US" spc="-1" dirty="0" err="1">
+                <a:solidFill>
+                  <a:srgbClr val="000000"/>
+                </a:solidFill>
+                <a:uFill>
+                  <a:solidFill>
+                    <a:srgbClr val="FFFFFF"/>
+                  </a:solidFill>
+                </a:uFill>
+                <a:latin typeface="Source Code Pro" panose="020B0509030403020204" pitchFamily="49" charset="77"/>
+              </a:rPr>
+              <a:t>sentence.split</a:t>
+            </a:r>
+            <a:r>
+              <a:rPr lang="en-US" spc="-1" dirty="0">
+                <a:solidFill>
+                  <a:srgbClr val="000000"/>
+                </a:solidFill>
+                <a:uFill>
+                  <a:solidFill>
+                    <a:srgbClr val="FFFFFF"/>
+                  </a:solidFill>
+                </a:uFill>
+                <a:latin typeface="Source Code Pro" panose="020B0509030403020204" pitchFamily="49" charset="77"/>
+              </a:rPr>
+              <a:t>()</a:t>
+            </a:r>
+          </a:p>
+          <a:p>
+            <a:pPr>
+              <a:lnSpc>
+                <a:spcPct val="100000"/>
+              </a:lnSpc>
+            </a:pPr>
+            <a:r>
+              <a:rPr lang="en-US" spc="-1" dirty="0">
+                <a:solidFill>
+                  <a:srgbClr val="000000"/>
+                </a:solidFill>
+                <a:uFill>
+                  <a:solidFill>
+                    <a:srgbClr val="FFFFFF"/>
+                  </a:solidFill>
+                </a:uFill>
+                <a:latin typeface="Source Code Pro" panose="020B0509030403020204" pitchFamily="49" charset="77"/>
+              </a:rPr>
+              <a:t>    return reduce(add, map(</a:t>
+            </a:r>
+            <a:r>
+              <a:rPr lang="en-US" spc="-1" dirty="0" err="1">
+                <a:solidFill>
+                  <a:srgbClr val="000000"/>
+                </a:solidFill>
+                <a:uFill>
+                  <a:solidFill>
+                    <a:srgbClr val="FFFFFF"/>
+                  </a:solidFill>
+                </a:uFill>
+                <a:latin typeface="Source Code Pro" panose="020B0509030403020204" pitchFamily="49" charset="77"/>
+              </a:rPr>
+              <a:t>first_letter</a:t>
+            </a:r>
+            <a:r>
+              <a:rPr lang="en-US" spc="-1" dirty="0">
+                <a:solidFill>
+                  <a:srgbClr val="000000"/>
+                </a:solidFill>
+                <a:uFill>
+                  <a:solidFill>
+                    <a:srgbClr val="FFFFFF"/>
+                  </a:solidFill>
+                </a:uFill>
+                <a:latin typeface="Source Code Pro" panose="020B0509030403020204" pitchFamily="49" charset="77"/>
+              </a:rPr>
+              <a:t>, filter(</a:t>
+            </a:r>
+            <a:r>
+              <a:rPr lang="en-US" spc="-1" dirty="0" err="1">
+                <a:solidFill>
+                  <a:srgbClr val="000000"/>
+                </a:solidFill>
+                <a:uFill>
+                  <a:solidFill>
+                    <a:srgbClr val="FFFFFF"/>
+                  </a:solidFill>
+                </a:uFill>
+                <a:latin typeface="Source Code Pro" panose="020B0509030403020204" pitchFamily="49" charset="77"/>
+              </a:rPr>
+              <a:t>long_word</a:t>
+            </a:r>
+            <a:r>
+              <a:rPr lang="en-US" spc="-1" dirty="0">
+                <a:solidFill>
+                  <a:srgbClr val="000000"/>
+                </a:solidFill>
+                <a:uFill>
+                  <a:solidFill>
+                    <a:srgbClr val="FFFFFF"/>
+                  </a:solidFill>
+                </a:uFill>
+                <a:latin typeface="Source Code Pro" panose="020B0509030403020204" pitchFamily="49" charset="77"/>
+              </a:rPr>
+              <a:t>, words)))</a:t>
+            </a:r>
+          </a:p>
+          <a:p>
+            <a:pPr>
+              <a:lnSpc>
+                <a:spcPct val="100000"/>
+              </a:lnSpc>
+            </a:pPr>
+            <a:endParaRPr lang="en-US" spc="-1" dirty="0">
+              <a:solidFill>
+                <a:srgbClr val="000000"/>
+              </a:solidFill>
+              <a:uFill>
+                <a:solidFill>
+                  <a:srgbClr val="FFFFFF"/>
+                </a:solidFill>
+              </a:uFill>
+              <a:latin typeface="Source Code Pro" panose="020B0509030403020204" pitchFamily="49" charset="77"/>
+            </a:endParaRPr>
+          </a:p>
+        </p:txBody>
+      </p:sp>
+      <p:sp>
+        <p:nvSpPr>
+          <p:cNvPr id="7" name="TextShape 11">
+            <a:extLst>
+              <a:ext uri="{FF2B5EF4-FFF2-40B4-BE49-F238E27FC236}">
+                <a16:creationId xmlns:a16="http://schemas.microsoft.com/office/drawing/2014/main" id="{55609106-671F-E84E-8744-3B2453668F27}"/>
+              </a:ext>
+            </a:extLst>
+          </p:cNvPr>
+          <p:cNvSpPr txBox="1"/>
+          <p:nvPr/>
+        </p:nvSpPr>
+        <p:spPr>
+          <a:xfrm>
+            <a:off x="2281080" y="5012456"/>
+            <a:ext cx="7171560" cy="602280"/>
+          </a:xfrm>
+          <a:prstGeom prst="rect">
+            <a:avLst/>
+          </a:prstGeom>
+          <a:noFill/>
+          <a:ln>
+            <a:noFill/>
+          </a:ln>
+        </p:spPr>
+        <p:txBody>
+          <a:bodyPr lIns="90000" tIns="45000" rIns="90000" bIns="45000"/>
+          <a:lstStyle/>
+          <a:p>
+            <a:r>
+              <a:rPr lang="en-US" spc="-1" dirty="0">
+                <a:solidFill>
+                  <a:srgbClr val="000000"/>
+                </a:solidFill>
+                <a:uFill>
+                  <a:solidFill>
+                    <a:srgbClr val="FFFFFF"/>
+                  </a:solidFill>
+                </a:uFill>
+                <a:latin typeface="Arial"/>
+              </a:rPr>
+              <a:t>P.S. Pedantry alert: This is really an </a:t>
+            </a:r>
+            <a:r>
+              <a:rPr lang="en-US" i="1" spc="-1" dirty="0">
+                <a:solidFill>
+                  <a:srgbClr val="000000"/>
+                </a:solidFill>
+                <a:uFill>
+                  <a:solidFill>
+                    <a:srgbClr val="FFFFFF"/>
+                  </a:solidFill>
+                </a:uFill>
+                <a:latin typeface="Arial"/>
+              </a:rPr>
+              <a:t>initialism</a:t>
+            </a:r>
+            <a:r>
+              <a:rPr lang="en-US" spc="-1" dirty="0">
+                <a:solidFill>
+                  <a:srgbClr val="000000"/>
+                </a:solidFill>
+                <a:uFill>
+                  <a:solidFill>
+                    <a:srgbClr val="FFFFFF"/>
+                  </a:solidFill>
+                </a:uFill>
+                <a:latin typeface="Arial"/>
+              </a:rPr>
+              <a:t> but that's rather annoying to say and type. </a:t>
+            </a:r>
+            <a:r>
+              <a:rPr lang="en-US" spc="-1" dirty="0">
+                <a:solidFill>
+                  <a:srgbClr val="000000"/>
+                </a:solidFill>
+                <a:uFill>
+                  <a:solidFill>
+                    <a:srgbClr val="FFFFFF"/>
+                  </a:solidFill>
+                </a:uFill>
+                <a:latin typeface="Arial"/>
+                <a:sym typeface="Wingdings" pitchFamily="2" charset="2"/>
+              </a:rPr>
+              <a:t> (However, the code we write is the same, the difference is in how you pronounce the result.) The more you know!</a:t>
+            </a:r>
+            <a:endParaRPr lang="en-US" spc="-1" dirty="0">
+              <a:solidFill>
+                <a:srgbClr val="000000"/>
+              </a:solidFill>
+              <a:uFill>
+                <a:solidFill>
+                  <a:srgbClr val="FFFFFF"/>
+                </a:solidFill>
+              </a:uFill>
+              <a:latin typeface="Arial"/>
+            </a:endParaRPr>
+          </a:p>
+        </p:txBody>
+      </p:sp>
+    </p:spTree>
+    <p:extLst>
+      <p:ext uri="{BB962C8B-B14F-4D97-AF65-F5344CB8AC3E}">
+        <p14:creationId xmlns:p14="http://schemas.microsoft.com/office/powerpoint/2010/main" val="3338411237"/>
+      </p:ext>
+    </p:extLst>
+  </p:cSld>
+  <p:clrMapOvr>
+    <a:masterClrMapping/>
+  </p:clrMapOvr>
+</p:sld>
+</file>
+
+<file path=ppt/slides/slide8.xml><?xml version="1.0" encoding="utf-8"?>
+<p:sld xmlns:a="http://schemas.openxmlformats.org/drawingml/2006/main" xmlns:r="http://schemas.openxmlformats.org/officeDocument/2006/relationships" xmlns:p="http://schemas.openxmlformats.org/presentationml/2006/main">
+  <p:cSld>
+    <p:spTree>
+      <p:nvGrpSpPr>
+        <p:cNvPr id="1" name=""/>
+        <p:cNvGrpSpPr/>
+        <p:nvPr/>
+      </p:nvGrpSpPr>
+      <p:grpSpPr>
+        <a:xfrm>
+          <a:off x="0" y="0"/>
+          <a:ext cx="0" cy="0"/>
+          <a:chOff x="0" y="0"/>
+          <a:chExt cx="0" cy="0"/>
+        </a:xfrm>
+      </p:grpSpPr>
+      <p:sp>
+        <p:nvSpPr>
+          <p:cNvPr id="2" name="Title 1">
+            <a:extLst>
+              <a:ext uri="{FF2B5EF4-FFF2-40B4-BE49-F238E27FC236}">
                 <a16:creationId xmlns:a16="http://schemas.microsoft.com/office/drawing/2014/main" id="{4C391A7B-517B-1F28-7683-AA06AF06A49F}"/>
               </a:ext>
             </a:extLst>
@@ -15138,7 +15854,7 @@
 </p:sld>
 </file>
 
-<file path=ppt/slides/slide8.xml><?xml version="1.0" encoding="utf-8"?>
+<file path=ppt/slides/slide9.xml><?xml version="1.0" encoding="utf-8"?>
 <p:sld xmlns:a="http://schemas.openxmlformats.org/drawingml/2006/main" xmlns:r="http://schemas.openxmlformats.org/officeDocument/2006/relationships" xmlns:p="http://schemas.openxmlformats.org/presentationml/2006/main">
   <p:cSld>
     <p:spTree>
@@ -15746,91 +16462,6 @@
   <p:clrMapOvr>
     <a:masterClrMapping/>
   </p:clrMapOvr>
-</p:sld>
-</file>
-
-<file path=ppt/slides/slide9.xml><?xml version="1.0" encoding="utf-8"?>
-<p:sld xmlns:a="http://schemas.openxmlformats.org/drawingml/2006/main" xmlns:r="http://schemas.openxmlformats.org/officeDocument/2006/relationships" xmlns:p="http://schemas.openxmlformats.org/presentationml/2006/main">
-  <p:cSld>
-    <p:spTree>
-      <p:nvGrpSpPr>
-        <p:cNvPr id="1" name=""/>
-        <p:cNvGrpSpPr/>
-        <p:nvPr/>
-      </p:nvGrpSpPr>
-      <p:grpSpPr>
-        <a:xfrm>
-          <a:off x="0" y="0"/>
-          <a:ext cx="0" cy="0"/>
-          <a:chOff x="0" y="0"/>
-          <a:chExt cx="0" cy="0"/>
-        </a:xfrm>
-      </p:grpSpPr>
-      <p:sp>
-        <p:nvSpPr>
-          <p:cNvPr id="2" name="Title 1">
-            <a:extLst>
-              <a:ext uri="{FF2B5EF4-FFF2-40B4-BE49-F238E27FC236}">
-                <a16:creationId xmlns:a16="http://schemas.microsoft.com/office/drawing/2014/main" id="{D2340843-39A8-4E4A-A923-FEDC64A7AE32}"/>
-              </a:ext>
-            </a:extLst>
-          </p:cNvPr>
-          <p:cNvSpPr>
-            <a:spLocks noGrp="1"/>
-          </p:cNvSpPr>
-          <p:nvPr>
-            <p:ph type="ctrTitle"/>
-          </p:nvPr>
-        </p:nvSpPr>
-        <p:spPr/>
-        <p:txBody>
-          <a:bodyPr/>
-          <a:lstStyle/>
-          <a:p>
-            <a:r>
-              <a:rPr lang="en-US" dirty="0"/>
-              <a:t>Functions That Return Functions</a:t>
-            </a:r>
-          </a:p>
-        </p:txBody>
-      </p:sp>
-    </p:spTree>
-    <p:extLst>
-      <p:ext uri="{BB962C8B-B14F-4D97-AF65-F5344CB8AC3E}">
-        <p14:creationId xmlns:p14="http://schemas.microsoft.com/office/powerpoint/2010/main" val="4264810558"/>
-      </p:ext>
-    </p:extLst>
-  </p:cSld>
-  <p:clrMapOvr>
-    <a:masterClrMapping/>
-  </p:clrMapOvr>
-  <p:timing>
-    <p:tnLst>
-      <p:par>
-        <p:cTn id="1" dur="indefinite" restart="never" nodeType="tmRoot">
-          <p:childTnLst>
-            <p:seq>
-              <p:cTn id="2" nodeType="mainSeq"/>
-              <p:prevCondLst>
-                <p:cond evt="onPrev" delay="0">
-                  <p:tgtEl>
-                    <p:sldTgt/>
-                  </p:tgtEl>
-                </p:cond>
-              </p:prevCondLst>
-              <p:nextCondLst>
-                <p:cond evt="onNext" delay="0">
-                  <p:tgtEl>
-                    <p:sldTgt/>
-                  </p:tgtEl>
-                </p:cond>
-              </p:nextCondLst>
-            </p:seq>
-          </p:childTnLst>
-        </p:cTn>
-      </p:par>
-    </p:tnLst>
-  </p:timing>
 </p:sld>
 </file>
 

</xml_diff>

<commit_message>
Deploy website Mon Feb 12 13:56:16 PST 2024
</commit_message>
<xml_diff>
--- a/assets/slides/sp24/07-HOFs_Environments.pptx
+++ b/assets/slides/sp24/07-HOFs_Environments.pptx
@@ -5,7 +5,7 @@
     <p:sldMasterId id="2147483703" r:id="rId1"/>
   </p:sldMasterIdLst>
   <p:notesMasterIdLst>
-    <p:notesMasterId r:id="rId25"/>
+    <p:notesMasterId r:id="rId26"/>
   </p:notesMasterIdLst>
   <p:sldIdLst>
     <p:sldId id="256" r:id="rId2"/>
@@ -14,23 +14,24 @@
     <p:sldId id="392" r:id="rId5"/>
     <p:sldId id="396" r:id="rId6"/>
     <p:sldId id="402" r:id="rId7"/>
-    <p:sldId id="397" r:id="rId8"/>
-    <p:sldId id="398" r:id="rId9"/>
-    <p:sldId id="399" r:id="rId10"/>
-    <p:sldId id="286" r:id="rId11"/>
-    <p:sldId id="291" r:id="rId12"/>
-    <p:sldId id="285" r:id="rId13"/>
-    <p:sldId id="268" r:id="rId14"/>
-    <p:sldId id="287" r:id="rId15"/>
-    <p:sldId id="401" r:id="rId16"/>
-    <p:sldId id="289" r:id="rId17"/>
-    <p:sldId id="265" r:id="rId18"/>
-    <p:sldId id="390" r:id="rId19"/>
-    <p:sldId id="389" r:id="rId20"/>
-    <p:sldId id="387" r:id="rId21"/>
-    <p:sldId id="388" r:id="rId22"/>
-    <p:sldId id="288" r:id="rId23"/>
-    <p:sldId id="400" r:id="rId24"/>
+    <p:sldId id="435" r:id="rId8"/>
+    <p:sldId id="397" r:id="rId9"/>
+    <p:sldId id="398" r:id="rId10"/>
+    <p:sldId id="399" r:id="rId11"/>
+    <p:sldId id="286" r:id="rId12"/>
+    <p:sldId id="291" r:id="rId13"/>
+    <p:sldId id="285" r:id="rId14"/>
+    <p:sldId id="268" r:id="rId15"/>
+    <p:sldId id="287" r:id="rId16"/>
+    <p:sldId id="401" r:id="rId17"/>
+    <p:sldId id="289" r:id="rId18"/>
+    <p:sldId id="265" r:id="rId19"/>
+    <p:sldId id="390" r:id="rId20"/>
+    <p:sldId id="389" r:id="rId21"/>
+    <p:sldId id="387" r:id="rId22"/>
+    <p:sldId id="388" r:id="rId23"/>
+    <p:sldId id="288" r:id="rId24"/>
+    <p:sldId id="400" r:id="rId25"/>
   </p:sldIdLst>
   <p:sldSz cx="12192000" cy="6858000"/>
   <p:notesSz cx="6997700" cy="9194800"/>
@@ -797,7 +798,7 @@
                 <a:latin typeface="Times New Roman"/>
                 <a:ea typeface="ＭＳ Ｐゴシック"/>
               </a:rPr>
-              <a:t>10</a:t>
+              <a:t>11</a:t>
             </a:fld>
             <a:endParaRPr lang="en-US" sz="2400" b="0" strike="noStrike" spc="-1">
               <a:solidFill>
@@ -921,7 +922,7 @@
                 <a:latin typeface="Times New Roman"/>
                 <a:ea typeface="ＭＳ Ｐゴシック"/>
               </a:rPr>
-              <a:t>14</a:t>
+              <a:t>15</a:t>
             </a:fld>
             <a:endParaRPr lang="en-US" sz="2400" b="0" strike="noStrike" spc="-1">
               <a:solidFill>
@@ -1077,7 +1078,7 @@
                 </a:uFill>
                 <a:latin typeface="Times New Roman"/>
               </a:rPr>
-              <a:t>17</a:t>
+              <a:t>18</a:t>
             </a:fld>
             <a:endParaRPr lang="en-US" sz="1400" b="0" strike="noStrike" spc="-1">
               <a:solidFill>
@@ -1196,7 +1197,7 @@
                 </a:uFill>
                 <a:latin typeface="Times New Roman"/>
               </a:rPr>
-              <a:t>20</a:t>
+              <a:t>21</a:t>
             </a:fld>
             <a:endParaRPr lang="en-US" sz="1400" b="0" strike="noStrike" spc="-1">
               <a:solidFill>
@@ -1315,7 +1316,7 @@
                 </a:uFill>
                 <a:latin typeface="Times New Roman"/>
               </a:rPr>
-              <a:t>22</a:t>
+              <a:t>23</a:t>
             </a:fld>
             <a:endParaRPr lang="en-US" sz="1400" b="0" strike="noStrike" spc="-1">
               <a:solidFill>
@@ -4101,7 +4102,7 @@
           </a:ln>
           <a:extLst>
             <a:ext uri="{909E8E84-426E-40dd-AFC4-6F175D3DCCD1}">
-              <a14:hiddenFill xmlns:a14="http://schemas.microsoft.com/office/drawing/2010/main" xmlns="">
+              <a14:hiddenFill xmlns="" xmlns:a14="http://schemas.microsoft.com/office/drawing/2010/main">
                 <a:noFill/>
               </a14:hiddenFill>
             </a:ext>
@@ -4223,14 +4224,14 @@
           </a:ln>
           <a:extLst>
             <a:ext uri="{909E8E84-426E-40dd-AFC4-6F175D3DCCD1}">
-              <a14:hiddenFill xmlns:a14="http://schemas.microsoft.com/office/drawing/2010/main" xmlns="">
+              <a14:hiddenFill xmlns="" xmlns:a14="http://schemas.microsoft.com/office/drawing/2010/main">
                 <a:solidFill>
                   <a:srgbClr val="FFFFFF"/>
                 </a:solidFill>
               </a14:hiddenFill>
             </a:ext>
             <a:ext uri="{91240B29-F687-4f45-9708-019B960494DF}">
-              <a14:hiddenLine xmlns:a14="http://schemas.microsoft.com/office/drawing/2010/main" xmlns="" w="9525">
+              <a14:hiddenLine xmlns="" xmlns:a14="http://schemas.microsoft.com/office/drawing/2010/main" w="9525">
                 <a:solidFill>
                   <a:srgbClr val="000000"/>
                 </a:solidFill>
@@ -4240,7 +4241,7 @@
               </a14:hiddenLine>
             </a:ext>
             <a:ext uri="{FAA26D3D-D897-4be2-8F04-BA451C77F1D7}">
-              <ma14:placeholderFlag xmlns:ma14="http://schemas.microsoft.com/office/mac/drawingml/2011/main" xmlns="" val="1"/>
+              <ma14:placeholderFlag xmlns="" xmlns:ma14="http://schemas.microsoft.com/office/mac/drawingml/2011/main" val="1"/>
             </a:ext>
           </a:extLst>
         </p:spPr>
@@ -4798,7 +4799,7 @@
           </a:ln>
           <a:extLst>
             <a:ext uri="{909E8E84-426E-40dd-AFC4-6F175D3DCCD1}">
-              <a14:hiddenFill xmlns:a14="http://schemas.microsoft.com/office/drawing/2010/main" xmlns="">
+              <a14:hiddenFill xmlns="" xmlns:a14="http://schemas.microsoft.com/office/drawing/2010/main">
                 <a:noFill/>
               </a14:hiddenFill>
             </a:ext>
@@ -4843,14 +4844,14 @@
           </a:ln>
           <a:extLst>
             <a:ext uri="{909E8E84-426E-40dd-AFC4-6F175D3DCCD1}">
-              <a14:hiddenFill xmlns:a14="http://schemas.microsoft.com/office/drawing/2010/main" xmlns="">
+              <a14:hiddenFill xmlns="" xmlns:a14="http://schemas.microsoft.com/office/drawing/2010/main">
                 <a:solidFill>
                   <a:srgbClr val="FFFFFF"/>
                 </a:solidFill>
               </a14:hiddenFill>
             </a:ext>
             <a:ext uri="{91240B29-F687-4f45-9708-019B960494DF}">
-              <a14:hiddenLine xmlns:a14="http://schemas.microsoft.com/office/drawing/2010/main" xmlns="" w="9525">
+              <a14:hiddenLine xmlns="" xmlns:a14="http://schemas.microsoft.com/office/drawing/2010/main" w="9525">
                 <a:solidFill>
                   <a:srgbClr val="000000"/>
                 </a:solidFill>
@@ -4958,14 +4959,14 @@
           </a:ln>
           <a:extLst>
             <a:ext uri="{909E8E84-426E-40dd-AFC4-6F175D3DCCD1}">
-              <a14:hiddenFill xmlns:a14="http://schemas.microsoft.com/office/drawing/2010/main" xmlns="">
+              <a14:hiddenFill xmlns="" xmlns:a14="http://schemas.microsoft.com/office/drawing/2010/main">
                 <a:solidFill>
                   <a:srgbClr val="FFFFFF"/>
                 </a:solidFill>
               </a14:hiddenFill>
             </a:ext>
             <a:ext uri="{91240B29-F687-4f45-9708-019B960494DF}">
-              <a14:hiddenLine xmlns:a14="http://schemas.microsoft.com/office/drawing/2010/main" xmlns="" w="9525">
+              <a14:hiddenLine xmlns="" xmlns:a14="http://schemas.microsoft.com/office/drawing/2010/main" w="9525">
                 <a:solidFill>
                   <a:srgbClr val="000000"/>
                 </a:solidFill>
@@ -4975,7 +4976,7 @@
               </a14:hiddenLine>
             </a:ext>
             <a:ext uri="{FAA26D3D-D897-4be2-8F04-BA451C77F1D7}">
-              <ma14:placeholderFlag xmlns:ma14="http://schemas.microsoft.com/office/mac/drawingml/2011/main" xmlns="" val="1"/>
+              <ma14:placeholderFlag xmlns="" xmlns:ma14="http://schemas.microsoft.com/office/mac/drawingml/2011/main" val="1"/>
             </a:ext>
           </a:extLst>
         </p:spPr>
@@ -5323,14 +5324,14 @@
           </a:ln>
           <a:extLst>
             <a:ext uri="{909E8E84-426E-40dd-AFC4-6F175D3DCCD1}">
-              <a14:hiddenFill xmlns:a14="http://schemas.microsoft.com/office/drawing/2010/main" xmlns="">
+              <a14:hiddenFill xmlns="" xmlns:a14="http://schemas.microsoft.com/office/drawing/2010/main">
                 <a:solidFill>
                   <a:srgbClr val="FFFFFF"/>
                 </a:solidFill>
               </a14:hiddenFill>
             </a:ext>
             <a:ext uri="{91240B29-F687-4f45-9708-019B960494DF}">
-              <a14:hiddenLine xmlns:a14="http://schemas.microsoft.com/office/drawing/2010/main" xmlns="" w="9525">
+              <a14:hiddenLine xmlns="" xmlns:a14="http://schemas.microsoft.com/office/drawing/2010/main" w="9525">
                 <a:solidFill>
                   <a:srgbClr val="000000"/>
                 </a:solidFill>
@@ -5340,7 +5341,7 @@
               </a14:hiddenLine>
             </a:ext>
             <a:ext uri="{FAA26D3D-D897-4be2-8F04-BA451C77F1D7}">
-              <ma14:placeholderFlag xmlns:ma14="http://schemas.microsoft.com/office/mac/drawingml/2011/main" xmlns="" val="1"/>
+              <ma14:placeholderFlag xmlns="" xmlns:ma14="http://schemas.microsoft.com/office/mac/drawingml/2011/main" val="1"/>
             </a:ext>
           </a:extLst>
         </p:spPr>
@@ -6401,7 +6402,7 @@
           </a:ln>
           <a:extLst>
             <a:ext uri="{909E8E84-426E-40dd-AFC4-6F175D3DCCD1}">
-              <a14:hiddenFill xmlns="" xmlns:a14="http://schemas.microsoft.com/office/drawing/2010/main">
+              <a14:hiddenFill xmlns:a14="http://schemas.microsoft.com/office/drawing/2010/main" xmlns="">
                 <a:noFill/>
               </a14:hiddenFill>
             </a:ext>
@@ -6526,14 +6527,14 @@
           </a:ln>
           <a:extLst>
             <a:ext uri="{909E8E84-426E-40dd-AFC4-6F175D3DCCD1}">
-              <a14:hiddenFill xmlns="" xmlns:a14="http://schemas.microsoft.com/office/drawing/2010/main">
+              <a14:hiddenFill xmlns:a14="http://schemas.microsoft.com/office/drawing/2010/main" xmlns="">
                 <a:solidFill>
                   <a:srgbClr val="FFFFFF"/>
                 </a:solidFill>
               </a14:hiddenFill>
             </a:ext>
             <a:ext uri="{91240B29-F687-4f45-9708-019B960494DF}">
-              <a14:hiddenLine xmlns="" xmlns:a14="http://schemas.microsoft.com/office/drawing/2010/main" w="9525">
+              <a14:hiddenLine xmlns:a14="http://schemas.microsoft.com/office/drawing/2010/main" xmlns="" w="9525">
                 <a:solidFill>
                   <a:srgbClr val="000000"/>
                 </a:solidFill>
@@ -6543,7 +6544,7 @@
               </a14:hiddenLine>
             </a:ext>
             <a:ext uri="{FAA26D3D-D897-4be2-8F04-BA451C77F1D7}">
-              <ma14:placeholderFlag xmlns="" xmlns:ma14="http://schemas.microsoft.com/office/mac/drawingml/2011/main" val="1"/>
+              <ma14:placeholderFlag xmlns:ma14="http://schemas.microsoft.com/office/mac/drawingml/2011/main" xmlns="" val="1"/>
             </a:ext>
           </a:extLst>
         </p:spPr>
@@ -8686,14 +8687,14 @@
           </a:ln>
           <a:extLst>
             <a:ext uri="{909E8E84-426E-40dd-AFC4-6F175D3DCCD1}">
-              <a14:hiddenFill xmlns="" xmlns:a14="http://schemas.microsoft.com/office/drawing/2010/main">
+              <a14:hiddenFill xmlns:a14="http://schemas.microsoft.com/office/drawing/2010/main" xmlns="">
                 <a:solidFill>
                   <a:srgbClr val="FFFFFF"/>
                 </a:solidFill>
               </a14:hiddenFill>
             </a:ext>
             <a:ext uri="{91240B29-F687-4f45-9708-019B960494DF}">
-              <a14:hiddenLine xmlns="" xmlns:a14="http://schemas.microsoft.com/office/drawing/2010/main" w="9525">
+              <a14:hiddenLine xmlns:a14="http://schemas.microsoft.com/office/drawing/2010/main" xmlns="" w="9525">
                 <a:solidFill>
                   <a:srgbClr val="000000"/>
                 </a:solidFill>
@@ -8703,7 +8704,7 @@
               </a14:hiddenLine>
             </a:ext>
             <a:ext uri="{FAA26D3D-D897-4be2-8F04-BA451C77F1D7}">
-              <ma14:placeholderFlag xmlns="" xmlns:ma14="http://schemas.microsoft.com/office/mac/drawingml/2011/main" val="1"/>
+              <ma14:placeholderFlag xmlns:ma14="http://schemas.microsoft.com/office/mac/drawingml/2011/main" xmlns="" val="1"/>
             </a:ext>
           </a:extLst>
         </p:spPr>
@@ -8748,14 +8749,14 @@
           </a:ln>
           <a:extLst>
             <a:ext uri="{909E8E84-426E-40dd-AFC4-6F175D3DCCD1}">
-              <a14:hiddenFill xmlns="" xmlns:a14="http://schemas.microsoft.com/office/drawing/2010/main">
+              <a14:hiddenFill xmlns:a14="http://schemas.microsoft.com/office/drawing/2010/main" xmlns="">
                 <a:solidFill>
                   <a:srgbClr val="FFFFFF"/>
                 </a:solidFill>
               </a14:hiddenFill>
             </a:ext>
             <a:ext uri="{91240B29-F687-4f45-9708-019B960494DF}">
-              <a14:hiddenLine xmlns="" xmlns:a14="http://schemas.microsoft.com/office/drawing/2010/main" w="9525">
+              <a14:hiddenLine xmlns:a14="http://schemas.microsoft.com/office/drawing/2010/main" xmlns="" w="9525">
                 <a:solidFill>
                   <a:srgbClr val="000000"/>
                 </a:solidFill>
@@ -8765,7 +8766,7 @@
               </a14:hiddenLine>
             </a:ext>
             <a:ext uri="{FAA26D3D-D897-4be2-8F04-BA451C77F1D7}">
-              <ma14:placeholderFlag xmlns="" xmlns:ma14="http://schemas.microsoft.com/office/mac/drawingml/2011/main" val="1"/>
+              <ma14:placeholderFlag xmlns:ma14="http://schemas.microsoft.com/office/mac/drawingml/2011/main" xmlns="" val="1"/>
             </a:ext>
           </a:extLst>
         </p:spPr>
@@ -9516,6 +9517,617 @@
           <p:cNvPr id="2" name="Title 1">
             <a:extLst>
               <a:ext uri="{FF2B5EF4-FFF2-40B4-BE49-F238E27FC236}">
+                <a16:creationId xmlns:a16="http://schemas.microsoft.com/office/drawing/2014/main" id="{C3A57493-490E-6541-9973-A295DBF3E35F}"/>
+              </a:ext>
+            </a:extLst>
+          </p:cNvPr>
+          <p:cNvSpPr>
+            <a:spLocks noGrp="1"/>
+          </p:cNvSpPr>
+          <p:nvPr>
+            <p:ph type="title"/>
+          </p:nvPr>
+        </p:nvSpPr>
+        <p:spPr/>
+        <p:txBody>
+          <a:bodyPr/>
+          <a:lstStyle/>
+          <a:p>
+            <a:r>
+              <a:rPr lang="en-US" dirty="0"/>
+              <a:t>Functional Sequence (List) Operations</a:t>
+            </a:r>
+          </a:p>
+        </p:txBody>
+      </p:sp>
+      <p:sp>
+        <p:nvSpPr>
+          <p:cNvPr id="3" name="Content Placeholder 2">
+            <a:extLst>
+              <a:ext uri="{FF2B5EF4-FFF2-40B4-BE49-F238E27FC236}">
+                <a16:creationId xmlns:a16="http://schemas.microsoft.com/office/drawing/2014/main" id="{AAAEACB3-3528-3B4E-9961-861C7DBB5CBC}"/>
+              </a:ext>
+            </a:extLst>
+          </p:cNvPr>
+          <p:cNvSpPr>
+            <a:spLocks noGrp="1"/>
+          </p:cNvSpPr>
+          <p:nvPr>
+            <p:ph idx="1"/>
+          </p:nvPr>
+        </p:nvSpPr>
+        <p:spPr/>
+        <p:txBody>
+          <a:bodyPr/>
+          <a:lstStyle/>
+          <a:p>
+            <a:r>
+              <a:rPr lang="en-US" dirty="0"/>
+              <a:t>Goal: Transform a</a:t>
+            </a:r>
+            <a:r>
+              <a:rPr lang="en-US" i="1" dirty="0"/>
+              <a:t> sequence</a:t>
+            </a:r>
+            <a:r>
+              <a:rPr lang="en-US" dirty="0"/>
+              <a:t>, and return a new result</a:t>
+            </a:r>
+          </a:p>
+          <a:p>
+            <a:r>
+              <a:rPr lang="en-US" dirty="0"/>
+              <a:t>We'll use 3 functions that are hallmarks of functional programming</a:t>
+            </a:r>
+          </a:p>
+          <a:p>
+            <a:r>
+              <a:rPr lang="en-US" dirty="0"/>
+              <a:t>Each of these takes in a function and a sequence as arguments</a:t>
+            </a:r>
+          </a:p>
+          <a:p>
+            <a:endParaRPr lang="en-US" dirty="0"/>
+          </a:p>
+          <a:p>
+            <a:pPr marL="0" indent="0">
+              <a:buNone/>
+            </a:pPr>
+            <a:endParaRPr lang="en-US" dirty="0"/>
+          </a:p>
+          <a:p>
+            <a:pPr marL="0" indent="0">
+              <a:buNone/>
+            </a:pPr>
+            <a:endParaRPr lang="en-US" dirty="0"/>
+          </a:p>
+        </p:txBody>
+      </p:sp>
+      <p:sp>
+        <p:nvSpPr>
+          <p:cNvPr id="4" name="Footer Placeholder 3">
+            <a:extLst>
+              <a:ext uri="{FF2B5EF4-FFF2-40B4-BE49-F238E27FC236}">
+                <a16:creationId xmlns:a16="http://schemas.microsoft.com/office/drawing/2014/main" id="{B4344FEE-E72B-B65D-1AD5-8C1189F1FACC}"/>
+              </a:ext>
+            </a:extLst>
+          </p:cNvPr>
+          <p:cNvSpPr>
+            <a:spLocks noGrp="1"/>
+          </p:cNvSpPr>
+          <p:nvPr>
+            <p:ph type="ftr" sz="quarter" idx="10"/>
+          </p:nvPr>
+        </p:nvSpPr>
+        <p:spPr>
+          <a:xfrm>
+            <a:off x="4038599" y="6356350"/>
+            <a:ext cx="4348655" cy="365125"/>
+          </a:xfrm>
+        </p:spPr>
+        <p:txBody>
+          <a:bodyPr/>
+          <a:lstStyle/>
+          <a:p>
+            <a:r>
+              <a:rPr lang="en-US" dirty="0"/>
+              <a:t>Michael Ball | UC Berkeley | https://c88c.org | © CC BY-NC-SA</a:t>
+            </a:r>
+          </a:p>
+        </p:txBody>
+      </p:sp>
+      <p:graphicFrame>
+        <p:nvGraphicFramePr>
+          <p:cNvPr id="6" name="Table 6">
+            <a:extLst>
+              <a:ext uri="{FF2B5EF4-FFF2-40B4-BE49-F238E27FC236}">
+                <a16:creationId xmlns:a16="http://schemas.microsoft.com/office/drawing/2014/main" id="{25EBD1E5-B78E-72B6-6282-D80B13046B4F}"/>
+              </a:ext>
+            </a:extLst>
+          </p:cNvPr>
+          <p:cNvGraphicFramePr>
+            <a:graphicFrameLocks noGrp="1"/>
+          </p:cNvGraphicFramePr>
+          <p:nvPr/>
+        </p:nvGraphicFramePr>
+        <p:xfrm>
+          <a:off x="420415" y="2792760"/>
+          <a:ext cx="10594426" cy="3421927"/>
+        </p:xfrm>
+        <a:graphic>
+          <a:graphicData uri="http://schemas.openxmlformats.org/drawingml/2006/table">
+            <a:tbl>
+              <a:tblPr firstRow="1" bandRow="1">
+                <a:tableStyleId>{5C22544A-7EE6-4342-B048-85BDC9FD1C3A}</a:tableStyleId>
+              </a:tblPr>
+              <a:tblGrid>
+                <a:gridCol w="1692164">
+                  <a:extLst>
+                    <a:ext uri="{9D8B030D-6E8A-4147-A177-3AD203B41FA5}">
+                      <a16:colId xmlns:a16="http://schemas.microsoft.com/office/drawing/2014/main" val="2059777158"/>
+                    </a:ext>
+                  </a:extLst>
+                </a:gridCol>
+                <a:gridCol w="2333297">
+                  <a:extLst>
+                    <a:ext uri="{9D8B030D-6E8A-4147-A177-3AD203B41FA5}">
+                      <a16:colId xmlns:a16="http://schemas.microsoft.com/office/drawing/2014/main" val="2894650286"/>
+                    </a:ext>
+                  </a:extLst>
+                </a:gridCol>
+                <a:gridCol w="2280745">
+                  <a:extLst>
+                    <a:ext uri="{9D8B030D-6E8A-4147-A177-3AD203B41FA5}">
+                      <a16:colId xmlns:a16="http://schemas.microsoft.com/office/drawing/2014/main" val="3290081916"/>
+                    </a:ext>
+                  </a:extLst>
+                </a:gridCol>
+                <a:gridCol w="2007476">
+                  <a:extLst>
+                    <a:ext uri="{9D8B030D-6E8A-4147-A177-3AD203B41FA5}">
+                      <a16:colId xmlns:a16="http://schemas.microsoft.com/office/drawing/2014/main" val="2002986398"/>
+                    </a:ext>
+                  </a:extLst>
+                </a:gridCol>
+                <a:gridCol w="2280744">
+                  <a:extLst>
+                    <a:ext uri="{9D8B030D-6E8A-4147-A177-3AD203B41FA5}">
+                      <a16:colId xmlns:a16="http://schemas.microsoft.com/office/drawing/2014/main" val="756374945"/>
+                    </a:ext>
+                  </a:extLst>
+                </a:gridCol>
+              </a:tblGrid>
+              <a:tr h="678727">
+                <a:tc>
+                  <a:txBody>
+                    <a:bodyPr/>
+                    <a:lstStyle/>
+                    <a:p>
+                      <a:pPr algn="ctr"/>
+                      <a:r>
+                        <a:rPr lang="en-US" sz="2000" b="1" dirty="0">
+                          <a:latin typeface="FreightSans Pro Book" panose="02000606030000020004" pitchFamily="2" charset="0"/>
+                        </a:rPr>
+                        <a:t>Function</a:t>
+                      </a:r>
+                    </a:p>
+                  </a:txBody>
+                  <a:tcPr anchor="ctr"/>
+                </a:tc>
+                <a:tc>
+                  <a:txBody>
+                    <a:bodyPr/>
+                    <a:lstStyle/>
+                    <a:p>
+                      <a:pPr algn="ctr"/>
+                      <a:r>
+                        <a:rPr lang="en-US" sz="2000" dirty="0">
+                          <a:latin typeface="FreightSans Pro Book" panose="02000606030000020004" pitchFamily="2" charset="0"/>
+                        </a:rPr>
+                        <a:t>Action</a:t>
+                      </a:r>
+                    </a:p>
+                  </a:txBody>
+                  <a:tcPr anchor="ctr"/>
+                </a:tc>
+                <a:tc>
+                  <a:txBody>
+                    <a:bodyPr/>
+                    <a:lstStyle/>
+                    <a:p>
+                      <a:pPr algn="ctr"/>
+                      <a:r>
+                        <a:rPr lang="en-US" sz="2000" dirty="0">
+                          <a:latin typeface="FreightSans Pro Book" panose="02000606030000020004" pitchFamily="2" charset="0"/>
+                        </a:rPr>
+                        <a:t>Input arguments</a:t>
+                      </a:r>
+                    </a:p>
+                  </a:txBody>
+                  <a:tcPr anchor="ctr"/>
+                </a:tc>
+                <a:tc>
+                  <a:txBody>
+                    <a:bodyPr/>
+                    <a:lstStyle/>
+                    <a:p>
+                      <a:pPr algn="ctr"/>
+                      <a:r>
+                        <a:rPr lang="en-US" sz="2000" dirty="0">
+                          <a:latin typeface="FreightSans Pro Book" panose="02000606030000020004" pitchFamily="2" charset="0"/>
+                        </a:rPr>
+                        <a:t>Input Fn. Returns</a:t>
+                      </a:r>
+                    </a:p>
+                  </a:txBody>
+                  <a:tcPr anchor="ctr"/>
+                </a:tc>
+                <a:tc>
+                  <a:txBody>
+                    <a:bodyPr/>
+                    <a:lstStyle/>
+                    <a:p>
+                      <a:pPr marL="0" marR="0" lvl="0" indent="0" algn="ctr" defTabSz="342900" rtl="0" eaLnBrk="1" fontAlgn="auto" latinLnBrk="0" hangingPunct="1">
+                        <a:lnSpc>
+                          <a:spcPct val="100000"/>
+                        </a:lnSpc>
+                        <a:spcBef>
+                          <a:spcPts val="0"/>
+                        </a:spcBef>
+                        <a:spcAft>
+                          <a:spcPts val="0"/>
+                        </a:spcAft>
+                        <a:buClrTx/>
+                        <a:buSzTx/>
+                        <a:buFontTx/>
+                        <a:buNone/>
+                        <a:tabLst/>
+                        <a:defRPr/>
+                      </a:pPr>
+                      <a:r>
+                        <a:rPr lang="en-US" sz="2000" dirty="0">
+                          <a:latin typeface="FreightSans Pro Book" panose="02000606030000020004" pitchFamily="2" charset="0"/>
+                        </a:rPr>
+                        <a:t>Output</a:t>
+                      </a:r>
+                    </a:p>
+                  </a:txBody>
+                  <a:tcPr anchor="ctr"/>
+                </a:tc>
+                <a:extLst>
+                  <a:ext uri="{0D108BD9-81ED-4DB2-BD59-A6C34878D82A}">
+                    <a16:rowId xmlns:a16="http://schemas.microsoft.com/office/drawing/2014/main" val="1140645906"/>
+                  </a:ext>
+                </a:extLst>
+              </a:tr>
+              <a:tr h="678727">
+                <a:tc>
+                  <a:txBody>
+                    <a:bodyPr/>
+                    <a:lstStyle/>
+                    <a:p>
+                      <a:pPr algn="ctr"/>
+                      <a:r>
+                        <a:rPr lang="en-US" sz="1800" b="1" dirty="0">
+                          <a:latin typeface="Source Code Pro" panose="020B0509030403020204" pitchFamily="49" charset="77"/>
+                        </a:rPr>
+                        <a:t>map</a:t>
+                      </a:r>
+                    </a:p>
+                  </a:txBody>
+                  <a:tcPr anchor="ctr"/>
+                </a:tc>
+                <a:tc>
+                  <a:txBody>
+                    <a:bodyPr/>
+                    <a:lstStyle/>
+                    <a:p>
+                      <a:r>
+                        <a:rPr lang="en-US" sz="1800" b="0" i="0" dirty="0">
+                          <a:latin typeface="Open Sans Light" panose="020B0606030504020204" pitchFamily="34" charset="0"/>
+                          <a:ea typeface="Open Sans Light" panose="020B0606030504020204" pitchFamily="34" charset="0"/>
+                          <a:cs typeface="Open Sans Light" panose="020B0606030504020204" pitchFamily="34" charset="0"/>
+                        </a:rPr>
+                        <a:t>Transform every item</a:t>
+                      </a:r>
+                    </a:p>
+                  </a:txBody>
+                  <a:tcPr anchor="ctr"/>
+                </a:tc>
+                <a:tc>
+                  <a:txBody>
+                    <a:bodyPr/>
+                    <a:lstStyle/>
+                    <a:p>
+                      <a:r>
+                        <a:rPr lang="en-US" sz="1800" b="0" i="0" dirty="0">
+                          <a:latin typeface="Open Sans Light" panose="020B0606030504020204" pitchFamily="34" charset="0"/>
+                          <a:ea typeface="Open Sans Light" panose="020B0606030504020204" pitchFamily="34" charset="0"/>
+                          <a:cs typeface="Open Sans Light" panose="020B0606030504020204" pitchFamily="34" charset="0"/>
+                        </a:rPr>
+                        <a:t>1 (each item)</a:t>
+                      </a:r>
+                    </a:p>
+                  </a:txBody>
+                  <a:tcPr anchor="ctr"/>
+                </a:tc>
+                <a:tc>
+                  <a:txBody>
+                    <a:bodyPr/>
+                    <a:lstStyle/>
+                    <a:p>
+                      <a:r>
+                        <a:rPr lang="en-US" sz="1800" b="0" i="0" dirty="0">
+                          <a:latin typeface="Open Sans Light" panose="020B0606030504020204" pitchFamily="34" charset="0"/>
+                          <a:ea typeface="Open Sans Light" panose="020B0606030504020204" pitchFamily="34" charset="0"/>
+                          <a:cs typeface="Open Sans Light" panose="020B0606030504020204" pitchFamily="34" charset="0"/>
+                        </a:rPr>
+                        <a:t>"Anything", a new item</a:t>
+                      </a:r>
+                    </a:p>
+                  </a:txBody>
+                  <a:tcPr anchor="ctr"/>
+                </a:tc>
+                <a:tc>
+                  <a:txBody>
+                    <a:bodyPr/>
+                    <a:lstStyle/>
+                    <a:p>
+                      <a:r>
+                        <a:rPr lang="en-US" sz="1800" b="1" i="0" dirty="0">
+                          <a:latin typeface="Open Sans ExtraBold" panose="020B0606030504020204" pitchFamily="34" charset="0"/>
+                          <a:ea typeface="Open Sans ExtraBold" panose="020B0606030504020204" pitchFamily="34" charset="0"/>
+                          <a:cs typeface="Open Sans ExtraBold" panose="020B0606030504020204" pitchFamily="34" charset="0"/>
+                        </a:rPr>
+                        <a:t>List</a:t>
+                      </a:r>
+                      <a:r>
+                        <a:rPr lang="en-US" sz="1800" b="0" i="0" dirty="0">
+                          <a:latin typeface="Open Sans Light" panose="020B0606030504020204" pitchFamily="34" charset="0"/>
+                          <a:ea typeface="Open Sans Light" panose="020B0606030504020204" pitchFamily="34" charset="0"/>
+                          <a:cs typeface="Open Sans Light" panose="020B0606030504020204" pitchFamily="34" charset="0"/>
+                        </a:rPr>
+                        <a:t>: same length, but possibly new values</a:t>
+                      </a:r>
+                    </a:p>
+                  </a:txBody>
+                  <a:tcPr anchor="ctr"/>
+                </a:tc>
+                <a:extLst>
+                  <a:ext uri="{0D108BD9-81ED-4DB2-BD59-A6C34878D82A}">
+                    <a16:rowId xmlns:a16="http://schemas.microsoft.com/office/drawing/2014/main" val="1601251051"/>
+                  </a:ext>
+                </a:extLst>
+              </a:tr>
+              <a:tr h="678727">
+                <a:tc>
+                  <a:txBody>
+                    <a:bodyPr/>
+                    <a:lstStyle/>
+                    <a:p>
+                      <a:pPr algn="ctr"/>
+                      <a:r>
+                        <a:rPr lang="en-US" sz="1800" b="1" dirty="0">
+                          <a:latin typeface="Source Code Pro" panose="020B0509030403020204" pitchFamily="49" charset="77"/>
+                        </a:rPr>
+                        <a:t>filter</a:t>
+                      </a:r>
+                    </a:p>
+                  </a:txBody>
+                  <a:tcPr anchor="ctr"/>
+                </a:tc>
+                <a:tc>
+                  <a:txBody>
+                    <a:bodyPr/>
+                    <a:lstStyle/>
+                    <a:p>
+                      <a:r>
+                        <a:rPr lang="en-US" sz="1800" b="0" i="0" dirty="0">
+                          <a:latin typeface="Open Sans Light" panose="020B0606030504020204" pitchFamily="34" charset="0"/>
+                          <a:ea typeface="Open Sans Light" panose="020B0606030504020204" pitchFamily="34" charset="0"/>
+                          <a:cs typeface="Open Sans Light" panose="020B0606030504020204" pitchFamily="34" charset="0"/>
+                        </a:rPr>
+                        <a:t>Return a list with fewer items</a:t>
+                      </a:r>
+                    </a:p>
+                  </a:txBody>
+                  <a:tcPr anchor="ctr"/>
+                </a:tc>
+                <a:tc>
+                  <a:txBody>
+                    <a:bodyPr/>
+                    <a:lstStyle/>
+                    <a:p>
+                      <a:r>
+                        <a:rPr lang="en-US" sz="1800" b="0" i="0" dirty="0">
+                          <a:latin typeface="Open Sans Light" panose="020B0606030504020204" pitchFamily="34" charset="0"/>
+                          <a:ea typeface="Open Sans Light" panose="020B0606030504020204" pitchFamily="34" charset="0"/>
+                          <a:cs typeface="Open Sans Light" panose="020B0606030504020204" pitchFamily="34" charset="0"/>
+                        </a:rPr>
+                        <a:t>1 (each item)</a:t>
+                      </a:r>
+                    </a:p>
+                  </a:txBody>
+                  <a:tcPr anchor="ctr"/>
+                </a:tc>
+                <a:tc>
+                  <a:txBody>
+                    <a:bodyPr/>
+                    <a:lstStyle/>
+                    <a:p>
+                      <a:r>
+                        <a:rPr lang="en-US" sz="1800" b="0" i="0" dirty="0">
+                          <a:latin typeface="Open Sans Light" panose="020B0606030504020204" pitchFamily="34" charset="0"/>
+                          <a:ea typeface="Open Sans Light" panose="020B0606030504020204" pitchFamily="34" charset="0"/>
+                          <a:cs typeface="Open Sans Light" panose="020B0606030504020204" pitchFamily="34" charset="0"/>
+                        </a:rPr>
+                        <a:t>A Boolean</a:t>
+                      </a:r>
+                    </a:p>
+                  </a:txBody>
+                  <a:tcPr anchor="ctr"/>
+                </a:tc>
+                <a:tc>
+                  <a:txBody>
+                    <a:bodyPr/>
+                    <a:lstStyle/>
+                    <a:p>
+                      <a:r>
+                        <a:rPr lang="en-US" sz="1800" b="1" i="0" dirty="0">
+                          <a:latin typeface="Open Sans ExtraBold" panose="020B0606030504020204" pitchFamily="34" charset="0"/>
+                          <a:ea typeface="Open Sans ExtraBold" panose="020B0606030504020204" pitchFamily="34" charset="0"/>
+                          <a:cs typeface="Open Sans ExtraBold" panose="020B0606030504020204" pitchFamily="34" charset="0"/>
+                        </a:rPr>
+                        <a:t>List: </a:t>
+                      </a:r>
+                      <a:r>
+                        <a:rPr lang="en-US" sz="1800" b="0" i="0" dirty="0">
+                          <a:latin typeface="Open Sans Light" panose="020B0606030504020204" pitchFamily="34" charset="0"/>
+                          <a:ea typeface="Open Sans Light" panose="020B0606030504020204" pitchFamily="34" charset="0"/>
+                          <a:cs typeface="Open Sans Light" panose="020B0606030504020204" pitchFamily="34" charset="0"/>
+                        </a:rPr>
+                        <a:t>possibly fewer items, values are the same</a:t>
+                      </a:r>
+                    </a:p>
+                  </a:txBody>
+                  <a:tcPr anchor="ctr"/>
+                </a:tc>
+                <a:extLst>
+                  <a:ext uri="{0D108BD9-81ED-4DB2-BD59-A6C34878D82A}">
+                    <a16:rowId xmlns:a16="http://schemas.microsoft.com/office/drawing/2014/main" val="1639889719"/>
+                  </a:ext>
+                </a:extLst>
+              </a:tr>
+              <a:tr h="678727">
+                <a:tc>
+                  <a:txBody>
+                    <a:bodyPr/>
+                    <a:lstStyle/>
+                    <a:p>
+                      <a:pPr algn="ctr"/>
+                      <a:r>
+                        <a:rPr lang="en-US" sz="1800" b="1" dirty="0">
+                          <a:latin typeface="Source Code Pro" panose="020B0509030403020204" pitchFamily="49" charset="77"/>
+                        </a:rPr>
+                        <a:t>reduce</a:t>
+                      </a:r>
+                    </a:p>
+                  </a:txBody>
+                  <a:tcPr anchor="ctr"/>
+                </a:tc>
+                <a:tc>
+                  <a:txBody>
+                    <a:bodyPr/>
+                    <a:lstStyle/>
+                    <a:p>
+                      <a:r>
+                        <a:rPr lang="en-US" sz="1800" b="0" i="0" dirty="0">
+                          <a:latin typeface="Open Sans Light" panose="020B0606030504020204" pitchFamily="34" charset="0"/>
+                          <a:ea typeface="Open Sans Light" panose="020B0606030504020204" pitchFamily="34" charset="0"/>
+                          <a:cs typeface="Open Sans Light" panose="020B0606030504020204" pitchFamily="34" charset="0"/>
+                        </a:rPr>
+                        <a:t>"Combine" items together</a:t>
+                      </a:r>
+                    </a:p>
+                  </a:txBody>
+                  <a:tcPr anchor="ctr"/>
+                </a:tc>
+                <a:tc>
+                  <a:txBody>
+                    <a:bodyPr/>
+                    <a:lstStyle/>
+                    <a:p>
+                      <a:r>
+                        <a:rPr lang="en-US" sz="1800" b="0" i="0" dirty="0">
+                          <a:latin typeface="Open Sans Light" panose="020B0606030504020204" pitchFamily="34" charset="0"/>
+                          <a:ea typeface="Open Sans Light" panose="020B0606030504020204" pitchFamily="34" charset="0"/>
+                          <a:cs typeface="Open Sans Light" panose="020B0606030504020204" pitchFamily="34" charset="0"/>
+                        </a:rPr>
+                        <a:t>2 (current item, and the previous result)</a:t>
+                      </a:r>
+                    </a:p>
+                  </a:txBody>
+                  <a:tcPr anchor="ctr"/>
+                </a:tc>
+                <a:tc>
+                  <a:txBody>
+                    <a:bodyPr/>
+                    <a:lstStyle/>
+                    <a:p>
+                      <a:r>
+                        <a:rPr lang="en-US" sz="1800" b="0" i="0" dirty="0">
+                          <a:latin typeface="Open Sans Light" panose="020B0606030504020204" pitchFamily="34" charset="0"/>
+                          <a:ea typeface="Open Sans Light" panose="020B0606030504020204" pitchFamily="34" charset="0"/>
+                          <a:cs typeface="Open Sans Light" panose="020B0606030504020204" pitchFamily="34" charset="0"/>
+                        </a:rPr>
+                        <a:t>Type should match the type each item</a:t>
+                      </a:r>
+                    </a:p>
+                  </a:txBody>
+                  <a:tcPr anchor="ctr"/>
+                </a:tc>
+                <a:tc>
+                  <a:txBody>
+                    <a:bodyPr/>
+                    <a:lstStyle/>
+                    <a:p>
+                      <a:r>
+                        <a:rPr lang="en-US" sz="1800" b="0" i="0" dirty="0">
+                          <a:latin typeface="Open Sans Light" panose="020B0606030504020204" pitchFamily="34" charset="0"/>
+                          <a:ea typeface="Open Sans Light" panose="020B0606030504020204" pitchFamily="34" charset="0"/>
+                          <a:cs typeface="Open Sans Light" panose="020B0606030504020204" pitchFamily="34" charset="0"/>
+                        </a:rPr>
+                        <a:t>A "single" item</a:t>
+                      </a:r>
+                    </a:p>
+                  </a:txBody>
+                  <a:tcPr anchor="ctr"/>
+                </a:tc>
+                <a:extLst>
+                  <a:ext uri="{0D108BD9-81ED-4DB2-BD59-A6C34878D82A}">
+                    <a16:rowId xmlns:a16="http://schemas.microsoft.com/office/drawing/2014/main" val="2091545836"/>
+                  </a:ext>
+                </a:extLst>
+              </a:tr>
+            </a:tbl>
+          </a:graphicData>
+        </a:graphic>
+      </p:graphicFrame>
+    </p:spTree>
+    <p:extLst>
+      <p:ext uri="{BB962C8B-B14F-4D97-AF65-F5344CB8AC3E}">
+        <p14:creationId xmlns:p14="http://schemas.microsoft.com/office/powerpoint/2010/main" val="3998291529"/>
+      </p:ext>
+    </p:extLst>
+  </p:cSld>
+  <p:clrMapOvr>
+    <a:masterClrMapping/>
+  </p:clrMapOvr>
+</p:sld>
+</file>
+
+<file path=ppt/slides/slide11.xml><?xml version="1.0" encoding="utf-8"?>
+<p:sld xmlns:a="http://schemas.openxmlformats.org/drawingml/2006/main" xmlns:r="http://schemas.openxmlformats.org/officeDocument/2006/relationships" xmlns:p="http://schemas.openxmlformats.org/presentationml/2006/main">
+  <p:cSld>
+    <p:spTree>
+      <p:nvGrpSpPr>
+        <p:cNvPr id="1" name=""/>
+        <p:cNvGrpSpPr/>
+        <p:nvPr/>
+      </p:nvGrpSpPr>
+      <p:grpSpPr>
+        <a:xfrm>
+          <a:off x="0" y="0"/>
+          <a:ext cx="0" cy="0"/>
+          <a:chOff x="0" y="0"/>
+          <a:chExt cx="0" cy="0"/>
+        </a:xfrm>
+      </p:grpSpPr>
+      <p:sp>
+        <p:nvSpPr>
+          <p:cNvPr id="2" name="Title 1">
+            <a:extLst>
+              <a:ext uri="{FF2B5EF4-FFF2-40B4-BE49-F238E27FC236}">
                 <a16:creationId xmlns:a16="http://schemas.microsoft.com/office/drawing/2014/main" id="{D2340843-39A8-4E4A-A923-FEDC64A7AE32}"/>
               </a:ext>
             </a:extLst>
@@ -9579,143 +10191,6 @@
 </p:sld>
 </file>
 
-<file path=ppt/slides/slide11.xml><?xml version="1.0" encoding="utf-8"?>
-<p:sld xmlns:a="http://schemas.openxmlformats.org/drawingml/2006/main" xmlns:r="http://schemas.openxmlformats.org/officeDocument/2006/relationships" xmlns:p="http://schemas.openxmlformats.org/presentationml/2006/main">
-  <p:cSld>
-    <p:spTree>
-      <p:nvGrpSpPr>
-        <p:cNvPr id="1" name=""/>
-        <p:cNvGrpSpPr/>
-        <p:nvPr/>
-      </p:nvGrpSpPr>
-      <p:grpSpPr>
-        <a:xfrm>
-          <a:off x="0" y="0"/>
-          <a:ext cx="0" cy="0"/>
-          <a:chOff x="0" y="0"/>
-          <a:chExt cx="0" cy="0"/>
-        </a:xfrm>
-      </p:grpSpPr>
-      <p:sp>
-        <p:nvSpPr>
-          <p:cNvPr id="2" name="Title 1">
-            <a:extLst>
-              <a:ext uri="{FF2B5EF4-FFF2-40B4-BE49-F238E27FC236}">
-                <a16:creationId xmlns:a16="http://schemas.microsoft.com/office/drawing/2014/main" id="{100B1421-7577-D94A-A03F-9746321D9D5E}"/>
-              </a:ext>
-            </a:extLst>
-          </p:cNvPr>
-          <p:cNvSpPr>
-            <a:spLocks noGrp="1"/>
-          </p:cNvSpPr>
-          <p:nvPr>
-            <p:ph type="title"/>
-          </p:nvPr>
-        </p:nvSpPr>
-        <p:spPr/>
-        <p:txBody>
-          <a:bodyPr/>
-          <a:lstStyle/>
-          <a:p>
-            <a:r>
-              <a:rPr lang="en-US" dirty="0"/>
-              <a:t>Learning Objectives</a:t>
-            </a:r>
-          </a:p>
-        </p:txBody>
-      </p:sp>
-      <p:sp>
-        <p:nvSpPr>
-          <p:cNvPr id="3" name="Content Placeholder 2">
-            <a:extLst>
-              <a:ext uri="{FF2B5EF4-FFF2-40B4-BE49-F238E27FC236}">
-                <a16:creationId xmlns:a16="http://schemas.microsoft.com/office/drawing/2014/main" id="{86019B6B-B854-7643-924E-9BF51C8B86D3}"/>
-              </a:ext>
-            </a:extLst>
-          </p:cNvPr>
-          <p:cNvSpPr>
-            <a:spLocks noGrp="1"/>
-          </p:cNvSpPr>
-          <p:nvPr>
-            <p:ph idx="1"/>
-          </p:nvPr>
-        </p:nvSpPr>
-        <p:spPr/>
-        <p:txBody>
-          <a:bodyPr/>
-          <a:lstStyle/>
-          <a:p>
-            <a:r>
-              <a:rPr lang="en-US" dirty="0"/>
-              <a:t>Learn how to use and create higher order functions:</a:t>
-            </a:r>
-          </a:p>
-          <a:p>
-            <a:r>
-              <a:rPr lang="en-US" dirty="0"/>
-              <a:t>Functions can be used as data</a:t>
-            </a:r>
-          </a:p>
-          <a:p>
-            <a:r>
-              <a:rPr lang="en-US" dirty="0"/>
-              <a:t>Functions can accept a function as an argument</a:t>
-            </a:r>
-          </a:p>
-          <a:p>
-            <a:r>
-              <a:rPr lang="en-US" b="1" dirty="0"/>
-              <a:t>Functions can return a new function</a:t>
-            </a:r>
-          </a:p>
-        </p:txBody>
-      </p:sp>
-      <p:sp>
-        <p:nvSpPr>
-          <p:cNvPr id="5" name="Footer Placeholder 3">
-            <a:extLst>
-              <a:ext uri="{FF2B5EF4-FFF2-40B4-BE49-F238E27FC236}">
-                <a16:creationId xmlns:a16="http://schemas.microsoft.com/office/drawing/2014/main" id="{0AB8D426-819A-7542-8C8B-D59D3E625434}"/>
-              </a:ext>
-            </a:extLst>
-          </p:cNvPr>
-          <p:cNvSpPr>
-            <a:spLocks noGrp="1"/>
-          </p:cNvSpPr>
-          <p:nvPr>
-            <p:ph type="ftr" sz="quarter" idx="10"/>
-          </p:nvPr>
-        </p:nvSpPr>
-        <p:spPr>
-          <a:xfrm>
-            <a:off x="4038599" y="6356350"/>
-            <a:ext cx="4348655" cy="365125"/>
-          </a:xfrm>
-        </p:spPr>
-        <p:txBody>
-          <a:bodyPr/>
-          <a:lstStyle/>
-          <a:p>
-            <a:r>
-              <a:rPr lang="en-US" dirty="0"/>
-              <a:t>Michael Ball | UC Berkeley | https://c88c.org | © CC BY-NC-SA</a:t>
-            </a:r>
-          </a:p>
-        </p:txBody>
-      </p:sp>
-    </p:spTree>
-    <p:extLst>
-      <p:ext uri="{BB962C8B-B14F-4D97-AF65-F5344CB8AC3E}">
-        <p14:creationId xmlns:p14="http://schemas.microsoft.com/office/powerpoint/2010/main" val="1593238648"/>
-      </p:ext>
-    </p:extLst>
-  </p:cSld>
-  <p:clrMapOvr>
-    <a:masterClrMapping/>
-  </p:clrMapOvr>
-</p:sld>
-</file>
-
 <file path=ppt/slides/slide12.xml><?xml version="1.0" encoding="utf-8"?>
 <p:sld xmlns:a="http://schemas.openxmlformats.org/drawingml/2006/main" xmlns:r="http://schemas.openxmlformats.org/officeDocument/2006/relationships" xmlns:p="http://schemas.openxmlformats.org/presentationml/2006/main">
   <p:cSld>
@@ -9738,6 +10213,143 @@
           <p:cNvPr id="2" name="Title 1">
             <a:extLst>
               <a:ext uri="{FF2B5EF4-FFF2-40B4-BE49-F238E27FC236}">
+                <a16:creationId xmlns:a16="http://schemas.microsoft.com/office/drawing/2014/main" id="{100B1421-7577-D94A-A03F-9746321D9D5E}"/>
+              </a:ext>
+            </a:extLst>
+          </p:cNvPr>
+          <p:cNvSpPr>
+            <a:spLocks noGrp="1"/>
+          </p:cNvSpPr>
+          <p:nvPr>
+            <p:ph type="title"/>
+          </p:nvPr>
+        </p:nvSpPr>
+        <p:spPr/>
+        <p:txBody>
+          <a:bodyPr/>
+          <a:lstStyle/>
+          <a:p>
+            <a:r>
+              <a:rPr lang="en-US" dirty="0"/>
+              <a:t>Learning Objectives</a:t>
+            </a:r>
+          </a:p>
+        </p:txBody>
+      </p:sp>
+      <p:sp>
+        <p:nvSpPr>
+          <p:cNvPr id="3" name="Content Placeholder 2">
+            <a:extLst>
+              <a:ext uri="{FF2B5EF4-FFF2-40B4-BE49-F238E27FC236}">
+                <a16:creationId xmlns:a16="http://schemas.microsoft.com/office/drawing/2014/main" id="{86019B6B-B854-7643-924E-9BF51C8B86D3}"/>
+              </a:ext>
+            </a:extLst>
+          </p:cNvPr>
+          <p:cNvSpPr>
+            <a:spLocks noGrp="1"/>
+          </p:cNvSpPr>
+          <p:nvPr>
+            <p:ph idx="1"/>
+          </p:nvPr>
+        </p:nvSpPr>
+        <p:spPr/>
+        <p:txBody>
+          <a:bodyPr/>
+          <a:lstStyle/>
+          <a:p>
+            <a:r>
+              <a:rPr lang="en-US" dirty="0"/>
+              <a:t>Learn how to use and create higher order functions:</a:t>
+            </a:r>
+          </a:p>
+          <a:p>
+            <a:r>
+              <a:rPr lang="en-US" dirty="0"/>
+              <a:t>Functions can be used as data</a:t>
+            </a:r>
+          </a:p>
+          <a:p>
+            <a:r>
+              <a:rPr lang="en-US" dirty="0"/>
+              <a:t>Functions can accept a function as an argument</a:t>
+            </a:r>
+          </a:p>
+          <a:p>
+            <a:r>
+              <a:rPr lang="en-US" b="1" dirty="0"/>
+              <a:t>Functions can return a new function</a:t>
+            </a:r>
+          </a:p>
+        </p:txBody>
+      </p:sp>
+      <p:sp>
+        <p:nvSpPr>
+          <p:cNvPr id="5" name="Footer Placeholder 3">
+            <a:extLst>
+              <a:ext uri="{FF2B5EF4-FFF2-40B4-BE49-F238E27FC236}">
+                <a16:creationId xmlns:a16="http://schemas.microsoft.com/office/drawing/2014/main" id="{0AB8D426-819A-7542-8C8B-D59D3E625434}"/>
+              </a:ext>
+            </a:extLst>
+          </p:cNvPr>
+          <p:cNvSpPr>
+            <a:spLocks noGrp="1"/>
+          </p:cNvSpPr>
+          <p:nvPr>
+            <p:ph type="ftr" sz="quarter" idx="10"/>
+          </p:nvPr>
+        </p:nvSpPr>
+        <p:spPr>
+          <a:xfrm>
+            <a:off x="4038599" y="6356350"/>
+            <a:ext cx="4348655" cy="365125"/>
+          </a:xfrm>
+        </p:spPr>
+        <p:txBody>
+          <a:bodyPr/>
+          <a:lstStyle/>
+          <a:p>
+            <a:r>
+              <a:rPr lang="en-US" dirty="0"/>
+              <a:t>Michael Ball | UC Berkeley | https://c88c.org | © CC BY-NC-SA</a:t>
+            </a:r>
+          </a:p>
+        </p:txBody>
+      </p:sp>
+    </p:spTree>
+    <p:extLst>
+      <p:ext uri="{BB962C8B-B14F-4D97-AF65-F5344CB8AC3E}">
+        <p14:creationId xmlns:p14="http://schemas.microsoft.com/office/powerpoint/2010/main" val="1593238648"/>
+      </p:ext>
+    </p:extLst>
+  </p:cSld>
+  <p:clrMapOvr>
+    <a:masterClrMapping/>
+  </p:clrMapOvr>
+</p:sld>
+</file>
+
+<file path=ppt/slides/slide13.xml><?xml version="1.0" encoding="utf-8"?>
+<p:sld xmlns:a="http://schemas.openxmlformats.org/drawingml/2006/main" xmlns:r="http://schemas.openxmlformats.org/officeDocument/2006/relationships" xmlns:p="http://schemas.openxmlformats.org/presentationml/2006/main">
+  <p:cSld>
+    <p:spTree>
+      <p:nvGrpSpPr>
+        <p:cNvPr id="1" name=""/>
+        <p:cNvGrpSpPr/>
+        <p:nvPr/>
+      </p:nvGrpSpPr>
+      <p:grpSpPr>
+        <a:xfrm>
+          <a:off x="0" y="0"/>
+          <a:ext cx="0" cy="0"/>
+          <a:chOff x="0" y="0"/>
+          <a:chExt cx="0" cy="0"/>
+        </a:xfrm>
+      </p:grpSpPr>
+      <p:sp>
+        <p:nvSpPr>
+          <p:cNvPr id="2" name="Title 1">
+            <a:extLst>
+              <a:ext uri="{FF2B5EF4-FFF2-40B4-BE49-F238E27FC236}">
                 <a16:creationId xmlns:a16="http://schemas.microsoft.com/office/drawing/2014/main" id="{E6F99501-F0C7-EC42-A944-CAC24ED1FA0A}"/>
               </a:ext>
             </a:extLst>
@@ -9857,7 +10469,7 @@
 </p:sld>
 </file>
 
-<file path=ppt/slides/slide13.xml><?xml version="1.0" encoding="utf-8"?>
+<file path=ppt/slides/slide14.xml><?xml version="1.0" encoding="utf-8"?>
 <p:sld xmlns:a="http://schemas.openxmlformats.org/drawingml/2006/main" xmlns:r="http://schemas.openxmlformats.org/officeDocument/2006/relationships" xmlns:p="http://schemas.openxmlformats.org/presentationml/2006/main">
   <p:cSld>
     <p:spTree>
@@ -10819,7 +11431,7 @@
 </p:sld>
 </file>
 
-<file path=ppt/slides/slide14.xml><?xml version="1.0" encoding="utf-8"?>
+<file path=ppt/slides/slide15.xml><?xml version="1.0" encoding="utf-8"?>
 <p:sld xmlns:a="http://schemas.openxmlformats.org/drawingml/2006/main" xmlns:r="http://schemas.openxmlformats.org/officeDocument/2006/relationships" xmlns:p="http://schemas.openxmlformats.org/presentationml/2006/main">
   <p:cSld>
     <p:spTree>
@@ -10904,7 +11516,7 @@
 </p:sld>
 </file>
 
-<file path=ppt/slides/slide15.xml><?xml version="1.0" encoding="utf-8"?>
+<file path=ppt/slides/slide16.xml><?xml version="1.0" encoding="utf-8"?>
 <p:sld xmlns:a="http://schemas.openxmlformats.org/drawingml/2006/main" xmlns:r="http://schemas.openxmlformats.org/officeDocument/2006/relationships" xmlns:p="http://schemas.openxmlformats.org/presentationml/2006/main">
   <p:cSld>
     <p:spTree>
@@ -11078,7 +11690,7 @@
 </p:sld>
 </file>
 
-<file path=ppt/slides/slide16.xml><?xml version="1.0" encoding="utf-8"?>
+<file path=ppt/slides/slide17.xml><?xml version="1.0" encoding="utf-8"?>
 <p:sld xmlns:a="http://schemas.openxmlformats.org/drawingml/2006/main" xmlns:r="http://schemas.openxmlformats.org/officeDocument/2006/relationships" xmlns:p="http://schemas.openxmlformats.org/presentationml/2006/main">
   <p:cSld>
     <p:spTree>
@@ -11661,7 +12273,7 @@
 </p:sld>
 </file>
 
-<file path=ppt/slides/slide17.xml><?xml version="1.0" encoding="utf-8"?>
+<file path=ppt/slides/slide18.xml><?xml version="1.0" encoding="utf-8"?>
 <p:sld xmlns:a="http://schemas.openxmlformats.org/drawingml/2006/main" xmlns:r="http://schemas.openxmlformats.org/officeDocument/2006/relationships" xmlns:p="http://schemas.openxmlformats.org/presentationml/2006/main">
   <p:cSld>
     <p:spTree>
@@ -12347,254 +12959,6 @@
 </p:sld>
 </file>
 
-<file path=ppt/slides/slide18.xml><?xml version="1.0" encoding="utf-8"?>
-<p:sld xmlns:a="http://schemas.openxmlformats.org/drawingml/2006/main" xmlns:r="http://schemas.openxmlformats.org/officeDocument/2006/relationships" xmlns:p="http://schemas.openxmlformats.org/presentationml/2006/main">
-  <p:cSld>
-    <p:spTree>
-      <p:nvGrpSpPr>
-        <p:cNvPr id="1" name=""/>
-        <p:cNvGrpSpPr/>
-        <p:nvPr/>
-      </p:nvGrpSpPr>
-      <p:grpSpPr>
-        <a:xfrm>
-          <a:off x="0" y="0"/>
-          <a:ext cx="0" cy="0"/>
-          <a:chOff x="0" y="0"/>
-          <a:chExt cx="0" cy="0"/>
-        </a:xfrm>
-      </p:grpSpPr>
-      <p:sp>
-        <p:nvSpPr>
-          <p:cNvPr id="2" name="Title 1">
-            <a:extLst>
-              <a:ext uri="{FF2B5EF4-FFF2-40B4-BE49-F238E27FC236}">
-                <a16:creationId xmlns:a16="http://schemas.microsoft.com/office/drawing/2014/main" id="{3240DA3F-5262-644A-8A04-EDF80650B9C2}"/>
-              </a:ext>
-            </a:extLst>
-          </p:cNvPr>
-          <p:cNvSpPr>
-            <a:spLocks noGrp="1"/>
-          </p:cNvSpPr>
-          <p:nvPr>
-            <p:ph type="title"/>
-          </p:nvPr>
-        </p:nvSpPr>
-        <p:spPr/>
-        <p:txBody>
-          <a:bodyPr/>
-          <a:lstStyle/>
-          <a:p>
-            <a:r>
-              <a:rPr lang="en-US" dirty="0"/>
-              <a:t>Python Tutor Example #1</a:t>
-            </a:r>
-          </a:p>
-        </p:txBody>
-      </p:sp>
-      <p:sp>
-        <p:nvSpPr>
-          <p:cNvPr id="3" name="Content Placeholder 2">
-            <a:extLst>
-              <a:ext uri="{FF2B5EF4-FFF2-40B4-BE49-F238E27FC236}">
-                <a16:creationId xmlns:a16="http://schemas.microsoft.com/office/drawing/2014/main" id="{284F9A36-1B36-EA49-B322-395902ACCA87}"/>
-              </a:ext>
-            </a:extLst>
-          </p:cNvPr>
-          <p:cNvSpPr>
-            <a:spLocks noGrp="1"/>
-          </p:cNvSpPr>
-          <p:nvPr>
-            <p:ph idx="1"/>
-          </p:nvPr>
-        </p:nvSpPr>
-        <p:spPr>
-          <a:xfrm>
-            <a:off x="533399" y="1066800"/>
-            <a:ext cx="11225011" cy="5257800"/>
-          </a:xfrm>
-        </p:spPr>
-        <p:txBody>
-          <a:bodyPr/>
-          <a:lstStyle/>
-          <a:p>
-            <a:pPr marL="0" indent="0">
-              <a:buNone/>
-            </a:pPr>
-            <a:r>
-              <a:rPr lang="en-US" sz="2200" dirty="0">
-                <a:latin typeface="Source Code Pro" panose="020B0509030403020204" pitchFamily="49" charset="0"/>
-                <a:ea typeface="Source Code Pro" panose="020B0509030403020204" pitchFamily="49" charset="0"/>
-              </a:rPr>
-              <a:t>def </a:t>
-            </a:r>
-            <a:r>
-              <a:rPr lang="en-US" sz="2200" dirty="0" err="1">
-                <a:latin typeface="Source Code Pro" panose="020B0509030403020204" pitchFamily="49" charset="0"/>
-                <a:ea typeface="Source Code Pro" panose="020B0509030403020204" pitchFamily="49" charset="0"/>
-              </a:rPr>
-              <a:t>make_adder</a:t>
-            </a:r>
-            <a:r>
-              <a:rPr lang="en-US" sz="2200" dirty="0">
-                <a:latin typeface="Source Code Pro" panose="020B0509030403020204" pitchFamily="49" charset="0"/>
-                <a:ea typeface="Source Code Pro" panose="020B0509030403020204" pitchFamily="49" charset="0"/>
-              </a:rPr>
-              <a:t>(n):</a:t>
-            </a:r>
-          </a:p>
-          <a:p>
-            <a:pPr marL="0" indent="0">
-              <a:buNone/>
-            </a:pPr>
-            <a:r>
-              <a:rPr lang="en-US" sz="2200" dirty="0">
-                <a:latin typeface="Source Code Pro" panose="020B0509030403020204" pitchFamily="49" charset="0"/>
-                <a:ea typeface="Source Code Pro" panose="020B0509030403020204" pitchFamily="49" charset="0"/>
-              </a:rPr>
-              <a:t>    def adder(k):</a:t>
-            </a:r>
-          </a:p>
-          <a:p>
-            <a:pPr marL="0" indent="0">
-              <a:buNone/>
-            </a:pPr>
-            <a:r>
-              <a:rPr lang="en-US" sz="2200" dirty="0">
-                <a:latin typeface="Source Code Pro" panose="020B0509030403020204" pitchFamily="49" charset="0"/>
-                <a:ea typeface="Source Code Pro" panose="020B0509030403020204" pitchFamily="49" charset="0"/>
-              </a:rPr>
-              <a:t>        return k + n</a:t>
-            </a:r>
-          </a:p>
-          <a:p>
-            <a:pPr marL="0" indent="0">
-              <a:buNone/>
-            </a:pPr>
-            <a:r>
-              <a:rPr lang="en-US" sz="2200" dirty="0">
-                <a:latin typeface="Source Code Pro" panose="020B0509030403020204" pitchFamily="49" charset="0"/>
-                <a:ea typeface="Source Code Pro" panose="020B0509030403020204" pitchFamily="49" charset="0"/>
-              </a:rPr>
-              <a:t>    return adder</a:t>
-            </a:r>
-          </a:p>
-          <a:p>
-            <a:pPr marL="0" indent="0">
-              <a:buNone/>
-            </a:pPr>
-            <a:endParaRPr lang="en-US" sz="2200" dirty="0">
-              <a:latin typeface="Source Code Pro" panose="020B0509030403020204" pitchFamily="49" charset="0"/>
-              <a:ea typeface="Source Code Pro" panose="020B0509030403020204" pitchFamily="49" charset="0"/>
-            </a:endParaRPr>
-          </a:p>
-          <a:p>
-            <a:pPr marL="0" indent="0">
-              <a:buNone/>
-            </a:pPr>
-            <a:r>
-              <a:rPr lang="en-US" sz="2200" dirty="0">
-                <a:latin typeface="Source Code Pro" panose="020B0509030403020204" pitchFamily="49" charset="0"/>
-                <a:ea typeface="Source Code Pro" panose="020B0509030403020204" pitchFamily="49" charset="0"/>
-              </a:rPr>
-              <a:t>n = 10    </a:t>
-            </a:r>
-          </a:p>
-          <a:p>
-            <a:pPr marL="0" indent="0">
-              <a:buNone/>
-            </a:pPr>
-            <a:r>
-              <a:rPr lang="en-US" sz="2200" dirty="0">
-                <a:latin typeface="Source Code Pro" panose="020B0509030403020204" pitchFamily="49" charset="0"/>
-                <a:ea typeface="Source Code Pro" panose="020B0509030403020204" pitchFamily="49" charset="0"/>
-              </a:rPr>
-              <a:t>add_2 = </a:t>
-            </a:r>
-            <a:r>
-              <a:rPr lang="en-US" sz="2200" dirty="0" err="1">
-                <a:latin typeface="Source Code Pro" panose="020B0509030403020204" pitchFamily="49" charset="0"/>
-                <a:ea typeface="Source Code Pro" panose="020B0509030403020204" pitchFamily="49" charset="0"/>
-              </a:rPr>
-              <a:t>make_adder</a:t>
-            </a:r>
-            <a:r>
-              <a:rPr lang="en-US" sz="2200" dirty="0">
-                <a:latin typeface="Source Code Pro" panose="020B0509030403020204" pitchFamily="49" charset="0"/>
-                <a:ea typeface="Source Code Pro" panose="020B0509030403020204" pitchFamily="49" charset="0"/>
-              </a:rPr>
-              <a:t>(2)</a:t>
-            </a:r>
-          </a:p>
-          <a:p>
-            <a:pPr marL="0" indent="0">
-              <a:buNone/>
-            </a:pPr>
-            <a:r>
-              <a:rPr lang="en-US" sz="2200" dirty="0">
-                <a:latin typeface="Source Code Pro" panose="020B0509030403020204" pitchFamily="49" charset="0"/>
-                <a:ea typeface="Source Code Pro" panose="020B0509030403020204" pitchFamily="49" charset="0"/>
-              </a:rPr>
-              <a:t>x = add_2(5)</a:t>
-            </a:r>
-            <a:endParaRPr lang="en-US" sz="2200" dirty="0">
-              <a:solidFill>
-                <a:schemeClr val="bg1">
-                  <a:lumMod val="50000"/>
-                </a:schemeClr>
-              </a:solidFill>
-              <a:latin typeface="Source Code Pro" panose="020B0509030403020204" pitchFamily="49" charset="0"/>
-              <a:ea typeface="Source Code Pro" panose="020B0509030403020204" pitchFamily="49" charset="0"/>
-            </a:endParaRPr>
-          </a:p>
-        </p:txBody>
-      </p:sp>
-      <p:sp>
-        <p:nvSpPr>
-          <p:cNvPr id="5" name="Footer Placeholder 3">
-            <a:extLst>
-              <a:ext uri="{FF2B5EF4-FFF2-40B4-BE49-F238E27FC236}">
-                <a16:creationId xmlns:a16="http://schemas.microsoft.com/office/drawing/2014/main" id="{677B590B-530D-43F7-EACB-A4315211A94E}"/>
-              </a:ext>
-            </a:extLst>
-          </p:cNvPr>
-          <p:cNvSpPr>
-            <a:spLocks noGrp="1"/>
-          </p:cNvSpPr>
-          <p:nvPr>
-            <p:ph type="ftr" sz="quarter" idx="10"/>
-          </p:nvPr>
-        </p:nvSpPr>
-        <p:spPr>
-          <a:xfrm>
-            <a:off x="4038599" y="6356350"/>
-            <a:ext cx="4348655" cy="365125"/>
-          </a:xfrm>
-        </p:spPr>
-        <p:txBody>
-          <a:bodyPr/>
-          <a:lstStyle/>
-          <a:p>
-            <a:r>
-              <a:rPr lang="en-US" dirty="0"/>
-              <a:t>Michael Ball | UC Berkeley | https://c88c.org | © CC BY-NC-SA</a:t>
-            </a:r>
-          </a:p>
-        </p:txBody>
-      </p:sp>
-    </p:spTree>
-    <p:extLst>
-      <p:ext uri="{BB962C8B-B14F-4D97-AF65-F5344CB8AC3E}">
-        <p14:creationId xmlns:p14="http://schemas.microsoft.com/office/powerpoint/2010/main" val="1613526114"/>
-      </p:ext>
-    </p:extLst>
-  </p:cSld>
-  <p:clrMapOvr>
-    <a:masterClrMapping/>
-  </p:clrMapOvr>
-</p:sld>
-</file>
-
 <file path=ppt/slides/slide19.xml><?xml version="1.0" encoding="utf-8"?>
 <p:sld xmlns:a="http://schemas.openxmlformats.org/drawingml/2006/main" xmlns:r="http://schemas.openxmlformats.org/officeDocument/2006/relationships" xmlns:p="http://schemas.openxmlformats.org/presentationml/2006/main">
   <p:cSld>
@@ -12635,7 +12999,7 @@
           <a:p>
             <a:r>
               <a:rPr lang="en-US" dirty="0"/>
-              <a:t>Python Tutor Example #2</a:t>
+              <a:t>Python Tutor Example #1</a:t>
             </a:r>
           </a:p>
         </p:txBody>
@@ -12656,7 +13020,12 @@
             <p:ph idx="1"/>
           </p:nvPr>
         </p:nvSpPr>
-        <p:spPr/>
+        <p:spPr>
+          <a:xfrm>
+            <a:off x="533399" y="1066800"/>
+            <a:ext cx="11225011" cy="5257800"/>
+          </a:xfrm>
+        </p:spPr>
         <p:txBody>
           <a:bodyPr/>
           <a:lstStyle/>
@@ -12669,19 +13038,21 @@
                 <a:latin typeface="Source Code Pro" panose="020B0509030403020204" pitchFamily="49" charset="0"/>
                 <a:ea typeface="Source Code Pro" panose="020B0509030403020204" pitchFamily="49" charset="0"/>
               </a:rPr>
-              <a:t>a = "chipotle"</a:t>
-            </a:r>
-          </a:p>
-          <a:p>
-            <a:pPr marL="0" indent="0">
-              <a:buNone/>
-            </a:pPr>
+              <a:t>def </a:t>
+            </a:r>
+            <a:r>
+              <a:rPr lang="en-US" sz="2200" dirty="0" err="1">
+                <a:latin typeface="Source Code Pro" panose="020B0509030403020204" pitchFamily="49" charset="0"/>
+                <a:ea typeface="Source Code Pro" panose="020B0509030403020204" pitchFamily="49" charset="0"/>
+              </a:rPr>
+              <a:t>make_adder</a:t>
+            </a:r>
             <a:r>
               <a:rPr lang="en-US" sz="2200" dirty="0">
                 <a:latin typeface="Source Code Pro" panose="020B0509030403020204" pitchFamily="49" charset="0"/>
                 <a:ea typeface="Source Code Pro" panose="020B0509030403020204" pitchFamily="49" charset="0"/>
               </a:rPr>
-              <a:t>b = 5 &gt; 3</a:t>
+              <a:t>(n):</a:t>
             </a:r>
           </a:p>
           <a:p>
@@ -12693,7 +13064,31 @@
                 <a:latin typeface="Source Code Pro" panose="020B0509030403020204" pitchFamily="49" charset="0"/>
                 <a:ea typeface="Source Code Pro" panose="020B0509030403020204" pitchFamily="49" charset="0"/>
               </a:rPr>
-              <a:t>c = 8</a:t>
+              <a:t>    def adder(k):</a:t>
+            </a:r>
+          </a:p>
+          <a:p>
+            <a:pPr marL="0" indent="0">
+              <a:buNone/>
+            </a:pPr>
+            <a:r>
+              <a:rPr lang="en-US" sz="2200" dirty="0">
+                <a:latin typeface="Source Code Pro" panose="020B0509030403020204" pitchFamily="49" charset="0"/>
+                <a:ea typeface="Source Code Pro" panose="020B0509030403020204" pitchFamily="49" charset="0"/>
+              </a:rPr>
+              <a:t>        return k + n</a:t>
+            </a:r>
+          </a:p>
+          <a:p>
+            <a:pPr marL="0" indent="0">
+              <a:buNone/>
+            </a:pPr>
+            <a:r>
+              <a:rPr lang="en-US" sz="2200" dirty="0">
+                <a:latin typeface="Source Code Pro" panose="020B0509030403020204" pitchFamily="49" charset="0"/>
+                <a:ea typeface="Source Code Pro" panose="020B0509030403020204" pitchFamily="49" charset="0"/>
+              </a:rPr>
+              <a:t>    return adder</a:t>
             </a:r>
           </a:p>
           <a:p>
@@ -12714,7 +13109,7 @@
                 <a:latin typeface="Source Code Pro" panose="020B0509030403020204" pitchFamily="49" charset="0"/>
                 <a:ea typeface="Source Code Pro" panose="020B0509030403020204" pitchFamily="49" charset="0"/>
               </a:rPr>
-              <a:t>def foo(c):</a:t>
+              <a:t>n = 10    </a:t>
             </a:r>
           </a:p>
           <a:p>
@@ -12726,87 +13121,44 @@
                 <a:latin typeface="Source Code Pro" panose="020B0509030403020204" pitchFamily="49" charset="0"/>
                 <a:ea typeface="Source Code Pro" panose="020B0509030403020204" pitchFamily="49" charset="0"/>
               </a:rPr>
-              <a:t>    return c - 5</a:t>
+              <a:t>add_2 = </a:t>
+            </a:r>
+            <a:r>
+              <a:rPr lang="en-US" sz="2200" dirty="0" err="1">
+                <a:latin typeface="Source Code Pro" panose="020B0509030403020204" pitchFamily="49" charset="0"/>
+                <a:ea typeface="Source Code Pro" panose="020B0509030403020204" pitchFamily="49" charset="0"/>
+              </a:rPr>
+              <a:t>make_adder</a:t>
+            </a:r>
+            <a:r>
+              <a:rPr lang="en-US" sz="2200" dirty="0">
+                <a:latin typeface="Source Code Pro" panose="020B0509030403020204" pitchFamily="49" charset="0"/>
+                <a:ea typeface="Source Code Pro" panose="020B0509030403020204" pitchFamily="49" charset="0"/>
+              </a:rPr>
+              <a:t>(2)</a:t>
             </a:r>
           </a:p>
           <a:p>
             <a:pPr marL="0" indent="0">
               <a:buNone/>
             </a:pPr>
+            <a:r>
+              <a:rPr lang="en-US" sz="2200" dirty="0">
+                <a:latin typeface="Source Code Pro" panose="020B0509030403020204" pitchFamily="49" charset="0"/>
+                <a:ea typeface="Source Code Pro" panose="020B0509030403020204" pitchFamily="49" charset="0"/>
+              </a:rPr>
+              <a:t>x = add_2(5)</a:t>
+            </a:r>
             <a:endParaRPr lang="en-US" sz="2200" dirty="0">
+              <a:solidFill>
+                <a:schemeClr val="bg1">
+                  <a:lumMod val="50000"/>
+                </a:schemeClr>
+              </a:solidFill>
               <a:latin typeface="Source Code Pro" panose="020B0509030403020204" pitchFamily="49" charset="0"/>
               <a:ea typeface="Source Code Pro" panose="020B0509030403020204" pitchFamily="49" charset="0"/>
             </a:endParaRPr>
           </a:p>
-          <a:p>
-            <a:pPr marL="0" indent="0">
-              <a:buNone/>
-            </a:pPr>
-            <a:r>
-              <a:rPr lang="en-US" sz="2200" dirty="0">
-                <a:latin typeface="Source Code Pro" panose="020B0509030403020204" pitchFamily="49" charset="0"/>
-                <a:ea typeface="Source Code Pro" panose="020B0509030403020204" pitchFamily="49" charset="0"/>
-              </a:rPr>
-              <a:t>def bar():</a:t>
-            </a:r>
-          </a:p>
-          <a:p>
-            <a:pPr marL="0" indent="0">
-              <a:buNone/>
-            </a:pPr>
-            <a:r>
-              <a:rPr lang="en-US" sz="2200" dirty="0">
-                <a:latin typeface="Source Code Pro" panose="020B0509030403020204" pitchFamily="49" charset="0"/>
-                <a:ea typeface="Source Code Pro" panose="020B0509030403020204" pitchFamily="49" charset="0"/>
-              </a:rPr>
-              <a:t>    if b:</a:t>
-            </a:r>
-          </a:p>
-          <a:p>
-            <a:pPr marL="0" indent="0">
-              <a:buNone/>
-            </a:pPr>
-            <a:r>
-              <a:rPr lang="en-US" sz="2200" dirty="0">
-                <a:latin typeface="Source Code Pro" panose="020B0509030403020204" pitchFamily="49" charset="0"/>
-                <a:ea typeface="Source Code Pro" panose="020B0509030403020204" pitchFamily="49" charset="0"/>
-              </a:rPr>
-              <a:t>        a = "taco bell"</a:t>
-            </a:r>
-          </a:p>
-          <a:p>
-            <a:pPr marL="0" indent="0">
-              <a:buNone/>
-            </a:pPr>
-            <a:endParaRPr lang="en-US" sz="2200" dirty="0">
-              <a:latin typeface="Source Code Pro" panose="020B0509030403020204" pitchFamily="49" charset="0"/>
-              <a:ea typeface="Source Code Pro" panose="020B0509030403020204" pitchFamily="49" charset="0"/>
-            </a:endParaRPr>
-          </a:p>
-          <a:p>
-            <a:pPr marL="0" indent="0">
-              <a:buNone/>
-            </a:pPr>
-            <a:r>
-              <a:rPr lang="en-US" sz="2200" dirty="0">
-                <a:latin typeface="Source Code Pro" panose="020B0509030403020204" pitchFamily="49" charset="0"/>
-                <a:ea typeface="Source Code Pro" panose="020B0509030403020204" pitchFamily="49" charset="0"/>
-              </a:rPr>
-              <a:t>result1 = foo(10)</a:t>
-            </a:r>
-          </a:p>
-          <a:p>
-            <a:pPr marL="0" indent="0">
-              <a:buNone/>
-            </a:pPr>
-            <a:r>
-              <a:rPr lang="en-US" sz="2200" dirty="0">
-                <a:latin typeface="Source Code Pro" panose="020B0509030403020204" pitchFamily="49" charset="0"/>
-                <a:ea typeface="Source Code Pro" panose="020B0509030403020204" pitchFamily="49" charset="0"/>
-              </a:rPr>
-              <a:t>result2 = bar()</a:t>
-            </a:r>
-          </a:p>
         </p:txBody>
       </p:sp>
       <p:sp>
@@ -12814,7 +13166,7 @@
           <p:cNvPr id="5" name="Footer Placeholder 3">
             <a:extLst>
               <a:ext uri="{FF2B5EF4-FFF2-40B4-BE49-F238E27FC236}">
-                <a16:creationId xmlns:a16="http://schemas.microsoft.com/office/drawing/2014/main" id="{063CC9AD-AB85-ED1A-8BBF-11586ADBA2A7}"/>
+                <a16:creationId xmlns:a16="http://schemas.microsoft.com/office/drawing/2014/main" id="{677B590B-530D-43F7-EACB-A4315211A94E}"/>
               </a:ext>
             </a:extLst>
           </p:cNvPr>
@@ -12845,7 +13197,7 @@
     </p:spTree>
     <p:extLst>
       <p:ext uri="{BB962C8B-B14F-4D97-AF65-F5344CB8AC3E}">
-        <p14:creationId xmlns:p14="http://schemas.microsoft.com/office/powerpoint/2010/main" val="3096584794"/>
+        <p14:creationId xmlns:p14="http://schemas.microsoft.com/office/powerpoint/2010/main" val="1613526114"/>
       </p:ext>
     </p:extLst>
   </p:cSld>
@@ -13118,7 +13470,7 @@
           <p:cNvPr id="2" name="Title 1">
             <a:extLst>
               <a:ext uri="{FF2B5EF4-FFF2-40B4-BE49-F238E27FC236}">
-                <a16:creationId xmlns:a16="http://schemas.microsoft.com/office/drawing/2014/main" id="{80893AED-AB1E-9F40-BE86-23A4ED91A56E}"/>
+                <a16:creationId xmlns:a16="http://schemas.microsoft.com/office/drawing/2014/main" id="{3240DA3F-5262-644A-8A04-EDF80650B9C2}"/>
               </a:ext>
             </a:extLst>
           </p:cNvPr>
@@ -13136,7 +13488,7 @@
           <a:p>
             <a:r>
               <a:rPr lang="en-US" dirty="0"/>
-              <a:t>Python Tutor Example #3</a:t>
+              <a:t>Python Tutor Example #2</a:t>
             </a:r>
           </a:p>
         </p:txBody>
@@ -13146,7 +13498,7 @@
           <p:cNvPr id="3" name="Content Placeholder 2">
             <a:extLst>
               <a:ext uri="{FF2B5EF4-FFF2-40B4-BE49-F238E27FC236}">
-                <a16:creationId xmlns:a16="http://schemas.microsoft.com/office/drawing/2014/main" id="{96930B3E-847A-CF45-BFCB-5C129A38C53F}"/>
+                <a16:creationId xmlns:a16="http://schemas.microsoft.com/office/drawing/2014/main" id="{284F9A36-1B36-EA49-B322-395902ACCA87}"/>
               </a:ext>
             </a:extLst>
           </p:cNvPr>
@@ -13166,22 +13518,11 @@
               <a:buNone/>
             </a:pPr>
             <a:r>
-              <a:rPr lang="en-US" dirty="0">
-                <a:latin typeface="Source Code Pro" panose="020B0509030403020204" pitchFamily="49" charset="77"/>
-              </a:rPr>
-              <a:t>add_2 = </a:t>
-            </a:r>
-            <a:r>
-              <a:rPr lang="en-US" dirty="0" err="1">
-                <a:latin typeface="Source Code Pro" panose="020B0509030403020204" pitchFamily="49" charset="77"/>
-              </a:rPr>
-              <a:t>make_adder</a:t>
-            </a:r>
-            <a:r>
-              <a:rPr lang="en-US" dirty="0">
-                <a:latin typeface="Source Code Pro" panose="020B0509030403020204" pitchFamily="49" charset="77"/>
-              </a:rPr>
-              <a:t>(2)</a:t>
+              <a:rPr lang="en-US" sz="2200" dirty="0">
+                <a:latin typeface="Source Code Pro" panose="020B0509030403020204" pitchFamily="49" charset="0"/>
+                <a:ea typeface="Source Code Pro" panose="020B0509030403020204" pitchFamily="49" charset="0"/>
+              </a:rPr>
+              <a:t>a = "chipotle"</a:t>
             </a:r>
           </a:p>
           <a:p>
@@ -13189,30 +13530,32 @@
               <a:buNone/>
             </a:pPr>
             <a:r>
-              <a:rPr lang="en-US" dirty="0">
-                <a:latin typeface="Source Code Pro" panose="020B0509030403020204" pitchFamily="49" charset="77"/>
-              </a:rPr>
-              <a:t>add_3 = </a:t>
-            </a:r>
-            <a:r>
-              <a:rPr lang="en-US" dirty="0" err="1">
-                <a:latin typeface="Source Code Pro" panose="020B0509030403020204" pitchFamily="49" charset="77"/>
-              </a:rPr>
-              <a:t>make_adder</a:t>
-            </a:r>
-            <a:r>
-              <a:rPr lang="en-US" dirty="0">
-                <a:latin typeface="Source Code Pro" panose="020B0509030403020204" pitchFamily="49" charset="77"/>
-              </a:rPr>
-              <a:t>(3)</a:t>
+              <a:rPr lang="en-US" sz="2200" dirty="0">
+                <a:latin typeface="Source Code Pro" panose="020B0509030403020204" pitchFamily="49" charset="0"/>
+                <a:ea typeface="Source Code Pro" panose="020B0509030403020204" pitchFamily="49" charset="0"/>
+              </a:rPr>
+              <a:t>b = 5 &gt; 3</a:t>
             </a:r>
           </a:p>
           <a:p>
             <a:pPr marL="0" indent="0">
               <a:buNone/>
             </a:pPr>
-            <a:endParaRPr lang="en-US" dirty="0">
-              <a:latin typeface="Source Code Pro" panose="020B0509030403020204" pitchFamily="49" charset="77"/>
+            <a:r>
+              <a:rPr lang="en-US" sz="2200" dirty="0">
+                <a:latin typeface="Source Code Pro" panose="020B0509030403020204" pitchFamily="49" charset="0"/>
+                <a:ea typeface="Source Code Pro" panose="020B0509030403020204" pitchFamily="49" charset="0"/>
+              </a:rPr>
+              <a:t>c = 8</a:t>
+            </a:r>
+          </a:p>
+          <a:p>
+            <a:pPr marL="0" indent="0">
+              <a:buNone/>
+            </a:pPr>
+            <a:endParaRPr lang="en-US" sz="2200" dirty="0">
+              <a:latin typeface="Source Code Pro" panose="020B0509030403020204" pitchFamily="49" charset="0"/>
+              <a:ea typeface="Source Code Pro" panose="020B0509030403020204" pitchFamily="49" charset="0"/>
             </a:endParaRPr>
           </a:p>
           <a:p>
@@ -13220,10 +13563,11 @@
               <a:buNone/>
             </a:pPr>
             <a:r>
-              <a:rPr lang="en-US" dirty="0">
-                <a:latin typeface="Source Code Pro" panose="020B0509030403020204" pitchFamily="49" charset="77"/>
-              </a:rPr>
-              <a:t>x = add_2(2)</a:t>
+              <a:rPr lang="en-US" sz="2200" dirty="0">
+                <a:latin typeface="Source Code Pro" panose="020B0509030403020204" pitchFamily="49" charset="0"/>
+                <a:ea typeface="Source Code Pro" panose="020B0509030403020204" pitchFamily="49" charset="0"/>
+              </a:rPr>
+              <a:t>def foo(c):</a:t>
             </a:r>
           </a:p>
           <a:p>
@@ -13231,32 +13575,32 @@
               <a:buNone/>
             </a:pPr>
             <a:r>
-              <a:rPr lang="en-US" dirty="0">
-                <a:latin typeface="Source Code Pro" panose="020B0509030403020204" pitchFamily="49" charset="77"/>
-              </a:rPr>
-              <a:t>def compose(f, g):</a:t>
+              <a:rPr lang="en-US" sz="2200" dirty="0">
+                <a:latin typeface="Source Code Pro" panose="020B0509030403020204" pitchFamily="49" charset="0"/>
+                <a:ea typeface="Source Code Pro" panose="020B0509030403020204" pitchFamily="49" charset="0"/>
+              </a:rPr>
+              <a:t>    return c - 5</a:t>
             </a:r>
           </a:p>
           <a:p>
             <a:pPr marL="0" indent="0">
               <a:buNone/>
             </a:pPr>
-            <a:r>
-              <a:rPr lang="en-US" dirty="0">
-                <a:latin typeface="Source Code Pro" panose="020B0509030403020204" pitchFamily="49" charset="77"/>
-              </a:rPr>
-              <a:t>    def h(x):</a:t>
-            </a:r>
+            <a:endParaRPr lang="en-US" sz="2200" dirty="0">
+              <a:latin typeface="Source Code Pro" panose="020B0509030403020204" pitchFamily="49" charset="0"/>
+              <a:ea typeface="Source Code Pro" panose="020B0509030403020204" pitchFamily="49" charset="0"/>
+            </a:endParaRPr>
           </a:p>
           <a:p>
             <a:pPr marL="0" indent="0">
               <a:buNone/>
             </a:pPr>
             <a:r>
-              <a:rPr lang="en-US" dirty="0">
-                <a:latin typeface="Source Code Pro" panose="020B0509030403020204" pitchFamily="49" charset="77"/>
-              </a:rPr>
-              <a:t>        return f(g(x))</a:t>
+              <a:rPr lang="en-US" sz="2200" dirty="0">
+                <a:latin typeface="Source Code Pro" panose="020B0509030403020204" pitchFamily="49" charset="0"/>
+                <a:ea typeface="Source Code Pro" panose="020B0509030403020204" pitchFamily="49" charset="0"/>
+              </a:rPr>
+              <a:t>def bar():</a:t>
             </a:r>
           </a:p>
           <a:p>
@@ -13264,10 +13608,11 @@
               <a:buNone/>
             </a:pPr>
             <a:r>
-              <a:rPr lang="en-US" dirty="0">
-                <a:latin typeface="Source Code Pro" panose="020B0509030403020204" pitchFamily="49" charset="77"/>
-              </a:rPr>
-              <a:t>    return h</a:t>
+              <a:rPr lang="en-US" sz="2200" dirty="0">
+                <a:latin typeface="Source Code Pro" panose="020B0509030403020204" pitchFamily="49" charset="0"/>
+                <a:ea typeface="Source Code Pro" panose="020B0509030403020204" pitchFamily="49" charset="0"/>
+              </a:rPr>
+              <a:t>    if b:</a:t>
             </a:r>
           </a:p>
           <a:p>
@@ -13275,21 +13620,44 @@
               <a:buNone/>
             </a:pPr>
             <a:r>
-              <a:rPr lang="en-US" dirty="0">
-                <a:latin typeface="Source Code Pro" panose="020B0509030403020204" pitchFamily="49" charset="77"/>
-              </a:rPr>
-              <a:t>add_5 = compose(add_2, add_3)</a:t>
+              <a:rPr lang="en-US" sz="2200" dirty="0">
+                <a:latin typeface="Source Code Pro" panose="020B0509030403020204" pitchFamily="49" charset="0"/>
+                <a:ea typeface="Source Code Pro" panose="020B0509030403020204" pitchFamily="49" charset="0"/>
+              </a:rPr>
+              <a:t>        a = "taco bell"</a:t>
             </a:r>
           </a:p>
           <a:p>
             <a:pPr marL="0" indent="0">
               <a:buNone/>
             </a:pPr>
-            <a:r>
-              <a:rPr lang="en-US" dirty="0">
-                <a:latin typeface="Source Code Pro" panose="020B0509030403020204" pitchFamily="49" charset="77"/>
-              </a:rPr>
-              <a:t>z = add_5(x)</a:t>
+            <a:endParaRPr lang="en-US" sz="2200" dirty="0">
+              <a:latin typeface="Source Code Pro" panose="020B0509030403020204" pitchFamily="49" charset="0"/>
+              <a:ea typeface="Source Code Pro" panose="020B0509030403020204" pitchFamily="49" charset="0"/>
+            </a:endParaRPr>
+          </a:p>
+          <a:p>
+            <a:pPr marL="0" indent="0">
+              <a:buNone/>
+            </a:pPr>
+            <a:r>
+              <a:rPr lang="en-US" sz="2200" dirty="0">
+                <a:latin typeface="Source Code Pro" panose="020B0509030403020204" pitchFamily="49" charset="0"/>
+                <a:ea typeface="Source Code Pro" panose="020B0509030403020204" pitchFamily="49" charset="0"/>
+              </a:rPr>
+              <a:t>result1 = foo(10)</a:t>
+            </a:r>
+          </a:p>
+          <a:p>
+            <a:pPr marL="0" indent="0">
+              <a:buNone/>
+            </a:pPr>
+            <a:r>
+              <a:rPr lang="en-US" sz="2200" dirty="0">
+                <a:latin typeface="Source Code Pro" panose="020B0509030403020204" pitchFamily="49" charset="0"/>
+                <a:ea typeface="Source Code Pro" panose="020B0509030403020204" pitchFamily="49" charset="0"/>
+              </a:rPr>
+              <a:t>result2 = bar()</a:t>
             </a:r>
           </a:p>
         </p:txBody>
@@ -13299,7 +13667,7 @@
           <p:cNvPr id="5" name="Footer Placeholder 3">
             <a:extLst>
               <a:ext uri="{FF2B5EF4-FFF2-40B4-BE49-F238E27FC236}">
-                <a16:creationId xmlns:a16="http://schemas.microsoft.com/office/drawing/2014/main" id="{3AF96BFF-6AF9-AFF8-E585-7AA7162824BC}"/>
+                <a16:creationId xmlns:a16="http://schemas.microsoft.com/office/drawing/2014/main" id="{063CC9AD-AB85-ED1A-8BBF-11586ADBA2A7}"/>
               </a:ext>
             </a:extLst>
           </p:cNvPr>
@@ -13330,7 +13698,7 @@
     </p:spTree>
     <p:extLst>
       <p:ext uri="{BB962C8B-B14F-4D97-AF65-F5344CB8AC3E}">
-        <p14:creationId xmlns:p14="http://schemas.microsoft.com/office/powerpoint/2010/main" val="3318854379"/>
+        <p14:creationId xmlns:p14="http://schemas.microsoft.com/office/powerpoint/2010/main" val="3096584794"/>
       </p:ext>
     </p:extLst>
   </p:cSld>
@@ -13362,7 +13730,7 @@
           <p:cNvPr id="2" name="Title 1">
             <a:extLst>
               <a:ext uri="{FF2B5EF4-FFF2-40B4-BE49-F238E27FC236}">
-                <a16:creationId xmlns:a16="http://schemas.microsoft.com/office/drawing/2014/main" id="{3240DA3F-5262-644A-8A04-EDF80650B9C2}"/>
+                <a16:creationId xmlns:a16="http://schemas.microsoft.com/office/drawing/2014/main" id="{80893AED-AB1E-9F40-BE86-23A4ED91A56E}"/>
               </a:ext>
             </a:extLst>
           </p:cNvPr>
@@ -13380,7 +13748,7 @@
           <a:p>
             <a:r>
               <a:rPr lang="en-US" dirty="0"/>
-              <a:t>Demo</a:t>
+              <a:t>Python Tutor Example #3</a:t>
             </a:r>
           </a:p>
         </p:txBody>
@@ -13390,7 +13758,7 @@
           <p:cNvPr id="3" name="Content Placeholder 2">
             <a:extLst>
               <a:ext uri="{FF2B5EF4-FFF2-40B4-BE49-F238E27FC236}">
-                <a16:creationId xmlns:a16="http://schemas.microsoft.com/office/drawing/2014/main" id="{284F9A36-1B36-EA49-B322-395902ACCA87}"/>
+                <a16:creationId xmlns:a16="http://schemas.microsoft.com/office/drawing/2014/main" id="{96930B3E-847A-CF45-BFCB-5C129A38C53F}"/>
               </a:ext>
             </a:extLst>
           </p:cNvPr>
@@ -13401,12 +13769,7 @@
             <p:ph idx="1"/>
           </p:nvPr>
         </p:nvSpPr>
-        <p:spPr>
-          <a:xfrm>
-            <a:off x="533399" y="1066800"/>
-            <a:ext cx="11225011" cy="5257800"/>
-          </a:xfrm>
-        </p:spPr>
+        <p:spPr/>
         <p:txBody>
           <a:bodyPr/>
           <a:lstStyle/>
@@ -13415,19 +13778,53 @@
               <a:buNone/>
             </a:pPr>
             <a:r>
-              <a:rPr lang="en-US" sz="2400" dirty="0"/>
-              <a:t>Example 1:</a:t>
-            </a:r>
-          </a:p>
-          <a:p>
-            <a:r>
-              <a:rPr lang="en-US" sz="2400" dirty="0">
-                <a:hlinkClick r:id="rId2"/>
-              </a:rPr>
-              <a:t>make_adder Higher Order Function: Environment Diagram Python Tutor Link</a:t>
-            </a:r>
-            <a:endParaRPr lang="en-US" sz="2400" dirty="0">
-              <a:hlinkClick r:id="rId3"/>
+              <a:rPr lang="en-US" dirty="0">
+                <a:latin typeface="Source Code Pro" panose="020B0509030403020204" pitchFamily="49" charset="77"/>
+              </a:rPr>
+              <a:t>add_2 = </a:t>
+            </a:r>
+            <a:r>
+              <a:rPr lang="en-US" dirty="0" err="1">
+                <a:latin typeface="Source Code Pro" panose="020B0509030403020204" pitchFamily="49" charset="77"/>
+              </a:rPr>
+              <a:t>make_adder</a:t>
+            </a:r>
+            <a:r>
+              <a:rPr lang="en-US" dirty="0">
+                <a:latin typeface="Source Code Pro" panose="020B0509030403020204" pitchFamily="49" charset="77"/>
+              </a:rPr>
+              <a:t>(2)</a:t>
+            </a:r>
+          </a:p>
+          <a:p>
+            <a:pPr marL="0" indent="0">
+              <a:buNone/>
+            </a:pPr>
+            <a:r>
+              <a:rPr lang="en-US" dirty="0">
+                <a:latin typeface="Source Code Pro" panose="020B0509030403020204" pitchFamily="49" charset="77"/>
+              </a:rPr>
+              <a:t>add_3 = </a:t>
+            </a:r>
+            <a:r>
+              <a:rPr lang="en-US" dirty="0" err="1">
+                <a:latin typeface="Source Code Pro" panose="020B0509030403020204" pitchFamily="49" charset="77"/>
+              </a:rPr>
+              <a:t>make_adder</a:t>
+            </a:r>
+            <a:r>
+              <a:rPr lang="en-US" dirty="0">
+                <a:latin typeface="Source Code Pro" panose="020B0509030403020204" pitchFamily="49" charset="77"/>
+              </a:rPr>
+              <a:t>(3)</a:t>
+            </a:r>
+          </a:p>
+          <a:p>
+            <a:pPr marL="0" indent="0">
+              <a:buNone/>
+            </a:pPr>
+            <a:endParaRPr lang="en-US" dirty="0">
+              <a:latin typeface="Source Code Pro" panose="020B0509030403020204" pitchFamily="49" charset="77"/>
             </a:endParaRPr>
           </a:p>
           <a:p>
@@ -13435,60 +13832,86 @@
               <a:buNone/>
             </a:pPr>
             <a:r>
-              <a:rPr lang="en-US" sz="2400" dirty="0"/>
-              <a:t>Example 2:</a:t>
-            </a:r>
-            <a:endParaRPr lang="en-US" sz="2400" dirty="0">
-              <a:hlinkClick r:id="rId3"/>
-            </a:endParaRPr>
-          </a:p>
-          <a:p>
-            <a:r>
-              <a:rPr lang="en-US" sz="2400" dirty="0">
-                <a:solidFill>
-                  <a:schemeClr val="tx1">
-                    <a:lumMod val="95000"/>
-                    <a:lumOff val="5000"/>
-                  </a:schemeClr>
-                </a:solidFill>
-                <a:hlinkClick r:id="rId4"/>
-              </a:rPr>
-              <a:t>Primitives and Functions: Environment Diagram Python Tutor</a:t>
-            </a:r>
-            <a:r>
-              <a:rPr lang="en-US" sz="2400" dirty="0">
-                <a:hlinkClick r:id="rId4"/>
-              </a:rPr>
-              <a:t>:</a:t>
-            </a:r>
-            <a:endParaRPr lang="en-US" sz="2400" dirty="0"/>
+              <a:rPr lang="en-US" dirty="0">
+                <a:latin typeface="Source Code Pro" panose="020B0509030403020204" pitchFamily="49" charset="77"/>
+              </a:rPr>
+              <a:t>x = add_2(2)</a:t>
+            </a:r>
           </a:p>
           <a:p>
             <a:pPr marL="0" indent="0">
               <a:buNone/>
             </a:pPr>
             <a:r>
-              <a:rPr lang="en-US" sz="2400" dirty="0"/>
-              <a:t>Example 3:</a:t>
-            </a:r>
-          </a:p>
-          <a:p>
-            <a:r>
-              <a:rPr lang="en-US" sz="2400" dirty="0">
-                <a:hlinkClick r:id="rId5"/>
-              </a:rPr>
-              <a:t>Compose Python Tutor Link</a:t>
-            </a:r>
-            <a:endParaRPr lang="en-US" sz="2400" dirty="0"/>
-          </a:p>
-        </p:txBody>
-      </p:sp>
-      <p:sp>
-        <p:nvSpPr>
-          <p:cNvPr id="4" name="Footer Placeholder 3">
+              <a:rPr lang="en-US" dirty="0">
+                <a:latin typeface="Source Code Pro" panose="020B0509030403020204" pitchFamily="49" charset="77"/>
+              </a:rPr>
+              <a:t>def compose(f, g):</a:t>
+            </a:r>
+          </a:p>
+          <a:p>
+            <a:pPr marL="0" indent="0">
+              <a:buNone/>
+            </a:pPr>
+            <a:r>
+              <a:rPr lang="en-US" dirty="0">
+                <a:latin typeface="Source Code Pro" panose="020B0509030403020204" pitchFamily="49" charset="77"/>
+              </a:rPr>
+              <a:t>    def h(x):</a:t>
+            </a:r>
+          </a:p>
+          <a:p>
+            <a:pPr marL="0" indent="0">
+              <a:buNone/>
+            </a:pPr>
+            <a:r>
+              <a:rPr lang="en-US" dirty="0">
+                <a:latin typeface="Source Code Pro" panose="020B0509030403020204" pitchFamily="49" charset="77"/>
+              </a:rPr>
+              <a:t>        return f(g(x))</a:t>
+            </a:r>
+          </a:p>
+          <a:p>
+            <a:pPr marL="0" indent="0">
+              <a:buNone/>
+            </a:pPr>
+            <a:r>
+              <a:rPr lang="en-US" dirty="0">
+                <a:latin typeface="Source Code Pro" panose="020B0509030403020204" pitchFamily="49" charset="77"/>
+              </a:rPr>
+              <a:t>    return h</a:t>
+            </a:r>
+          </a:p>
+          <a:p>
+            <a:pPr marL="0" indent="0">
+              <a:buNone/>
+            </a:pPr>
+            <a:r>
+              <a:rPr lang="en-US" dirty="0">
+                <a:latin typeface="Source Code Pro" panose="020B0509030403020204" pitchFamily="49" charset="77"/>
+              </a:rPr>
+              <a:t>add_5 = compose(add_2, add_3)</a:t>
+            </a:r>
+          </a:p>
+          <a:p>
+            <a:pPr marL="0" indent="0">
+              <a:buNone/>
+            </a:pPr>
+            <a:r>
+              <a:rPr lang="en-US" dirty="0">
+                <a:latin typeface="Source Code Pro" panose="020B0509030403020204" pitchFamily="49" charset="77"/>
+              </a:rPr>
+              <a:t>z = add_5(x)</a:t>
+            </a:r>
+          </a:p>
+        </p:txBody>
+      </p:sp>
+      <p:sp>
+        <p:nvSpPr>
+          <p:cNvPr id="5" name="Footer Placeholder 3">
             <a:extLst>
               <a:ext uri="{FF2B5EF4-FFF2-40B4-BE49-F238E27FC236}">
-                <a16:creationId xmlns:a16="http://schemas.microsoft.com/office/drawing/2014/main" id="{F98321EF-8CA7-4B88-C14F-0290A39B3BC4}"/>
+                <a16:creationId xmlns:a16="http://schemas.microsoft.com/office/drawing/2014/main" id="{3AF96BFF-6AF9-AFF8-E585-7AA7162824BC}"/>
               </a:ext>
             </a:extLst>
           </p:cNvPr>
@@ -13519,7 +13942,7 @@
     </p:spTree>
     <p:extLst>
       <p:ext uri="{BB962C8B-B14F-4D97-AF65-F5344CB8AC3E}">
-        <p14:creationId xmlns:p14="http://schemas.microsoft.com/office/powerpoint/2010/main" val="776121693"/>
+        <p14:creationId xmlns:p14="http://schemas.microsoft.com/office/powerpoint/2010/main" val="3318854379"/>
       </p:ext>
     </p:extLst>
   </p:cSld>
@@ -13551,6 +13974,195 @@
           <p:cNvPr id="2" name="Title 1">
             <a:extLst>
               <a:ext uri="{FF2B5EF4-FFF2-40B4-BE49-F238E27FC236}">
+                <a16:creationId xmlns:a16="http://schemas.microsoft.com/office/drawing/2014/main" id="{3240DA3F-5262-644A-8A04-EDF80650B9C2}"/>
+              </a:ext>
+            </a:extLst>
+          </p:cNvPr>
+          <p:cNvSpPr>
+            <a:spLocks noGrp="1"/>
+          </p:cNvSpPr>
+          <p:nvPr>
+            <p:ph type="title"/>
+          </p:nvPr>
+        </p:nvSpPr>
+        <p:spPr/>
+        <p:txBody>
+          <a:bodyPr/>
+          <a:lstStyle/>
+          <a:p>
+            <a:r>
+              <a:rPr lang="en-US" dirty="0"/>
+              <a:t>Demo</a:t>
+            </a:r>
+          </a:p>
+        </p:txBody>
+      </p:sp>
+      <p:sp>
+        <p:nvSpPr>
+          <p:cNvPr id="3" name="Content Placeholder 2">
+            <a:extLst>
+              <a:ext uri="{FF2B5EF4-FFF2-40B4-BE49-F238E27FC236}">
+                <a16:creationId xmlns:a16="http://schemas.microsoft.com/office/drawing/2014/main" id="{284F9A36-1B36-EA49-B322-395902ACCA87}"/>
+              </a:ext>
+            </a:extLst>
+          </p:cNvPr>
+          <p:cNvSpPr>
+            <a:spLocks noGrp="1"/>
+          </p:cNvSpPr>
+          <p:nvPr>
+            <p:ph idx="1"/>
+          </p:nvPr>
+        </p:nvSpPr>
+        <p:spPr>
+          <a:xfrm>
+            <a:off x="533399" y="1066800"/>
+            <a:ext cx="11225011" cy="5257800"/>
+          </a:xfrm>
+        </p:spPr>
+        <p:txBody>
+          <a:bodyPr/>
+          <a:lstStyle/>
+          <a:p>
+            <a:pPr marL="0" indent="0">
+              <a:buNone/>
+            </a:pPr>
+            <a:r>
+              <a:rPr lang="en-US" sz="2400" dirty="0"/>
+              <a:t>Example 1:</a:t>
+            </a:r>
+          </a:p>
+          <a:p>
+            <a:r>
+              <a:rPr lang="en-US" sz="2400" dirty="0">
+                <a:hlinkClick r:id="rId2"/>
+              </a:rPr>
+              <a:t>make_adder Higher Order Function: Environment Diagram Python Tutor Link</a:t>
+            </a:r>
+            <a:endParaRPr lang="en-US" sz="2400" dirty="0">
+              <a:hlinkClick r:id="rId3"/>
+            </a:endParaRPr>
+          </a:p>
+          <a:p>
+            <a:pPr marL="0" indent="0">
+              <a:buNone/>
+            </a:pPr>
+            <a:r>
+              <a:rPr lang="en-US" sz="2400" dirty="0"/>
+              <a:t>Example 2:</a:t>
+            </a:r>
+            <a:endParaRPr lang="en-US" sz="2400" dirty="0">
+              <a:hlinkClick r:id="rId3"/>
+            </a:endParaRPr>
+          </a:p>
+          <a:p>
+            <a:r>
+              <a:rPr lang="en-US" sz="2400" dirty="0">
+                <a:solidFill>
+                  <a:schemeClr val="tx1">
+                    <a:lumMod val="95000"/>
+                    <a:lumOff val="5000"/>
+                  </a:schemeClr>
+                </a:solidFill>
+                <a:hlinkClick r:id="rId4"/>
+              </a:rPr>
+              <a:t>Primitives and Functions: Environment Diagram Python Tutor</a:t>
+            </a:r>
+            <a:r>
+              <a:rPr lang="en-US" sz="2400" dirty="0">
+                <a:hlinkClick r:id="rId4"/>
+              </a:rPr>
+              <a:t>:</a:t>
+            </a:r>
+            <a:endParaRPr lang="en-US" sz="2400" dirty="0"/>
+          </a:p>
+          <a:p>
+            <a:pPr marL="0" indent="0">
+              <a:buNone/>
+            </a:pPr>
+            <a:r>
+              <a:rPr lang="en-US" sz="2400" dirty="0"/>
+              <a:t>Example 3:</a:t>
+            </a:r>
+          </a:p>
+          <a:p>
+            <a:r>
+              <a:rPr lang="en-US" sz="2400" dirty="0">
+                <a:hlinkClick r:id="rId5"/>
+              </a:rPr>
+              <a:t>Compose Python Tutor Link</a:t>
+            </a:r>
+            <a:endParaRPr lang="en-US" sz="2400" dirty="0"/>
+          </a:p>
+        </p:txBody>
+      </p:sp>
+      <p:sp>
+        <p:nvSpPr>
+          <p:cNvPr id="4" name="Footer Placeholder 3">
+            <a:extLst>
+              <a:ext uri="{FF2B5EF4-FFF2-40B4-BE49-F238E27FC236}">
+                <a16:creationId xmlns:a16="http://schemas.microsoft.com/office/drawing/2014/main" id="{F98321EF-8CA7-4B88-C14F-0290A39B3BC4}"/>
+              </a:ext>
+            </a:extLst>
+          </p:cNvPr>
+          <p:cNvSpPr>
+            <a:spLocks noGrp="1"/>
+          </p:cNvSpPr>
+          <p:nvPr>
+            <p:ph type="ftr" sz="quarter" idx="10"/>
+          </p:nvPr>
+        </p:nvSpPr>
+        <p:spPr>
+          <a:xfrm>
+            <a:off x="4038599" y="6356350"/>
+            <a:ext cx="4348655" cy="365125"/>
+          </a:xfrm>
+        </p:spPr>
+        <p:txBody>
+          <a:bodyPr/>
+          <a:lstStyle/>
+          <a:p>
+            <a:r>
+              <a:rPr lang="en-US" dirty="0"/>
+              <a:t>Michael Ball | UC Berkeley | https://c88c.org | © CC BY-NC-SA</a:t>
+            </a:r>
+          </a:p>
+        </p:txBody>
+      </p:sp>
+    </p:spTree>
+    <p:extLst>
+      <p:ext uri="{BB962C8B-B14F-4D97-AF65-F5344CB8AC3E}">
+        <p14:creationId xmlns:p14="http://schemas.microsoft.com/office/powerpoint/2010/main" val="776121693"/>
+      </p:ext>
+    </p:extLst>
+  </p:cSld>
+  <p:clrMapOvr>
+    <a:masterClrMapping/>
+  </p:clrMapOvr>
+</p:sld>
+</file>
+
+<file path=ppt/slides/slide23.xml><?xml version="1.0" encoding="utf-8"?>
+<p:sld xmlns:a="http://schemas.openxmlformats.org/drawingml/2006/main" xmlns:r="http://schemas.openxmlformats.org/officeDocument/2006/relationships" xmlns:p="http://schemas.openxmlformats.org/presentationml/2006/main">
+  <p:cSld>
+    <p:spTree>
+      <p:nvGrpSpPr>
+        <p:cNvPr id="1" name=""/>
+        <p:cNvGrpSpPr/>
+        <p:nvPr/>
+      </p:nvGrpSpPr>
+      <p:grpSpPr>
+        <a:xfrm>
+          <a:off x="0" y="0"/>
+          <a:ext cx="0" cy="0"/>
+          <a:chOff x="0" y="0"/>
+          <a:chExt cx="0" cy="0"/>
+        </a:xfrm>
+      </p:grpSpPr>
+      <p:sp>
+        <p:nvSpPr>
+          <p:cNvPr id="2" name="Title 1">
+            <a:extLst>
+              <a:ext uri="{FF2B5EF4-FFF2-40B4-BE49-F238E27FC236}">
                 <a16:creationId xmlns:a16="http://schemas.microsoft.com/office/drawing/2014/main" id="{3D058CAE-0705-B045-AD80-3D6241BFCD42}"/>
               </a:ext>
             </a:extLst>
@@ -13708,7 +14320,7 @@
 </p:sld>
 </file>
 
-<file path=ppt/slides/slide23.xml><?xml version="1.0" encoding="utf-8"?>
+<file path=ppt/slides/slide24.xml><?xml version="1.0" encoding="utf-8"?>
 <p:sld xmlns:a="http://schemas.openxmlformats.org/drawingml/2006/main" xmlns:r="http://schemas.openxmlformats.org/officeDocument/2006/relationships" xmlns:p="http://schemas.openxmlformats.org/presentationml/2006/main">
   <p:cSld>
     <p:spTree>
@@ -15002,7 +15614,13 @@
   <p:cSld>
     <p:spTree>
       <p:nvGrpSpPr>
-        <p:cNvPr id="1" name=""/>
+        <p:cNvPr id="1" name="">
+          <a:extLst>
+            <a:ext uri="{FF2B5EF4-FFF2-40B4-BE49-F238E27FC236}">
+              <a16:creationId xmlns:a16="http://schemas.microsoft.com/office/drawing/2014/main" id="{093AC4AF-5E4D-9A43-727C-9C63AF68E378}"/>
+            </a:ext>
+          </a:extLst>
+        </p:cNvPr>
         <p:cNvGrpSpPr/>
         <p:nvPr/>
       </p:nvGrpSpPr>
@@ -15019,7 +15637,7 @@
           <p:cNvPr id="2" name="Title 1">
             <a:extLst>
               <a:ext uri="{FF2B5EF4-FFF2-40B4-BE49-F238E27FC236}">
-                <a16:creationId xmlns:a16="http://schemas.microsoft.com/office/drawing/2014/main" id="{D78DEC67-149D-7747-87F3-D940F8EF2C93}"/>
+                <a16:creationId xmlns:a16="http://schemas.microsoft.com/office/drawing/2014/main" id="{D5EDDD8D-F7A6-87EB-D7CF-451F58884030}"/>
               </a:ext>
             </a:extLst>
           </p:cNvPr>
@@ -15047,7 +15665,7 @@
           <p:cNvPr id="3" name="Footer Placeholder 3">
             <a:extLst>
               <a:ext uri="{FF2B5EF4-FFF2-40B4-BE49-F238E27FC236}">
-                <a16:creationId xmlns:a16="http://schemas.microsoft.com/office/drawing/2014/main" id="{945EF9C5-F59D-F53F-E807-CF0E2DF60EA6}"/>
+                <a16:creationId xmlns:a16="http://schemas.microsoft.com/office/drawing/2014/main" id="{55666DC2-17A3-DA6B-9BFE-036E767F5A13}"/>
               </a:ext>
             </a:extLst>
           </p:cNvPr>
@@ -15080,7 +15698,7 @@
           <p:cNvPr id="5" name="Rectangle 4">
             <a:extLst>
               <a:ext uri="{FF2B5EF4-FFF2-40B4-BE49-F238E27FC236}">
-                <a16:creationId xmlns:a16="http://schemas.microsoft.com/office/drawing/2014/main" id="{F4E01054-B4B8-BC41-8667-60CEB7A01846}"/>
+                <a16:creationId xmlns:a16="http://schemas.microsoft.com/office/drawing/2014/main" id="{76FBC101-3046-6855-59CA-2963E80BEBF6}"/>
               </a:ext>
             </a:extLst>
           </p:cNvPr>
@@ -15090,7 +15708,7 @@
         <p:spPr>
           <a:xfrm>
             <a:off x="533400" y="1081668"/>
-            <a:ext cx="8610600" cy="3139321"/>
+            <a:ext cx="8610600" cy="2308324"/>
           </a:xfrm>
           <a:prstGeom prst="rect">
             <a:avLst/>
@@ -15101,6 +15719,181 @@
             <a:spAutoFit/>
           </a:bodyPr>
           <a:lstStyle/>
+          <a:p>
+            <a:pPr>
+              <a:lnSpc>
+                <a:spcPct val="100000"/>
+              </a:lnSpc>
+            </a:pPr>
+            <a:r>
+              <a:rPr lang="en-US" spc="-1" dirty="0">
+                <a:solidFill>
+                  <a:srgbClr val="000000"/>
+                </a:solidFill>
+                <a:uFill>
+                  <a:solidFill>
+                    <a:srgbClr val="FFFFFF"/>
+                  </a:solidFill>
+                </a:uFill>
+                <a:latin typeface="Source Code Pro" panose="020B0509030403020204" pitchFamily="49" charset="77"/>
+              </a:rPr>
+              <a:t>def acronym(sentence):</a:t>
+            </a:r>
+          </a:p>
+          <a:p>
+            <a:pPr>
+              <a:lnSpc>
+                <a:spcPct val="100000"/>
+              </a:lnSpc>
+            </a:pPr>
+            <a:r>
+              <a:rPr lang="en-US" spc="-1" dirty="0">
+                <a:solidFill>
+                  <a:srgbClr val="000000"/>
+                </a:solidFill>
+                <a:uFill>
+                  <a:solidFill>
+                    <a:srgbClr val="FFFFFF"/>
+                  </a:solidFill>
+                </a:uFill>
+                <a:latin typeface="Source Code Pro" panose="020B0509030403020204" pitchFamily="49" charset="77"/>
+              </a:rPr>
+              <a:t>    """</a:t>
+            </a:r>
+          </a:p>
+          <a:p>
+            <a:pPr>
+              <a:lnSpc>
+                <a:spcPct val="100000"/>
+              </a:lnSpc>
+            </a:pPr>
+            <a:r>
+              <a:rPr lang="en-US" spc="-1" dirty="0">
+                <a:solidFill>
+                  <a:srgbClr val="000000"/>
+                </a:solidFill>
+                <a:uFill>
+                  <a:solidFill>
+                    <a:srgbClr val="FFFFFF"/>
+                  </a:solidFill>
+                </a:uFill>
+                <a:latin typeface="Source Code Pro" panose="020B0509030403020204" pitchFamily="49" charset="77"/>
+              </a:rPr>
+              <a:t>    &gt;&gt;&gt; acronym("The University of California at Berkeley")</a:t>
+            </a:r>
+          </a:p>
+          <a:p>
+            <a:pPr>
+              <a:lnSpc>
+                <a:spcPct val="100000"/>
+              </a:lnSpc>
+            </a:pPr>
+            <a:r>
+              <a:rPr lang="en-US" spc="-1" dirty="0">
+                <a:solidFill>
+                  <a:srgbClr val="000000"/>
+                </a:solidFill>
+                <a:uFill>
+                  <a:solidFill>
+                    <a:srgbClr val="FFFFFF"/>
+                  </a:solidFill>
+                </a:uFill>
+                <a:latin typeface="Source Code Pro" panose="020B0509030403020204" pitchFamily="49" charset="77"/>
+              </a:rPr>
+              <a:t>    "UCB"</a:t>
+            </a:r>
+          </a:p>
+          <a:p>
+            <a:pPr>
+              <a:lnSpc>
+                <a:spcPct val="100000"/>
+              </a:lnSpc>
+            </a:pPr>
+            <a:r>
+              <a:rPr lang="en-US" spc="-1" dirty="0">
+                <a:solidFill>
+                  <a:srgbClr val="000000"/>
+                </a:solidFill>
+                <a:uFill>
+                  <a:solidFill>
+                    <a:srgbClr val="FFFFFF"/>
+                  </a:solidFill>
+                </a:uFill>
+                <a:latin typeface="Source Code Pro" panose="020B0509030403020204" pitchFamily="49" charset="77"/>
+              </a:rPr>
+              <a:t>    """</a:t>
+            </a:r>
+          </a:p>
+          <a:p>
+            <a:pPr>
+              <a:lnSpc>
+                <a:spcPct val="100000"/>
+              </a:lnSpc>
+            </a:pPr>
+            <a:r>
+              <a:rPr lang="en-US" spc="-1" dirty="0">
+                <a:solidFill>
+                  <a:srgbClr val="000000"/>
+                </a:solidFill>
+                <a:uFill>
+                  <a:solidFill>
+                    <a:srgbClr val="FFFFFF"/>
+                  </a:solidFill>
+                </a:uFill>
+                <a:latin typeface="Source Code Pro" panose="020B0509030403020204" pitchFamily="49" charset="77"/>
+              </a:rPr>
+              <a:t>    words = </a:t>
+            </a:r>
+            <a:r>
+              <a:rPr lang="en-US" spc="-1" dirty="0" err="1">
+                <a:solidFill>
+                  <a:srgbClr val="000000"/>
+                </a:solidFill>
+                <a:uFill>
+                  <a:solidFill>
+                    <a:srgbClr val="FFFFFF"/>
+                  </a:solidFill>
+                </a:uFill>
+                <a:latin typeface="Source Code Pro" panose="020B0509030403020204" pitchFamily="49" charset="77"/>
+              </a:rPr>
+              <a:t>sentence.split</a:t>
+            </a:r>
+            <a:r>
+              <a:rPr lang="en-US" spc="-1" dirty="0">
+                <a:solidFill>
+                  <a:srgbClr val="000000"/>
+                </a:solidFill>
+                <a:uFill>
+                  <a:solidFill>
+                    <a:srgbClr val="FFFFFF"/>
+                  </a:solidFill>
+                </a:uFill>
+                <a:latin typeface="Source Code Pro" panose="020B0509030403020204" pitchFamily="49" charset="77"/>
+              </a:rPr>
+              <a:t>()</a:t>
+            </a:r>
+          </a:p>
+          <a:p>
+            <a:pPr>
+              <a:lnSpc>
+                <a:spcPct val="100000"/>
+              </a:lnSpc>
+            </a:pPr>
+            <a:r>
+              <a:rPr lang="en-US" spc="-1" dirty="0">
+                <a:solidFill>
+                  <a:srgbClr val="000000"/>
+                </a:solidFill>
+                <a:uFill>
+                  <a:solidFill>
+                    <a:srgbClr val="FFFFFF"/>
+                  </a:solidFill>
+                </a:uFill>
+                <a:latin typeface="Source Code Pro" panose="020B0509030403020204" pitchFamily="49" charset="77"/>
+              </a:rPr>
+              <a:t>    return "YOUR CODE HERE"</a:t>
+            </a:r>
+          </a:p>
           <a:p>
             <a:pPr>
               <a:lnSpc>
@@ -15119,301 +15912,6 @@
               <a:latin typeface="Source Code Pro" panose="020B0509030403020204" pitchFamily="49" charset="77"/>
             </a:endParaRPr>
           </a:p>
-          <a:p>
-            <a:pPr>
-              <a:lnSpc>
-                <a:spcPct val="100000"/>
-              </a:lnSpc>
-            </a:pPr>
-            <a:r>
-              <a:rPr lang="en-US" spc="-1" dirty="0">
-                <a:solidFill>
-                  <a:srgbClr val="000000"/>
-                </a:solidFill>
-                <a:uFill>
-                  <a:solidFill>
-                    <a:srgbClr val="FFFFFF"/>
-                  </a:solidFill>
-                </a:uFill>
-                <a:latin typeface="Source Code Pro" panose="020B0509030403020204" pitchFamily="49" charset="77"/>
-              </a:rPr>
-              <a:t>Input: "The University of California at Berkeley"</a:t>
-            </a:r>
-          </a:p>
-          <a:p>
-            <a:pPr>
-              <a:lnSpc>
-                <a:spcPct val="100000"/>
-              </a:lnSpc>
-            </a:pPr>
-            <a:endParaRPr lang="en-US" spc="-1" dirty="0">
-              <a:solidFill>
-                <a:srgbClr val="000000"/>
-              </a:solidFill>
-              <a:uFill>
-                <a:solidFill>
-                  <a:srgbClr val="FFFFFF"/>
-                </a:solidFill>
-              </a:uFill>
-              <a:latin typeface="Source Code Pro" panose="020B0509030403020204" pitchFamily="49" charset="77"/>
-            </a:endParaRPr>
-          </a:p>
-          <a:p>
-            <a:pPr>
-              <a:lnSpc>
-                <a:spcPct val="100000"/>
-              </a:lnSpc>
-            </a:pPr>
-            <a:r>
-              <a:rPr lang="en-US" spc="-1" dirty="0">
-                <a:solidFill>
-                  <a:srgbClr val="000000"/>
-                </a:solidFill>
-                <a:uFill>
-                  <a:solidFill>
-                    <a:srgbClr val="FFFFFF"/>
-                  </a:solidFill>
-                </a:uFill>
-                <a:latin typeface="Source Code Pro" panose="020B0509030403020204" pitchFamily="49" charset="77"/>
-              </a:rPr>
-              <a:t>Output: "UCB"</a:t>
-            </a:r>
-          </a:p>
-          <a:p>
-            <a:pPr>
-              <a:lnSpc>
-                <a:spcPct val="100000"/>
-              </a:lnSpc>
-            </a:pPr>
-            <a:r>
-              <a:rPr lang="en-US" spc="-1" dirty="0">
-                <a:solidFill>
-                  <a:srgbClr val="000000"/>
-                </a:solidFill>
-                <a:uFill>
-                  <a:solidFill>
-                    <a:srgbClr val="FFFFFF"/>
-                  </a:solidFill>
-                </a:uFill>
-                <a:latin typeface="Source Code Pro" panose="020B0509030403020204" pitchFamily="49" charset="77"/>
-              </a:rPr>
-              <a:t>def acronym(sentence):</a:t>
-            </a:r>
-          </a:p>
-          <a:p>
-            <a:pPr>
-              <a:lnSpc>
-                <a:spcPct val="100000"/>
-              </a:lnSpc>
-            </a:pPr>
-            <a:r>
-              <a:rPr lang="en-US" spc="-1" dirty="0">
-                <a:solidFill>
-                  <a:srgbClr val="000000"/>
-                </a:solidFill>
-                <a:uFill>
-                  <a:solidFill>
-                    <a:srgbClr val="FFFFFF"/>
-                  </a:solidFill>
-                </a:uFill>
-                <a:latin typeface="Source Code Pro" panose="020B0509030403020204" pitchFamily="49" charset="77"/>
-              </a:rPr>
-              <a:t>    """ (Some </a:t>
-            </a:r>
-            <a:r>
-              <a:rPr lang="en-US" spc="-1" dirty="0" err="1">
-                <a:solidFill>
-                  <a:srgbClr val="000000"/>
-                </a:solidFill>
-                <a:uFill>
-                  <a:solidFill>
-                    <a:srgbClr val="FFFFFF"/>
-                  </a:solidFill>
-                </a:uFill>
-                <a:latin typeface="Source Code Pro" panose="020B0509030403020204" pitchFamily="49" charset="77"/>
-              </a:rPr>
-              <a:t>doctests</a:t>
-            </a:r>
-            <a:r>
-              <a:rPr lang="en-US" spc="-1" dirty="0">
-                <a:solidFill>
-                  <a:srgbClr val="000000"/>
-                </a:solidFill>
-                <a:uFill>
-                  <a:solidFill>
-                    <a:srgbClr val="FFFFFF"/>
-                  </a:solidFill>
-                </a:uFill>
-                <a:latin typeface="Source Code Pro" panose="020B0509030403020204" pitchFamily="49" charset="77"/>
-              </a:rPr>
-              <a:t>)</a:t>
-            </a:r>
-          </a:p>
-          <a:p>
-            <a:pPr>
-              <a:lnSpc>
-                <a:spcPct val="100000"/>
-              </a:lnSpc>
-            </a:pPr>
-            <a:r>
-              <a:rPr lang="en-US" spc="-1" dirty="0">
-                <a:solidFill>
-                  <a:srgbClr val="000000"/>
-                </a:solidFill>
-                <a:uFill>
-                  <a:solidFill>
-                    <a:srgbClr val="FFFFFF"/>
-                  </a:solidFill>
-                </a:uFill>
-                <a:latin typeface="Source Code Pro" panose="020B0509030403020204" pitchFamily="49" charset="77"/>
-              </a:rPr>
-              <a:t>    """</a:t>
-            </a:r>
-          </a:p>
-          <a:p>
-            <a:pPr>
-              <a:lnSpc>
-                <a:spcPct val="100000"/>
-              </a:lnSpc>
-            </a:pPr>
-            <a:r>
-              <a:rPr lang="en-US" spc="-1" dirty="0">
-                <a:solidFill>
-                  <a:srgbClr val="000000"/>
-                </a:solidFill>
-                <a:uFill>
-                  <a:solidFill>
-                    <a:srgbClr val="FFFFFF"/>
-                  </a:solidFill>
-                </a:uFill>
-                <a:latin typeface="Source Code Pro" panose="020B0509030403020204" pitchFamily="49" charset="77"/>
-              </a:rPr>
-              <a:t>    words = </a:t>
-            </a:r>
-            <a:r>
-              <a:rPr lang="en-US" spc="-1" dirty="0" err="1">
-                <a:solidFill>
-                  <a:srgbClr val="000000"/>
-                </a:solidFill>
-                <a:uFill>
-                  <a:solidFill>
-                    <a:srgbClr val="FFFFFF"/>
-                  </a:solidFill>
-                </a:uFill>
-                <a:latin typeface="Source Code Pro" panose="020B0509030403020204" pitchFamily="49" charset="77"/>
-              </a:rPr>
-              <a:t>sentence.split</a:t>
-            </a:r>
-            <a:r>
-              <a:rPr lang="en-US" spc="-1" dirty="0">
-                <a:solidFill>
-                  <a:srgbClr val="000000"/>
-                </a:solidFill>
-                <a:uFill>
-                  <a:solidFill>
-                    <a:srgbClr val="FFFFFF"/>
-                  </a:solidFill>
-                </a:uFill>
-                <a:latin typeface="Source Code Pro" panose="020B0509030403020204" pitchFamily="49" charset="77"/>
-              </a:rPr>
-              <a:t>()</a:t>
-            </a:r>
-          </a:p>
-          <a:p>
-            <a:pPr>
-              <a:lnSpc>
-                <a:spcPct val="100000"/>
-              </a:lnSpc>
-            </a:pPr>
-            <a:r>
-              <a:rPr lang="en-US" spc="-1" dirty="0">
-                <a:solidFill>
-                  <a:srgbClr val="000000"/>
-                </a:solidFill>
-                <a:uFill>
-                  <a:solidFill>
-                    <a:srgbClr val="FFFFFF"/>
-                  </a:solidFill>
-                </a:uFill>
-                <a:latin typeface="Source Code Pro" panose="020B0509030403020204" pitchFamily="49" charset="77"/>
-              </a:rPr>
-              <a:t>    return reduce(add, map(</a:t>
-            </a:r>
-            <a:r>
-              <a:rPr lang="en-US" spc="-1" dirty="0" err="1">
-                <a:solidFill>
-                  <a:srgbClr val="000000"/>
-                </a:solidFill>
-                <a:uFill>
-                  <a:solidFill>
-                    <a:srgbClr val="FFFFFF"/>
-                  </a:solidFill>
-                </a:uFill>
-                <a:latin typeface="Source Code Pro" panose="020B0509030403020204" pitchFamily="49" charset="77"/>
-              </a:rPr>
-              <a:t>first_letter</a:t>
-            </a:r>
-            <a:r>
-              <a:rPr lang="en-US" spc="-1" dirty="0">
-                <a:solidFill>
-                  <a:srgbClr val="000000"/>
-                </a:solidFill>
-                <a:uFill>
-                  <a:solidFill>
-                    <a:srgbClr val="FFFFFF"/>
-                  </a:solidFill>
-                </a:uFill>
-                <a:latin typeface="Source Code Pro" panose="020B0509030403020204" pitchFamily="49" charset="77"/>
-              </a:rPr>
-              <a:t>, filter(</a:t>
-            </a:r>
-            <a:r>
-              <a:rPr lang="en-US" spc="-1" dirty="0" err="1">
-                <a:solidFill>
-                  <a:srgbClr val="000000"/>
-                </a:solidFill>
-                <a:uFill>
-                  <a:solidFill>
-                    <a:srgbClr val="FFFFFF"/>
-                  </a:solidFill>
-                </a:uFill>
-                <a:latin typeface="Source Code Pro" panose="020B0509030403020204" pitchFamily="49" charset="77"/>
-              </a:rPr>
-              <a:t>long_word</a:t>
-            </a:r>
-            <a:r>
-              <a:rPr lang="en-US" spc="-1" dirty="0">
-                <a:solidFill>
-                  <a:srgbClr val="000000"/>
-                </a:solidFill>
-                <a:uFill>
-                  <a:solidFill>
-                    <a:srgbClr val="FFFFFF"/>
-                  </a:solidFill>
-                </a:uFill>
-                <a:latin typeface="Source Code Pro" panose="020B0509030403020204" pitchFamily="49" charset="77"/>
-              </a:rPr>
-              <a:t>, words)))</a:t>
-            </a:r>
-          </a:p>
-          <a:p>
-            <a:pPr>
-              <a:lnSpc>
-                <a:spcPct val="100000"/>
-              </a:lnSpc>
-            </a:pPr>
-            <a:endParaRPr lang="en-US" spc="-1" dirty="0">
-              <a:solidFill>
-                <a:srgbClr val="000000"/>
-              </a:solidFill>
-              <a:uFill>
-                <a:solidFill>
-                  <a:srgbClr val="FFFFFF"/>
-                </a:solidFill>
-              </a:uFill>
-              <a:latin typeface="Source Code Pro" panose="020B0509030403020204" pitchFamily="49" charset="77"/>
-            </a:endParaRPr>
-          </a:p>
         </p:txBody>
       </p:sp>
       <p:sp>
@@ -15421,7 +15919,7 @@
           <p:cNvPr id="7" name="TextShape 11">
             <a:extLst>
               <a:ext uri="{FF2B5EF4-FFF2-40B4-BE49-F238E27FC236}">
-                <a16:creationId xmlns:a16="http://schemas.microsoft.com/office/drawing/2014/main" id="{55609106-671F-E84E-8744-3B2453668F27}"/>
+                <a16:creationId xmlns:a16="http://schemas.microsoft.com/office/drawing/2014/main" id="{FBB37F23-03A0-B7ED-65E5-CFFF81253EE7}"/>
               </a:ext>
             </a:extLst>
           </p:cNvPr>
@@ -15519,7 +16017,7 @@
     </p:spTree>
     <p:extLst>
       <p:ext uri="{BB962C8B-B14F-4D97-AF65-F5344CB8AC3E}">
-        <p14:creationId xmlns:p14="http://schemas.microsoft.com/office/powerpoint/2010/main" val="3338411237"/>
+        <p14:creationId xmlns:p14="http://schemas.microsoft.com/office/powerpoint/2010/main" val="251180740"/>
       </p:ext>
     </p:extLst>
   </p:cSld>
@@ -15551,7 +16049,7 @@
           <p:cNvPr id="2" name="Title 1">
             <a:extLst>
               <a:ext uri="{FF2B5EF4-FFF2-40B4-BE49-F238E27FC236}">
-                <a16:creationId xmlns:a16="http://schemas.microsoft.com/office/drawing/2014/main" id="{4C391A7B-517B-1F28-7683-AA06AF06A49F}"/>
+                <a16:creationId xmlns:a16="http://schemas.microsoft.com/office/drawing/2014/main" id="{D78DEC67-149D-7747-87F3-D940F8EF2C93}"/>
               </a:ext>
             </a:extLst>
           </p:cNvPr>
@@ -15569,251 +16067,17 @@
           <a:p>
             <a:r>
               <a:rPr lang="en-US" dirty="0"/>
-              <a:t>Acronym With HOFs</a:t>
-            </a:r>
-          </a:p>
-        </p:txBody>
-      </p:sp>
-      <p:sp>
-        <p:nvSpPr>
-          <p:cNvPr id="3" name="Content Placeholder 2">
+              <a:t>Today’s Task: Acronym</a:t>
+            </a:r>
+          </a:p>
+        </p:txBody>
+      </p:sp>
+      <p:sp>
+        <p:nvSpPr>
+          <p:cNvPr id="3" name="Footer Placeholder 3">
             <a:extLst>
               <a:ext uri="{FF2B5EF4-FFF2-40B4-BE49-F238E27FC236}">
-                <a16:creationId xmlns:a16="http://schemas.microsoft.com/office/drawing/2014/main" id="{0EBA5618-B947-D60E-CA5F-2F85BE526602}"/>
-              </a:ext>
-            </a:extLst>
-          </p:cNvPr>
-          <p:cNvSpPr>
-            <a:spLocks noGrp="1"/>
-          </p:cNvSpPr>
-          <p:nvPr>
-            <p:ph idx="1"/>
-          </p:nvPr>
-        </p:nvSpPr>
-        <p:spPr/>
-        <p:txBody>
-          <a:bodyPr/>
-          <a:lstStyle/>
-          <a:p>
-            <a:pPr marL="0" indent="0">
-              <a:buNone/>
-            </a:pPr>
-            <a:r>
-              <a:rPr lang="en-US" dirty="0"/>
-              <a:t>What is we want to control the filtering method?</a:t>
-            </a:r>
-          </a:p>
-          <a:p>
-            <a:pPr marL="0" indent="0">
-              <a:buNone/>
-            </a:pPr>
-            <a:endParaRPr lang="en-US" dirty="0"/>
-          </a:p>
-          <a:p>
-            <a:pPr marL="0" indent="0">
-              <a:buNone/>
-            </a:pPr>
-            <a:r>
-              <a:rPr lang="en-US" dirty="0">
-                <a:latin typeface="Source Code Pro" panose="020B0509030403020204" pitchFamily="49" charset="77"/>
-              </a:rPr>
-              <a:t>def </a:t>
-            </a:r>
-            <a:r>
-              <a:rPr lang="en-US" dirty="0" err="1">
-                <a:latin typeface="Source Code Pro" panose="020B0509030403020204" pitchFamily="49" charset="77"/>
-              </a:rPr>
-              <a:t>keep_words</a:t>
-            </a:r>
-            <a:r>
-              <a:rPr lang="en-US" dirty="0">
-                <a:latin typeface="Source Code Pro" panose="020B0509030403020204" pitchFamily="49" charset="77"/>
-              </a:rPr>
-              <a:t>(word):</a:t>
-            </a:r>
-          </a:p>
-          <a:p>
-            <a:pPr marL="0" indent="0">
-              <a:buNone/>
-            </a:pPr>
-            <a:r>
-              <a:rPr lang="en-US" dirty="0">
-                <a:latin typeface="Source Code Pro" panose="020B0509030403020204" pitchFamily="49" charset="77"/>
-              </a:rPr>
-              <a:t>    specials = ['Los']</a:t>
-            </a:r>
-          </a:p>
-          <a:p>
-            <a:pPr marL="0" indent="0">
-              <a:buNone/>
-            </a:pPr>
-            <a:r>
-              <a:rPr lang="en-US" dirty="0">
-                <a:latin typeface="Source Code Pro" panose="020B0509030403020204" pitchFamily="49" charset="77"/>
-              </a:rPr>
-              <a:t>    return word in specials or </a:t>
-            </a:r>
-            <a:r>
-              <a:rPr lang="en-US" dirty="0" err="1">
-                <a:latin typeface="Source Code Pro" panose="020B0509030403020204" pitchFamily="49" charset="77"/>
-              </a:rPr>
-              <a:t>long_word</a:t>
-            </a:r>
-            <a:r>
-              <a:rPr lang="en-US" dirty="0">
-                <a:latin typeface="Source Code Pro" panose="020B0509030403020204" pitchFamily="49" charset="77"/>
-              </a:rPr>
-              <a:t>(word)</a:t>
-            </a:r>
-          </a:p>
-          <a:p>
-            <a:pPr marL="0" indent="0">
-              <a:buNone/>
-            </a:pPr>
-            <a:endParaRPr lang="en-US" dirty="0">
-              <a:latin typeface="Source Code Pro" panose="020B0509030403020204" pitchFamily="49" charset="77"/>
-            </a:endParaRPr>
-          </a:p>
-          <a:p>
-            <a:pPr marL="0" indent="0">
-              <a:buNone/>
-            </a:pPr>
-            <a:r>
-              <a:rPr lang="en-US" dirty="0">
-                <a:latin typeface="Source Code Pro" panose="020B0509030403020204" pitchFamily="49" charset="77"/>
-              </a:rPr>
-              <a:t>def </a:t>
-            </a:r>
-            <a:r>
-              <a:rPr lang="en-US" dirty="0" err="1">
-                <a:latin typeface="Source Code Pro" panose="020B0509030403020204" pitchFamily="49" charset="77"/>
-              </a:rPr>
-              <a:t>acronym_hof</a:t>
-            </a:r>
-            <a:r>
-              <a:rPr lang="en-US" dirty="0">
-                <a:latin typeface="Source Code Pro" panose="020B0509030403020204" pitchFamily="49" charset="77"/>
-              </a:rPr>
-              <a:t>(sentence, </a:t>
-            </a:r>
-            <a:r>
-              <a:rPr lang="en-US" b="1" dirty="0" err="1">
-                <a:latin typeface="Source Code Pro" panose="020B0509030403020204" pitchFamily="49" charset="77"/>
-              </a:rPr>
-              <a:t>filter_fn</a:t>
-            </a:r>
-            <a:r>
-              <a:rPr lang="en-US" dirty="0">
-                <a:latin typeface="Source Code Pro" panose="020B0509030403020204" pitchFamily="49" charset="77"/>
-              </a:rPr>
-              <a:t>):</a:t>
-            </a:r>
-          </a:p>
-          <a:p>
-            <a:pPr marL="0" indent="0">
-              <a:buNone/>
-            </a:pPr>
-            <a:r>
-              <a:rPr lang="en-US" dirty="0">
-                <a:latin typeface="Source Code Pro" panose="020B0509030403020204" pitchFamily="49" charset="77"/>
-              </a:rPr>
-              <a:t>    words = </a:t>
-            </a:r>
-            <a:r>
-              <a:rPr lang="en-US" dirty="0" err="1">
-                <a:latin typeface="Source Code Pro" panose="020B0509030403020204" pitchFamily="49" charset="77"/>
-              </a:rPr>
-              <a:t>sentence.split</a:t>
-            </a:r>
-            <a:r>
-              <a:rPr lang="en-US" dirty="0">
-                <a:latin typeface="Source Code Pro" panose="020B0509030403020204" pitchFamily="49" charset="77"/>
-              </a:rPr>
-              <a:t>()</a:t>
-            </a:r>
-          </a:p>
-          <a:p>
-            <a:pPr marL="0" indent="0">
-              <a:buNone/>
-            </a:pPr>
-            <a:r>
-              <a:rPr lang="en-US" dirty="0">
-                <a:latin typeface="Source Code Pro" panose="020B0509030403020204" pitchFamily="49" charset="77"/>
-              </a:rPr>
-              <a:t>    return reduce(add, map(</a:t>
-            </a:r>
-            <a:r>
-              <a:rPr lang="en-US" dirty="0" err="1">
-                <a:latin typeface="Source Code Pro" panose="020B0509030403020204" pitchFamily="49" charset="77"/>
-              </a:rPr>
-              <a:t>first_letter</a:t>
-            </a:r>
-            <a:r>
-              <a:rPr lang="en-US" dirty="0">
-                <a:latin typeface="Source Code Pro" panose="020B0509030403020204" pitchFamily="49" charset="77"/>
-              </a:rPr>
-              <a:t>, filter(</a:t>
-            </a:r>
-            <a:r>
-              <a:rPr lang="en-US" b="1" dirty="0" err="1">
-                <a:latin typeface="Source Code Pro" panose="020B0509030403020204" pitchFamily="49" charset="77"/>
-              </a:rPr>
-              <a:t>filter_fn</a:t>
-            </a:r>
-            <a:r>
-              <a:rPr lang="en-US" dirty="0">
-                <a:latin typeface="Source Code Pro" panose="020B0509030403020204" pitchFamily="49" charset="77"/>
-              </a:rPr>
-              <a:t>, words)))</a:t>
-            </a:r>
-          </a:p>
-          <a:p>
-            <a:pPr marL="0" indent="0">
-              <a:buNone/>
-            </a:pPr>
-            <a:endParaRPr lang="en-US" dirty="0"/>
-          </a:p>
-          <a:p>
-            <a:pPr marL="0" indent="0">
-              <a:buNone/>
-            </a:pPr>
-            <a:r>
-              <a:rPr lang="en-US" dirty="0" err="1">
-                <a:latin typeface="Source Code Pro" panose="020B0309030403020204" pitchFamily="34" charset="0"/>
-                <a:ea typeface="Source Code Pro" panose="020B0309030403020204" pitchFamily="34" charset="0"/>
-              </a:rPr>
-              <a:t>acronym_hof</a:t>
-            </a:r>
-            <a:r>
-              <a:rPr lang="en-US" dirty="0">
-                <a:latin typeface="Source Code Pro" panose="020B0309030403020204" pitchFamily="34" charset="0"/>
-                <a:ea typeface="Source Code Pro" panose="020B0309030403020204" pitchFamily="34" charset="0"/>
-              </a:rPr>
-              <a:t>(copycats, </a:t>
-            </a:r>
-            <a:r>
-              <a:rPr lang="en-US" dirty="0" err="1">
-                <a:latin typeface="Source Code Pro" panose="020B0309030403020204" pitchFamily="34" charset="0"/>
-                <a:ea typeface="Source Code Pro" panose="020B0309030403020204" pitchFamily="34" charset="0"/>
-              </a:rPr>
-              <a:t>keep_words</a:t>
-            </a:r>
-            <a:r>
-              <a:rPr lang="en-US" dirty="0">
-                <a:latin typeface="Source Code Pro" panose="020B0309030403020204" pitchFamily="34" charset="0"/>
-                <a:ea typeface="Source Code Pro" panose="020B0309030403020204" pitchFamily="34" charset="0"/>
-              </a:rPr>
-              <a:t>)</a:t>
-            </a:r>
-          </a:p>
-        </p:txBody>
-      </p:sp>
-      <p:sp>
-        <p:nvSpPr>
-          <p:cNvPr id="4" name="Footer Placeholder 3">
-            <a:extLst>
-              <a:ext uri="{FF2B5EF4-FFF2-40B4-BE49-F238E27FC236}">
-                <a16:creationId xmlns:a16="http://schemas.microsoft.com/office/drawing/2014/main" id="{9190173E-420E-9A58-E65B-E03B8A83BE80}"/>
+                <a16:creationId xmlns:a16="http://schemas.microsoft.com/office/drawing/2014/main" id="{945EF9C5-F59D-F53F-E807-CF0E2DF60EA6}"/>
               </a:ext>
             </a:extLst>
           </p:cNvPr>
@@ -15841,10 +16105,451 @@
           </a:p>
         </p:txBody>
       </p:sp>
+      <p:sp>
+        <p:nvSpPr>
+          <p:cNvPr id="5" name="Rectangle 4">
+            <a:extLst>
+              <a:ext uri="{FF2B5EF4-FFF2-40B4-BE49-F238E27FC236}">
+                <a16:creationId xmlns:a16="http://schemas.microsoft.com/office/drawing/2014/main" id="{F4E01054-B4B8-BC41-8667-60CEB7A01846}"/>
+              </a:ext>
+            </a:extLst>
+          </p:cNvPr>
+          <p:cNvSpPr/>
+          <p:nvPr/>
+        </p:nvSpPr>
+        <p:spPr>
+          <a:xfrm>
+            <a:off x="533400" y="1081668"/>
+            <a:ext cx="8610600" cy="3139321"/>
+          </a:xfrm>
+          <a:prstGeom prst="rect">
+            <a:avLst/>
+          </a:prstGeom>
+        </p:spPr>
+        <p:txBody>
+          <a:bodyPr wrap="square">
+            <a:spAutoFit/>
+          </a:bodyPr>
+          <a:lstStyle/>
+          <a:p>
+            <a:pPr>
+              <a:lnSpc>
+                <a:spcPct val="100000"/>
+              </a:lnSpc>
+            </a:pPr>
+            <a:endParaRPr lang="en-US" spc="-1" dirty="0">
+              <a:solidFill>
+                <a:srgbClr val="000000"/>
+              </a:solidFill>
+              <a:uFill>
+                <a:solidFill>
+                  <a:srgbClr val="FFFFFF"/>
+                </a:solidFill>
+              </a:uFill>
+              <a:latin typeface="Source Code Pro" panose="020B0509030403020204" pitchFamily="49" charset="77"/>
+            </a:endParaRPr>
+          </a:p>
+          <a:p>
+            <a:pPr>
+              <a:lnSpc>
+                <a:spcPct val="100000"/>
+              </a:lnSpc>
+            </a:pPr>
+            <a:r>
+              <a:rPr lang="en-US" spc="-1" dirty="0">
+                <a:solidFill>
+                  <a:srgbClr val="000000"/>
+                </a:solidFill>
+                <a:uFill>
+                  <a:solidFill>
+                    <a:srgbClr val="FFFFFF"/>
+                  </a:solidFill>
+                </a:uFill>
+                <a:latin typeface="Source Code Pro" panose="020B0509030403020204" pitchFamily="49" charset="77"/>
+              </a:rPr>
+              <a:t>Input: "The University of California at Berkeley"</a:t>
+            </a:r>
+          </a:p>
+          <a:p>
+            <a:pPr>
+              <a:lnSpc>
+                <a:spcPct val="100000"/>
+              </a:lnSpc>
+            </a:pPr>
+            <a:endParaRPr lang="en-US" spc="-1" dirty="0">
+              <a:solidFill>
+                <a:srgbClr val="000000"/>
+              </a:solidFill>
+              <a:uFill>
+                <a:solidFill>
+                  <a:srgbClr val="FFFFFF"/>
+                </a:solidFill>
+              </a:uFill>
+              <a:latin typeface="Source Code Pro" panose="020B0509030403020204" pitchFamily="49" charset="77"/>
+            </a:endParaRPr>
+          </a:p>
+          <a:p>
+            <a:pPr>
+              <a:lnSpc>
+                <a:spcPct val="100000"/>
+              </a:lnSpc>
+            </a:pPr>
+            <a:r>
+              <a:rPr lang="en-US" spc="-1" dirty="0">
+                <a:solidFill>
+                  <a:srgbClr val="000000"/>
+                </a:solidFill>
+                <a:uFill>
+                  <a:solidFill>
+                    <a:srgbClr val="FFFFFF"/>
+                  </a:solidFill>
+                </a:uFill>
+                <a:latin typeface="Source Code Pro" panose="020B0509030403020204" pitchFamily="49" charset="77"/>
+              </a:rPr>
+              <a:t>Output: "UCB"</a:t>
+            </a:r>
+          </a:p>
+          <a:p>
+            <a:pPr>
+              <a:lnSpc>
+                <a:spcPct val="100000"/>
+              </a:lnSpc>
+            </a:pPr>
+            <a:r>
+              <a:rPr lang="en-US" spc="-1" dirty="0">
+                <a:solidFill>
+                  <a:srgbClr val="000000"/>
+                </a:solidFill>
+                <a:uFill>
+                  <a:solidFill>
+                    <a:srgbClr val="FFFFFF"/>
+                  </a:solidFill>
+                </a:uFill>
+                <a:latin typeface="Source Code Pro" panose="020B0509030403020204" pitchFamily="49" charset="77"/>
+              </a:rPr>
+              <a:t>def acronym(sentence):</a:t>
+            </a:r>
+          </a:p>
+          <a:p>
+            <a:pPr>
+              <a:lnSpc>
+                <a:spcPct val="100000"/>
+              </a:lnSpc>
+            </a:pPr>
+            <a:r>
+              <a:rPr lang="en-US" spc="-1" dirty="0">
+                <a:solidFill>
+                  <a:srgbClr val="000000"/>
+                </a:solidFill>
+                <a:uFill>
+                  <a:solidFill>
+                    <a:srgbClr val="FFFFFF"/>
+                  </a:solidFill>
+                </a:uFill>
+                <a:latin typeface="Source Code Pro" panose="020B0509030403020204" pitchFamily="49" charset="77"/>
+              </a:rPr>
+              <a:t>    """ (Some </a:t>
+            </a:r>
+            <a:r>
+              <a:rPr lang="en-US" spc="-1" dirty="0" err="1">
+                <a:solidFill>
+                  <a:srgbClr val="000000"/>
+                </a:solidFill>
+                <a:uFill>
+                  <a:solidFill>
+                    <a:srgbClr val="FFFFFF"/>
+                  </a:solidFill>
+                </a:uFill>
+                <a:latin typeface="Source Code Pro" panose="020B0509030403020204" pitchFamily="49" charset="77"/>
+              </a:rPr>
+              <a:t>doctests</a:t>
+            </a:r>
+            <a:r>
+              <a:rPr lang="en-US" spc="-1" dirty="0">
+                <a:solidFill>
+                  <a:srgbClr val="000000"/>
+                </a:solidFill>
+                <a:uFill>
+                  <a:solidFill>
+                    <a:srgbClr val="FFFFFF"/>
+                  </a:solidFill>
+                </a:uFill>
+                <a:latin typeface="Source Code Pro" panose="020B0509030403020204" pitchFamily="49" charset="77"/>
+              </a:rPr>
+              <a:t>)</a:t>
+            </a:r>
+          </a:p>
+          <a:p>
+            <a:pPr>
+              <a:lnSpc>
+                <a:spcPct val="100000"/>
+              </a:lnSpc>
+            </a:pPr>
+            <a:r>
+              <a:rPr lang="en-US" spc="-1" dirty="0">
+                <a:solidFill>
+                  <a:srgbClr val="000000"/>
+                </a:solidFill>
+                <a:uFill>
+                  <a:solidFill>
+                    <a:srgbClr val="FFFFFF"/>
+                  </a:solidFill>
+                </a:uFill>
+                <a:latin typeface="Source Code Pro" panose="020B0509030403020204" pitchFamily="49" charset="77"/>
+              </a:rPr>
+              <a:t>    """</a:t>
+            </a:r>
+          </a:p>
+          <a:p>
+            <a:pPr>
+              <a:lnSpc>
+                <a:spcPct val="100000"/>
+              </a:lnSpc>
+            </a:pPr>
+            <a:r>
+              <a:rPr lang="en-US" spc="-1" dirty="0">
+                <a:solidFill>
+                  <a:srgbClr val="000000"/>
+                </a:solidFill>
+                <a:uFill>
+                  <a:solidFill>
+                    <a:srgbClr val="FFFFFF"/>
+                  </a:solidFill>
+                </a:uFill>
+                <a:latin typeface="Source Code Pro" panose="020B0509030403020204" pitchFamily="49" charset="77"/>
+              </a:rPr>
+              <a:t>    words = </a:t>
+            </a:r>
+            <a:r>
+              <a:rPr lang="en-US" spc="-1" dirty="0" err="1">
+                <a:solidFill>
+                  <a:srgbClr val="000000"/>
+                </a:solidFill>
+                <a:uFill>
+                  <a:solidFill>
+                    <a:srgbClr val="FFFFFF"/>
+                  </a:solidFill>
+                </a:uFill>
+                <a:latin typeface="Source Code Pro" panose="020B0509030403020204" pitchFamily="49" charset="77"/>
+              </a:rPr>
+              <a:t>sentence.split</a:t>
+            </a:r>
+            <a:r>
+              <a:rPr lang="en-US" spc="-1" dirty="0">
+                <a:solidFill>
+                  <a:srgbClr val="000000"/>
+                </a:solidFill>
+                <a:uFill>
+                  <a:solidFill>
+                    <a:srgbClr val="FFFFFF"/>
+                  </a:solidFill>
+                </a:uFill>
+                <a:latin typeface="Source Code Pro" panose="020B0509030403020204" pitchFamily="49" charset="77"/>
+              </a:rPr>
+              <a:t>()</a:t>
+            </a:r>
+          </a:p>
+          <a:p>
+            <a:pPr>
+              <a:lnSpc>
+                <a:spcPct val="100000"/>
+              </a:lnSpc>
+            </a:pPr>
+            <a:r>
+              <a:rPr lang="en-US" spc="-1" dirty="0">
+                <a:solidFill>
+                  <a:srgbClr val="000000"/>
+                </a:solidFill>
+                <a:uFill>
+                  <a:solidFill>
+                    <a:srgbClr val="FFFFFF"/>
+                  </a:solidFill>
+                </a:uFill>
+                <a:latin typeface="Source Code Pro" panose="020B0509030403020204" pitchFamily="49" charset="77"/>
+              </a:rPr>
+              <a:t>    return reduce(add, map(</a:t>
+            </a:r>
+            <a:r>
+              <a:rPr lang="en-US" spc="-1" dirty="0" err="1">
+                <a:solidFill>
+                  <a:srgbClr val="000000"/>
+                </a:solidFill>
+                <a:uFill>
+                  <a:solidFill>
+                    <a:srgbClr val="FFFFFF"/>
+                  </a:solidFill>
+                </a:uFill>
+                <a:latin typeface="Source Code Pro" panose="020B0509030403020204" pitchFamily="49" charset="77"/>
+              </a:rPr>
+              <a:t>first_letter</a:t>
+            </a:r>
+            <a:r>
+              <a:rPr lang="en-US" spc="-1" dirty="0">
+                <a:solidFill>
+                  <a:srgbClr val="000000"/>
+                </a:solidFill>
+                <a:uFill>
+                  <a:solidFill>
+                    <a:srgbClr val="FFFFFF"/>
+                  </a:solidFill>
+                </a:uFill>
+                <a:latin typeface="Source Code Pro" panose="020B0509030403020204" pitchFamily="49" charset="77"/>
+              </a:rPr>
+              <a:t>, filter(</a:t>
+            </a:r>
+            <a:r>
+              <a:rPr lang="en-US" spc="-1" dirty="0" err="1">
+                <a:solidFill>
+                  <a:srgbClr val="000000"/>
+                </a:solidFill>
+                <a:uFill>
+                  <a:solidFill>
+                    <a:srgbClr val="FFFFFF"/>
+                  </a:solidFill>
+                </a:uFill>
+                <a:latin typeface="Source Code Pro" panose="020B0509030403020204" pitchFamily="49" charset="77"/>
+              </a:rPr>
+              <a:t>long_word</a:t>
+            </a:r>
+            <a:r>
+              <a:rPr lang="en-US" spc="-1" dirty="0">
+                <a:solidFill>
+                  <a:srgbClr val="000000"/>
+                </a:solidFill>
+                <a:uFill>
+                  <a:solidFill>
+                    <a:srgbClr val="FFFFFF"/>
+                  </a:solidFill>
+                </a:uFill>
+                <a:latin typeface="Source Code Pro" panose="020B0509030403020204" pitchFamily="49" charset="77"/>
+              </a:rPr>
+              <a:t>, words)))</a:t>
+            </a:r>
+          </a:p>
+          <a:p>
+            <a:pPr>
+              <a:lnSpc>
+                <a:spcPct val="100000"/>
+              </a:lnSpc>
+            </a:pPr>
+            <a:endParaRPr lang="en-US" spc="-1" dirty="0">
+              <a:solidFill>
+                <a:srgbClr val="000000"/>
+              </a:solidFill>
+              <a:uFill>
+                <a:solidFill>
+                  <a:srgbClr val="FFFFFF"/>
+                </a:solidFill>
+              </a:uFill>
+              <a:latin typeface="Source Code Pro" panose="020B0509030403020204" pitchFamily="49" charset="77"/>
+            </a:endParaRPr>
+          </a:p>
+        </p:txBody>
+      </p:sp>
+      <p:sp>
+        <p:nvSpPr>
+          <p:cNvPr id="7" name="TextShape 11">
+            <a:extLst>
+              <a:ext uri="{FF2B5EF4-FFF2-40B4-BE49-F238E27FC236}">
+                <a16:creationId xmlns:a16="http://schemas.microsoft.com/office/drawing/2014/main" id="{55609106-671F-E84E-8744-3B2453668F27}"/>
+              </a:ext>
+            </a:extLst>
+          </p:cNvPr>
+          <p:cNvSpPr txBox="1"/>
+          <p:nvPr/>
+        </p:nvSpPr>
+        <p:spPr>
+          <a:xfrm>
+            <a:off x="2281080" y="5012456"/>
+            <a:ext cx="7171560" cy="602280"/>
+          </a:xfrm>
+          <a:prstGeom prst="rect">
+            <a:avLst/>
+          </a:prstGeom>
+          <a:noFill/>
+          <a:ln>
+            <a:noFill/>
+          </a:ln>
+        </p:spPr>
+        <p:txBody>
+          <a:bodyPr lIns="90000" tIns="45000" rIns="90000" bIns="45000"/>
+          <a:lstStyle/>
+          <a:p>
+            <a:r>
+              <a:rPr lang="en-US" spc="-1" dirty="0">
+                <a:solidFill>
+                  <a:srgbClr val="000000"/>
+                </a:solidFill>
+                <a:uFill>
+                  <a:solidFill>
+                    <a:srgbClr val="FFFFFF"/>
+                  </a:solidFill>
+                </a:uFill>
+                <a:latin typeface="Arial"/>
+              </a:rPr>
+              <a:t>P.S. Pedantry alert: This is really an </a:t>
+            </a:r>
+            <a:r>
+              <a:rPr lang="en-US" i="1" spc="-1" dirty="0">
+                <a:solidFill>
+                  <a:srgbClr val="000000"/>
+                </a:solidFill>
+                <a:uFill>
+                  <a:solidFill>
+                    <a:srgbClr val="FFFFFF"/>
+                  </a:solidFill>
+                </a:uFill>
+                <a:latin typeface="Arial"/>
+              </a:rPr>
+              <a:t>initialism</a:t>
+            </a:r>
+            <a:r>
+              <a:rPr lang="en-US" spc="-1" dirty="0">
+                <a:solidFill>
+                  <a:srgbClr val="000000"/>
+                </a:solidFill>
+                <a:uFill>
+                  <a:solidFill>
+                    <a:srgbClr val="FFFFFF"/>
+                  </a:solidFill>
+                </a:uFill>
+                <a:latin typeface="Arial"/>
+              </a:rPr>
+              <a:t> but that's rather annoying to say and type. </a:t>
+            </a:r>
+            <a:r>
+              <a:rPr lang="en-US" spc="-1" dirty="0">
+                <a:solidFill>
+                  <a:srgbClr val="000000"/>
+                </a:solidFill>
+                <a:uFill>
+                  <a:solidFill>
+                    <a:srgbClr val="FFFFFF"/>
+                  </a:solidFill>
+                </a:uFill>
+                <a:latin typeface="Arial"/>
+                <a:sym typeface="Wingdings" pitchFamily="2" charset="2"/>
+              </a:rPr>
+              <a:t> (However, the code we write is the same, the difference is in how you pronounce the result.) The more you know!</a:t>
+            </a:r>
+            <a:endParaRPr lang="en-US" spc="-1" dirty="0">
+              <a:solidFill>
+                <a:srgbClr val="000000"/>
+              </a:solidFill>
+              <a:uFill>
+                <a:solidFill>
+                  <a:srgbClr val="FFFFFF"/>
+                </a:solidFill>
+              </a:uFill>
+              <a:latin typeface="Arial"/>
+            </a:endParaRPr>
+          </a:p>
+        </p:txBody>
+      </p:sp>
     </p:spTree>
     <p:extLst>
       <p:ext uri="{BB962C8B-B14F-4D97-AF65-F5344CB8AC3E}">
-        <p14:creationId xmlns:p14="http://schemas.microsoft.com/office/powerpoint/2010/main" val="3478770812"/>
+        <p14:creationId xmlns:p14="http://schemas.microsoft.com/office/powerpoint/2010/main" val="3338411237"/>
       </p:ext>
     </p:extLst>
   </p:cSld>
@@ -15876,7 +16581,7 @@
           <p:cNvPr id="2" name="Title 1">
             <a:extLst>
               <a:ext uri="{FF2B5EF4-FFF2-40B4-BE49-F238E27FC236}">
-                <a16:creationId xmlns:a16="http://schemas.microsoft.com/office/drawing/2014/main" id="{C3A57493-490E-6541-9973-A295DBF3E35F}"/>
+                <a16:creationId xmlns:a16="http://schemas.microsoft.com/office/drawing/2014/main" id="{4C391A7B-517B-1F28-7683-AA06AF06A49F}"/>
               </a:ext>
             </a:extLst>
           </p:cNvPr>
@@ -15894,7 +16599,7 @@
           <a:p>
             <a:r>
               <a:rPr lang="en-US" dirty="0"/>
-              <a:t>Functional Sequence (List) Operations</a:t>
+              <a:t>Acronym With HOFs</a:t>
             </a:r>
           </a:p>
         </p:txBody>
@@ -15904,7 +16609,7 @@
           <p:cNvPr id="3" name="Content Placeholder 2">
             <a:extLst>
               <a:ext uri="{FF2B5EF4-FFF2-40B4-BE49-F238E27FC236}">
-                <a16:creationId xmlns:a16="http://schemas.microsoft.com/office/drawing/2014/main" id="{AAAEACB3-3528-3B4E-9961-861C7DBB5CBC}"/>
+                <a16:creationId xmlns:a16="http://schemas.microsoft.com/office/drawing/2014/main" id="{0EBA5618-B947-D60E-CA5F-2F85BE526602}"/>
               </a:ext>
             </a:extLst>
           </p:cNvPr>
@@ -15920,33 +16625,13 @@
           <a:bodyPr/>
           <a:lstStyle/>
           <a:p>
+            <a:pPr marL="0" indent="0">
+              <a:buNone/>
+            </a:pPr>
             <a:r>
               <a:rPr lang="en-US" dirty="0"/>
-              <a:t>Goal: Transform a</a:t>
-            </a:r>
-            <a:r>
-              <a:rPr lang="en-US" i="1" dirty="0"/>
-              <a:t> sequence</a:t>
-            </a:r>
-            <a:r>
-              <a:rPr lang="en-US" dirty="0"/>
-              <a:t>, and return a new result</a:t>
-            </a:r>
-          </a:p>
-          <a:p>
-            <a:r>
-              <a:rPr lang="en-US" dirty="0"/>
-              <a:t>We'll use 3 functions that are hallmarks of functional programming</a:t>
-            </a:r>
-          </a:p>
-          <a:p>
-            <a:r>
-              <a:rPr lang="en-US" dirty="0"/>
-              <a:t>Each of these takes in a function and a sequence as arguments</a:t>
-            </a:r>
-          </a:p>
-          <a:p>
-            <a:endParaRPr lang="en-US" dirty="0"/>
+              <a:t>What is we want to control the filtering method?</a:t>
+            </a:r>
           </a:p>
           <a:p>
             <a:pPr marL="0" indent="0">
@@ -15958,7 +16643,198 @@
             <a:pPr marL="0" indent="0">
               <a:buNone/>
             </a:pPr>
+            <a:r>
+              <a:rPr lang="en-US" dirty="0">
+                <a:latin typeface="Source Code Pro" panose="020B0509030403020204" pitchFamily="49" charset="77"/>
+              </a:rPr>
+              <a:t>def </a:t>
+            </a:r>
+            <a:r>
+              <a:rPr lang="en-US" dirty="0" err="1">
+                <a:latin typeface="Source Code Pro" panose="020B0509030403020204" pitchFamily="49" charset="77"/>
+              </a:rPr>
+              <a:t>keep_words</a:t>
+            </a:r>
+            <a:r>
+              <a:rPr lang="en-US" dirty="0">
+                <a:latin typeface="Source Code Pro" panose="020B0509030403020204" pitchFamily="49" charset="77"/>
+              </a:rPr>
+              <a:t>(word):</a:t>
+            </a:r>
+          </a:p>
+          <a:p>
+            <a:pPr marL="0" indent="0">
+              <a:buNone/>
+            </a:pPr>
+            <a:r>
+              <a:rPr lang="en-US" dirty="0">
+                <a:latin typeface="Source Code Pro" panose="020B0509030403020204" pitchFamily="49" charset="77"/>
+              </a:rPr>
+              <a:t>    specials = ['Los']</a:t>
+            </a:r>
+          </a:p>
+          <a:p>
+            <a:pPr marL="0" indent="0">
+              <a:buNone/>
+            </a:pPr>
+            <a:r>
+              <a:rPr lang="en-US" dirty="0">
+                <a:latin typeface="Source Code Pro" panose="020B0509030403020204" pitchFamily="49" charset="77"/>
+              </a:rPr>
+              <a:t>    return word in specials or </a:t>
+            </a:r>
+            <a:r>
+              <a:rPr lang="en-US" dirty="0" err="1">
+                <a:latin typeface="Source Code Pro" panose="020B0509030403020204" pitchFamily="49" charset="77"/>
+              </a:rPr>
+              <a:t>long_word</a:t>
+            </a:r>
+            <a:r>
+              <a:rPr lang="en-US" dirty="0">
+                <a:latin typeface="Source Code Pro" panose="020B0509030403020204" pitchFamily="49" charset="77"/>
+              </a:rPr>
+              <a:t>(word)</a:t>
+            </a:r>
+          </a:p>
+          <a:p>
+            <a:pPr marL="0" indent="0">
+              <a:buNone/>
+            </a:pPr>
+            <a:endParaRPr lang="en-US" dirty="0">
+              <a:latin typeface="Source Code Pro" panose="020B0509030403020204" pitchFamily="49" charset="77"/>
+            </a:endParaRPr>
+          </a:p>
+          <a:p>
+            <a:pPr marL="0" indent="0">
+              <a:buNone/>
+            </a:pPr>
+            <a:r>
+              <a:rPr lang="en-US" dirty="0">
+                <a:latin typeface="Source Code Pro" panose="020B0509030403020204" pitchFamily="49" charset="77"/>
+              </a:rPr>
+              <a:t>def </a:t>
+            </a:r>
+            <a:r>
+              <a:rPr lang="en-US" dirty="0" err="1">
+                <a:latin typeface="Source Code Pro" panose="020B0509030403020204" pitchFamily="49" charset="77"/>
+              </a:rPr>
+              <a:t>acronym_hof</a:t>
+            </a:r>
+            <a:r>
+              <a:rPr lang="en-US" dirty="0">
+                <a:latin typeface="Source Code Pro" panose="020B0509030403020204" pitchFamily="49" charset="77"/>
+              </a:rPr>
+              <a:t>(sentence, </a:t>
+            </a:r>
+            <a:r>
+              <a:rPr lang="en-US" b="1" dirty="0" err="1">
+                <a:latin typeface="Source Code Pro" panose="020B0509030403020204" pitchFamily="49" charset="77"/>
+              </a:rPr>
+              <a:t>filter_fn</a:t>
+            </a:r>
+            <a:r>
+              <a:rPr lang="en-US" dirty="0">
+                <a:latin typeface="Source Code Pro" panose="020B0509030403020204" pitchFamily="49" charset="77"/>
+              </a:rPr>
+              <a:t>):</a:t>
+            </a:r>
+          </a:p>
+          <a:p>
+            <a:pPr marL="0" indent="0">
+              <a:buNone/>
+            </a:pPr>
+            <a:r>
+              <a:rPr lang="en-US" dirty="0">
+                <a:latin typeface="Source Code Pro" panose="020B0509030403020204" pitchFamily="49" charset="77"/>
+              </a:rPr>
+              <a:t>    words = </a:t>
+            </a:r>
+            <a:r>
+              <a:rPr lang="en-US" dirty="0" err="1">
+                <a:latin typeface="Source Code Pro" panose="020B0509030403020204" pitchFamily="49" charset="77"/>
+              </a:rPr>
+              <a:t>sentence.split</a:t>
+            </a:r>
+            <a:r>
+              <a:rPr lang="en-US" dirty="0">
+                <a:latin typeface="Source Code Pro" panose="020B0509030403020204" pitchFamily="49" charset="77"/>
+              </a:rPr>
+              <a:t>()</a:t>
+            </a:r>
+          </a:p>
+          <a:p>
+            <a:pPr marL="0" indent="0">
+              <a:buNone/>
+            </a:pPr>
+            <a:r>
+              <a:rPr lang="en-US" dirty="0">
+                <a:latin typeface="Source Code Pro" panose="020B0509030403020204" pitchFamily="49" charset="77"/>
+              </a:rPr>
+              <a:t>    return reduce(add, map(</a:t>
+            </a:r>
+            <a:r>
+              <a:rPr lang="en-US" dirty="0" err="1">
+                <a:latin typeface="Source Code Pro" panose="020B0509030403020204" pitchFamily="49" charset="77"/>
+              </a:rPr>
+              <a:t>first_letter</a:t>
+            </a:r>
+            <a:r>
+              <a:rPr lang="en-US" dirty="0">
+                <a:latin typeface="Source Code Pro" panose="020B0509030403020204" pitchFamily="49" charset="77"/>
+              </a:rPr>
+              <a:t>, filter(</a:t>
+            </a:r>
+            <a:r>
+              <a:rPr lang="en-US" b="1" dirty="0" err="1">
+                <a:latin typeface="Source Code Pro" panose="020B0509030403020204" pitchFamily="49" charset="77"/>
+              </a:rPr>
+              <a:t>filter_fn</a:t>
+            </a:r>
+            <a:r>
+              <a:rPr lang="en-US" dirty="0">
+                <a:latin typeface="Source Code Pro" panose="020B0509030403020204" pitchFamily="49" charset="77"/>
+              </a:rPr>
+              <a:t>, words)))</a:t>
+            </a:r>
+          </a:p>
+          <a:p>
+            <a:pPr marL="0" indent="0">
+              <a:buNone/>
+            </a:pPr>
             <a:endParaRPr lang="en-US" dirty="0"/>
+          </a:p>
+          <a:p>
+            <a:pPr marL="0" indent="0">
+              <a:buNone/>
+            </a:pPr>
+            <a:r>
+              <a:rPr lang="en-US" dirty="0" err="1">
+                <a:latin typeface="Source Code Pro" panose="020B0309030403020204" pitchFamily="34" charset="0"/>
+                <a:ea typeface="Source Code Pro" panose="020B0309030403020204" pitchFamily="34" charset="0"/>
+              </a:rPr>
+              <a:t>acronym_hof</a:t>
+            </a:r>
+            <a:r>
+              <a:rPr lang="en-US" dirty="0">
+                <a:latin typeface="Source Code Pro" panose="020B0309030403020204" pitchFamily="34" charset="0"/>
+                <a:ea typeface="Source Code Pro" panose="020B0309030403020204" pitchFamily="34" charset="0"/>
+              </a:rPr>
+              <a:t>(copycats, </a:t>
+            </a:r>
+            <a:r>
+              <a:rPr lang="en-US" dirty="0" err="1">
+                <a:latin typeface="Source Code Pro" panose="020B0309030403020204" pitchFamily="34" charset="0"/>
+                <a:ea typeface="Source Code Pro" panose="020B0309030403020204" pitchFamily="34" charset="0"/>
+              </a:rPr>
+              <a:t>keep_words</a:t>
+            </a:r>
+            <a:r>
+              <a:rPr lang="en-US" dirty="0">
+                <a:latin typeface="Source Code Pro" panose="020B0309030403020204" pitchFamily="34" charset="0"/>
+                <a:ea typeface="Source Code Pro" panose="020B0309030403020204" pitchFamily="34" charset="0"/>
+              </a:rPr>
+              <a:t>)</a:t>
+            </a:r>
           </a:p>
         </p:txBody>
       </p:sp>
@@ -15967,7 +16843,7 @@
           <p:cNvPr id="4" name="Footer Placeholder 3">
             <a:extLst>
               <a:ext uri="{FF2B5EF4-FFF2-40B4-BE49-F238E27FC236}">
-                <a16:creationId xmlns:a16="http://schemas.microsoft.com/office/drawing/2014/main" id="{B4344FEE-E72B-B65D-1AD5-8C1189F1FACC}"/>
+                <a16:creationId xmlns:a16="http://schemas.microsoft.com/office/drawing/2014/main" id="{9190173E-420E-9A58-E65B-E03B8A83BE80}"/>
               </a:ext>
             </a:extLst>
           </p:cNvPr>
@@ -15995,467 +16871,10 @@
           </a:p>
         </p:txBody>
       </p:sp>
-      <p:graphicFrame>
-        <p:nvGraphicFramePr>
-          <p:cNvPr id="6" name="Table 6">
-            <a:extLst>
-              <a:ext uri="{FF2B5EF4-FFF2-40B4-BE49-F238E27FC236}">
-                <a16:creationId xmlns:a16="http://schemas.microsoft.com/office/drawing/2014/main" id="{25EBD1E5-B78E-72B6-6282-D80B13046B4F}"/>
-              </a:ext>
-            </a:extLst>
-          </p:cNvPr>
-          <p:cNvGraphicFramePr>
-            <a:graphicFrameLocks noGrp="1"/>
-          </p:cNvGraphicFramePr>
-          <p:nvPr/>
-        </p:nvGraphicFramePr>
-        <p:xfrm>
-          <a:off x="420415" y="2792760"/>
-          <a:ext cx="10594426" cy="3421927"/>
-        </p:xfrm>
-        <a:graphic>
-          <a:graphicData uri="http://schemas.openxmlformats.org/drawingml/2006/table">
-            <a:tbl>
-              <a:tblPr firstRow="1" bandRow="1">
-                <a:tableStyleId>{5C22544A-7EE6-4342-B048-85BDC9FD1C3A}</a:tableStyleId>
-              </a:tblPr>
-              <a:tblGrid>
-                <a:gridCol w="1692164">
-                  <a:extLst>
-                    <a:ext uri="{9D8B030D-6E8A-4147-A177-3AD203B41FA5}">
-                      <a16:colId xmlns:a16="http://schemas.microsoft.com/office/drawing/2014/main" val="2059777158"/>
-                    </a:ext>
-                  </a:extLst>
-                </a:gridCol>
-                <a:gridCol w="2333297">
-                  <a:extLst>
-                    <a:ext uri="{9D8B030D-6E8A-4147-A177-3AD203B41FA5}">
-                      <a16:colId xmlns:a16="http://schemas.microsoft.com/office/drawing/2014/main" val="2894650286"/>
-                    </a:ext>
-                  </a:extLst>
-                </a:gridCol>
-                <a:gridCol w="2280745">
-                  <a:extLst>
-                    <a:ext uri="{9D8B030D-6E8A-4147-A177-3AD203B41FA5}">
-                      <a16:colId xmlns:a16="http://schemas.microsoft.com/office/drawing/2014/main" val="3290081916"/>
-                    </a:ext>
-                  </a:extLst>
-                </a:gridCol>
-                <a:gridCol w="2007476">
-                  <a:extLst>
-                    <a:ext uri="{9D8B030D-6E8A-4147-A177-3AD203B41FA5}">
-                      <a16:colId xmlns:a16="http://schemas.microsoft.com/office/drawing/2014/main" val="2002986398"/>
-                    </a:ext>
-                  </a:extLst>
-                </a:gridCol>
-                <a:gridCol w="2280744">
-                  <a:extLst>
-                    <a:ext uri="{9D8B030D-6E8A-4147-A177-3AD203B41FA5}">
-                      <a16:colId xmlns:a16="http://schemas.microsoft.com/office/drawing/2014/main" val="756374945"/>
-                    </a:ext>
-                  </a:extLst>
-                </a:gridCol>
-              </a:tblGrid>
-              <a:tr h="678727">
-                <a:tc>
-                  <a:txBody>
-                    <a:bodyPr/>
-                    <a:lstStyle/>
-                    <a:p>
-                      <a:pPr algn="ctr"/>
-                      <a:r>
-                        <a:rPr lang="en-US" sz="2000" b="1" dirty="0">
-                          <a:latin typeface="FreightSans Pro Book" panose="02000606030000020004" pitchFamily="2" charset="0"/>
-                        </a:rPr>
-                        <a:t>Function</a:t>
-                      </a:r>
-                    </a:p>
-                  </a:txBody>
-                  <a:tcPr anchor="ctr"/>
-                </a:tc>
-                <a:tc>
-                  <a:txBody>
-                    <a:bodyPr/>
-                    <a:lstStyle/>
-                    <a:p>
-                      <a:pPr algn="ctr"/>
-                      <a:r>
-                        <a:rPr lang="en-US" sz="2000" dirty="0">
-                          <a:latin typeface="FreightSans Pro Book" panose="02000606030000020004" pitchFamily="2" charset="0"/>
-                        </a:rPr>
-                        <a:t>Action</a:t>
-                      </a:r>
-                    </a:p>
-                  </a:txBody>
-                  <a:tcPr anchor="ctr"/>
-                </a:tc>
-                <a:tc>
-                  <a:txBody>
-                    <a:bodyPr/>
-                    <a:lstStyle/>
-                    <a:p>
-                      <a:pPr algn="ctr"/>
-                      <a:r>
-                        <a:rPr lang="en-US" sz="2000" dirty="0">
-                          <a:latin typeface="FreightSans Pro Book" panose="02000606030000020004" pitchFamily="2" charset="0"/>
-                        </a:rPr>
-                        <a:t>Input arguments</a:t>
-                      </a:r>
-                    </a:p>
-                  </a:txBody>
-                  <a:tcPr anchor="ctr"/>
-                </a:tc>
-                <a:tc>
-                  <a:txBody>
-                    <a:bodyPr/>
-                    <a:lstStyle/>
-                    <a:p>
-                      <a:pPr algn="ctr"/>
-                      <a:r>
-                        <a:rPr lang="en-US" sz="2000" dirty="0">
-                          <a:latin typeface="FreightSans Pro Book" panose="02000606030000020004" pitchFamily="2" charset="0"/>
-                        </a:rPr>
-                        <a:t>Input Fn. Returns</a:t>
-                      </a:r>
-                    </a:p>
-                  </a:txBody>
-                  <a:tcPr anchor="ctr"/>
-                </a:tc>
-                <a:tc>
-                  <a:txBody>
-                    <a:bodyPr/>
-                    <a:lstStyle/>
-                    <a:p>
-                      <a:pPr marL="0" marR="0" lvl="0" indent="0" algn="ctr" defTabSz="342900" rtl="0" eaLnBrk="1" fontAlgn="auto" latinLnBrk="0" hangingPunct="1">
-                        <a:lnSpc>
-                          <a:spcPct val="100000"/>
-                        </a:lnSpc>
-                        <a:spcBef>
-                          <a:spcPts val="0"/>
-                        </a:spcBef>
-                        <a:spcAft>
-                          <a:spcPts val="0"/>
-                        </a:spcAft>
-                        <a:buClrTx/>
-                        <a:buSzTx/>
-                        <a:buFontTx/>
-                        <a:buNone/>
-                        <a:tabLst/>
-                        <a:defRPr/>
-                      </a:pPr>
-                      <a:r>
-                        <a:rPr lang="en-US" sz="2000" dirty="0">
-                          <a:latin typeface="FreightSans Pro Book" panose="02000606030000020004" pitchFamily="2" charset="0"/>
-                        </a:rPr>
-                        <a:t>Output</a:t>
-                      </a:r>
-                    </a:p>
-                  </a:txBody>
-                  <a:tcPr anchor="ctr"/>
-                </a:tc>
-                <a:extLst>
-                  <a:ext uri="{0D108BD9-81ED-4DB2-BD59-A6C34878D82A}">
-                    <a16:rowId xmlns:a16="http://schemas.microsoft.com/office/drawing/2014/main" val="1140645906"/>
-                  </a:ext>
-                </a:extLst>
-              </a:tr>
-              <a:tr h="678727">
-                <a:tc>
-                  <a:txBody>
-                    <a:bodyPr/>
-                    <a:lstStyle/>
-                    <a:p>
-                      <a:pPr algn="ctr"/>
-                      <a:r>
-                        <a:rPr lang="en-US" sz="1800" b="1" dirty="0">
-                          <a:latin typeface="Source Code Pro" panose="020B0509030403020204" pitchFamily="49" charset="77"/>
-                        </a:rPr>
-                        <a:t>map</a:t>
-                      </a:r>
-                    </a:p>
-                  </a:txBody>
-                  <a:tcPr anchor="ctr"/>
-                </a:tc>
-                <a:tc>
-                  <a:txBody>
-                    <a:bodyPr/>
-                    <a:lstStyle/>
-                    <a:p>
-                      <a:r>
-                        <a:rPr lang="en-US" sz="1800" b="0" i="0" dirty="0">
-                          <a:latin typeface="Open Sans Light" panose="020B0606030504020204" pitchFamily="34" charset="0"/>
-                          <a:ea typeface="Open Sans Light" panose="020B0606030504020204" pitchFamily="34" charset="0"/>
-                          <a:cs typeface="Open Sans Light" panose="020B0606030504020204" pitchFamily="34" charset="0"/>
-                        </a:rPr>
-                        <a:t>Transform every item</a:t>
-                      </a:r>
-                    </a:p>
-                  </a:txBody>
-                  <a:tcPr anchor="ctr"/>
-                </a:tc>
-                <a:tc>
-                  <a:txBody>
-                    <a:bodyPr/>
-                    <a:lstStyle/>
-                    <a:p>
-                      <a:r>
-                        <a:rPr lang="en-US" sz="1800" b="0" i="0" dirty="0">
-                          <a:latin typeface="Open Sans Light" panose="020B0606030504020204" pitchFamily="34" charset="0"/>
-                          <a:ea typeface="Open Sans Light" panose="020B0606030504020204" pitchFamily="34" charset="0"/>
-                          <a:cs typeface="Open Sans Light" panose="020B0606030504020204" pitchFamily="34" charset="0"/>
-                        </a:rPr>
-                        <a:t>1 (each item)</a:t>
-                      </a:r>
-                    </a:p>
-                  </a:txBody>
-                  <a:tcPr anchor="ctr"/>
-                </a:tc>
-                <a:tc>
-                  <a:txBody>
-                    <a:bodyPr/>
-                    <a:lstStyle/>
-                    <a:p>
-                      <a:r>
-                        <a:rPr lang="en-US" sz="1800" b="0" i="0" dirty="0">
-                          <a:latin typeface="Open Sans Light" panose="020B0606030504020204" pitchFamily="34" charset="0"/>
-                          <a:ea typeface="Open Sans Light" panose="020B0606030504020204" pitchFamily="34" charset="0"/>
-                          <a:cs typeface="Open Sans Light" panose="020B0606030504020204" pitchFamily="34" charset="0"/>
-                        </a:rPr>
-                        <a:t>"Anything", a new item</a:t>
-                      </a:r>
-                    </a:p>
-                  </a:txBody>
-                  <a:tcPr anchor="ctr"/>
-                </a:tc>
-                <a:tc>
-                  <a:txBody>
-                    <a:bodyPr/>
-                    <a:lstStyle/>
-                    <a:p>
-                      <a:r>
-                        <a:rPr lang="en-US" sz="1800" b="1" i="0" dirty="0">
-                          <a:latin typeface="Open Sans ExtraBold" panose="020B0606030504020204" pitchFamily="34" charset="0"/>
-                          <a:ea typeface="Open Sans ExtraBold" panose="020B0606030504020204" pitchFamily="34" charset="0"/>
-                          <a:cs typeface="Open Sans ExtraBold" panose="020B0606030504020204" pitchFamily="34" charset="0"/>
-                        </a:rPr>
-                        <a:t>List</a:t>
-                      </a:r>
-                      <a:r>
-                        <a:rPr lang="en-US" sz="1800" b="0" i="0" dirty="0">
-                          <a:latin typeface="Open Sans Light" panose="020B0606030504020204" pitchFamily="34" charset="0"/>
-                          <a:ea typeface="Open Sans Light" panose="020B0606030504020204" pitchFamily="34" charset="0"/>
-                          <a:cs typeface="Open Sans Light" panose="020B0606030504020204" pitchFamily="34" charset="0"/>
-                        </a:rPr>
-                        <a:t>: same length, but possibly new values</a:t>
-                      </a:r>
-                    </a:p>
-                  </a:txBody>
-                  <a:tcPr anchor="ctr"/>
-                </a:tc>
-                <a:extLst>
-                  <a:ext uri="{0D108BD9-81ED-4DB2-BD59-A6C34878D82A}">
-                    <a16:rowId xmlns:a16="http://schemas.microsoft.com/office/drawing/2014/main" val="1601251051"/>
-                  </a:ext>
-                </a:extLst>
-              </a:tr>
-              <a:tr h="678727">
-                <a:tc>
-                  <a:txBody>
-                    <a:bodyPr/>
-                    <a:lstStyle/>
-                    <a:p>
-                      <a:pPr algn="ctr"/>
-                      <a:r>
-                        <a:rPr lang="en-US" sz="1800" b="1" dirty="0">
-                          <a:latin typeface="Source Code Pro" panose="020B0509030403020204" pitchFamily="49" charset="77"/>
-                        </a:rPr>
-                        <a:t>filter</a:t>
-                      </a:r>
-                    </a:p>
-                  </a:txBody>
-                  <a:tcPr anchor="ctr"/>
-                </a:tc>
-                <a:tc>
-                  <a:txBody>
-                    <a:bodyPr/>
-                    <a:lstStyle/>
-                    <a:p>
-                      <a:r>
-                        <a:rPr lang="en-US" sz="1800" b="0" i="0" dirty="0">
-                          <a:latin typeface="Open Sans Light" panose="020B0606030504020204" pitchFamily="34" charset="0"/>
-                          <a:ea typeface="Open Sans Light" panose="020B0606030504020204" pitchFamily="34" charset="0"/>
-                          <a:cs typeface="Open Sans Light" panose="020B0606030504020204" pitchFamily="34" charset="0"/>
-                        </a:rPr>
-                        <a:t>Return a list with fewer items</a:t>
-                      </a:r>
-                    </a:p>
-                  </a:txBody>
-                  <a:tcPr anchor="ctr"/>
-                </a:tc>
-                <a:tc>
-                  <a:txBody>
-                    <a:bodyPr/>
-                    <a:lstStyle/>
-                    <a:p>
-                      <a:r>
-                        <a:rPr lang="en-US" sz="1800" b="0" i="0" dirty="0">
-                          <a:latin typeface="Open Sans Light" panose="020B0606030504020204" pitchFamily="34" charset="0"/>
-                          <a:ea typeface="Open Sans Light" panose="020B0606030504020204" pitchFamily="34" charset="0"/>
-                          <a:cs typeface="Open Sans Light" panose="020B0606030504020204" pitchFamily="34" charset="0"/>
-                        </a:rPr>
-                        <a:t>1 (each item)</a:t>
-                      </a:r>
-                    </a:p>
-                  </a:txBody>
-                  <a:tcPr anchor="ctr"/>
-                </a:tc>
-                <a:tc>
-                  <a:txBody>
-                    <a:bodyPr/>
-                    <a:lstStyle/>
-                    <a:p>
-                      <a:r>
-                        <a:rPr lang="en-US" sz="1800" b="0" i="0" dirty="0">
-                          <a:latin typeface="Open Sans Light" panose="020B0606030504020204" pitchFamily="34" charset="0"/>
-                          <a:ea typeface="Open Sans Light" panose="020B0606030504020204" pitchFamily="34" charset="0"/>
-                          <a:cs typeface="Open Sans Light" panose="020B0606030504020204" pitchFamily="34" charset="0"/>
-                        </a:rPr>
-                        <a:t>A Boolean</a:t>
-                      </a:r>
-                    </a:p>
-                  </a:txBody>
-                  <a:tcPr anchor="ctr"/>
-                </a:tc>
-                <a:tc>
-                  <a:txBody>
-                    <a:bodyPr/>
-                    <a:lstStyle/>
-                    <a:p>
-                      <a:r>
-                        <a:rPr lang="en-US" sz="1800" b="1" i="0" dirty="0">
-                          <a:latin typeface="Open Sans ExtraBold" panose="020B0606030504020204" pitchFamily="34" charset="0"/>
-                          <a:ea typeface="Open Sans ExtraBold" panose="020B0606030504020204" pitchFamily="34" charset="0"/>
-                          <a:cs typeface="Open Sans ExtraBold" panose="020B0606030504020204" pitchFamily="34" charset="0"/>
-                        </a:rPr>
-                        <a:t>List: </a:t>
-                      </a:r>
-                      <a:r>
-                        <a:rPr lang="en-US" sz="1800" b="0" i="0" dirty="0">
-                          <a:latin typeface="Open Sans Light" panose="020B0606030504020204" pitchFamily="34" charset="0"/>
-                          <a:ea typeface="Open Sans Light" panose="020B0606030504020204" pitchFamily="34" charset="0"/>
-                          <a:cs typeface="Open Sans Light" panose="020B0606030504020204" pitchFamily="34" charset="0"/>
-                        </a:rPr>
-                        <a:t>possibly fewer items, values are the same</a:t>
-                      </a:r>
-                    </a:p>
-                  </a:txBody>
-                  <a:tcPr anchor="ctr"/>
-                </a:tc>
-                <a:extLst>
-                  <a:ext uri="{0D108BD9-81ED-4DB2-BD59-A6C34878D82A}">
-                    <a16:rowId xmlns:a16="http://schemas.microsoft.com/office/drawing/2014/main" val="1639889719"/>
-                  </a:ext>
-                </a:extLst>
-              </a:tr>
-              <a:tr h="678727">
-                <a:tc>
-                  <a:txBody>
-                    <a:bodyPr/>
-                    <a:lstStyle/>
-                    <a:p>
-                      <a:pPr algn="ctr"/>
-                      <a:r>
-                        <a:rPr lang="en-US" sz="1800" b="1" dirty="0">
-                          <a:latin typeface="Source Code Pro" panose="020B0509030403020204" pitchFamily="49" charset="77"/>
-                        </a:rPr>
-                        <a:t>reduce</a:t>
-                      </a:r>
-                    </a:p>
-                  </a:txBody>
-                  <a:tcPr anchor="ctr"/>
-                </a:tc>
-                <a:tc>
-                  <a:txBody>
-                    <a:bodyPr/>
-                    <a:lstStyle/>
-                    <a:p>
-                      <a:r>
-                        <a:rPr lang="en-US" sz="1800" b="0" i="0" dirty="0">
-                          <a:latin typeface="Open Sans Light" panose="020B0606030504020204" pitchFamily="34" charset="0"/>
-                          <a:ea typeface="Open Sans Light" panose="020B0606030504020204" pitchFamily="34" charset="0"/>
-                          <a:cs typeface="Open Sans Light" panose="020B0606030504020204" pitchFamily="34" charset="0"/>
-                        </a:rPr>
-                        <a:t>"Combine" items together</a:t>
-                      </a:r>
-                    </a:p>
-                  </a:txBody>
-                  <a:tcPr anchor="ctr"/>
-                </a:tc>
-                <a:tc>
-                  <a:txBody>
-                    <a:bodyPr/>
-                    <a:lstStyle/>
-                    <a:p>
-                      <a:r>
-                        <a:rPr lang="en-US" sz="1800" b="0" i="0" dirty="0">
-                          <a:latin typeface="Open Sans Light" panose="020B0606030504020204" pitchFamily="34" charset="0"/>
-                          <a:ea typeface="Open Sans Light" panose="020B0606030504020204" pitchFamily="34" charset="0"/>
-                          <a:cs typeface="Open Sans Light" panose="020B0606030504020204" pitchFamily="34" charset="0"/>
-                        </a:rPr>
-                        <a:t>2 (current item, and the previous result)</a:t>
-                      </a:r>
-                    </a:p>
-                  </a:txBody>
-                  <a:tcPr anchor="ctr"/>
-                </a:tc>
-                <a:tc>
-                  <a:txBody>
-                    <a:bodyPr/>
-                    <a:lstStyle/>
-                    <a:p>
-                      <a:r>
-                        <a:rPr lang="en-US" sz="1800" b="0" i="0" dirty="0">
-                          <a:latin typeface="Open Sans Light" panose="020B0606030504020204" pitchFamily="34" charset="0"/>
-                          <a:ea typeface="Open Sans Light" panose="020B0606030504020204" pitchFamily="34" charset="0"/>
-                          <a:cs typeface="Open Sans Light" panose="020B0606030504020204" pitchFamily="34" charset="0"/>
-                        </a:rPr>
-                        <a:t>Type should match the type each item</a:t>
-                      </a:r>
-                    </a:p>
-                  </a:txBody>
-                  <a:tcPr anchor="ctr"/>
-                </a:tc>
-                <a:tc>
-                  <a:txBody>
-                    <a:bodyPr/>
-                    <a:lstStyle/>
-                    <a:p>
-                      <a:r>
-                        <a:rPr lang="en-US" sz="1800" b="0" i="0" dirty="0">
-                          <a:latin typeface="Open Sans Light" panose="020B0606030504020204" pitchFamily="34" charset="0"/>
-                          <a:ea typeface="Open Sans Light" panose="020B0606030504020204" pitchFamily="34" charset="0"/>
-                          <a:cs typeface="Open Sans Light" panose="020B0606030504020204" pitchFamily="34" charset="0"/>
-                        </a:rPr>
-                        <a:t>A "single" item</a:t>
-                      </a:r>
-                    </a:p>
-                  </a:txBody>
-                  <a:tcPr anchor="ctr"/>
-                </a:tc>
-                <a:extLst>
-                  <a:ext uri="{0D108BD9-81ED-4DB2-BD59-A6C34878D82A}">
-                    <a16:rowId xmlns:a16="http://schemas.microsoft.com/office/drawing/2014/main" val="2091545836"/>
-                  </a:ext>
-                </a:extLst>
-              </a:tr>
-            </a:tbl>
-          </a:graphicData>
-        </a:graphic>
-      </p:graphicFrame>
     </p:spTree>
     <p:extLst>
       <p:ext uri="{BB962C8B-B14F-4D97-AF65-F5344CB8AC3E}">
-        <p14:creationId xmlns:p14="http://schemas.microsoft.com/office/powerpoint/2010/main" val="3998291529"/>
+        <p14:creationId xmlns:p14="http://schemas.microsoft.com/office/powerpoint/2010/main" val="3478770812"/>
       </p:ext>
     </p:extLst>
   </p:cSld>

</xml_diff>

<commit_message>
Deploy website Tue Feb 13 17:46:28 PST 2024
</commit_message>
<xml_diff>
--- a/assets/slides/sp24/07-HOFs_Environments.pptx
+++ b/assets/slides/sp24/07-HOFs_Environments.pptx
@@ -5,7 +5,7 @@
     <p:sldMasterId id="2147483703" r:id="rId1"/>
   </p:sldMasterIdLst>
   <p:notesMasterIdLst>
-    <p:notesMasterId r:id="rId26"/>
+    <p:notesMasterId r:id="rId25"/>
   </p:notesMasterIdLst>
   <p:sldIdLst>
     <p:sldId id="256" r:id="rId2"/>
@@ -14,24 +14,23 @@
     <p:sldId id="392" r:id="rId5"/>
     <p:sldId id="396" r:id="rId6"/>
     <p:sldId id="402" r:id="rId7"/>
-    <p:sldId id="435" r:id="rId8"/>
-    <p:sldId id="397" r:id="rId9"/>
-    <p:sldId id="398" r:id="rId10"/>
-    <p:sldId id="399" r:id="rId11"/>
-    <p:sldId id="286" r:id="rId12"/>
-    <p:sldId id="291" r:id="rId13"/>
-    <p:sldId id="285" r:id="rId14"/>
-    <p:sldId id="268" r:id="rId15"/>
-    <p:sldId id="287" r:id="rId16"/>
-    <p:sldId id="401" r:id="rId17"/>
-    <p:sldId id="289" r:id="rId18"/>
-    <p:sldId id="265" r:id="rId19"/>
-    <p:sldId id="390" r:id="rId20"/>
-    <p:sldId id="389" r:id="rId21"/>
-    <p:sldId id="387" r:id="rId22"/>
-    <p:sldId id="388" r:id="rId23"/>
-    <p:sldId id="288" r:id="rId24"/>
-    <p:sldId id="400" r:id="rId25"/>
+    <p:sldId id="397" r:id="rId8"/>
+    <p:sldId id="398" r:id="rId9"/>
+    <p:sldId id="399" r:id="rId10"/>
+    <p:sldId id="286" r:id="rId11"/>
+    <p:sldId id="291" r:id="rId12"/>
+    <p:sldId id="285" r:id="rId13"/>
+    <p:sldId id="268" r:id="rId14"/>
+    <p:sldId id="287" r:id="rId15"/>
+    <p:sldId id="401" r:id="rId16"/>
+    <p:sldId id="289" r:id="rId17"/>
+    <p:sldId id="265" r:id="rId18"/>
+    <p:sldId id="390" r:id="rId19"/>
+    <p:sldId id="389" r:id="rId20"/>
+    <p:sldId id="387" r:id="rId21"/>
+    <p:sldId id="388" r:id="rId22"/>
+    <p:sldId id="288" r:id="rId23"/>
+    <p:sldId id="400" r:id="rId24"/>
   </p:sldIdLst>
   <p:sldSz cx="12192000" cy="6858000"/>
   <p:notesSz cx="6997700" cy="9194800"/>
@@ -798,7 +797,7 @@
                 <a:latin typeface="Times New Roman"/>
                 <a:ea typeface="ＭＳ Ｐゴシック"/>
               </a:rPr>
-              <a:t>11</a:t>
+              <a:t>10</a:t>
             </a:fld>
             <a:endParaRPr lang="en-US" sz="2400" b="0" strike="noStrike" spc="-1">
               <a:solidFill>
@@ -922,7 +921,7 @@
                 <a:latin typeface="Times New Roman"/>
                 <a:ea typeface="ＭＳ Ｐゴシック"/>
               </a:rPr>
-              <a:t>15</a:t>
+              <a:t>14</a:t>
             </a:fld>
             <a:endParaRPr lang="en-US" sz="2400" b="0" strike="noStrike" spc="-1">
               <a:solidFill>
@@ -1078,7 +1077,7 @@
                 </a:uFill>
                 <a:latin typeface="Times New Roman"/>
               </a:rPr>
-              <a:t>18</a:t>
+              <a:t>17</a:t>
             </a:fld>
             <a:endParaRPr lang="en-US" sz="1400" b="0" strike="noStrike" spc="-1">
               <a:solidFill>
@@ -1197,7 +1196,7 @@
                 </a:uFill>
                 <a:latin typeface="Times New Roman"/>
               </a:rPr>
-              <a:t>21</a:t>
+              <a:t>20</a:t>
             </a:fld>
             <a:endParaRPr lang="en-US" sz="1400" b="0" strike="noStrike" spc="-1">
               <a:solidFill>
@@ -1316,7 +1315,7 @@
                 </a:uFill>
                 <a:latin typeface="Times New Roman"/>
               </a:rPr>
-              <a:t>23</a:t>
+              <a:t>22</a:t>
             </a:fld>
             <a:endParaRPr lang="en-US" sz="1400" b="0" strike="noStrike" spc="-1">
               <a:solidFill>
@@ -4102,7 +4101,7 @@
           </a:ln>
           <a:extLst>
             <a:ext uri="{909E8E84-426E-40dd-AFC4-6F175D3DCCD1}">
-              <a14:hiddenFill xmlns="" xmlns:a14="http://schemas.microsoft.com/office/drawing/2010/main">
+              <a14:hiddenFill xmlns:a14="http://schemas.microsoft.com/office/drawing/2010/main" xmlns="">
                 <a:noFill/>
               </a14:hiddenFill>
             </a:ext>
@@ -4224,14 +4223,14 @@
           </a:ln>
           <a:extLst>
             <a:ext uri="{909E8E84-426E-40dd-AFC4-6F175D3DCCD1}">
-              <a14:hiddenFill xmlns="" xmlns:a14="http://schemas.microsoft.com/office/drawing/2010/main">
+              <a14:hiddenFill xmlns:a14="http://schemas.microsoft.com/office/drawing/2010/main" xmlns="">
                 <a:solidFill>
                   <a:srgbClr val="FFFFFF"/>
                 </a:solidFill>
               </a14:hiddenFill>
             </a:ext>
             <a:ext uri="{91240B29-F687-4f45-9708-019B960494DF}">
-              <a14:hiddenLine xmlns="" xmlns:a14="http://schemas.microsoft.com/office/drawing/2010/main" w="9525">
+              <a14:hiddenLine xmlns:a14="http://schemas.microsoft.com/office/drawing/2010/main" xmlns="" w="9525">
                 <a:solidFill>
                   <a:srgbClr val="000000"/>
                 </a:solidFill>
@@ -4241,7 +4240,7 @@
               </a14:hiddenLine>
             </a:ext>
             <a:ext uri="{FAA26D3D-D897-4be2-8F04-BA451C77F1D7}">
-              <ma14:placeholderFlag xmlns="" xmlns:ma14="http://schemas.microsoft.com/office/mac/drawingml/2011/main" val="1"/>
+              <ma14:placeholderFlag xmlns:ma14="http://schemas.microsoft.com/office/mac/drawingml/2011/main" xmlns="" val="1"/>
             </a:ext>
           </a:extLst>
         </p:spPr>
@@ -4799,7 +4798,7 @@
           </a:ln>
           <a:extLst>
             <a:ext uri="{909E8E84-426E-40dd-AFC4-6F175D3DCCD1}">
-              <a14:hiddenFill xmlns="" xmlns:a14="http://schemas.microsoft.com/office/drawing/2010/main">
+              <a14:hiddenFill xmlns:a14="http://schemas.microsoft.com/office/drawing/2010/main" xmlns="">
                 <a:noFill/>
               </a14:hiddenFill>
             </a:ext>
@@ -4844,14 +4843,14 @@
           </a:ln>
           <a:extLst>
             <a:ext uri="{909E8E84-426E-40dd-AFC4-6F175D3DCCD1}">
-              <a14:hiddenFill xmlns="" xmlns:a14="http://schemas.microsoft.com/office/drawing/2010/main">
+              <a14:hiddenFill xmlns:a14="http://schemas.microsoft.com/office/drawing/2010/main" xmlns="">
                 <a:solidFill>
                   <a:srgbClr val="FFFFFF"/>
                 </a:solidFill>
               </a14:hiddenFill>
             </a:ext>
             <a:ext uri="{91240B29-F687-4f45-9708-019B960494DF}">
-              <a14:hiddenLine xmlns="" xmlns:a14="http://schemas.microsoft.com/office/drawing/2010/main" w="9525">
+              <a14:hiddenLine xmlns:a14="http://schemas.microsoft.com/office/drawing/2010/main" xmlns="" w="9525">
                 <a:solidFill>
                   <a:srgbClr val="000000"/>
                 </a:solidFill>
@@ -4959,14 +4958,14 @@
           </a:ln>
           <a:extLst>
             <a:ext uri="{909E8E84-426E-40dd-AFC4-6F175D3DCCD1}">
-              <a14:hiddenFill xmlns="" xmlns:a14="http://schemas.microsoft.com/office/drawing/2010/main">
+              <a14:hiddenFill xmlns:a14="http://schemas.microsoft.com/office/drawing/2010/main" xmlns="">
                 <a:solidFill>
                   <a:srgbClr val="FFFFFF"/>
                 </a:solidFill>
               </a14:hiddenFill>
             </a:ext>
             <a:ext uri="{91240B29-F687-4f45-9708-019B960494DF}">
-              <a14:hiddenLine xmlns="" xmlns:a14="http://schemas.microsoft.com/office/drawing/2010/main" w="9525">
+              <a14:hiddenLine xmlns:a14="http://schemas.microsoft.com/office/drawing/2010/main" xmlns="" w="9525">
                 <a:solidFill>
                   <a:srgbClr val="000000"/>
                 </a:solidFill>
@@ -4976,7 +4975,7 @@
               </a14:hiddenLine>
             </a:ext>
             <a:ext uri="{FAA26D3D-D897-4be2-8F04-BA451C77F1D7}">
-              <ma14:placeholderFlag xmlns="" xmlns:ma14="http://schemas.microsoft.com/office/mac/drawingml/2011/main" val="1"/>
+              <ma14:placeholderFlag xmlns:ma14="http://schemas.microsoft.com/office/mac/drawingml/2011/main" xmlns="" val="1"/>
             </a:ext>
           </a:extLst>
         </p:spPr>
@@ -5324,14 +5323,14 @@
           </a:ln>
           <a:extLst>
             <a:ext uri="{909E8E84-426E-40dd-AFC4-6F175D3DCCD1}">
-              <a14:hiddenFill xmlns="" xmlns:a14="http://schemas.microsoft.com/office/drawing/2010/main">
+              <a14:hiddenFill xmlns:a14="http://schemas.microsoft.com/office/drawing/2010/main" xmlns="">
                 <a:solidFill>
                   <a:srgbClr val="FFFFFF"/>
                 </a:solidFill>
               </a14:hiddenFill>
             </a:ext>
             <a:ext uri="{91240B29-F687-4f45-9708-019B960494DF}">
-              <a14:hiddenLine xmlns="" xmlns:a14="http://schemas.microsoft.com/office/drawing/2010/main" w="9525">
+              <a14:hiddenLine xmlns:a14="http://schemas.microsoft.com/office/drawing/2010/main" xmlns="" w="9525">
                 <a:solidFill>
                   <a:srgbClr val="000000"/>
                 </a:solidFill>
@@ -5341,7 +5340,7 @@
               </a14:hiddenLine>
             </a:ext>
             <a:ext uri="{FAA26D3D-D897-4be2-8F04-BA451C77F1D7}">
-              <ma14:placeholderFlag xmlns="" xmlns:ma14="http://schemas.microsoft.com/office/mac/drawingml/2011/main" val="1"/>
+              <ma14:placeholderFlag xmlns:ma14="http://schemas.microsoft.com/office/mac/drawingml/2011/main" xmlns="" val="1"/>
             </a:ext>
           </a:extLst>
         </p:spPr>
@@ -6402,7 +6401,7 @@
           </a:ln>
           <a:extLst>
             <a:ext uri="{909E8E84-426E-40dd-AFC4-6F175D3DCCD1}">
-              <a14:hiddenFill xmlns:a14="http://schemas.microsoft.com/office/drawing/2010/main" xmlns="">
+              <a14:hiddenFill xmlns="" xmlns:a14="http://schemas.microsoft.com/office/drawing/2010/main">
                 <a:noFill/>
               </a14:hiddenFill>
             </a:ext>
@@ -6527,14 +6526,14 @@
           </a:ln>
           <a:extLst>
             <a:ext uri="{909E8E84-426E-40dd-AFC4-6F175D3DCCD1}">
-              <a14:hiddenFill xmlns:a14="http://schemas.microsoft.com/office/drawing/2010/main" xmlns="">
+              <a14:hiddenFill xmlns="" xmlns:a14="http://schemas.microsoft.com/office/drawing/2010/main">
                 <a:solidFill>
                   <a:srgbClr val="FFFFFF"/>
                 </a:solidFill>
               </a14:hiddenFill>
             </a:ext>
             <a:ext uri="{91240B29-F687-4f45-9708-019B960494DF}">
-              <a14:hiddenLine xmlns:a14="http://schemas.microsoft.com/office/drawing/2010/main" xmlns="" w="9525">
+              <a14:hiddenLine xmlns="" xmlns:a14="http://schemas.microsoft.com/office/drawing/2010/main" w="9525">
                 <a:solidFill>
                   <a:srgbClr val="000000"/>
                 </a:solidFill>
@@ -6544,7 +6543,7 @@
               </a14:hiddenLine>
             </a:ext>
             <a:ext uri="{FAA26D3D-D897-4be2-8F04-BA451C77F1D7}">
-              <ma14:placeholderFlag xmlns:ma14="http://schemas.microsoft.com/office/mac/drawingml/2011/main" xmlns="" val="1"/>
+              <ma14:placeholderFlag xmlns="" xmlns:ma14="http://schemas.microsoft.com/office/mac/drawingml/2011/main" val="1"/>
             </a:ext>
           </a:extLst>
         </p:spPr>
@@ -8687,14 +8686,14 @@
           </a:ln>
           <a:extLst>
             <a:ext uri="{909E8E84-426E-40dd-AFC4-6F175D3DCCD1}">
-              <a14:hiddenFill xmlns:a14="http://schemas.microsoft.com/office/drawing/2010/main" xmlns="">
+              <a14:hiddenFill xmlns="" xmlns:a14="http://schemas.microsoft.com/office/drawing/2010/main">
                 <a:solidFill>
                   <a:srgbClr val="FFFFFF"/>
                 </a:solidFill>
               </a14:hiddenFill>
             </a:ext>
             <a:ext uri="{91240B29-F687-4f45-9708-019B960494DF}">
-              <a14:hiddenLine xmlns:a14="http://schemas.microsoft.com/office/drawing/2010/main" xmlns="" w="9525">
+              <a14:hiddenLine xmlns="" xmlns:a14="http://schemas.microsoft.com/office/drawing/2010/main" w="9525">
                 <a:solidFill>
                   <a:srgbClr val="000000"/>
                 </a:solidFill>
@@ -8704,7 +8703,7 @@
               </a14:hiddenLine>
             </a:ext>
             <a:ext uri="{FAA26D3D-D897-4be2-8F04-BA451C77F1D7}">
-              <ma14:placeholderFlag xmlns:ma14="http://schemas.microsoft.com/office/mac/drawingml/2011/main" xmlns="" val="1"/>
+              <ma14:placeholderFlag xmlns="" xmlns:ma14="http://schemas.microsoft.com/office/mac/drawingml/2011/main" val="1"/>
             </a:ext>
           </a:extLst>
         </p:spPr>
@@ -8749,14 +8748,14 @@
           </a:ln>
           <a:extLst>
             <a:ext uri="{909E8E84-426E-40dd-AFC4-6F175D3DCCD1}">
-              <a14:hiddenFill xmlns:a14="http://schemas.microsoft.com/office/drawing/2010/main" xmlns="">
+              <a14:hiddenFill xmlns="" xmlns:a14="http://schemas.microsoft.com/office/drawing/2010/main">
                 <a:solidFill>
                   <a:srgbClr val="FFFFFF"/>
                 </a:solidFill>
               </a14:hiddenFill>
             </a:ext>
             <a:ext uri="{91240B29-F687-4f45-9708-019B960494DF}">
-              <a14:hiddenLine xmlns:a14="http://schemas.microsoft.com/office/drawing/2010/main" xmlns="" w="9525">
+              <a14:hiddenLine xmlns="" xmlns:a14="http://schemas.microsoft.com/office/drawing/2010/main" w="9525">
                 <a:solidFill>
                   <a:srgbClr val="000000"/>
                 </a:solidFill>
@@ -8766,7 +8765,7 @@
               </a14:hiddenLine>
             </a:ext>
             <a:ext uri="{FAA26D3D-D897-4be2-8F04-BA451C77F1D7}">
-              <ma14:placeholderFlag xmlns:ma14="http://schemas.microsoft.com/office/mac/drawingml/2011/main" xmlns="" val="1"/>
+              <ma14:placeholderFlag xmlns="" xmlns:ma14="http://schemas.microsoft.com/office/mac/drawingml/2011/main" val="1"/>
             </a:ext>
           </a:extLst>
         </p:spPr>
@@ -9517,617 +9516,6 @@
           <p:cNvPr id="2" name="Title 1">
             <a:extLst>
               <a:ext uri="{FF2B5EF4-FFF2-40B4-BE49-F238E27FC236}">
-                <a16:creationId xmlns:a16="http://schemas.microsoft.com/office/drawing/2014/main" id="{C3A57493-490E-6541-9973-A295DBF3E35F}"/>
-              </a:ext>
-            </a:extLst>
-          </p:cNvPr>
-          <p:cNvSpPr>
-            <a:spLocks noGrp="1"/>
-          </p:cNvSpPr>
-          <p:nvPr>
-            <p:ph type="title"/>
-          </p:nvPr>
-        </p:nvSpPr>
-        <p:spPr/>
-        <p:txBody>
-          <a:bodyPr/>
-          <a:lstStyle/>
-          <a:p>
-            <a:r>
-              <a:rPr lang="en-US" dirty="0"/>
-              <a:t>Functional Sequence (List) Operations</a:t>
-            </a:r>
-          </a:p>
-        </p:txBody>
-      </p:sp>
-      <p:sp>
-        <p:nvSpPr>
-          <p:cNvPr id="3" name="Content Placeholder 2">
-            <a:extLst>
-              <a:ext uri="{FF2B5EF4-FFF2-40B4-BE49-F238E27FC236}">
-                <a16:creationId xmlns:a16="http://schemas.microsoft.com/office/drawing/2014/main" id="{AAAEACB3-3528-3B4E-9961-861C7DBB5CBC}"/>
-              </a:ext>
-            </a:extLst>
-          </p:cNvPr>
-          <p:cNvSpPr>
-            <a:spLocks noGrp="1"/>
-          </p:cNvSpPr>
-          <p:nvPr>
-            <p:ph idx="1"/>
-          </p:nvPr>
-        </p:nvSpPr>
-        <p:spPr/>
-        <p:txBody>
-          <a:bodyPr/>
-          <a:lstStyle/>
-          <a:p>
-            <a:r>
-              <a:rPr lang="en-US" dirty="0"/>
-              <a:t>Goal: Transform a</a:t>
-            </a:r>
-            <a:r>
-              <a:rPr lang="en-US" i="1" dirty="0"/>
-              <a:t> sequence</a:t>
-            </a:r>
-            <a:r>
-              <a:rPr lang="en-US" dirty="0"/>
-              <a:t>, and return a new result</a:t>
-            </a:r>
-          </a:p>
-          <a:p>
-            <a:r>
-              <a:rPr lang="en-US" dirty="0"/>
-              <a:t>We'll use 3 functions that are hallmarks of functional programming</a:t>
-            </a:r>
-          </a:p>
-          <a:p>
-            <a:r>
-              <a:rPr lang="en-US" dirty="0"/>
-              <a:t>Each of these takes in a function and a sequence as arguments</a:t>
-            </a:r>
-          </a:p>
-          <a:p>
-            <a:endParaRPr lang="en-US" dirty="0"/>
-          </a:p>
-          <a:p>
-            <a:pPr marL="0" indent="0">
-              <a:buNone/>
-            </a:pPr>
-            <a:endParaRPr lang="en-US" dirty="0"/>
-          </a:p>
-          <a:p>
-            <a:pPr marL="0" indent="0">
-              <a:buNone/>
-            </a:pPr>
-            <a:endParaRPr lang="en-US" dirty="0"/>
-          </a:p>
-        </p:txBody>
-      </p:sp>
-      <p:sp>
-        <p:nvSpPr>
-          <p:cNvPr id="4" name="Footer Placeholder 3">
-            <a:extLst>
-              <a:ext uri="{FF2B5EF4-FFF2-40B4-BE49-F238E27FC236}">
-                <a16:creationId xmlns:a16="http://schemas.microsoft.com/office/drawing/2014/main" id="{B4344FEE-E72B-B65D-1AD5-8C1189F1FACC}"/>
-              </a:ext>
-            </a:extLst>
-          </p:cNvPr>
-          <p:cNvSpPr>
-            <a:spLocks noGrp="1"/>
-          </p:cNvSpPr>
-          <p:nvPr>
-            <p:ph type="ftr" sz="quarter" idx="10"/>
-          </p:nvPr>
-        </p:nvSpPr>
-        <p:spPr>
-          <a:xfrm>
-            <a:off x="4038599" y="6356350"/>
-            <a:ext cx="4348655" cy="365125"/>
-          </a:xfrm>
-        </p:spPr>
-        <p:txBody>
-          <a:bodyPr/>
-          <a:lstStyle/>
-          <a:p>
-            <a:r>
-              <a:rPr lang="en-US" dirty="0"/>
-              <a:t>Michael Ball | UC Berkeley | https://c88c.org | © CC BY-NC-SA</a:t>
-            </a:r>
-          </a:p>
-        </p:txBody>
-      </p:sp>
-      <p:graphicFrame>
-        <p:nvGraphicFramePr>
-          <p:cNvPr id="6" name="Table 6">
-            <a:extLst>
-              <a:ext uri="{FF2B5EF4-FFF2-40B4-BE49-F238E27FC236}">
-                <a16:creationId xmlns:a16="http://schemas.microsoft.com/office/drawing/2014/main" id="{25EBD1E5-B78E-72B6-6282-D80B13046B4F}"/>
-              </a:ext>
-            </a:extLst>
-          </p:cNvPr>
-          <p:cNvGraphicFramePr>
-            <a:graphicFrameLocks noGrp="1"/>
-          </p:cNvGraphicFramePr>
-          <p:nvPr/>
-        </p:nvGraphicFramePr>
-        <p:xfrm>
-          <a:off x="420415" y="2792760"/>
-          <a:ext cx="10594426" cy="3421927"/>
-        </p:xfrm>
-        <a:graphic>
-          <a:graphicData uri="http://schemas.openxmlformats.org/drawingml/2006/table">
-            <a:tbl>
-              <a:tblPr firstRow="1" bandRow="1">
-                <a:tableStyleId>{5C22544A-7EE6-4342-B048-85BDC9FD1C3A}</a:tableStyleId>
-              </a:tblPr>
-              <a:tblGrid>
-                <a:gridCol w="1692164">
-                  <a:extLst>
-                    <a:ext uri="{9D8B030D-6E8A-4147-A177-3AD203B41FA5}">
-                      <a16:colId xmlns:a16="http://schemas.microsoft.com/office/drawing/2014/main" val="2059777158"/>
-                    </a:ext>
-                  </a:extLst>
-                </a:gridCol>
-                <a:gridCol w="2333297">
-                  <a:extLst>
-                    <a:ext uri="{9D8B030D-6E8A-4147-A177-3AD203B41FA5}">
-                      <a16:colId xmlns:a16="http://schemas.microsoft.com/office/drawing/2014/main" val="2894650286"/>
-                    </a:ext>
-                  </a:extLst>
-                </a:gridCol>
-                <a:gridCol w="2280745">
-                  <a:extLst>
-                    <a:ext uri="{9D8B030D-6E8A-4147-A177-3AD203B41FA5}">
-                      <a16:colId xmlns:a16="http://schemas.microsoft.com/office/drawing/2014/main" val="3290081916"/>
-                    </a:ext>
-                  </a:extLst>
-                </a:gridCol>
-                <a:gridCol w="2007476">
-                  <a:extLst>
-                    <a:ext uri="{9D8B030D-6E8A-4147-A177-3AD203B41FA5}">
-                      <a16:colId xmlns:a16="http://schemas.microsoft.com/office/drawing/2014/main" val="2002986398"/>
-                    </a:ext>
-                  </a:extLst>
-                </a:gridCol>
-                <a:gridCol w="2280744">
-                  <a:extLst>
-                    <a:ext uri="{9D8B030D-6E8A-4147-A177-3AD203B41FA5}">
-                      <a16:colId xmlns:a16="http://schemas.microsoft.com/office/drawing/2014/main" val="756374945"/>
-                    </a:ext>
-                  </a:extLst>
-                </a:gridCol>
-              </a:tblGrid>
-              <a:tr h="678727">
-                <a:tc>
-                  <a:txBody>
-                    <a:bodyPr/>
-                    <a:lstStyle/>
-                    <a:p>
-                      <a:pPr algn="ctr"/>
-                      <a:r>
-                        <a:rPr lang="en-US" sz="2000" b="1" dirty="0">
-                          <a:latin typeface="FreightSans Pro Book" panose="02000606030000020004" pitchFamily="2" charset="0"/>
-                        </a:rPr>
-                        <a:t>Function</a:t>
-                      </a:r>
-                    </a:p>
-                  </a:txBody>
-                  <a:tcPr anchor="ctr"/>
-                </a:tc>
-                <a:tc>
-                  <a:txBody>
-                    <a:bodyPr/>
-                    <a:lstStyle/>
-                    <a:p>
-                      <a:pPr algn="ctr"/>
-                      <a:r>
-                        <a:rPr lang="en-US" sz="2000" dirty="0">
-                          <a:latin typeface="FreightSans Pro Book" panose="02000606030000020004" pitchFamily="2" charset="0"/>
-                        </a:rPr>
-                        <a:t>Action</a:t>
-                      </a:r>
-                    </a:p>
-                  </a:txBody>
-                  <a:tcPr anchor="ctr"/>
-                </a:tc>
-                <a:tc>
-                  <a:txBody>
-                    <a:bodyPr/>
-                    <a:lstStyle/>
-                    <a:p>
-                      <a:pPr algn="ctr"/>
-                      <a:r>
-                        <a:rPr lang="en-US" sz="2000" dirty="0">
-                          <a:latin typeface="FreightSans Pro Book" panose="02000606030000020004" pitchFamily="2" charset="0"/>
-                        </a:rPr>
-                        <a:t>Input arguments</a:t>
-                      </a:r>
-                    </a:p>
-                  </a:txBody>
-                  <a:tcPr anchor="ctr"/>
-                </a:tc>
-                <a:tc>
-                  <a:txBody>
-                    <a:bodyPr/>
-                    <a:lstStyle/>
-                    <a:p>
-                      <a:pPr algn="ctr"/>
-                      <a:r>
-                        <a:rPr lang="en-US" sz="2000" dirty="0">
-                          <a:latin typeface="FreightSans Pro Book" panose="02000606030000020004" pitchFamily="2" charset="0"/>
-                        </a:rPr>
-                        <a:t>Input Fn. Returns</a:t>
-                      </a:r>
-                    </a:p>
-                  </a:txBody>
-                  <a:tcPr anchor="ctr"/>
-                </a:tc>
-                <a:tc>
-                  <a:txBody>
-                    <a:bodyPr/>
-                    <a:lstStyle/>
-                    <a:p>
-                      <a:pPr marL="0" marR="0" lvl="0" indent="0" algn="ctr" defTabSz="342900" rtl="0" eaLnBrk="1" fontAlgn="auto" latinLnBrk="0" hangingPunct="1">
-                        <a:lnSpc>
-                          <a:spcPct val="100000"/>
-                        </a:lnSpc>
-                        <a:spcBef>
-                          <a:spcPts val="0"/>
-                        </a:spcBef>
-                        <a:spcAft>
-                          <a:spcPts val="0"/>
-                        </a:spcAft>
-                        <a:buClrTx/>
-                        <a:buSzTx/>
-                        <a:buFontTx/>
-                        <a:buNone/>
-                        <a:tabLst/>
-                        <a:defRPr/>
-                      </a:pPr>
-                      <a:r>
-                        <a:rPr lang="en-US" sz="2000" dirty="0">
-                          <a:latin typeface="FreightSans Pro Book" panose="02000606030000020004" pitchFamily="2" charset="0"/>
-                        </a:rPr>
-                        <a:t>Output</a:t>
-                      </a:r>
-                    </a:p>
-                  </a:txBody>
-                  <a:tcPr anchor="ctr"/>
-                </a:tc>
-                <a:extLst>
-                  <a:ext uri="{0D108BD9-81ED-4DB2-BD59-A6C34878D82A}">
-                    <a16:rowId xmlns:a16="http://schemas.microsoft.com/office/drawing/2014/main" val="1140645906"/>
-                  </a:ext>
-                </a:extLst>
-              </a:tr>
-              <a:tr h="678727">
-                <a:tc>
-                  <a:txBody>
-                    <a:bodyPr/>
-                    <a:lstStyle/>
-                    <a:p>
-                      <a:pPr algn="ctr"/>
-                      <a:r>
-                        <a:rPr lang="en-US" sz="1800" b="1" dirty="0">
-                          <a:latin typeface="Source Code Pro" panose="020B0509030403020204" pitchFamily="49" charset="77"/>
-                        </a:rPr>
-                        <a:t>map</a:t>
-                      </a:r>
-                    </a:p>
-                  </a:txBody>
-                  <a:tcPr anchor="ctr"/>
-                </a:tc>
-                <a:tc>
-                  <a:txBody>
-                    <a:bodyPr/>
-                    <a:lstStyle/>
-                    <a:p>
-                      <a:r>
-                        <a:rPr lang="en-US" sz="1800" b="0" i="0" dirty="0">
-                          <a:latin typeface="Open Sans Light" panose="020B0606030504020204" pitchFamily="34" charset="0"/>
-                          <a:ea typeface="Open Sans Light" panose="020B0606030504020204" pitchFamily="34" charset="0"/>
-                          <a:cs typeface="Open Sans Light" panose="020B0606030504020204" pitchFamily="34" charset="0"/>
-                        </a:rPr>
-                        <a:t>Transform every item</a:t>
-                      </a:r>
-                    </a:p>
-                  </a:txBody>
-                  <a:tcPr anchor="ctr"/>
-                </a:tc>
-                <a:tc>
-                  <a:txBody>
-                    <a:bodyPr/>
-                    <a:lstStyle/>
-                    <a:p>
-                      <a:r>
-                        <a:rPr lang="en-US" sz="1800" b="0" i="0" dirty="0">
-                          <a:latin typeface="Open Sans Light" panose="020B0606030504020204" pitchFamily="34" charset="0"/>
-                          <a:ea typeface="Open Sans Light" panose="020B0606030504020204" pitchFamily="34" charset="0"/>
-                          <a:cs typeface="Open Sans Light" panose="020B0606030504020204" pitchFamily="34" charset="0"/>
-                        </a:rPr>
-                        <a:t>1 (each item)</a:t>
-                      </a:r>
-                    </a:p>
-                  </a:txBody>
-                  <a:tcPr anchor="ctr"/>
-                </a:tc>
-                <a:tc>
-                  <a:txBody>
-                    <a:bodyPr/>
-                    <a:lstStyle/>
-                    <a:p>
-                      <a:r>
-                        <a:rPr lang="en-US" sz="1800" b="0" i="0" dirty="0">
-                          <a:latin typeface="Open Sans Light" panose="020B0606030504020204" pitchFamily="34" charset="0"/>
-                          <a:ea typeface="Open Sans Light" panose="020B0606030504020204" pitchFamily="34" charset="0"/>
-                          <a:cs typeface="Open Sans Light" panose="020B0606030504020204" pitchFamily="34" charset="0"/>
-                        </a:rPr>
-                        <a:t>"Anything", a new item</a:t>
-                      </a:r>
-                    </a:p>
-                  </a:txBody>
-                  <a:tcPr anchor="ctr"/>
-                </a:tc>
-                <a:tc>
-                  <a:txBody>
-                    <a:bodyPr/>
-                    <a:lstStyle/>
-                    <a:p>
-                      <a:r>
-                        <a:rPr lang="en-US" sz="1800" b="1" i="0" dirty="0">
-                          <a:latin typeface="Open Sans ExtraBold" panose="020B0606030504020204" pitchFamily="34" charset="0"/>
-                          <a:ea typeface="Open Sans ExtraBold" panose="020B0606030504020204" pitchFamily="34" charset="0"/>
-                          <a:cs typeface="Open Sans ExtraBold" panose="020B0606030504020204" pitchFamily="34" charset="0"/>
-                        </a:rPr>
-                        <a:t>List</a:t>
-                      </a:r>
-                      <a:r>
-                        <a:rPr lang="en-US" sz="1800" b="0" i="0" dirty="0">
-                          <a:latin typeface="Open Sans Light" panose="020B0606030504020204" pitchFamily="34" charset="0"/>
-                          <a:ea typeface="Open Sans Light" panose="020B0606030504020204" pitchFamily="34" charset="0"/>
-                          <a:cs typeface="Open Sans Light" panose="020B0606030504020204" pitchFamily="34" charset="0"/>
-                        </a:rPr>
-                        <a:t>: same length, but possibly new values</a:t>
-                      </a:r>
-                    </a:p>
-                  </a:txBody>
-                  <a:tcPr anchor="ctr"/>
-                </a:tc>
-                <a:extLst>
-                  <a:ext uri="{0D108BD9-81ED-4DB2-BD59-A6C34878D82A}">
-                    <a16:rowId xmlns:a16="http://schemas.microsoft.com/office/drawing/2014/main" val="1601251051"/>
-                  </a:ext>
-                </a:extLst>
-              </a:tr>
-              <a:tr h="678727">
-                <a:tc>
-                  <a:txBody>
-                    <a:bodyPr/>
-                    <a:lstStyle/>
-                    <a:p>
-                      <a:pPr algn="ctr"/>
-                      <a:r>
-                        <a:rPr lang="en-US" sz="1800" b="1" dirty="0">
-                          <a:latin typeface="Source Code Pro" panose="020B0509030403020204" pitchFamily="49" charset="77"/>
-                        </a:rPr>
-                        <a:t>filter</a:t>
-                      </a:r>
-                    </a:p>
-                  </a:txBody>
-                  <a:tcPr anchor="ctr"/>
-                </a:tc>
-                <a:tc>
-                  <a:txBody>
-                    <a:bodyPr/>
-                    <a:lstStyle/>
-                    <a:p>
-                      <a:r>
-                        <a:rPr lang="en-US" sz="1800" b="0" i="0" dirty="0">
-                          <a:latin typeface="Open Sans Light" panose="020B0606030504020204" pitchFamily="34" charset="0"/>
-                          <a:ea typeface="Open Sans Light" panose="020B0606030504020204" pitchFamily="34" charset="0"/>
-                          <a:cs typeface="Open Sans Light" panose="020B0606030504020204" pitchFamily="34" charset="0"/>
-                        </a:rPr>
-                        <a:t>Return a list with fewer items</a:t>
-                      </a:r>
-                    </a:p>
-                  </a:txBody>
-                  <a:tcPr anchor="ctr"/>
-                </a:tc>
-                <a:tc>
-                  <a:txBody>
-                    <a:bodyPr/>
-                    <a:lstStyle/>
-                    <a:p>
-                      <a:r>
-                        <a:rPr lang="en-US" sz="1800" b="0" i="0" dirty="0">
-                          <a:latin typeface="Open Sans Light" panose="020B0606030504020204" pitchFamily="34" charset="0"/>
-                          <a:ea typeface="Open Sans Light" panose="020B0606030504020204" pitchFamily="34" charset="0"/>
-                          <a:cs typeface="Open Sans Light" panose="020B0606030504020204" pitchFamily="34" charset="0"/>
-                        </a:rPr>
-                        <a:t>1 (each item)</a:t>
-                      </a:r>
-                    </a:p>
-                  </a:txBody>
-                  <a:tcPr anchor="ctr"/>
-                </a:tc>
-                <a:tc>
-                  <a:txBody>
-                    <a:bodyPr/>
-                    <a:lstStyle/>
-                    <a:p>
-                      <a:r>
-                        <a:rPr lang="en-US" sz="1800" b="0" i="0" dirty="0">
-                          <a:latin typeface="Open Sans Light" panose="020B0606030504020204" pitchFamily="34" charset="0"/>
-                          <a:ea typeface="Open Sans Light" panose="020B0606030504020204" pitchFamily="34" charset="0"/>
-                          <a:cs typeface="Open Sans Light" panose="020B0606030504020204" pitchFamily="34" charset="0"/>
-                        </a:rPr>
-                        <a:t>A Boolean</a:t>
-                      </a:r>
-                    </a:p>
-                  </a:txBody>
-                  <a:tcPr anchor="ctr"/>
-                </a:tc>
-                <a:tc>
-                  <a:txBody>
-                    <a:bodyPr/>
-                    <a:lstStyle/>
-                    <a:p>
-                      <a:r>
-                        <a:rPr lang="en-US" sz="1800" b="1" i="0" dirty="0">
-                          <a:latin typeface="Open Sans ExtraBold" panose="020B0606030504020204" pitchFamily="34" charset="0"/>
-                          <a:ea typeface="Open Sans ExtraBold" panose="020B0606030504020204" pitchFamily="34" charset="0"/>
-                          <a:cs typeface="Open Sans ExtraBold" panose="020B0606030504020204" pitchFamily="34" charset="0"/>
-                        </a:rPr>
-                        <a:t>List: </a:t>
-                      </a:r>
-                      <a:r>
-                        <a:rPr lang="en-US" sz="1800" b="0" i="0" dirty="0">
-                          <a:latin typeface="Open Sans Light" panose="020B0606030504020204" pitchFamily="34" charset="0"/>
-                          <a:ea typeface="Open Sans Light" panose="020B0606030504020204" pitchFamily="34" charset="0"/>
-                          <a:cs typeface="Open Sans Light" panose="020B0606030504020204" pitchFamily="34" charset="0"/>
-                        </a:rPr>
-                        <a:t>possibly fewer items, values are the same</a:t>
-                      </a:r>
-                    </a:p>
-                  </a:txBody>
-                  <a:tcPr anchor="ctr"/>
-                </a:tc>
-                <a:extLst>
-                  <a:ext uri="{0D108BD9-81ED-4DB2-BD59-A6C34878D82A}">
-                    <a16:rowId xmlns:a16="http://schemas.microsoft.com/office/drawing/2014/main" val="1639889719"/>
-                  </a:ext>
-                </a:extLst>
-              </a:tr>
-              <a:tr h="678727">
-                <a:tc>
-                  <a:txBody>
-                    <a:bodyPr/>
-                    <a:lstStyle/>
-                    <a:p>
-                      <a:pPr algn="ctr"/>
-                      <a:r>
-                        <a:rPr lang="en-US" sz="1800" b="1" dirty="0">
-                          <a:latin typeface="Source Code Pro" panose="020B0509030403020204" pitchFamily="49" charset="77"/>
-                        </a:rPr>
-                        <a:t>reduce</a:t>
-                      </a:r>
-                    </a:p>
-                  </a:txBody>
-                  <a:tcPr anchor="ctr"/>
-                </a:tc>
-                <a:tc>
-                  <a:txBody>
-                    <a:bodyPr/>
-                    <a:lstStyle/>
-                    <a:p>
-                      <a:r>
-                        <a:rPr lang="en-US" sz="1800" b="0" i="0" dirty="0">
-                          <a:latin typeface="Open Sans Light" panose="020B0606030504020204" pitchFamily="34" charset="0"/>
-                          <a:ea typeface="Open Sans Light" panose="020B0606030504020204" pitchFamily="34" charset="0"/>
-                          <a:cs typeface="Open Sans Light" panose="020B0606030504020204" pitchFamily="34" charset="0"/>
-                        </a:rPr>
-                        <a:t>"Combine" items together</a:t>
-                      </a:r>
-                    </a:p>
-                  </a:txBody>
-                  <a:tcPr anchor="ctr"/>
-                </a:tc>
-                <a:tc>
-                  <a:txBody>
-                    <a:bodyPr/>
-                    <a:lstStyle/>
-                    <a:p>
-                      <a:r>
-                        <a:rPr lang="en-US" sz="1800" b="0" i="0" dirty="0">
-                          <a:latin typeface="Open Sans Light" panose="020B0606030504020204" pitchFamily="34" charset="0"/>
-                          <a:ea typeface="Open Sans Light" panose="020B0606030504020204" pitchFamily="34" charset="0"/>
-                          <a:cs typeface="Open Sans Light" panose="020B0606030504020204" pitchFamily="34" charset="0"/>
-                        </a:rPr>
-                        <a:t>2 (current item, and the previous result)</a:t>
-                      </a:r>
-                    </a:p>
-                  </a:txBody>
-                  <a:tcPr anchor="ctr"/>
-                </a:tc>
-                <a:tc>
-                  <a:txBody>
-                    <a:bodyPr/>
-                    <a:lstStyle/>
-                    <a:p>
-                      <a:r>
-                        <a:rPr lang="en-US" sz="1800" b="0" i="0" dirty="0">
-                          <a:latin typeface="Open Sans Light" panose="020B0606030504020204" pitchFamily="34" charset="0"/>
-                          <a:ea typeface="Open Sans Light" panose="020B0606030504020204" pitchFamily="34" charset="0"/>
-                          <a:cs typeface="Open Sans Light" panose="020B0606030504020204" pitchFamily="34" charset="0"/>
-                        </a:rPr>
-                        <a:t>Type should match the type each item</a:t>
-                      </a:r>
-                    </a:p>
-                  </a:txBody>
-                  <a:tcPr anchor="ctr"/>
-                </a:tc>
-                <a:tc>
-                  <a:txBody>
-                    <a:bodyPr/>
-                    <a:lstStyle/>
-                    <a:p>
-                      <a:r>
-                        <a:rPr lang="en-US" sz="1800" b="0" i="0" dirty="0">
-                          <a:latin typeface="Open Sans Light" panose="020B0606030504020204" pitchFamily="34" charset="0"/>
-                          <a:ea typeface="Open Sans Light" panose="020B0606030504020204" pitchFamily="34" charset="0"/>
-                          <a:cs typeface="Open Sans Light" panose="020B0606030504020204" pitchFamily="34" charset="0"/>
-                        </a:rPr>
-                        <a:t>A "single" item</a:t>
-                      </a:r>
-                    </a:p>
-                  </a:txBody>
-                  <a:tcPr anchor="ctr"/>
-                </a:tc>
-                <a:extLst>
-                  <a:ext uri="{0D108BD9-81ED-4DB2-BD59-A6C34878D82A}">
-                    <a16:rowId xmlns:a16="http://schemas.microsoft.com/office/drawing/2014/main" val="2091545836"/>
-                  </a:ext>
-                </a:extLst>
-              </a:tr>
-            </a:tbl>
-          </a:graphicData>
-        </a:graphic>
-      </p:graphicFrame>
-    </p:spTree>
-    <p:extLst>
-      <p:ext uri="{BB962C8B-B14F-4D97-AF65-F5344CB8AC3E}">
-        <p14:creationId xmlns:p14="http://schemas.microsoft.com/office/powerpoint/2010/main" val="3998291529"/>
-      </p:ext>
-    </p:extLst>
-  </p:cSld>
-  <p:clrMapOvr>
-    <a:masterClrMapping/>
-  </p:clrMapOvr>
-</p:sld>
-</file>
-
-<file path=ppt/slides/slide11.xml><?xml version="1.0" encoding="utf-8"?>
-<p:sld xmlns:a="http://schemas.openxmlformats.org/drawingml/2006/main" xmlns:r="http://schemas.openxmlformats.org/officeDocument/2006/relationships" xmlns:p="http://schemas.openxmlformats.org/presentationml/2006/main">
-  <p:cSld>
-    <p:spTree>
-      <p:nvGrpSpPr>
-        <p:cNvPr id="1" name=""/>
-        <p:cNvGrpSpPr/>
-        <p:nvPr/>
-      </p:nvGrpSpPr>
-      <p:grpSpPr>
-        <a:xfrm>
-          <a:off x="0" y="0"/>
-          <a:ext cx="0" cy="0"/>
-          <a:chOff x="0" y="0"/>
-          <a:chExt cx="0" cy="0"/>
-        </a:xfrm>
-      </p:grpSpPr>
-      <p:sp>
-        <p:nvSpPr>
-          <p:cNvPr id="2" name="Title 1">
-            <a:extLst>
-              <a:ext uri="{FF2B5EF4-FFF2-40B4-BE49-F238E27FC236}">
                 <a16:creationId xmlns:a16="http://schemas.microsoft.com/office/drawing/2014/main" id="{D2340843-39A8-4E4A-A923-FEDC64A7AE32}"/>
               </a:ext>
             </a:extLst>
@@ -10191,6 +9579,143 @@
 </p:sld>
 </file>
 
+<file path=ppt/slides/slide11.xml><?xml version="1.0" encoding="utf-8"?>
+<p:sld xmlns:a="http://schemas.openxmlformats.org/drawingml/2006/main" xmlns:r="http://schemas.openxmlformats.org/officeDocument/2006/relationships" xmlns:p="http://schemas.openxmlformats.org/presentationml/2006/main">
+  <p:cSld>
+    <p:spTree>
+      <p:nvGrpSpPr>
+        <p:cNvPr id="1" name=""/>
+        <p:cNvGrpSpPr/>
+        <p:nvPr/>
+      </p:nvGrpSpPr>
+      <p:grpSpPr>
+        <a:xfrm>
+          <a:off x="0" y="0"/>
+          <a:ext cx="0" cy="0"/>
+          <a:chOff x="0" y="0"/>
+          <a:chExt cx="0" cy="0"/>
+        </a:xfrm>
+      </p:grpSpPr>
+      <p:sp>
+        <p:nvSpPr>
+          <p:cNvPr id="2" name="Title 1">
+            <a:extLst>
+              <a:ext uri="{FF2B5EF4-FFF2-40B4-BE49-F238E27FC236}">
+                <a16:creationId xmlns:a16="http://schemas.microsoft.com/office/drawing/2014/main" id="{100B1421-7577-D94A-A03F-9746321D9D5E}"/>
+              </a:ext>
+            </a:extLst>
+          </p:cNvPr>
+          <p:cNvSpPr>
+            <a:spLocks noGrp="1"/>
+          </p:cNvSpPr>
+          <p:nvPr>
+            <p:ph type="title"/>
+          </p:nvPr>
+        </p:nvSpPr>
+        <p:spPr/>
+        <p:txBody>
+          <a:bodyPr/>
+          <a:lstStyle/>
+          <a:p>
+            <a:r>
+              <a:rPr lang="en-US" dirty="0"/>
+              <a:t>Learning Objectives</a:t>
+            </a:r>
+          </a:p>
+        </p:txBody>
+      </p:sp>
+      <p:sp>
+        <p:nvSpPr>
+          <p:cNvPr id="3" name="Content Placeholder 2">
+            <a:extLst>
+              <a:ext uri="{FF2B5EF4-FFF2-40B4-BE49-F238E27FC236}">
+                <a16:creationId xmlns:a16="http://schemas.microsoft.com/office/drawing/2014/main" id="{86019B6B-B854-7643-924E-9BF51C8B86D3}"/>
+              </a:ext>
+            </a:extLst>
+          </p:cNvPr>
+          <p:cNvSpPr>
+            <a:spLocks noGrp="1"/>
+          </p:cNvSpPr>
+          <p:nvPr>
+            <p:ph idx="1"/>
+          </p:nvPr>
+        </p:nvSpPr>
+        <p:spPr/>
+        <p:txBody>
+          <a:bodyPr/>
+          <a:lstStyle/>
+          <a:p>
+            <a:r>
+              <a:rPr lang="en-US" dirty="0"/>
+              <a:t>Learn how to use and create higher order functions:</a:t>
+            </a:r>
+          </a:p>
+          <a:p>
+            <a:r>
+              <a:rPr lang="en-US" dirty="0"/>
+              <a:t>Functions can be used as data</a:t>
+            </a:r>
+          </a:p>
+          <a:p>
+            <a:r>
+              <a:rPr lang="en-US" dirty="0"/>
+              <a:t>Functions can accept a function as an argument</a:t>
+            </a:r>
+          </a:p>
+          <a:p>
+            <a:r>
+              <a:rPr lang="en-US" b="1" dirty="0"/>
+              <a:t>Functions can return a new function</a:t>
+            </a:r>
+          </a:p>
+        </p:txBody>
+      </p:sp>
+      <p:sp>
+        <p:nvSpPr>
+          <p:cNvPr id="5" name="Footer Placeholder 3">
+            <a:extLst>
+              <a:ext uri="{FF2B5EF4-FFF2-40B4-BE49-F238E27FC236}">
+                <a16:creationId xmlns:a16="http://schemas.microsoft.com/office/drawing/2014/main" id="{0AB8D426-819A-7542-8C8B-D59D3E625434}"/>
+              </a:ext>
+            </a:extLst>
+          </p:cNvPr>
+          <p:cNvSpPr>
+            <a:spLocks noGrp="1"/>
+          </p:cNvSpPr>
+          <p:nvPr>
+            <p:ph type="ftr" sz="quarter" idx="10"/>
+          </p:nvPr>
+        </p:nvSpPr>
+        <p:spPr>
+          <a:xfrm>
+            <a:off x="4038599" y="6356350"/>
+            <a:ext cx="4348655" cy="365125"/>
+          </a:xfrm>
+        </p:spPr>
+        <p:txBody>
+          <a:bodyPr/>
+          <a:lstStyle/>
+          <a:p>
+            <a:r>
+              <a:rPr lang="en-US" dirty="0"/>
+              <a:t>Michael Ball | UC Berkeley | https://c88c.org | © CC BY-NC-SA</a:t>
+            </a:r>
+          </a:p>
+        </p:txBody>
+      </p:sp>
+    </p:spTree>
+    <p:extLst>
+      <p:ext uri="{BB962C8B-B14F-4D97-AF65-F5344CB8AC3E}">
+        <p14:creationId xmlns:p14="http://schemas.microsoft.com/office/powerpoint/2010/main" val="1593238648"/>
+      </p:ext>
+    </p:extLst>
+  </p:cSld>
+  <p:clrMapOvr>
+    <a:masterClrMapping/>
+  </p:clrMapOvr>
+</p:sld>
+</file>
+
 <file path=ppt/slides/slide12.xml><?xml version="1.0" encoding="utf-8"?>
 <p:sld xmlns:a="http://schemas.openxmlformats.org/drawingml/2006/main" xmlns:r="http://schemas.openxmlformats.org/officeDocument/2006/relationships" xmlns:p="http://schemas.openxmlformats.org/presentationml/2006/main">
   <p:cSld>
@@ -10213,143 +9738,6 @@
           <p:cNvPr id="2" name="Title 1">
             <a:extLst>
               <a:ext uri="{FF2B5EF4-FFF2-40B4-BE49-F238E27FC236}">
-                <a16:creationId xmlns:a16="http://schemas.microsoft.com/office/drawing/2014/main" id="{100B1421-7577-D94A-A03F-9746321D9D5E}"/>
-              </a:ext>
-            </a:extLst>
-          </p:cNvPr>
-          <p:cNvSpPr>
-            <a:spLocks noGrp="1"/>
-          </p:cNvSpPr>
-          <p:nvPr>
-            <p:ph type="title"/>
-          </p:nvPr>
-        </p:nvSpPr>
-        <p:spPr/>
-        <p:txBody>
-          <a:bodyPr/>
-          <a:lstStyle/>
-          <a:p>
-            <a:r>
-              <a:rPr lang="en-US" dirty="0"/>
-              <a:t>Learning Objectives</a:t>
-            </a:r>
-          </a:p>
-        </p:txBody>
-      </p:sp>
-      <p:sp>
-        <p:nvSpPr>
-          <p:cNvPr id="3" name="Content Placeholder 2">
-            <a:extLst>
-              <a:ext uri="{FF2B5EF4-FFF2-40B4-BE49-F238E27FC236}">
-                <a16:creationId xmlns:a16="http://schemas.microsoft.com/office/drawing/2014/main" id="{86019B6B-B854-7643-924E-9BF51C8B86D3}"/>
-              </a:ext>
-            </a:extLst>
-          </p:cNvPr>
-          <p:cNvSpPr>
-            <a:spLocks noGrp="1"/>
-          </p:cNvSpPr>
-          <p:nvPr>
-            <p:ph idx="1"/>
-          </p:nvPr>
-        </p:nvSpPr>
-        <p:spPr/>
-        <p:txBody>
-          <a:bodyPr/>
-          <a:lstStyle/>
-          <a:p>
-            <a:r>
-              <a:rPr lang="en-US" dirty="0"/>
-              <a:t>Learn how to use and create higher order functions:</a:t>
-            </a:r>
-          </a:p>
-          <a:p>
-            <a:r>
-              <a:rPr lang="en-US" dirty="0"/>
-              <a:t>Functions can be used as data</a:t>
-            </a:r>
-          </a:p>
-          <a:p>
-            <a:r>
-              <a:rPr lang="en-US" dirty="0"/>
-              <a:t>Functions can accept a function as an argument</a:t>
-            </a:r>
-          </a:p>
-          <a:p>
-            <a:r>
-              <a:rPr lang="en-US" b="1" dirty="0"/>
-              <a:t>Functions can return a new function</a:t>
-            </a:r>
-          </a:p>
-        </p:txBody>
-      </p:sp>
-      <p:sp>
-        <p:nvSpPr>
-          <p:cNvPr id="5" name="Footer Placeholder 3">
-            <a:extLst>
-              <a:ext uri="{FF2B5EF4-FFF2-40B4-BE49-F238E27FC236}">
-                <a16:creationId xmlns:a16="http://schemas.microsoft.com/office/drawing/2014/main" id="{0AB8D426-819A-7542-8C8B-D59D3E625434}"/>
-              </a:ext>
-            </a:extLst>
-          </p:cNvPr>
-          <p:cNvSpPr>
-            <a:spLocks noGrp="1"/>
-          </p:cNvSpPr>
-          <p:nvPr>
-            <p:ph type="ftr" sz="quarter" idx="10"/>
-          </p:nvPr>
-        </p:nvSpPr>
-        <p:spPr>
-          <a:xfrm>
-            <a:off x="4038599" y="6356350"/>
-            <a:ext cx="4348655" cy="365125"/>
-          </a:xfrm>
-        </p:spPr>
-        <p:txBody>
-          <a:bodyPr/>
-          <a:lstStyle/>
-          <a:p>
-            <a:r>
-              <a:rPr lang="en-US" dirty="0"/>
-              <a:t>Michael Ball | UC Berkeley | https://c88c.org | © CC BY-NC-SA</a:t>
-            </a:r>
-          </a:p>
-        </p:txBody>
-      </p:sp>
-    </p:spTree>
-    <p:extLst>
-      <p:ext uri="{BB962C8B-B14F-4D97-AF65-F5344CB8AC3E}">
-        <p14:creationId xmlns:p14="http://schemas.microsoft.com/office/powerpoint/2010/main" val="1593238648"/>
-      </p:ext>
-    </p:extLst>
-  </p:cSld>
-  <p:clrMapOvr>
-    <a:masterClrMapping/>
-  </p:clrMapOvr>
-</p:sld>
-</file>
-
-<file path=ppt/slides/slide13.xml><?xml version="1.0" encoding="utf-8"?>
-<p:sld xmlns:a="http://schemas.openxmlformats.org/drawingml/2006/main" xmlns:r="http://schemas.openxmlformats.org/officeDocument/2006/relationships" xmlns:p="http://schemas.openxmlformats.org/presentationml/2006/main">
-  <p:cSld>
-    <p:spTree>
-      <p:nvGrpSpPr>
-        <p:cNvPr id="1" name=""/>
-        <p:cNvGrpSpPr/>
-        <p:nvPr/>
-      </p:nvGrpSpPr>
-      <p:grpSpPr>
-        <a:xfrm>
-          <a:off x="0" y="0"/>
-          <a:ext cx="0" cy="0"/>
-          <a:chOff x="0" y="0"/>
-          <a:chExt cx="0" cy="0"/>
-        </a:xfrm>
-      </p:grpSpPr>
-      <p:sp>
-        <p:nvSpPr>
-          <p:cNvPr id="2" name="Title 1">
-            <a:extLst>
-              <a:ext uri="{FF2B5EF4-FFF2-40B4-BE49-F238E27FC236}">
                 <a16:creationId xmlns:a16="http://schemas.microsoft.com/office/drawing/2014/main" id="{E6F99501-F0C7-EC42-A944-CAC24ED1FA0A}"/>
               </a:ext>
             </a:extLst>
@@ -10469,7 +9857,7 @@
 </p:sld>
 </file>
 
-<file path=ppt/slides/slide14.xml><?xml version="1.0" encoding="utf-8"?>
+<file path=ppt/slides/slide13.xml><?xml version="1.0" encoding="utf-8"?>
 <p:sld xmlns:a="http://schemas.openxmlformats.org/drawingml/2006/main" xmlns:r="http://schemas.openxmlformats.org/officeDocument/2006/relationships" xmlns:p="http://schemas.openxmlformats.org/presentationml/2006/main">
   <p:cSld>
     <p:spTree>
@@ -11431,7 +10819,7 @@
 </p:sld>
 </file>
 
-<file path=ppt/slides/slide15.xml><?xml version="1.0" encoding="utf-8"?>
+<file path=ppt/slides/slide14.xml><?xml version="1.0" encoding="utf-8"?>
 <p:sld xmlns:a="http://schemas.openxmlformats.org/drawingml/2006/main" xmlns:r="http://schemas.openxmlformats.org/officeDocument/2006/relationships" xmlns:p="http://schemas.openxmlformats.org/presentationml/2006/main">
   <p:cSld>
     <p:spTree>
@@ -11516,7 +10904,7 @@
 </p:sld>
 </file>
 
-<file path=ppt/slides/slide16.xml><?xml version="1.0" encoding="utf-8"?>
+<file path=ppt/slides/slide15.xml><?xml version="1.0" encoding="utf-8"?>
 <p:sld xmlns:a="http://schemas.openxmlformats.org/drawingml/2006/main" xmlns:r="http://schemas.openxmlformats.org/officeDocument/2006/relationships" xmlns:p="http://schemas.openxmlformats.org/presentationml/2006/main">
   <p:cSld>
     <p:spTree>
@@ -11690,7 +11078,7 @@
 </p:sld>
 </file>
 
-<file path=ppt/slides/slide17.xml><?xml version="1.0" encoding="utf-8"?>
+<file path=ppt/slides/slide16.xml><?xml version="1.0" encoding="utf-8"?>
 <p:sld xmlns:a="http://schemas.openxmlformats.org/drawingml/2006/main" xmlns:r="http://schemas.openxmlformats.org/officeDocument/2006/relationships" xmlns:p="http://schemas.openxmlformats.org/presentationml/2006/main">
   <p:cSld>
     <p:spTree>
@@ -12273,7 +11661,7 @@
 </p:sld>
 </file>
 
-<file path=ppt/slides/slide18.xml><?xml version="1.0" encoding="utf-8"?>
+<file path=ppt/slides/slide17.xml><?xml version="1.0" encoding="utf-8"?>
 <p:sld xmlns:a="http://schemas.openxmlformats.org/drawingml/2006/main" xmlns:r="http://schemas.openxmlformats.org/officeDocument/2006/relationships" xmlns:p="http://schemas.openxmlformats.org/presentationml/2006/main">
   <p:cSld>
     <p:spTree>
@@ -12959,6 +12347,254 @@
 </p:sld>
 </file>
 
+<file path=ppt/slides/slide18.xml><?xml version="1.0" encoding="utf-8"?>
+<p:sld xmlns:a="http://schemas.openxmlformats.org/drawingml/2006/main" xmlns:r="http://schemas.openxmlformats.org/officeDocument/2006/relationships" xmlns:p="http://schemas.openxmlformats.org/presentationml/2006/main">
+  <p:cSld>
+    <p:spTree>
+      <p:nvGrpSpPr>
+        <p:cNvPr id="1" name=""/>
+        <p:cNvGrpSpPr/>
+        <p:nvPr/>
+      </p:nvGrpSpPr>
+      <p:grpSpPr>
+        <a:xfrm>
+          <a:off x="0" y="0"/>
+          <a:ext cx="0" cy="0"/>
+          <a:chOff x="0" y="0"/>
+          <a:chExt cx="0" cy="0"/>
+        </a:xfrm>
+      </p:grpSpPr>
+      <p:sp>
+        <p:nvSpPr>
+          <p:cNvPr id="2" name="Title 1">
+            <a:extLst>
+              <a:ext uri="{FF2B5EF4-FFF2-40B4-BE49-F238E27FC236}">
+                <a16:creationId xmlns:a16="http://schemas.microsoft.com/office/drawing/2014/main" id="{3240DA3F-5262-644A-8A04-EDF80650B9C2}"/>
+              </a:ext>
+            </a:extLst>
+          </p:cNvPr>
+          <p:cNvSpPr>
+            <a:spLocks noGrp="1"/>
+          </p:cNvSpPr>
+          <p:nvPr>
+            <p:ph type="title"/>
+          </p:nvPr>
+        </p:nvSpPr>
+        <p:spPr/>
+        <p:txBody>
+          <a:bodyPr/>
+          <a:lstStyle/>
+          <a:p>
+            <a:r>
+              <a:rPr lang="en-US" dirty="0"/>
+              <a:t>Python Tutor Example #1</a:t>
+            </a:r>
+          </a:p>
+        </p:txBody>
+      </p:sp>
+      <p:sp>
+        <p:nvSpPr>
+          <p:cNvPr id="3" name="Content Placeholder 2">
+            <a:extLst>
+              <a:ext uri="{FF2B5EF4-FFF2-40B4-BE49-F238E27FC236}">
+                <a16:creationId xmlns:a16="http://schemas.microsoft.com/office/drawing/2014/main" id="{284F9A36-1B36-EA49-B322-395902ACCA87}"/>
+              </a:ext>
+            </a:extLst>
+          </p:cNvPr>
+          <p:cNvSpPr>
+            <a:spLocks noGrp="1"/>
+          </p:cNvSpPr>
+          <p:nvPr>
+            <p:ph idx="1"/>
+          </p:nvPr>
+        </p:nvSpPr>
+        <p:spPr>
+          <a:xfrm>
+            <a:off x="533399" y="1066800"/>
+            <a:ext cx="11225011" cy="5257800"/>
+          </a:xfrm>
+        </p:spPr>
+        <p:txBody>
+          <a:bodyPr/>
+          <a:lstStyle/>
+          <a:p>
+            <a:pPr marL="0" indent="0">
+              <a:buNone/>
+            </a:pPr>
+            <a:r>
+              <a:rPr lang="en-US" sz="2200" dirty="0">
+                <a:latin typeface="Source Code Pro" panose="020B0509030403020204" pitchFamily="49" charset="0"/>
+                <a:ea typeface="Source Code Pro" panose="020B0509030403020204" pitchFamily="49" charset="0"/>
+              </a:rPr>
+              <a:t>def </a:t>
+            </a:r>
+            <a:r>
+              <a:rPr lang="en-US" sz="2200" dirty="0" err="1">
+                <a:latin typeface="Source Code Pro" panose="020B0509030403020204" pitchFamily="49" charset="0"/>
+                <a:ea typeface="Source Code Pro" panose="020B0509030403020204" pitchFamily="49" charset="0"/>
+              </a:rPr>
+              <a:t>make_adder</a:t>
+            </a:r>
+            <a:r>
+              <a:rPr lang="en-US" sz="2200" dirty="0">
+                <a:latin typeface="Source Code Pro" panose="020B0509030403020204" pitchFamily="49" charset="0"/>
+                <a:ea typeface="Source Code Pro" panose="020B0509030403020204" pitchFamily="49" charset="0"/>
+              </a:rPr>
+              <a:t>(n):</a:t>
+            </a:r>
+          </a:p>
+          <a:p>
+            <a:pPr marL="0" indent="0">
+              <a:buNone/>
+            </a:pPr>
+            <a:r>
+              <a:rPr lang="en-US" sz="2200" dirty="0">
+                <a:latin typeface="Source Code Pro" panose="020B0509030403020204" pitchFamily="49" charset="0"/>
+                <a:ea typeface="Source Code Pro" panose="020B0509030403020204" pitchFamily="49" charset="0"/>
+              </a:rPr>
+              <a:t>    def adder(k):</a:t>
+            </a:r>
+          </a:p>
+          <a:p>
+            <a:pPr marL="0" indent="0">
+              <a:buNone/>
+            </a:pPr>
+            <a:r>
+              <a:rPr lang="en-US" sz="2200" dirty="0">
+                <a:latin typeface="Source Code Pro" panose="020B0509030403020204" pitchFamily="49" charset="0"/>
+                <a:ea typeface="Source Code Pro" panose="020B0509030403020204" pitchFamily="49" charset="0"/>
+              </a:rPr>
+              <a:t>        return k + n</a:t>
+            </a:r>
+          </a:p>
+          <a:p>
+            <a:pPr marL="0" indent="0">
+              <a:buNone/>
+            </a:pPr>
+            <a:r>
+              <a:rPr lang="en-US" sz="2200" dirty="0">
+                <a:latin typeface="Source Code Pro" panose="020B0509030403020204" pitchFamily="49" charset="0"/>
+                <a:ea typeface="Source Code Pro" panose="020B0509030403020204" pitchFamily="49" charset="0"/>
+              </a:rPr>
+              <a:t>    return adder</a:t>
+            </a:r>
+          </a:p>
+          <a:p>
+            <a:pPr marL="0" indent="0">
+              <a:buNone/>
+            </a:pPr>
+            <a:endParaRPr lang="en-US" sz="2200" dirty="0">
+              <a:latin typeface="Source Code Pro" panose="020B0509030403020204" pitchFamily="49" charset="0"/>
+              <a:ea typeface="Source Code Pro" panose="020B0509030403020204" pitchFamily="49" charset="0"/>
+            </a:endParaRPr>
+          </a:p>
+          <a:p>
+            <a:pPr marL="0" indent="0">
+              <a:buNone/>
+            </a:pPr>
+            <a:r>
+              <a:rPr lang="en-US" sz="2200" dirty="0">
+                <a:latin typeface="Source Code Pro" panose="020B0509030403020204" pitchFamily="49" charset="0"/>
+                <a:ea typeface="Source Code Pro" panose="020B0509030403020204" pitchFamily="49" charset="0"/>
+              </a:rPr>
+              <a:t>n = 10    </a:t>
+            </a:r>
+          </a:p>
+          <a:p>
+            <a:pPr marL="0" indent="0">
+              <a:buNone/>
+            </a:pPr>
+            <a:r>
+              <a:rPr lang="en-US" sz="2200" dirty="0">
+                <a:latin typeface="Source Code Pro" panose="020B0509030403020204" pitchFamily="49" charset="0"/>
+                <a:ea typeface="Source Code Pro" panose="020B0509030403020204" pitchFamily="49" charset="0"/>
+              </a:rPr>
+              <a:t>add_2 = </a:t>
+            </a:r>
+            <a:r>
+              <a:rPr lang="en-US" sz="2200" dirty="0" err="1">
+                <a:latin typeface="Source Code Pro" panose="020B0509030403020204" pitchFamily="49" charset="0"/>
+                <a:ea typeface="Source Code Pro" panose="020B0509030403020204" pitchFamily="49" charset="0"/>
+              </a:rPr>
+              <a:t>make_adder</a:t>
+            </a:r>
+            <a:r>
+              <a:rPr lang="en-US" sz="2200" dirty="0">
+                <a:latin typeface="Source Code Pro" panose="020B0509030403020204" pitchFamily="49" charset="0"/>
+                <a:ea typeface="Source Code Pro" panose="020B0509030403020204" pitchFamily="49" charset="0"/>
+              </a:rPr>
+              <a:t>(2)</a:t>
+            </a:r>
+          </a:p>
+          <a:p>
+            <a:pPr marL="0" indent="0">
+              <a:buNone/>
+            </a:pPr>
+            <a:r>
+              <a:rPr lang="en-US" sz="2200" dirty="0">
+                <a:latin typeface="Source Code Pro" panose="020B0509030403020204" pitchFamily="49" charset="0"/>
+                <a:ea typeface="Source Code Pro" panose="020B0509030403020204" pitchFamily="49" charset="0"/>
+              </a:rPr>
+              <a:t>x = add_2(5)</a:t>
+            </a:r>
+            <a:endParaRPr lang="en-US" sz="2200" dirty="0">
+              <a:solidFill>
+                <a:schemeClr val="bg1">
+                  <a:lumMod val="50000"/>
+                </a:schemeClr>
+              </a:solidFill>
+              <a:latin typeface="Source Code Pro" panose="020B0509030403020204" pitchFamily="49" charset="0"/>
+              <a:ea typeface="Source Code Pro" panose="020B0509030403020204" pitchFamily="49" charset="0"/>
+            </a:endParaRPr>
+          </a:p>
+        </p:txBody>
+      </p:sp>
+      <p:sp>
+        <p:nvSpPr>
+          <p:cNvPr id="5" name="Footer Placeholder 3">
+            <a:extLst>
+              <a:ext uri="{FF2B5EF4-FFF2-40B4-BE49-F238E27FC236}">
+                <a16:creationId xmlns:a16="http://schemas.microsoft.com/office/drawing/2014/main" id="{677B590B-530D-43F7-EACB-A4315211A94E}"/>
+              </a:ext>
+            </a:extLst>
+          </p:cNvPr>
+          <p:cNvSpPr>
+            <a:spLocks noGrp="1"/>
+          </p:cNvSpPr>
+          <p:nvPr>
+            <p:ph type="ftr" sz="quarter" idx="10"/>
+          </p:nvPr>
+        </p:nvSpPr>
+        <p:spPr>
+          <a:xfrm>
+            <a:off x="4038599" y="6356350"/>
+            <a:ext cx="4348655" cy="365125"/>
+          </a:xfrm>
+        </p:spPr>
+        <p:txBody>
+          <a:bodyPr/>
+          <a:lstStyle/>
+          <a:p>
+            <a:r>
+              <a:rPr lang="en-US" dirty="0"/>
+              <a:t>Michael Ball | UC Berkeley | https://c88c.org | © CC BY-NC-SA</a:t>
+            </a:r>
+          </a:p>
+        </p:txBody>
+      </p:sp>
+    </p:spTree>
+    <p:extLst>
+      <p:ext uri="{BB962C8B-B14F-4D97-AF65-F5344CB8AC3E}">
+        <p14:creationId xmlns:p14="http://schemas.microsoft.com/office/powerpoint/2010/main" val="1613526114"/>
+      </p:ext>
+    </p:extLst>
+  </p:cSld>
+  <p:clrMapOvr>
+    <a:masterClrMapping/>
+  </p:clrMapOvr>
+</p:sld>
+</file>
+
 <file path=ppt/slides/slide19.xml><?xml version="1.0" encoding="utf-8"?>
 <p:sld xmlns:a="http://schemas.openxmlformats.org/drawingml/2006/main" xmlns:r="http://schemas.openxmlformats.org/officeDocument/2006/relationships" xmlns:p="http://schemas.openxmlformats.org/presentationml/2006/main">
   <p:cSld>
@@ -12999,7 +12635,7 @@
           <a:p>
             <a:r>
               <a:rPr lang="en-US" dirty="0"/>
-              <a:t>Python Tutor Example #1</a:t>
+              <a:t>Python Tutor Example #2</a:t>
             </a:r>
           </a:p>
         </p:txBody>
@@ -13020,12 +12656,7 @@
             <p:ph idx="1"/>
           </p:nvPr>
         </p:nvSpPr>
-        <p:spPr>
-          <a:xfrm>
-            <a:off x="533399" y="1066800"/>
-            <a:ext cx="11225011" cy="5257800"/>
-          </a:xfrm>
-        </p:spPr>
+        <p:spPr/>
         <p:txBody>
           <a:bodyPr/>
           <a:lstStyle/>
@@ -13038,21 +12669,19 @@
                 <a:latin typeface="Source Code Pro" panose="020B0509030403020204" pitchFamily="49" charset="0"/>
                 <a:ea typeface="Source Code Pro" panose="020B0509030403020204" pitchFamily="49" charset="0"/>
               </a:rPr>
-              <a:t>def </a:t>
-            </a:r>
-            <a:r>
-              <a:rPr lang="en-US" sz="2200" dirty="0" err="1">
-                <a:latin typeface="Source Code Pro" panose="020B0509030403020204" pitchFamily="49" charset="0"/>
-                <a:ea typeface="Source Code Pro" panose="020B0509030403020204" pitchFamily="49" charset="0"/>
-              </a:rPr>
-              <a:t>make_adder</a:t>
-            </a:r>
+              <a:t>a = "chipotle"</a:t>
+            </a:r>
+          </a:p>
+          <a:p>
+            <a:pPr marL="0" indent="0">
+              <a:buNone/>
+            </a:pPr>
             <a:r>
               <a:rPr lang="en-US" sz="2200" dirty="0">
                 <a:latin typeface="Source Code Pro" panose="020B0509030403020204" pitchFamily="49" charset="0"/>
                 <a:ea typeface="Source Code Pro" panose="020B0509030403020204" pitchFamily="49" charset="0"/>
               </a:rPr>
-              <a:t>(n):</a:t>
+              <a:t>b = 5 &gt; 3</a:t>
             </a:r>
           </a:p>
           <a:p>
@@ -13064,31 +12693,7 @@
                 <a:latin typeface="Source Code Pro" panose="020B0509030403020204" pitchFamily="49" charset="0"/>
                 <a:ea typeface="Source Code Pro" panose="020B0509030403020204" pitchFamily="49" charset="0"/>
               </a:rPr>
-              <a:t>    def adder(k):</a:t>
-            </a:r>
-          </a:p>
-          <a:p>
-            <a:pPr marL="0" indent="0">
-              <a:buNone/>
-            </a:pPr>
-            <a:r>
-              <a:rPr lang="en-US" sz="2200" dirty="0">
-                <a:latin typeface="Source Code Pro" panose="020B0509030403020204" pitchFamily="49" charset="0"/>
-                <a:ea typeface="Source Code Pro" panose="020B0509030403020204" pitchFamily="49" charset="0"/>
-              </a:rPr>
-              <a:t>        return k + n</a:t>
-            </a:r>
-          </a:p>
-          <a:p>
-            <a:pPr marL="0" indent="0">
-              <a:buNone/>
-            </a:pPr>
-            <a:r>
-              <a:rPr lang="en-US" sz="2200" dirty="0">
-                <a:latin typeface="Source Code Pro" panose="020B0509030403020204" pitchFamily="49" charset="0"/>
-                <a:ea typeface="Source Code Pro" panose="020B0509030403020204" pitchFamily="49" charset="0"/>
-              </a:rPr>
-              <a:t>    return adder</a:t>
+              <a:t>c = 8</a:t>
             </a:r>
           </a:p>
           <a:p>
@@ -13109,7 +12714,7 @@
                 <a:latin typeface="Source Code Pro" panose="020B0509030403020204" pitchFamily="49" charset="0"/>
                 <a:ea typeface="Source Code Pro" panose="020B0509030403020204" pitchFamily="49" charset="0"/>
               </a:rPr>
-              <a:t>n = 10    </a:t>
+              <a:t>def foo(c):</a:t>
             </a:r>
           </a:p>
           <a:p>
@@ -13121,21 +12726,28 @@
                 <a:latin typeface="Source Code Pro" panose="020B0509030403020204" pitchFamily="49" charset="0"/>
                 <a:ea typeface="Source Code Pro" panose="020B0509030403020204" pitchFamily="49" charset="0"/>
               </a:rPr>
-              <a:t>add_2 = </a:t>
-            </a:r>
-            <a:r>
-              <a:rPr lang="en-US" sz="2200" dirty="0" err="1">
-                <a:latin typeface="Source Code Pro" panose="020B0509030403020204" pitchFamily="49" charset="0"/>
-                <a:ea typeface="Source Code Pro" panose="020B0509030403020204" pitchFamily="49" charset="0"/>
-              </a:rPr>
-              <a:t>make_adder</a:t>
-            </a:r>
+              <a:t>    return c - 5</a:t>
+            </a:r>
+          </a:p>
+          <a:p>
+            <a:pPr marL="0" indent="0">
+              <a:buNone/>
+            </a:pPr>
+            <a:endParaRPr lang="en-US" sz="2200" dirty="0">
+              <a:latin typeface="Source Code Pro" panose="020B0509030403020204" pitchFamily="49" charset="0"/>
+              <a:ea typeface="Source Code Pro" panose="020B0509030403020204" pitchFamily="49" charset="0"/>
+            </a:endParaRPr>
+          </a:p>
+          <a:p>
+            <a:pPr marL="0" indent="0">
+              <a:buNone/>
+            </a:pPr>
             <a:r>
               <a:rPr lang="en-US" sz="2200" dirty="0">
                 <a:latin typeface="Source Code Pro" panose="020B0509030403020204" pitchFamily="49" charset="0"/>
                 <a:ea typeface="Source Code Pro" panose="020B0509030403020204" pitchFamily="49" charset="0"/>
               </a:rPr>
-              <a:t>(2)</a:t>
+              <a:t>def bar():</a:t>
             </a:r>
           </a:p>
           <a:p>
@@ -13147,18 +12759,54 @@
                 <a:latin typeface="Source Code Pro" panose="020B0509030403020204" pitchFamily="49" charset="0"/>
                 <a:ea typeface="Source Code Pro" panose="020B0509030403020204" pitchFamily="49" charset="0"/>
               </a:rPr>
-              <a:t>x = add_2(5)</a:t>
-            </a:r>
+              <a:t>    if b:</a:t>
+            </a:r>
+          </a:p>
+          <a:p>
+            <a:pPr marL="0" indent="0">
+              <a:buNone/>
+            </a:pPr>
+            <a:r>
+              <a:rPr lang="en-US" sz="2200" dirty="0">
+                <a:latin typeface="Source Code Pro" panose="020B0509030403020204" pitchFamily="49" charset="0"/>
+                <a:ea typeface="Source Code Pro" panose="020B0509030403020204" pitchFamily="49" charset="0"/>
+              </a:rPr>
+              <a:t>        a = "taco bell"</a:t>
+            </a:r>
+          </a:p>
+          <a:p>
+            <a:pPr marL="0" indent="0">
+              <a:buNone/>
+            </a:pPr>
             <a:endParaRPr lang="en-US" sz="2200" dirty="0">
-              <a:solidFill>
-                <a:schemeClr val="bg1">
-                  <a:lumMod val="50000"/>
-                </a:schemeClr>
-              </a:solidFill>
               <a:latin typeface="Source Code Pro" panose="020B0509030403020204" pitchFamily="49" charset="0"/>
               <a:ea typeface="Source Code Pro" panose="020B0509030403020204" pitchFamily="49" charset="0"/>
             </a:endParaRPr>
           </a:p>
+          <a:p>
+            <a:pPr marL="0" indent="0">
+              <a:buNone/>
+            </a:pPr>
+            <a:r>
+              <a:rPr lang="en-US" sz="2200" dirty="0">
+                <a:latin typeface="Source Code Pro" panose="020B0509030403020204" pitchFamily="49" charset="0"/>
+                <a:ea typeface="Source Code Pro" panose="020B0509030403020204" pitchFamily="49" charset="0"/>
+              </a:rPr>
+              <a:t>result1 = foo(10)</a:t>
+            </a:r>
+          </a:p>
+          <a:p>
+            <a:pPr marL="0" indent="0">
+              <a:buNone/>
+            </a:pPr>
+            <a:r>
+              <a:rPr lang="en-US" sz="2200" dirty="0">
+                <a:latin typeface="Source Code Pro" panose="020B0509030403020204" pitchFamily="49" charset="0"/>
+                <a:ea typeface="Source Code Pro" panose="020B0509030403020204" pitchFamily="49" charset="0"/>
+              </a:rPr>
+              <a:t>result2 = bar()</a:t>
+            </a:r>
+          </a:p>
         </p:txBody>
       </p:sp>
       <p:sp>
@@ -13166,7 +12814,7 @@
           <p:cNvPr id="5" name="Footer Placeholder 3">
             <a:extLst>
               <a:ext uri="{FF2B5EF4-FFF2-40B4-BE49-F238E27FC236}">
-                <a16:creationId xmlns:a16="http://schemas.microsoft.com/office/drawing/2014/main" id="{677B590B-530D-43F7-EACB-A4315211A94E}"/>
+                <a16:creationId xmlns:a16="http://schemas.microsoft.com/office/drawing/2014/main" id="{063CC9AD-AB85-ED1A-8BBF-11586ADBA2A7}"/>
               </a:ext>
             </a:extLst>
           </p:cNvPr>
@@ -13197,7 +12845,7 @@
     </p:spTree>
     <p:extLst>
       <p:ext uri="{BB962C8B-B14F-4D97-AF65-F5344CB8AC3E}">
-        <p14:creationId xmlns:p14="http://schemas.microsoft.com/office/powerpoint/2010/main" val="1613526114"/>
+        <p14:creationId xmlns:p14="http://schemas.microsoft.com/office/powerpoint/2010/main" val="3096584794"/>
       </p:ext>
     </p:extLst>
   </p:cSld>
@@ -13470,7 +13118,7 @@
           <p:cNvPr id="2" name="Title 1">
             <a:extLst>
               <a:ext uri="{FF2B5EF4-FFF2-40B4-BE49-F238E27FC236}">
-                <a16:creationId xmlns:a16="http://schemas.microsoft.com/office/drawing/2014/main" id="{3240DA3F-5262-644A-8A04-EDF80650B9C2}"/>
+                <a16:creationId xmlns:a16="http://schemas.microsoft.com/office/drawing/2014/main" id="{80893AED-AB1E-9F40-BE86-23A4ED91A56E}"/>
               </a:ext>
             </a:extLst>
           </p:cNvPr>
@@ -13488,7 +13136,7 @@
           <a:p>
             <a:r>
               <a:rPr lang="en-US" dirty="0"/>
-              <a:t>Python Tutor Example #2</a:t>
+              <a:t>Python Tutor Example #3</a:t>
             </a:r>
           </a:p>
         </p:txBody>
@@ -13498,7 +13146,7 @@
           <p:cNvPr id="3" name="Content Placeholder 2">
             <a:extLst>
               <a:ext uri="{FF2B5EF4-FFF2-40B4-BE49-F238E27FC236}">
-                <a16:creationId xmlns:a16="http://schemas.microsoft.com/office/drawing/2014/main" id="{284F9A36-1B36-EA49-B322-395902ACCA87}"/>
+                <a16:creationId xmlns:a16="http://schemas.microsoft.com/office/drawing/2014/main" id="{96930B3E-847A-CF45-BFCB-5C129A38C53F}"/>
               </a:ext>
             </a:extLst>
           </p:cNvPr>
@@ -13518,11 +13166,22 @@
               <a:buNone/>
             </a:pPr>
             <a:r>
-              <a:rPr lang="en-US" sz="2200" dirty="0">
-                <a:latin typeface="Source Code Pro" panose="020B0509030403020204" pitchFamily="49" charset="0"/>
-                <a:ea typeface="Source Code Pro" panose="020B0509030403020204" pitchFamily="49" charset="0"/>
+              <a:rPr lang="en-US" dirty="0">
+                <a:latin typeface="Source Code Pro" panose="020B0509030403020204" pitchFamily="49" charset="77"/>
               </a:rPr>
-              <a:t>a = "chipotle"</a:t>
+              <a:t>add_2 = </a:t>
+            </a:r>
+            <a:r>
+              <a:rPr lang="en-US" dirty="0" err="1">
+                <a:latin typeface="Source Code Pro" panose="020B0509030403020204" pitchFamily="49" charset="77"/>
+              </a:rPr>
+              <a:t>make_adder</a:t>
+            </a:r>
+            <a:r>
+              <a:rPr lang="en-US" dirty="0">
+                <a:latin typeface="Source Code Pro" panose="020B0509030403020204" pitchFamily="49" charset="77"/>
+              </a:rPr>
+              <a:t>(2)</a:t>
             </a:r>
           </a:p>
           <a:p>
@@ -13530,44 +13189,63 @@
               <a:buNone/>
             </a:pPr>
             <a:r>
-              <a:rPr lang="en-US" sz="2200" dirty="0">
-                <a:latin typeface="Source Code Pro" panose="020B0509030403020204" pitchFamily="49" charset="0"/>
-                <a:ea typeface="Source Code Pro" panose="020B0509030403020204" pitchFamily="49" charset="0"/>
+              <a:rPr lang="en-US" dirty="0">
+                <a:latin typeface="Source Code Pro" panose="020B0509030403020204" pitchFamily="49" charset="77"/>
               </a:rPr>
-              <a:t>b = 5 &gt; 3</a:t>
+              <a:t>add_3 = </a:t>
+            </a:r>
+            <a:r>
+              <a:rPr lang="en-US" dirty="0" err="1">
+                <a:latin typeface="Source Code Pro" panose="020B0509030403020204" pitchFamily="49" charset="77"/>
+              </a:rPr>
+              <a:t>make_adder</a:t>
+            </a:r>
+            <a:r>
+              <a:rPr lang="en-US" dirty="0">
+                <a:latin typeface="Source Code Pro" panose="020B0509030403020204" pitchFamily="49" charset="77"/>
+              </a:rPr>
+              <a:t>(3)</a:t>
             </a:r>
           </a:p>
           <a:p>
             <a:pPr marL="0" indent="0">
               <a:buNone/>
             </a:pPr>
-            <a:r>
-              <a:rPr lang="en-US" sz="2200" dirty="0">
-                <a:latin typeface="Source Code Pro" panose="020B0509030403020204" pitchFamily="49" charset="0"/>
-                <a:ea typeface="Source Code Pro" panose="020B0509030403020204" pitchFamily="49" charset="0"/>
+            <a:endParaRPr lang="en-US" dirty="0">
+              <a:latin typeface="Source Code Pro" panose="020B0509030403020204" pitchFamily="49" charset="77"/>
+            </a:endParaRPr>
+          </a:p>
+          <a:p>
+            <a:pPr marL="0" indent="0">
+              <a:buNone/>
+            </a:pPr>
+            <a:r>
+              <a:rPr lang="en-US" dirty="0">
+                <a:latin typeface="Source Code Pro" panose="020B0509030403020204" pitchFamily="49" charset="77"/>
               </a:rPr>
-              <a:t>c = 8</a:t>
+              <a:t>x = add_2(2)</a:t>
             </a:r>
           </a:p>
           <a:p>
             <a:pPr marL="0" indent="0">
               <a:buNone/>
             </a:pPr>
-            <a:endParaRPr lang="en-US" sz="2200" dirty="0">
-              <a:latin typeface="Source Code Pro" panose="020B0509030403020204" pitchFamily="49" charset="0"/>
-              <a:ea typeface="Source Code Pro" panose="020B0509030403020204" pitchFamily="49" charset="0"/>
-            </a:endParaRPr>
+            <a:r>
+              <a:rPr lang="en-US" dirty="0">
+                <a:latin typeface="Source Code Pro" panose="020B0509030403020204" pitchFamily="49" charset="77"/>
+              </a:rPr>
+              <a:t>def compose(f, g):</a:t>
+            </a:r>
           </a:p>
           <a:p>
             <a:pPr marL="0" indent="0">
               <a:buNone/>
             </a:pPr>
             <a:r>
-              <a:rPr lang="en-US" sz="2200" dirty="0">
-                <a:latin typeface="Source Code Pro" panose="020B0509030403020204" pitchFamily="49" charset="0"/>
-                <a:ea typeface="Source Code Pro" panose="020B0509030403020204" pitchFamily="49" charset="0"/>
+              <a:rPr lang="en-US" dirty="0">
+                <a:latin typeface="Source Code Pro" panose="020B0509030403020204" pitchFamily="49" charset="77"/>
               </a:rPr>
-              <a:t>def foo(c):</a:t>
+              <a:t>    def h(x):</a:t>
             </a:r>
           </a:p>
           <a:p>
@@ -13575,32 +13253,32 @@
               <a:buNone/>
             </a:pPr>
             <a:r>
-              <a:rPr lang="en-US" sz="2200" dirty="0">
-                <a:latin typeface="Source Code Pro" panose="020B0509030403020204" pitchFamily="49" charset="0"/>
-                <a:ea typeface="Source Code Pro" panose="020B0509030403020204" pitchFamily="49" charset="0"/>
+              <a:rPr lang="en-US" dirty="0">
+                <a:latin typeface="Source Code Pro" panose="020B0509030403020204" pitchFamily="49" charset="77"/>
               </a:rPr>
-              <a:t>    return c - 5</a:t>
+              <a:t>        return f(g(x))</a:t>
             </a:r>
           </a:p>
           <a:p>
             <a:pPr marL="0" indent="0">
               <a:buNone/>
             </a:pPr>
-            <a:endParaRPr lang="en-US" sz="2200" dirty="0">
-              <a:latin typeface="Source Code Pro" panose="020B0509030403020204" pitchFamily="49" charset="0"/>
-              <a:ea typeface="Source Code Pro" panose="020B0509030403020204" pitchFamily="49" charset="0"/>
-            </a:endParaRPr>
+            <a:r>
+              <a:rPr lang="en-US" dirty="0">
+                <a:latin typeface="Source Code Pro" panose="020B0509030403020204" pitchFamily="49" charset="77"/>
+              </a:rPr>
+              <a:t>    return h</a:t>
+            </a:r>
           </a:p>
           <a:p>
             <a:pPr marL="0" indent="0">
               <a:buNone/>
             </a:pPr>
             <a:r>
-              <a:rPr lang="en-US" sz="2200" dirty="0">
-                <a:latin typeface="Source Code Pro" panose="020B0509030403020204" pitchFamily="49" charset="0"/>
-                <a:ea typeface="Source Code Pro" panose="020B0509030403020204" pitchFamily="49" charset="0"/>
+              <a:rPr lang="en-US" dirty="0">
+                <a:latin typeface="Source Code Pro" panose="020B0509030403020204" pitchFamily="49" charset="77"/>
               </a:rPr>
-              <a:t>def bar():</a:t>
+              <a:t>add_5 = compose(add_2, add_3)</a:t>
             </a:r>
           </a:p>
           <a:p>
@@ -13608,56 +13286,10 @@
               <a:buNone/>
             </a:pPr>
             <a:r>
-              <a:rPr lang="en-US" sz="2200" dirty="0">
-                <a:latin typeface="Source Code Pro" panose="020B0509030403020204" pitchFamily="49" charset="0"/>
-                <a:ea typeface="Source Code Pro" panose="020B0509030403020204" pitchFamily="49" charset="0"/>
+              <a:rPr lang="en-US" dirty="0">
+                <a:latin typeface="Source Code Pro" panose="020B0509030403020204" pitchFamily="49" charset="77"/>
               </a:rPr>
-              <a:t>    if b:</a:t>
-            </a:r>
-          </a:p>
-          <a:p>
-            <a:pPr marL="0" indent="0">
-              <a:buNone/>
-            </a:pPr>
-            <a:r>
-              <a:rPr lang="en-US" sz="2200" dirty="0">
-                <a:latin typeface="Source Code Pro" panose="020B0509030403020204" pitchFamily="49" charset="0"/>
-                <a:ea typeface="Source Code Pro" panose="020B0509030403020204" pitchFamily="49" charset="0"/>
-              </a:rPr>
-              <a:t>        a = "taco bell"</a:t>
-            </a:r>
-          </a:p>
-          <a:p>
-            <a:pPr marL="0" indent="0">
-              <a:buNone/>
-            </a:pPr>
-            <a:endParaRPr lang="en-US" sz="2200" dirty="0">
-              <a:latin typeface="Source Code Pro" panose="020B0509030403020204" pitchFamily="49" charset="0"/>
-              <a:ea typeface="Source Code Pro" panose="020B0509030403020204" pitchFamily="49" charset="0"/>
-            </a:endParaRPr>
-          </a:p>
-          <a:p>
-            <a:pPr marL="0" indent="0">
-              <a:buNone/>
-            </a:pPr>
-            <a:r>
-              <a:rPr lang="en-US" sz="2200" dirty="0">
-                <a:latin typeface="Source Code Pro" panose="020B0509030403020204" pitchFamily="49" charset="0"/>
-                <a:ea typeface="Source Code Pro" panose="020B0509030403020204" pitchFamily="49" charset="0"/>
-              </a:rPr>
-              <a:t>result1 = foo(10)</a:t>
-            </a:r>
-          </a:p>
-          <a:p>
-            <a:pPr marL="0" indent="0">
-              <a:buNone/>
-            </a:pPr>
-            <a:r>
-              <a:rPr lang="en-US" sz="2200" dirty="0">
-                <a:latin typeface="Source Code Pro" panose="020B0509030403020204" pitchFamily="49" charset="0"/>
-                <a:ea typeface="Source Code Pro" panose="020B0509030403020204" pitchFamily="49" charset="0"/>
-              </a:rPr>
-              <a:t>result2 = bar()</a:t>
+              <a:t>z = add_5(x)</a:t>
             </a:r>
           </a:p>
         </p:txBody>
@@ -13667,7 +13299,7 @@
           <p:cNvPr id="5" name="Footer Placeholder 3">
             <a:extLst>
               <a:ext uri="{FF2B5EF4-FFF2-40B4-BE49-F238E27FC236}">
-                <a16:creationId xmlns:a16="http://schemas.microsoft.com/office/drawing/2014/main" id="{063CC9AD-AB85-ED1A-8BBF-11586ADBA2A7}"/>
+                <a16:creationId xmlns:a16="http://schemas.microsoft.com/office/drawing/2014/main" id="{3AF96BFF-6AF9-AFF8-E585-7AA7162824BC}"/>
               </a:ext>
             </a:extLst>
           </p:cNvPr>
@@ -13698,7 +13330,7 @@
     </p:spTree>
     <p:extLst>
       <p:ext uri="{BB962C8B-B14F-4D97-AF65-F5344CB8AC3E}">
-        <p14:creationId xmlns:p14="http://schemas.microsoft.com/office/powerpoint/2010/main" val="3096584794"/>
+        <p14:creationId xmlns:p14="http://schemas.microsoft.com/office/powerpoint/2010/main" val="3318854379"/>
       </p:ext>
     </p:extLst>
   </p:cSld>
@@ -13730,7 +13362,7 @@
           <p:cNvPr id="2" name="Title 1">
             <a:extLst>
               <a:ext uri="{FF2B5EF4-FFF2-40B4-BE49-F238E27FC236}">
-                <a16:creationId xmlns:a16="http://schemas.microsoft.com/office/drawing/2014/main" id="{80893AED-AB1E-9F40-BE86-23A4ED91A56E}"/>
+                <a16:creationId xmlns:a16="http://schemas.microsoft.com/office/drawing/2014/main" id="{3240DA3F-5262-644A-8A04-EDF80650B9C2}"/>
               </a:ext>
             </a:extLst>
           </p:cNvPr>
@@ -13748,7 +13380,7 @@
           <a:p>
             <a:r>
               <a:rPr lang="en-US" dirty="0"/>
-              <a:t>Python Tutor Example #3</a:t>
+              <a:t>Demo</a:t>
             </a:r>
           </a:p>
         </p:txBody>
@@ -13758,7 +13390,7 @@
           <p:cNvPr id="3" name="Content Placeholder 2">
             <a:extLst>
               <a:ext uri="{FF2B5EF4-FFF2-40B4-BE49-F238E27FC236}">
-                <a16:creationId xmlns:a16="http://schemas.microsoft.com/office/drawing/2014/main" id="{96930B3E-847A-CF45-BFCB-5C129A38C53F}"/>
+                <a16:creationId xmlns:a16="http://schemas.microsoft.com/office/drawing/2014/main" id="{284F9A36-1B36-EA49-B322-395902ACCA87}"/>
               </a:ext>
             </a:extLst>
           </p:cNvPr>
@@ -13769,7 +13401,12 @@
             <p:ph idx="1"/>
           </p:nvPr>
         </p:nvSpPr>
-        <p:spPr/>
+        <p:spPr>
+          <a:xfrm>
+            <a:off x="533399" y="1066800"/>
+            <a:ext cx="11225011" cy="5257800"/>
+          </a:xfrm>
+        </p:spPr>
         <p:txBody>
           <a:bodyPr/>
           <a:lstStyle/>
@@ -13778,140 +13415,80 @@
               <a:buNone/>
             </a:pPr>
             <a:r>
-              <a:rPr lang="en-US" dirty="0">
-                <a:latin typeface="Source Code Pro" panose="020B0509030403020204" pitchFamily="49" charset="77"/>
+              <a:rPr lang="en-US" sz="2400" dirty="0"/>
+              <a:t>Example 1:</a:t>
+            </a:r>
+          </a:p>
+          <a:p>
+            <a:r>
+              <a:rPr lang="en-US" sz="2400" dirty="0">
+                <a:hlinkClick r:id="rId2"/>
               </a:rPr>
-              <a:t>add_2 = </a:t>
-            </a:r>
-            <a:r>
-              <a:rPr lang="en-US" dirty="0" err="1">
-                <a:latin typeface="Source Code Pro" panose="020B0509030403020204" pitchFamily="49" charset="77"/>
+              <a:t>make_adder Higher Order Function: Environment Diagram Python Tutor Link</a:t>
+            </a:r>
+            <a:endParaRPr lang="en-US" sz="2400" dirty="0">
+              <a:hlinkClick r:id="rId3"/>
+            </a:endParaRPr>
+          </a:p>
+          <a:p>
+            <a:pPr marL="0" indent="0">
+              <a:buNone/>
+            </a:pPr>
+            <a:r>
+              <a:rPr lang="en-US" sz="2400" dirty="0"/>
+              <a:t>Example 2:</a:t>
+            </a:r>
+            <a:endParaRPr lang="en-US" sz="2400" dirty="0">
+              <a:hlinkClick r:id="rId3"/>
+            </a:endParaRPr>
+          </a:p>
+          <a:p>
+            <a:r>
+              <a:rPr lang="en-US" sz="2400" dirty="0">
+                <a:solidFill>
+                  <a:schemeClr val="tx1">
+                    <a:lumMod val="95000"/>
+                    <a:lumOff val="5000"/>
+                  </a:schemeClr>
+                </a:solidFill>
+                <a:hlinkClick r:id="rId4"/>
               </a:rPr>
-              <a:t>make_adder</a:t>
-            </a:r>
-            <a:r>
-              <a:rPr lang="en-US" dirty="0">
-                <a:latin typeface="Source Code Pro" panose="020B0509030403020204" pitchFamily="49" charset="77"/>
+              <a:t>Primitives and Functions: Environment Diagram Python Tutor</a:t>
+            </a:r>
+            <a:r>
+              <a:rPr lang="en-US" sz="2400" dirty="0">
+                <a:hlinkClick r:id="rId4"/>
               </a:rPr>
-              <a:t>(2)</a:t>
-            </a:r>
+              <a:t>:</a:t>
+            </a:r>
+            <a:endParaRPr lang="en-US" sz="2400" dirty="0"/>
           </a:p>
           <a:p>
             <a:pPr marL="0" indent="0">
               <a:buNone/>
             </a:pPr>
             <a:r>
-              <a:rPr lang="en-US" dirty="0">
-                <a:latin typeface="Source Code Pro" panose="020B0509030403020204" pitchFamily="49" charset="77"/>
+              <a:rPr lang="en-US" sz="2400" dirty="0"/>
+              <a:t>Example 3:</a:t>
+            </a:r>
+          </a:p>
+          <a:p>
+            <a:r>
+              <a:rPr lang="en-US" sz="2400" dirty="0">
+                <a:hlinkClick r:id="rId5"/>
               </a:rPr>
-              <a:t>add_3 = </a:t>
-            </a:r>
-            <a:r>
-              <a:rPr lang="en-US" dirty="0" err="1">
-                <a:latin typeface="Source Code Pro" panose="020B0509030403020204" pitchFamily="49" charset="77"/>
-              </a:rPr>
-              <a:t>make_adder</a:t>
-            </a:r>
-            <a:r>
-              <a:rPr lang="en-US" dirty="0">
-                <a:latin typeface="Source Code Pro" panose="020B0509030403020204" pitchFamily="49" charset="77"/>
-              </a:rPr>
-              <a:t>(3)</a:t>
-            </a:r>
-          </a:p>
-          <a:p>
-            <a:pPr marL="0" indent="0">
-              <a:buNone/>
-            </a:pPr>
-            <a:endParaRPr lang="en-US" dirty="0">
-              <a:latin typeface="Source Code Pro" panose="020B0509030403020204" pitchFamily="49" charset="77"/>
-            </a:endParaRPr>
-          </a:p>
-          <a:p>
-            <a:pPr marL="0" indent="0">
-              <a:buNone/>
-            </a:pPr>
-            <a:r>
-              <a:rPr lang="en-US" dirty="0">
-                <a:latin typeface="Source Code Pro" panose="020B0509030403020204" pitchFamily="49" charset="77"/>
-              </a:rPr>
-              <a:t>x = add_2(2)</a:t>
-            </a:r>
-          </a:p>
-          <a:p>
-            <a:pPr marL="0" indent="0">
-              <a:buNone/>
-            </a:pPr>
-            <a:r>
-              <a:rPr lang="en-US" dirty="0">
-                <a:latin typeface="Source Code Pro" panose="020B0509030403020204" pitchFamily="49" charset="77"/>
-              </a:rPr>
-              <a:t>def compose(f, g):</a:t>
-            </a:r>
-          </a:p>
-          <a:p>
-            <a:pPr marL="0" indent="0">
-              <a:buNone/>
-            </a:pPr>
-            <a:r>
-              <a:rPr lang="en-US" dirty="0">
-                <a:latin typeface="Source Code Pro" panose="020B0509030403020204" pitchFamily="49" charset="77"/>
-              </a:rPr>
-              <a:t>    def h(x):</a:t>
-            </a:r>
-          </a:p>
-          <a:p>
-            <a:pPr marL="0" indent="0">
-              <a:buNone/>
-            </a:pPr>
-            <a:r>
-              <a:rPr lang="en-US" dirty="0">
-                <a:latin typeface="Source Code Pro" panose="020B0509030403020204" pitchFamily="49" charset="77"/>
-              </a:rPr>
-              <a:t>        return f(g(x))</a:t>
-            </a:r>
-          </a:p>
-          <a:p>
-            <a:pPr marL="0" indent="0">
-              <a:buNone/>
-            </a:pPr>
-            <a:r>
-              <a:rPr lang="en-US" dirty="0">
-                <a:latin typeface="Source Code Pro" panose="020B0509030403020204" pitchFamily="49" charset="77"/>
-              </a:rPr>
-              <a:t>    return h</a:t>
-            </a:r>
-          </a:p>
-          <a:p>
-            <a:pPr marL="0" indent="0">
-              <a:buNone/>
-            </a:pPr>
-            <a:r>
-              <a:rPr lang="en-US" dirty="0">
-                <a:latin typeface="Source Code Pro" panose="020B0509030403020204" pitchFamily="49" charset="77"/>
-              </a:rPr>
-              <a:t>add_5 = compose(add_2, add_3)</a:t>
-            </a:r>
-          </a:p>
-          <a:p>
-            <a:pPr marL="0" indent="0">
-              <a:buNone/>
-            </a:pPr>
-            <a:r>
-              <a:rPr lang="en-US" dirty="0">
-                <a:latin typeface="Source Code Pro" panose="020B0509030403020204" pitchFamily="49" charset="77"/>
-              </a:rPr>
-              <a:t>z = add_5(x)</a:t>
-            </a:r>
-          </a:p>
-        </p:txBody>
-      </p:sp>
-      <p:sp>
-        <p:nvSpPr>
-          <p:cNvPr id="5" name="Footer Placeholder 3">
+              <a:t>Compose Python Tutor Link</a:t>
+            </a:r>
+            <a:endParaRPr lang="en-US" sz="2400" dirty="0"/>
+          </a:p>
+        </p:txBody>
+      </p:sp>
+      <p:sp>
+        <p:nvSpPr>
+          <p:cNvPr id="4" name="Footer Placeholder 3">
             <a:extLst>
               <a:ext uri="{FF2B5EF4-FFF2-40B4-BE49-F238E27FC236}">
-                <a16:creationId xmlns:a16="http://schemas.microsoft.com/office/drawing/2014/main" id="{3AF96BFF-6AF9-AFF8-E585-7AA7162824BC}"/>
+                <a16:creationId xmlns:a16="http://schemas.microsoft.com/office/drawing/2014/main" id="{F98321EF-8CA7-4B88-C14F-0290A39B3BC4}"/>
               </a:ext>
             </a:extLst>
           </p:cNvPr>
@@ -13942,7 +13519,7 @@
     </p:spTree>
     <p:extLst>
       <p:ext uri="{BB962C8B-B14F-4D97-AF65-F5344CB8AC3E}">
-        <p14:creationId xmlns:p14="http://schemas.microsoft.com/office/powerpoint/2010/main" val="3318854379"/>
+        <p14:creationId xmlns:p14="http://schemas.microsoft.com/office/powerpoint/2010/main" val="776121693"/>
       </p:ext>
     </p:extLst>
   </p:cSld>
@@ -13974,195 +13551,6 @@
           <p:cNvPr id="2" name="Title 1">
             <a:extLst>
               <a:ext uri="{FF2B5EF4-FFF2-40B4-BE49-F238E27FC236}">
-                <a16:creationId xmlns:a16="http://schemas.microsoft.com/office/drawing/2014/main" id="{3240DA3F-5262-644A-8A04-EDF80650B9C2}"/>
-              </a:ext>
-            </a:extLst>
-          </p:cNvPr>
-          <p:cNvSpPr>
-            <a:spLocks noGrp="1"/>
-          </p:cNvSpPr>
-          <p:nvPr>
-            <p:ph type="title"/>
-          </p:nvPr>
-        </p:nvSpPr>
-        <p:spPr/>
-        <p:txBody>
-          <a:bodyPr/>
-          <a:lstStyle/>
-          <a:p>
-            <a:r>
-              <a:rPr lang="en-US" dirty="0"/>
-              <a:t>Demo</a:t>
-            </a:r>
-          </a:p>
-        </p:txBody>
-      </p:sp>
-      <p:sp>
-        <p:nvSpPr>
-          <p:cNvPr id="3" name="Content Placeholder 2">
-            <a:extLst>
-              <a:ext uri="{FF2B5EF4-FFF2-40B4-BE49-F238E27FC236}">
-                <a16:creationId xmlns:a16="http://schemas.microsoft.com/office/drawing/2014/main" id="{284F9A36-1B36-EA49-B322-395902ACCA87}"/>
-              </a:ext>
-            </a:extLst>
-          </p:cNvPr>
-          <p:cNvSpPr>
-            <a:spLocks noGrp="1"/>
-          </p:cNvSpPr>
-          <p:nvPr>
-            <p:ph idx="1"/>
-          </p:nvPr>
-        </p:nvSpPr>
-        <p:spPr>
-          <a:xfrm>
-            <a:off x="533399" y="1066800"/>
-            <a:ext cx="11225011" cy="5257800"/>
-          </a:xfrm>
-        </p:spPr>
-        <p:txBody>
-          <a:bodyPr/>
-          <a:lstStyle/>
-          <a:p>
-            <a:pPr marL="0" indent="0">
-              <a:buNone/>
-            </a:pPr>
-            <a:r>
-              <a:rPr lang="en-US" sz="2400" dirty="0"/>
-              <a:t>Example 1:</a:t>
-            </a:r>
-          </a:p>
-          <a:p>
-            <a:r>
-              <a:rPr lang="en-US" sz="2400" dirty="0">
-                <a:hlinkClick r:id="rId2"/>
-              </a:rPr>
-              <a:t>make_adder Higher Order Function: Environment Diagram Python Tutor Link</a:t>
-            </a:r>
-            <a:endParaRPr lang="en-US" sz="2400" dirty="0">
-              <a:hlinkClick r:id="rId3"/>
-            </a:endParaRPr>
-          </a:p>
-          <a:p>
-            <a:pPr marL="0" indent="0">
-              <a:buNone/>
-            </a:pPr>
-            <a:r>
-              <a:rPr lang="en-US" sz="2400" dirty="0"/>
-              <a:t>Example 2:</a:t>
-            </a:r>
-            <a:endParaRPr lang="en-US" sz="2400" dirty="0">
-              <a:hlinkClick r:id="rId3"/>
-            </a:endParaRPr>
-          </a:p>
-          <a:p>
-            <a:r>
-              <a:rPr lang="en-US" sz="2400" dirty="0">
-                <a:solidFill>
-                  <a:schemeClr val="tx1">
-                    <a:lumMod val="95000"/>
-                    <a:lumOff val="5000"/>
-                  </a:schemeClr>
-                </a:solidFill>
-                <a:hlinkClick r:id="rId4"/>
-              </a:rPr>
-              <a:t>Primitives and Functions: Environment Diagram Python Tutor</a:t>
-            </a:r>
-            <a:r>
-              <a:rPr lang="en-US" sz="2400" dirty="0">
-                <a:hlinkClick r:id="rId4"/>
-              </a:rPr>
-              <a:t>:</a:t>
-            </a:r>
-            <a:endParaRPr lang="en-US" sz="2400" dirty="0"/>
-          </a:p>
-          <a:p>
-            <a:pPr marL="0" indent="0">
-              <a:buNone/>
-            </a:pPr>
-            <a:r>
-              <a:rPr lang="en-US" sz="2400" dirty="0"/>
-              <a:t>Example 3:</a:t>
-            </a:r>
-          </a:p>
-          <a:p>
-            <a:r>
-              <a:rPr lang="en-US" sz="2400" dirty="0">
-                <a:hlinkClick r:id="rId5"/>
-              </a:rPr>
-              <a:t>Compose Python Tutor Link</a:t>
-            </a:r>
-            <a:endParaRPr lang="en-US" sz="2400" dirty="0"/>
-          </a:p>
-        </p:txBody>
-      </p:sp>
-      <p:sp>
-        <p:nvSpPr>
-          <p:cNvPr id="4" name="Footer Placeholder 3">
-            <a:extLst>
-              <a:ext uri="{FF2B5EF4-FFF2-40B4-BE49-F238E27FC236}">
-                <a16:creationId xmlns:a16="http://schemas.microsoft.com/office/drawing/2014/main" id="{F98321EF-8CA7-4B88-C14F-0290A39B3BC4}"/>
-              </a:ext>
-            </a:extLst>
-          </p:cNvPr>
-          <p:cNvSpPr>
-            <a:spLocks noGrp="1"/>
-          </p:cNvSpPr>
-          <p:nvPr>
-            <p:ph type="ftr" sz="quarter" idx="10"/>
-          </p:nvPr>
-        </p:nvSpPr>
-        <p:spPr>
-          <a:xfrm>
-            <a:off x="4038599" y="6356350"/>
-            <a:ext cx="4348655" cy="365125"/>
-          </a:xfrm>
-        </p:spPr>
-        <p:txBody>
-          <a:bodyPr/>
-          <a:lstStyle/>
-          <a:p>
-            <a:r>
-              <a:rPr lang="en-US" dirty="0"/>
-              <a:t>Michael Ball | UC Berkeley | https://c88c.org | © CC BY-NC-SA</a:t>
-            </a:r>
-          </a:p>
-        </p:txBody>
-      </p:sp>
-    </p:spTree>
-    <p:extLst>
-      <p:ext uri="{BB962C8B-B14F-4D97-AF65-F5344CB8AC3E}">
-        <p14:creationId xmlns:p14="http://schemas.microsoft.com/office/powerpoint/2010/main" val="776121693"/>
-      </p:ext>
-    </p:extLst>
-  </p:cSld>
-  <p:clrMapOvr>
-    <a:masterClrMapping/>
-  </p:clrMapOvr>
-</p:sld>
-</file>
-
-<file path=ppt/slides/slide23.xml><?xml version="1.0" encoding="utf-8"?>
-<p:sld xmlns:a="http://schemas.openxmlformats.org/drawingml/2006/main" xmlns:r="http://schemas.openxmlformats.org/officeDocument/2006/relationships" xmlns:p="http://schemas.openxmlformats.org/presentationml/2006/main">
-  <p:cSld>
-    <p:spTree>
-      <p:nvGrpSpPr>
-        <p:cNvPr id="1" name=""/>
-        <p:cNvGrpSpPr/>
-        <p:nvPr/>
-      </p:nvGrpSpPr>
-      <p:grpSpPr>
-        <a:xfrm>
-          <a:off x="0" y="0"/>
-          <a:ext cx="0" cy="0"/>
-          <a:chOff x="0" y="0"/>
-          <a:chExt cx="0" cy="0"/>
-        </a:xfrm>
-      </p:grpSpPr>
-      <p:sp>
-        <p:nvSpPr>
-          <p:cNvPr id="2" name="Title 1">
-            <a:extLst>
-              <a:ext uri="{FF2B5EF4-FFF2-40B4-BE49-F238E27FC236}">
                 <a16:creationId xmlns:a16="http://schemas.microsoft.com/office/drawing/2014/main" id="{3D058CAE-0705-B045-AD80-3D6241BFCD42}"/>
               </a:ext>
             </a:extLst>
@@ -14320,7 +13708,7 @@
 </p:sld>
 </file>
 
-<file path=ppt/slides/slide24.xml><?xml version="1.0" encoding="utf-8"?>
+<file path=ppt/slides/slide23.xml><?xml version="1.0" encoding="utf-8"?>
 <p:sld xmlns:a="http://schemas.openxmlformats.org/drawingml/2006/main" xmlns:r="http://schemas.openxmlformats.org/officeDocument/2006/relationships" xmlns:p="http://schemas.openxmlformats.org/presentationml/2006/main">
   <p:cSld>
     <p:spTree>
@@ -15614,13 +15002,7 @@
   <p:cSld>
     <p:spTree>
       <p:nvGrpSpPr>
-        <p:cNvPr id="1" name="">
-          <a:extLst>
-            <a:ext uri="{FF2B5EF4-FFF2-40B4-BE49-F238E27FC236}">
-              <a16:creationId xmlns:a16="http://schemas.microsoft.com/office/drawing/2014/main" id="{093AC4AF-5E4D-9A43-727C-9C63AF68E378}"/>
-            </a:ext>
-          </a:extLst>
-        </p:cNvPr>
+        <p:cNvPr id="1" name=""/>
         <p:cNvGrpSpPr/>
         <p:nvPr/>
       </p:nvGrpSpPr>
@@ -15637,7 +15019,7 @@
           <p:cNvPr id="2" name="Title 1">
             <a:extLst>
               <a:ext uri="{FF2B5EF4-FFF2-40B4-BE49-F238E27FC236}">
-                <a16:creationId xmlns:a16="http://schemas.microsoft.com/office/drawing/2014/main" id="{D5EDDD8D-F7A6-87EB-D7CF-451F58884030}"/>
+                <a16:creationId xmlns:a16="http://schemas.microsoft.com/office/drawing/2014/main" id="{D78DEC67-149D-7747-87F3-D940F8EF2C93}"/>
               </a:ext>
             </a:extLst>
           </p:cNvPr>
@@ -15665,7 +15047,7 @@
           <p:cNvPr id="3" name="Footer Placeholder 3">
             <a:extLst>
               <a:ext uri="{FF2B5EF4-FFF2-40B4-BE49-F238E27FC236}">
-                <a16:creationId xmlns:a16="http://schemas.microsoft.com/office/drawing/2014/main" id="{55666DC2-17A3-DA6B-9BFE-036E767F5A13}"/>
+                <a16:creationId xmlns:a16="http://schemas.microsoft.com/office/drawing/2014/main" id="{945EF9C5-F59D-F53F-E807-CF0E2DF60EA6}"/>
               </a:ext>
             </a:extLst>
           </p:cNvPr>
@@ -15698,7 +15080,7 @@
           <p:cNvPr id="5" name="Rectangle 4">
             <a:extLst>
               <a:ext uri="{FF2B5EF4-FFF2-40B4-BE49-F238E27FC236}">
-                <a16:creationId xmlns:a16="http://schemas.microsoft.com/office/drawing/2014/main" id="{76FBC101-3046-6855-59CA-2963E80BEBF6}"/>
+                <a16:creationId xmlns:a16="http://schemas.microsoft.com/office/drawing/2014/main" id="{F4E01054-B4B8-BC41-8667-60CEB7A01846}"/>
               </a:ext>
             </a:extLst>
           </p:cNvPr>
@@ -15708,7 +15090,7 @@
         <p:spPr>
           <a:xfrm>
             <a:off x="533400" y="1081668"/>
-            <a:ext cx="8610600" cy="2308324"/>
+            <a:ext cx="8610600" cy="3139321"/>
           </a:xfrm>
           <a:prstGeom prst="rect">
             <a:avLst/>
@@ -15719,181 +15101,6 @@
             <a:spAutoFit/>
           </a:bodyPr>
           <a:lstStyle/>
-          <a:p>
-            <a:pPr>
-              <a:lnSpc>
-                <a:spcPct val="100000"/>
-              </a:lnSpc>
-            </a:pPr>
-            <a:r>
-              <a:rPr lang="en-US" spc="-1" dirty="0">
-                <a:solidFill>
-                  <a:srgbClr val="000000"/>
-                </a:solidFill>
-                <a:uFill>
-                  <a:solidFill>
-                    <a:srgbClr val="FFFFFF"/>
-                  </a:solidFill>
-                </a:uFill>
-                <a:latin typeface="Source Code Pro" panose="020B0509030403020204" pitchFamily="49" charset="77"/>
-              </a:rPr>
-              <a:t>def acronym(sentence):</a:t>
-            </a:r>
-          </a:p>
-          <a:p>
-            <a:pPr>
-              <a:lnSpc>
-                <a:spcPct val="100000"/>
-              </a:lnSpc>
-            </a:pPr>
-            <a:r>
-              <a:rPr lang="en-US" spc="-1" dirty="0">
-                <a:solidFill>
-                  <a:srgbClr val="000000"/>
-                </a:solidFill>
-                <a:uFill>
-                  <a:solidFill>
-                    <a:srgbClr val="FFFFFF"/>
-                  </a:solidFill>
-                </a:uFill>
-                <a:latin typeface="Source Code Pro" panose="020B0509030403020204" pitchFamily="49" charset="77"/>
-              </a:rPr>
-              <a:t>    """</a:t>
-            </a:r>
-          </a:p>
-          <a:p>
-            <a:pPr>
-              <a:lnSpc>
-                <a:spcPct val="100000"/>
-              </a:lnSpc>
-            </a:pPr>
-            <a:r>
-              <a:rPr lang="en-US" spc="-1" dirty="0">
-                <a:solidFill>
-                  <a:srgbClr val="000000"/>
-                </a:solidFill>
-                <a:uFill>
-                  <a:solidFill>
-                    <a:srgbClr val="FFFFFF"/>
-                  </a:solidFill>
-                </a:uFill>
-                <a:latin typeface="Source Code Pro" panose="020B0509030403020204" pitchFamily="49" charset="77"/>
-              </a:rPr>
-              <a:t>    &gt;&gt;&gt; acronym("The University of California at Berkeley")</a:t>
-            </a:r>
-          </a:p>
-          <a:p>
-            <a:pPr>
-              <a:lnSpc>
-                <a:spcPct val="100000"/>
-              </a:lnSpc>
-            </a:pPr>
-            <a:r>
-              <a:rPr lang="en-US" spc="-1" dirty="0">
-                <a:solidFill>
-                  <a:srgbClr val="000000"/>
-                </a:solidFill>
-                <a:uFill>
-                  <a:solidFill>
-                    <a:srgbClr val="FFFFFF"/>
-                  </a:solidFill>
-                </a:uFill>
-                <a:latin typeface="Source Code Pro" panose="020B0509030403020204" pitchFamily="49" charset="77"/>
-              </a:rPr>
-              <a:t>    "UCB"</a:t>
-            </a:r>
-          </a:p>
-          <a:p>
-            <a:pPr>
-              <a:lnSpc>
-                <a:spcPct val="100000"/>
-              </a:lnSpc>
-            </a:pPr>
-            <a:r>
-              <a:rPr lang="en-US" spc="-1" dirty="0">
-                <a:solidFill>
-                  <a:srgbClr val="000000"/>
-                </a:solidFill>
-                <a:uFill>
-                  <a:solidFill>
-                    <a:srgbClr val="FFFFFF"/>
-                  </a:solidFill>
-                </a:uFill>
-                <a:latin typeface="Source Code Pro" panose="020B0509030403020204" pitchFamily="49" charset="77"/>
-              </a:rPr>
-              <a:t>    """</a:t>
-            </a:r>
-          </a:p>
-          <a:p>
-            <a:pPr>
-              <a:lnSpc>
-                <a:spcPct val="100000"/>
-              </a:lnSpc>
-            </a:pPr>
-            <a:r>
-              <a:rPr lang="en-US" spc="-1" dirty="0">
-                <a:solidFill>
-                  <a:srgbClr val="000000"/>
-                </a:solidFill>
-                <a:uFill>
-                  <a:solidFill>
-                    <a:srgbClr val="FFFFFF"/>
-                  </a:solidFill>
-                </a:uFill>
-                <a:latin typeface="Source Code Pro" panose="020B0509030403020204" pitchFamily="49" charset="77"/>
-              </a:rPr>
-              <a:t>    words = </a:t>
-            </a:r>
-            <a:r>
-              <a:rPr lang="en-US" spc="-1" dirty="0" err="1">
-                <a:solidFill>
-                  <a:srgbClr val="000000"/>
-                </a:solidFill>
-                <a:uFill>
-                  <a:solidFill>
-                    <a:srgbClr val="FFFFFF"/>
-                  </a:solidFill>
-                </a:uFill>
-                <a:latin typeface="Source Code Pro" panose="020B0509030403020204" pitchFamily="49" charset="77"/>
-              </a:rPr>
-              <a:t>sentence.split</a:t>
-            </a:r>
-            <a:r>
-              <a:rPr lang="en-US" spc="-1" dirty="0">
-                <a:solidFill>
-                  <a:srgbClr val="000000"/>
-                </a:solidFill>
-                <a:uFill>
-                  <a:solidFill>
-                    <a:srgbClr val="FFFFFF"/>
-                  </a:solidFill>
-                </a:uFill>
-                <a:latin typeface="Source Code Pro" panose="020B0509030403020204" pitchFamily="49" charset="77"/>
-              </a:rPr>
-              <a:t>()</a:t>
-            </a:r>
-          </a:p>
-          <a:p>
-            <a:pPr>
-              <a:lnSpc>
-                <a:spcPct val="100000"/>
-              </a:lnSpc>
-            </a:pPr>
-            <a:r>
-              <a:rPr lang="en-US" spc="-1" dirty="0">
-                <a:solidFill>
-                  <a:srgbClr val="000000"/>
-                </a:solidFill>
-                <a:uFill>
-                  <a:solidFill>
-                    <a:srgbClr val="FFFFFF"/>
-                  </a:solidFill>
-                </a:uFill>
-                <a:latin typeface="Source Code Pro" panose="020B0509030403020204" pitchFamily="49" charset="77"/>
-              </a:rPr>
-              <a:t>    return "YOUR CODE HERE"</a:t>
-            </a:r>
-          </a:p>
           <a:p>
             <a:pPr>
               <a:lnSpc>
@@ -15912,6 +15119,301 @@
               <a:latin typeface="Source Code Pro" panose="020B0509030403020204" pitchFamily="49" charset="77"/>
             </a:endParaRPr>
           </a:p>
+          <a:p>
+            <a:pPr>
+              <a:lnSpc>
+                <a:spcPct val="100000"/>
+              </a:lnSpc>
+            </a:pPr>
+            <a:r>
+              <a:rPr lang="en-US" spc="-1" dirty="0">
+                <a:solidFill>
+                  <a:srgbClr val="000000"/>
+                </a:solidFill>
+                <a:uFill>
+                  <a:solidFill>
+                    <a:srgbClr val="FFFFFF"/>
+                  </a:solidFill>
+                </a:uFill>
+                <a:latin typeface="Source Code Pro" panose="020B0509030403020204" pitchFamily="49" charset="77"/>
+              </a:rPr>
+              <a:t>Input: "The University of California at Berkeley"</a:t>
+            </a:r>
+          </a:p>
+          <a:p>
+            <a:pPr>
+              <a:lnSpc>
+                <a:spcPct val="100000"/>
+              </a:lnSpc>
+            </a:pPr>
+            <a:endParaRPr lang="en-US" spc="-1" dirty="0">
+              <a:solidFill>
+                <a:srgbClr val="000000"/>
+              </a:solidFill>
+              <a:uFill>
+                <a:solidFill>
+                  <a:srgbClr val="FFFFFF"/>
+                </a:solidFill>
+              </a:uFill>
+              <a:latin typeface="Source Code Pro" panose="020B0509030403020204" pitchFamily="49" charset="77"/>
+            </a:endParaRPr>
+          </a:p>
+          <a:p>
+            <a:pPr>
+              <a:lnSpc>
+                <a:spcPct val="100000"/>
+              </a:lnSpc>
+            </a:pPr>
+            <a:r>
+              <a:rPr lang="en-US" spc="-1" dirty="0">
+                <a:solidFill>
+                  <a:srgbClr val="000000"/>
+                </a:solidFill>
+                <a:uFill>
+                  <a:solidFill>
+                    <a:srgbClr val="FFFFFF"/>
+                  </a:solidFill>
+                </a:uFill>
+                <a:latin typeface="Source Code Pro" panose="020B0509030403020204" pitchFamily="49" charset="77"/>
+              </a:rPr>
+              <a:t>Output: "UCB"</a:t>
+            </a:r>
+          </a:p>
+          <a:p>
+            <a:pPr>
+              <a:lnSpc>
+                <a:spcPct val="100000"/>
+              </a:lnSpc>
+            </a:pPr>
+            <a:r>
+              <a:rPr lang="en-US" spc="-1" dirty="0">
+                <a:solidFill>
+                  <a:srgbClr val="000000"/>
+                </a:solidFill>
+                <a:uFill>
+                  <a:solidFill>
+                    <a:srgbClr val="FFFFFF"/>
+                  </a:solidFill>
+                </a:uFill>
+                <a:latin typeface="Source Code Pro" panose="020B0509030403020204" pitchFamily="49" charset="77"/>
+              </a:rPr>
+              <a:t>def acronym(sentence):</a:t>
+            </a:r>
+          </a:p>
+          <a:p>
+            <a:pPr>
+              <a:lnSpc>
+                <a:spcPct val="100000"/>
+              </a:lnSpc>
+            </a:pPr>
+            <a:r>
+              <a:rPr lang="en-US" spc="-1" dirty="0">
+                <a:solidFill>
+                  <a:srgbClr val="000000"/>
+                </a:solidFill>
+                <a:uFill>
+                  <a:solidFill>
+                    <a:srgbClr val="FFFFFF"/>
+                  </a:solidFill>
+                </a:uFill>
+                <a:latin typeface="Source Code Pro" panose="020B0509030403020204" pitchFamily="49" charset="77"/>
+              </a:rPr>
+              <a:t>    """ (Some </a:t>
+            </a:r>
+            <a:r>
+              <a:rPr lang="en-US" spc="-1" dirty="0" err="1">
+                <a:solidFill>
+                  <a:srgbClr val="000000"/>
+                </a:solidFill>
+                <a:uFill>
+                  <a:solidFill>
+                    <a:srgbClr val="FFFFFF"/>
+                  </a:solidFill>
+                </a:uFill>
+                <a:latin typeface="Source Code Pro" panose="020B0509030403020204" pitchFamily="49" charset="77"/>
+              </a:rPr>
+              <a:t>doctests</a:t>
+            </a:r>
+            <a:r>
+              <a:rPr lang="en-US" spc="-1" dirty="0">
+                <a:solidFill>
+                  <a:srgbClr val="000000"/>
+                </a:solidFill>
+                <a:uFill>
+                  <a:solidFill>
+                    <a:srgbClr val="FFFFFF"/>
+                  </a:solidFill>
+                </a:uFill>
+                <a:latin typeface="Source Code Pro" panose="020B0509030403020204" pitchFamily="49" charset="77"/>
+              </a:rPr>
+              <a:t>)</a:t>
+            </a:r>
+          </a:p>
+          <a:p>
+            <a:pPr>
+              <a:lnSpc>
+                <a:spcPct val="100000"/>
+              </a:lnSpc>
+            </a:pPr>
+            <a:r>
+              <a:rPr lang="en-US" spc="-1" dirty="0">
+                <a:solidFill>
+                  <a:srgbClr val="000000"/>
+                </a:solidFill>
+                <a:uFill>
+                  <a:solidFill>
+                    <a:srgbClr val="FFFFFF"/>
+                  </a:solidFill>
+                </a:uFill>
+                <a:latin typeface="Source Code Pro" panose="020B0509030403020204" pitchFamily="49" charset="77"/>
+              </a:rPr>
+              <a:t>    """</a:t>
+            </a:r>
+          </a:p>
+          <a:p>
+            <a:pPr>
+              <a:lnSpc>
+                <a:spcPct val="100000"/>
+              </a:lnSpc>
+            </a:pPr>
+            <a:r>
+              <a:rPr lang="en-US" spc="-1" dirty="0">
+                <a:solidFill>
+                  <a:srgbClr val="000000"/>
+                </a:solidFill>
+                <a:uFill>
+                  <a:solidFill>
+                    <a:srgbClr val="FFFFFF"/>
+                  </a:solidFill>
+                </a:uFill>
+                <a:latin typeface="Source Code Pro" panose="020B0509030403020204" pitchFamily="49" charset="77"/>
+              </a:rPr>
+              <a:t>    words = </a:t>
+            </a:r>
+            <a:r>
+              <a:rPr lang="en-US" spc="-1" dirty="0" err="1">
+                <a:solidFill>
+                  <a:srgbClr val="000000"/>
+                </a:solidFill>
+                <a:uFill>
+                  <a:solidFill>
+                    <a:srgbClr val="FFFFFF"/>
+                  </a:solidFill>
+                </a:uFill>
+                <a:latin typeface="Source Code Pro" panose="020B0509030403020204" pitchFamily="49" charset="77"/>
+              </a:rPr>
+              <a:t>sentence.split</a:t>
+            </a:r>
+            <a:r>
+              <a:rPr lang="en-US" spc="-1" dirty="0">
+                <a:solidFill>
+                  <a:srgbClr val="000000"/>
+                </a:solidFill>
+                <a:uFill>
+                  <a:solidFill>
+                    <a:srgbClr val="FFFFFF"/>
+                  </a:solidFill>
+                </a:uFill>
+                <a:latin typeface="Source Code Pro" panose="020B0509030403020204" pitchFamily="49" charset="77"/>
+              </a:rPr>
+              <a:t>()</a:t>
+            </a:r>
+          </a:p>
+          <a:p>
+            <a:pPr>
+              <a:lnSpc>
+                <a:spcPct val="100000"/>
+              </a:lnSpc>
+            </a:pPr>
+            <a:r>
+              <a:rPr lang="en-US" spc="-1" dirty="0">
+                <a:solidFill>
+                  <a:srgbClr val="000000"/>
+                </a:solidFill>
+                <a:uFill>
+                  <a:solidFill>
+                    <a:srgbClr val="FFFFFF"/>
+                  </a:solidFill>
+                </a:uFill>
+                <a:latin typeface="Source Code Pro" panose="020B0509030403020204" pitchFamily="49" charset="77"/>
+              </a:rPr>
+              <a:t>    return reduce(add, map(</a:t>
+            </a:r>
+            <a:r>
+              <a:rPr lang="en-US" spc="-1" dirty="0" err="1">
+                <a:solidFill>
+                  <a:srgbClr val="000000"/>
+                </a:solidFill>
+                <a:uFill>
+                  <a:solidFill>
+                    <a:srgbClr val="FFFFFF"/>
+                  </a:solidFill>
+                </a:uFill>
+                <a:latin typeface="Source Code Pro" panose="020B0509030403020204" pitchFamily="49" charset="77"/>
+              </a:rPr>
+              <a:t>first_letter</a:t>
+            </a:r>
+            <a:r>
+              <a:rPr lang="en-US" spc="-1" dirty="0">
+                <a:solidFill>
+                  <a:srgbClr val="000000"/>
+                </a:solidFill>
+                <a:uFill>
+                  <a:solidFill>
+                    <a:srgbClr val="FFFFFF"/>
+                  </a:solidFill>
+                </a:uFill>
+                <a:latin typeface="Source Code Pro" panose="020B0509030403020204" pitchFamily="49" charset="77"/>
+              </a:rPr>
+              <a:t>, filter(</a:t>
+            </a:r>
+            <a:r>
+              <a:rPr lang="en-US" spc="-1" dirty="0" err="1">
+                <a:solidFill>
+                  <a:srgbClr val="000000"/>
+                </a:solidFill>
+                <a:uFill>
+                  <a:solidFill>
+                    <a:srgbClr val="FFFFFF"/>
+                  </a:solidFill>
+                </a:uFill>
+                <a:latin typeface="Source Code Pro" panose="020B0509030403020204" pitchFamily="49" charset="77"/>
+              </a:rPr>
+              <a:t>long_word</a:t>
+            </a:r>
+            <a:r>
+              <a:rPr lang="en-US" spc="-1" dirty="0">
+                <a:solidFill>
+                  <a:srgbClr val="000000"/>
+                </a:solidFill>
+                <a:uFill>
+                  <a:solidFill>
+                    <a:srgbClr val="FFFFFF"/>
+                  </a:solidFill>
+                </a:uFill>
+                <a:latin typeface="Source Code Pro" panose="020B0509030403020204" pitchFamily="49" charset="77"/>
+              </a:rPr>
+              <a:t>, words)))</a:t>
+            </a:r>
+          </a:p>
+          <a:p>
+            <a:pPr>
+              <a:lnSpc>
+                <a:spcPct val="100000"/>
+              </a:lnSpc>
+            </a:pPr>
+            <a:endParaRPr lang="en-US" spc="-1" dirty="0">
+              <a:solidFill>
+                <a:srgbClr val="000000"/>
+              </a:solidFill>
+              <a:uFill>
+                <a:solidFill>
+                  <a:srgbClr val="FFFFFF"/>
+                </a:solidFill>
+              </a:uFill>
+              <a:latin typeface="Source Code Pro" panose="020B0509030403020204" pitchFamily="49" charset="77"/>
+            </a:endParaRPr>
+          </a:p>
         </p:txBody>
       </p:sp>
       <p:sp>
@@ -15919,7 +15421,7 @@
           <p:cNvPr id="7" name="TextShape 11">
             <a:extLst>
               <a:ext uri="{FF2B5EF4-FFF2-40B4-BE49-F238E27FC236}">
-                <a16:creationId xmlns:a16="http://schemas.microsoft.com/office/drawing/2014/main" id="{FBB37F23-03A0-B7ED-65E5-CFFF81253EE7}"/>
+                <a16:creationId xmlns:a16="http://schemas.microsoft.com/office/drawing/2014/main" id="{55609106-671F-E84E-8744-3B2453668F27}"/>
               </a:ext>
             </a:extLst>
           </p:cNvPr>
@@ -16017,7 +15519,7 @@
     </p:spTree>
     <p:extLst>
       <p:ext uri="{BB962C8B-B14F-4D97-AF65-F5344CB8AC3E}">
-        <p14:creationId xmlns:p14="http://schemas.microsoft.com/office/powerpoint/2010/main" val="251180740"/>
+        <p14:creationId xmlns:p14="http://schemas.microsoft.com/office/powerpoint/2010/main" val="3338411237"/>
       </p:ext>
     </p:extLst>
   </p:cSld>
@@ -16049,7 +15551,7 @@
           <p:cNvPr id="2" name="Title 1">
             <a:extLst>
               <a:ext uri="{FF2B5EF4-FFF2-40B4-BE49-F238E27FC236}">
-                <a16:creationId xmlns:a16="http://schemas.microsoft.com/office/drawing/2014/main" id="{D78DEC67-149D-7747-87F3-D940F8EF2C93}"/>
+                <a16:creationId xmlns:a16="http://schemas.microsoft.com/office/drawing/2014/main" id="{4C391A7B-517B-1F28-7683-AA06AF06A49F}"/>
               </a:ext>
             </a:extLst>
           </p:cNvPr>
@@ -16067,17 +15569,251 @@
           <a:p>
             <a:r>
               <a:rPr lang="en-US" dirty="0"/>
-              <a:t>Today’s Task: Acronym</a:t>
-            </a:r>
-          </a:p>
-        </p:txBody>
-      </p:sp>
-      <p:sp>
-        <p:nvSpPr>
-          <p:cNvPr id="3" name="Footer Placeholder 3">
+              <a:t>Acronym With HOFs</a:t>
+            </a:r>
+          </a:p>
+        </p:txBody>
+      </p:sp>
+      <p:sp>
+        <p:nvSpPr>
+          <p:cNvPr id="3" name="Content Placeholder 2">
             <a:extLst>
               <a:ext uri="{FF2B5EF4-FFF2-40B4-BE49-F238E27FC236}">
-                <a16:creationId xmlns:a16="http://schemas.microsoft.com/office/drawing/2014/main" id="{945EF9C5-F59D-F53F-E807-CF0E2DF60EA6}"/>
+                <a16:creationId xmlns:a16="http://schemas.microsoft.com/office/drawing/2014/main" id="{0EBA5618-B947-D60E-CA5F-2F85BE526602}"/>
+              </a:ext>
+            </a:extLst>
+          </p:cNvPr>
+          <p:cNvSpPr>
+            <a:spLocks noGrp="1"/>
+          </p:cNvSpPr>
+          <p:nvPr>
+            <p:ph idx="1"/>
+          </p:nvPr>
+        </p:nvSpPr>
+        <p:spPr/>
+        <p:txBody>
+          <a:bodyPr/>
+          <a:lstStyle/>
+          <a:p>
+            <a:pPr marL="0" indent="0">
+              <a:buNone/>
+            </a:pPr>
+            <a:r>
+              <a:rPr lang="en-US" dirty="0"/>
+              <a:t>What is we want to control the filtering method?</a:t>
+            </a:r>
+          </a:p>
+          <a:p>
+            <a:pPr marL="0" indent="0">
+              <a:buNone/>
+            </a:pPr>
+            <a:endParaRPr lang="en-US" dirty="0"/>
+          </a:p>
+          <a:p>
+            <a:pPr marL="0" indent="0">
+              <a:buNone/>
+            </a:pPr>
+            <a:r>
+              <a:rPr lang="en-US" dirty="0">
+                <a:latin typeface="Source Code Pro" panose="020B0509030403020204" pitchFamily="49" charset="77"/>
+              </a:rPr>
+              <a:t>def </a:t>
+            </a:r>
+            <a:r>
+              <a:rPr lang="en-US" dirty="0" err="1">
+                <a:latin typeface="Source Code Pro" panose="020B0509030403020204" pitchFamily="49" charset="77"/>
+              </a:rPr>
+              <a:t>keep_words</a:t>
+            </a:r>
+            <a:r>
+              <a:rPr lang="en-US" dirty="0">
+                <a:latin typeface="Source Code Pro" panose="020B0509030403020204" pitchFamily="49" charset="77"/>
+              </a:rPr>
+              <a:t>(word):</a:t>
+            </a:r>
+          </a:p>
+          <a:p>
+            <a:pPr marL="0" indent="0">
+              <a:buNone/>
+            </a:pPr>
+            <a:r>
+              <a:rPr lang="en-US" dirty="0">
+                <a:latin typeface="Source Code Pro" panose="020B0509030403020204" pitchFamily="49" charset="77"/>
+              </a:rPr>
+              <a:t>    specials = ['Los']</a:t>
+            </a:r>
+          </a:p>
+          <a:p>
+            <a:pPr marL="0" indent="0">
+              <a:buNone/>
+            </a:pPr>
+            <a:r>
+              <a:rPr lang="en-US" dirty="0">
+                <a:latin typeface="Source Code Pro" panose="020B0509030403020204" pitchFamily="49" charset="77"/>
+              </a:rPr>
+              <a:t>    return word in specials or </a:t>
+            </a:r>
+            <a:r>
+              <a:rPr lang="en-US" dirty="0" err="1">
+                <a:latin typeface="Source Code Pro" panose="020B0509030403020204" pitchFamily="49" charset="77"/>
+              </a:rPr>
+              <a:t>long_word</a:t>
+            </a:r>
+            <a:r>
+              <a:rPr lang="en-US" dirty="0">
+                <a:latin typeface="Source Code Pro" panose="020B0509030403020204" pitchFamily="49" charset="77"/>
+              </a:rPr>
+              <a:t>(word)</a:t>
+            </a:r>
+          </a:p>
+          <a:p>
+            <a:pPr marL="0" indent="0">
+              <a:buNone/>
+            </a:pPr>
+            <a:endParaRPr lang="en-US" dirty="0">
+              <a:latin typeface="Source Code Pro" panose="020B0509030403020204" pitchFamily="49" charset="77"/>
+            </a:endParaRPr>
+          </a:p>
+          <a:p>
+            <a:pPr marL="0" indent="0">
+              <a:buNone/>
+            </a:pPr>
+            <a:r>
+              <a:rPr lang="en-US" dirty="0">
+                <a:latin typeface="Source Code Pro" panose="020B0509030403020204" pitchFamily="49" charset="77"/>
+              </a:rPr>
+              <a:t>def </a:t>
+            </a:r>
+            <a:r>
+              <a:rPr lang="en-US" dirty="0" err="1">
+                <a:latin typeface="Source Code Pro" panose="020B0509030403020204" pitchFamily="49" charset="77"/>
+              </a:rPr>
+              <a:t>acronym_hof</a:t>
+            </a:r>
+            <a:r>
+              <a:rPr lang="en-US" dirty="0">
+                <a:latin typeface="Source Code Pro" panose="020B0509030403020204" pitchFamily="49" charset="77"/>
+              </a:rPr>
+              <a:t>(sentence, </a:t>
+            </a:r>
+            <a:r>
+              <a:rPr lang="en-US" b="1" dirty="0" err="1">
+                <a:latin typeface="Source Code Pro" panose="020B0509030403020204" pitchFamily="49" charset="77"/>
+              </a:rPr>
+              <a:t>filter_fn</a:t>
+            </a:r>
+            <a:r>
+              <a:rPr lang="en-US" dirty="0">
+                <a:latin typeface="Source Code Pro" panose="020B0509030403020204" pitchFamily="49" charset="77"/>
+              </a:rPr>
+              <a:t>):</a:t>
+            </a:r>
+          </a:p>
+          <a:p>
+            <a:pPr marL="0" indent="0">
+              <a:buNone/>
+            </a:pPr>
+            <a:r>
+              <a:rPr lang="en-US" dirty="0">
+                <a:latin typeface="Source Code Pro" panose="020B0509030403020204" pitchFamily="49" charset="77"/>
+              </a:rPr>
+              <a:t>    words = </a:t>
+            </a:r>
+            <a:r>
+              <a:rPr lang="en-US" dirty="0" err="1">
+                <a:latin typeface="Source Code Pro" panose="020B0509030403020204" pitchFamily="49" charset="77"/>
+              </a:rPr>
+              <a:t>sentence.split</a:t>
+            </a:r>
+            <a:r>
+              <a:rPr lang="en-US" dirty="0">
+                <a:latin typeface="Source Code Pro" panose="020B0509030403020204" pitchFamily="49" charset="77"/>
+              </a:rPr>
+              <a:t>()</a:t>
+            </a:r>
+          </a:p>
+          <a:p>
+            <a:pPr marL="0" indent="0">
+              <a:buNone/>
+            </a:pPr>
+            <a:r>
+              <a:rPr lang="en-US" dirty="0">
+                <a:latin typeface="Source Code Pro" panose="020B0509030403020204" pitchFamily="49" charset="77"/>
+              </a:rPr>
+              <a:t>    return reduce(add, map(</a:t>
+            </a:r>
+            <a:r>
+              <a:rPr lang="en-US" dirty="0" err="1">
+                <a:latin typeface="Source Code Pro" panose="020B0509030403020204" pitchFamily="49" charset="77"/>
+              </a:rPr>
+              <a:t>first_letter</a:t>
+            </a:r>
+            <a:r>
+              <a:rPr lang="en-US" dirty="0">
+                <a:latin typeface="Source Code Pro" panose="020B0509030403020204" pitchFamily="49" charset="77"/>
+              </a:rPr>
+              <a:t>, filter(</a:t>
+            </a:r>
+            <a:r>
+              <a:rPr lang="en-US" b="1" dirty="0" err="1">
+                <a:latin typeface="Source Code Pro" panose="020B0509030403020204" pitchFamily="49" charset="77"/>
+              </a:rPr>
+              <a:t>filter_fn</a:t>
+            </a:r>
+            <a:r>
+              <a:rPr lang="en-US" dirty="0">
+                <a:latin typeface="Source Code Pro" panose="020B0509030403020204" pitchFamily="49" charset="77"/>
+              </a:rPr>
+              <a:t>, words)))</a:t>
+            </a:r>
+          </a:p>
+          <a:p>
+            <a:pPr marL="0" indent="0">
+              <a:buNone/>
+            </a:pPr>
+            <a:endParaRPr lang="en-US" dirty="0"/>
+          </a:p>
+          <a:p>
+            <a:pPr marL="0" indent="0">
+              <a:buNone/>
+            </a:pPr>
+            <a:r>
+              <a:rPr lang="en-US" dirty="0" err="1">
+                <a:latin typeface="Source Code Pro" panose="020B0309030403020204" pitchFamily="34" charset="0"/>
+                <a:ea typeface="Source Code Pro" panose="020B0309030403020204" pitchFamily="34" charset="0"/>
+              </a:rPr>
+              <a:t>acronym_hof</a:t>
+            </a:r>
+            <a:r>
+              <a:rPr lang="en-US" dirty="0">
+                <a:latin typeface="Source Code Pro" panose="020B0309030403020204" pitchFamily="34" charset="0"/>
+                <a:ea typeface="Source Code Pro" panose="020B0309030403020204" pitchFamily="34" charset="0"/>
+              </a:rPr>
+              <a:t>(copycats, </a:t>
+            </a:r>
+            <a:r>
+              <a:rPr lang="en-US" dirty="0" err="1">
+                <a:latin typeface="Source Code Pro" panose="020B0309030403020204" pitchFamily="34" charset="0"/>
+                <a:ea typeface="Source Code Pro" panose="020B0309030403020204" pitchFamily="34" charset="0"/>
+              </a:rPr>
+              <a:t>keep_words</a:t>
+            </a:r>
+            <a:r>
+              <a:rPr lang="en-US" dirty="0">
+                <a:latin typeface="Source Code Pro" panose="020B0309030403020204" pitchFamily="34" charset="0"/>
+                <a:ea typeface="Source Code Pro" panose="020B0309030403020204" pitchFamily="34" charset="0"/>
+              </a:rPr>
+              <a:t>)</a:t>
+            </a:r>
+          </a:p>
+        </p:txBody>
+      </p:sp>
+      <p:sp>
+        <p:nvSpPr>
+          <p:cNvPr id="4" name="Footer Placeholder 3">
+            <a:extLst>
+              <a:ext uri="{FF2B5EF4-FFF2-40B4-BE49-F238E27FC236}">
+                <a16:creationId xmlns:a16="http://schemas.microsoft.com/office/drawing/2014/main" id="{9190173E-420E-9A58-E65B-E03B8A83BE80}"/>
               </a:ext>
             </a:extLst>
           </p:cNvPr>
@@ -16105,451 +15841,10 @@
           </a:p>
         </p:txBody>
       </p:sp>
-      <p:sp>
-        <p:nvSpPr>
-          <p:cNvPr id="5" name="Rectangle 4">
-            <a:extLst>
-              <a:ext uri="{FF2B5EF4-FFF2-40B4-BE49-F238E27FC236}">
-                <a16:creationId xmlns:a16="http://schemas.microsoft.com/office/drawing/2014/main" id="{F4E01054-B4B8-BC41-8667-60CEB7A01846}"/>
-              </a:ext>
-            </a:extLst>
-          </p:cNvPr>
-          <p:cNvSpPr/>
-          <p:nvPr/>
-        </p:nvSpPr>
-        <p:spPr>
-          <a:xfrm>
-            <a:off x="533400" y="1081668"/>
-            <a:ext cx="8610600" cy="3139321"/>
-          </a:xfrm>
-          <a:prstGeom prst="rect">
-            <a:avLst/>
-          </a:prstGeom>
-        </p:spPr>
-        <p:txBody>
-          <a:bodyPr wrap="square">
-            <a:spAutoFit/>
-          </a:bodyPr>
-          <a:lstStyle/>
-          <a:p>
-            <a:pPr>
-              <a:lnSpc>
-                <a:spcPct val="100000"/>
-              </a:lnSpc>
-            </a:pPr>
-            <a:endParaRPr lang="en-US" spc="-1" dirty="0">
-              <a:solidFill>
-                <a:srgbClr val="000000"/>
-              </a:solidFill>
-              <a:uFill>
-                <a:solidFill>
-                  <a:srgbClr val="FFFFFF"/>
-                </a:solidFill>
-              </a:uFill>
-              <a:latin typeface="Source Code Pro" panose="020B0509030403020204" pitchFamily="49" charset="77"/>
-            </a:endParaRPr>
-          </a:p>
-          <a:p>
-            <a:pPr>
-              <a:lnSpc>
-                <a:spcPct val="100000"/>
-              </a:lnSpc>
-            </a:pPr>
-            <a:r>
-              <a:rPr lang="en-US" spc="-1" dirty="0">
-                <a:solidFill>
-                  <a:srgbClr val="000000"/>
-                </a:solidFill>
-                <a:uFill>
-                  <a:solidFill>
-                    <a:srgbClr val="FFFFFF"/>
-                  </a:solidFill>
-                </a:uFill>
-                <a:latin typeface="Source Code Pro" panose="020B0509030403020204" pitchFamily="49" charset="77"/>
-              </a:rPr>
-              <a:t>Input: "The University of California at Berkeley"</a:t>
-            </a:r>
-          </a:p>
-          <a:p>
-            <a:pPr>
-              <a:lnSpc>
-                <a:spcPct val="100000"/>
-              </a:lnSpc>
-            </a:pPr>
-            <a:endParaRPr lang="en-US" spc="-1" dirty="0">
-              <a:solidFill>
-                <a:srgbClr val="000000"/>
-              </a:solidFill>
-              <a:uFill>
-                <a:solidFill>
-                  <a:srgbClr val="FFFFFF"/>
-                </a:solidFill>
-              </a:uFill>
-              <a:latin typeface="Source Code Pro" panose="020B0509030403020204" pitchFamily="49" charset="77"/>
-            </a:endParaRPr>
-          </a:p>
-          <a:p>
-            <a:pPr>
-              <a:lnSpc>
-                <a:spcPct val="100000"/>
-              </a:lnSpc>
-            </a:pPr>
-            <a:r>
-              <a:rPr lang="en-US" spc="-1" dirty="0">
-                <a:solidFill>
-                  <a:srgbClr val="000000"/>
-                </a:solidFill>
-                <a:uFill>
-                  <a:solidFill>
-                    <a:srgbClr val="FFFFFF"/>
-                  </a:solidFill>
-                </a:uFill>
-                <a:latin typeface="Source Code Pro" panose="020B0509030403020204" pitchFamily="49" charset="77"/>
-              </a:rPr>
-              <a:t>Output: "UCB"</a:t>
-            </a:r>
-          </a:p>
-          <a:p>
-            <a:pPr>
-              <a:lnSpc>
-                <a:spcPct val="100000"/>
-              </a:lnSpc>
-            </a:pPr>
-            <a:r>
-              <a:rPr lang="en-US" spc="-1" dirty="0">
-                <a:solidFill>
-                  <a:srgbClr val="000000"/>
-                </a:solidFill>
-                <a:uFill>
-                  <a:solidFill>
-                    <a:srgbClr val="FFFFFF"/>
-                  </a:solidFill>
-                </a:uFill>
-                <a:latin typeface="Source Code Pro" panose="020B0509030403020204" pitchFamily="49" charset="77"/>
-              </a:rPr>
-              <a:t>def acronym(sentence):</a:t>
-            </a:r>
-          </a:p>
-          <a:p>
-            <a:pPr>
-              <a:lnSpc>
-                <a:spcPct val="100000"/>
-              </a:lnSpc>
-            </a:pPr>
-            <a:r>
-              <a:rPr lang="en-US" spc="-1" dirty="0">
-                <a:solidFill>
-                  <a:srgbClr val="000000"/>
-                </a:solidFill>
-                <a:uFill>
-                  <a:solidFill>
-                    <a:srgbClr val="FFFFFF"/>
-                  </a:solidFill>
-                </a:uFill>
-                <a:latin typeface="Source Code Pro" panose="020B0509030403020204" pitchFamily="49" charset="77"/>
-              </a:rPr>
-              <a:t>    """ (Some </a:t>
-            </a:r>
-            <a:r>
-              <a:rPr lang="en-US" spc="-1" dirty="0" err="1">
-                <a:solidFill>
-                  <a:srgbClr val="000000"/>
-                </a:solidFill>
-                <a:uFill>
-                  <a:solidFill>
-                    <a:srgbClr val="FFFFFF"/>
-                  </a:solidFill>
-                </a:uFill>
-                <a:latin typeface="Source Code Pro" panose="020B0509030403020204" pitchFamily="49" charset="77"/>
-              </a:rPr>
-              <a:t>doctests</a:t>
-            </a:r>
-            <a:r>
-              <a:rPr lang="en-US" spc="-1" dirty="0">
-                <a:solidFill>
-                  <a:srgbClr val="000000"/>
-                </a:solidFill>
-                <a:uFill>
-                  <a:solidFill>
-                    <a:srgbClr val="FFFFFF"/>
-                  </a:solidFill>
-                </a:uFill>
-                <a:latin typeface="Source Code Pro" panose="020B0509030403020204" pitchFamily="49" charset="77"/>
-              </a:rPr>
-              <a:t>)</a:t>
-            </a:r>
-          </a:p>
-          <a:p>
-            <a:pPr>
-              <a:lnSpc>
-                <a:spcPct val="100000"/>
-              </a:lnSpc>
-            </a:pPr>
-            <a:r>
-              <a:rPr lang="en-US" spc="-1" dirty="0">
-                <a:solidFill>
-                  <a:srgbClr val="000000"/>
-                </a:solidFill>
-                <a:uFill>
-                  <a:solidFill>
-                    <a:srgbClr val="FFFFFF"/>
-                  </a:solidFill>
-                </a:uFill>
-                <a:latin typeface="Source Code Pro" panose="020B0509030403020204" pitchFamily="49" charset="77"/>
-              </a:rPr>
-              <a:t>    """</a:t>
-            </a:r>
-          </a:p>
-          <a:p>
-            <a:pPr>
-              <a:lnSpc>
-                <a:spcPct val="100000"/>
-              </a:lnSpc>
-            </a:pPr>
-            <a:r>
-              <a:rPr lang="en-US" spc="-1" dirty="0">
-                <a:solidFill>
-                  <a:srgbClr val="000000"/>
-                </a:solidFill>
-                <a:uFill>
-                  <a:solidFill>
-                    <a:srgbClr val="FFFFFF"/>
-                  </a:solidFill>
-                </a:uFill>
-                <a:latin typeface="Source Code Pro" panose="020B0509030403020204" pitchFamily="49" charset="77"/>
-              </a:rPr>
-              <a:t>    words = </a:t>
-            </a:r>
-            <a:r>
-              <a:rPr lang="en-US" spc="-1" dirty="0" err="1">
-                <a:solidFill>
-                  <a:srgbClr val="000000"/>
-                </a:solidFill>
-                <a:uFill>
-                  <a:solidFill>
-                    <a:srgbClr val="FFFFFF"/>
-                  </a:solidFill>
-                </a:uFill>
-                <a:latin typeface="Source Code Pro" panose="020B0509030403020204" pitchFamily="49" charset="77"/>
-              </a:rPr>
-              <a:t>sentence.split</a:t>
-            </a:r>
-            <a:r>
-              <a:rPr lang="en-US" spc="-1" dirty="0">
-                <a:solidFill>
-                  <a:srgbClr val="000000"/>
-                </a:solidFill>
-                <a:uFill>
-                  <a:solidFill>
-                    <a:srgbClr val="FFFFFF"/>
-                  </a:solidFill>
-                </a:uFill>
-                <a:latin typeface="Source Code Pro" panose="020B0509030403020204" pitchFamily="49" charset="77"/>
-              </a:rPr>
-              <a:t>()</a:t>
-            </a:r>
-          </a:p>
-          <a:p>
-            <a:pPr>
-              <a:lnSpc>
-                <a:spcPct val="100000"/>
-              </a:lnSpc>
-            </a:pPr>
-            <a:r>
-              <a:rPr lang="en-US" spc="-1" dirty="0">
-                <a:solidFill>
-                  <a:srgbClr val="000000"/>
-                </a:solidFill>
-                <a:uFill>
-                  <a:solidFill>
-                    <a:srgbClr val="FFFFFF"/>
-                  </a:solidFill>
-                </a:uFill>
-                <a:latin typeface="Source Code Pro" panose="020B0509030403020204" pitchFamily="49" charset="77"/>
-              </a:rPr>
-              <a:t>    return reduce(add, map(</a:t>
-            </a:r>
-            <a:r>
-              <a:rPr lang="en-US" spc="-1" dirty="0" err="1">
-                <a:solidFill>
-                  <a:srgbClr val="000000"/>
-                </a:solidFill>
-                <a:uFill>
-                  <a:solidFill>
-                    <a:srgbClr val="FFFFFF"/>
-                  </a:solidFill>
-                </a:uFill>
-                <a:latin typeface="Source Code Pro" panose="020B0509030403020204" pitchFamily="49" charset="77"/>
-              </a:rPr>
-              <a:t>first_letter</a:t>
-            </a:r>
-            <a:r>
-              <a:rPr lang="en-US" spc="-1" dirty="0">
-                <a:solidFill>
-                  <a:srgbClr val="000000"/>
-                </a:solidFill>
-                <a:uFill>
-                  <a:solidFill>
-                    <a:srgbClr val="FFFFFF"/>
-                  </a:solidFill>
-                </a:uFill>
-                <a:latin typeface="Source Code Pro" panose="020B0509030403020204" pitchFamily="49" charset="77"/>
-              </a:rPr>
-              <a:t>, filter(</a:t>
-            </a:r>
-            <a:r>
-              <a:rPr lang="en-US" spc="-1" dirty="0" err="1">
-                <a:solidFill>
-                  <a:srgbClr val="000000"/>
-                </a:solidFill>
-                <a:uFill>
-                  <a:solidFill>
-                    <a:srgbClr val="FFFFFF"/>
-                  </a:solidFill>
-                </a:uFill>
-                <a:latin typeface="Source Code Pro" panose="020B0509030403020204" pitchFamily="49" charset="77"/>
-              </a:rPr>
-              <a:t>long_word</a:t>
-            </a:r>
-            <a:r>
-              <a:rPr lang="en-US" spc="-1" dirty="0">
-                <a:solidFill>
-                  <a:srgbClr val="000000"/>
-                </a:solidFill>
-                <a:uFill>
-                  <a:solidFill>
-                    <a:srgbClr val="FFFFFF"/>
-                  </a:solidFill>
-                </a:uFill>
-                <a:latin typeface="Source Code Pro" panose="020B0509030403020204" pitchFamily="49" charset="77"/>
-              </a:rPr>
-              <a:t>, words)))</a:t>
-            </a:r>
-          </a:p>
-          <a:p>
-            <a:pPr>
-              <a:lnSpc>
-                <a:spcPct val="100000"/>
-              </a:lnSpc>
-            </a:pPr>
-            <a:endParaRPr lang="en-US" spc="-1" dirty="0">
-              <a:solidFill>
-                <a:srgbClr val="000000"/>
-              </a:solidFill>
-              <a:uFill>
-                <a:solidFill>
-                  <a:srgbClr val="FFFFFF"/>
-                </a:solidFill>
-              </a:uFill>
-              <a:latin typeface="Source Code Pro" panose="020B0509030403020204" pitchFamily="49" charset="77"/>
-            </a:endParaRPr>
-          </a:p>
-        </p:txBody>
-      </p:sp>
-      <p:sp>
-        <p:nvSpPr>
-          <p:cNvPr id="7" name="TextShape 11">
-            <a:extLst>
-              <a:ext uri="{FF2B5EF4-FFF2-40B4-BE49-F238E27FC236}">
-                <a16:creationId xmlns:a16="http://schemas.microsoft.com/office/drawing/2014/main" id="{55609106-671F-E84E-8744-3B2453668F27}"/>
-              </a:ext>
-            </a:extLst>
-          </p:cNvPr>
-          <p:cNvSpPr txBox="1"/>
-          <p:nvPr/>
-        </p:nvSpPr>
-        <p:spPr>
-          <a:xfrm>
-            <a:off x="2281080" y="5012456"/>
-            <a:ext cx="7171560" cy="602280"/>
-          </a:xfrm>
-          <a:prstGeom prst="rect">
-            <a:avLst/>
-          </a:prstGeom>
-          <a:noFill/>
-          <a:ln>
-            <a:noFill/>
-          </a:ln>
-        </p:spPr>
-        <p:txBody>
-          <a:bodyPr lIns="90000" tIns="45000" rIns="90000" bIns="45000"/>
-          <a:lstStyle/>
-          <a:p>
-            <a:r>
-              <a:rPr lang="en-US" spc="-1" dirty="0">
-                <a:solidFill>
-                  <a:srgbClr val="000000"/>
-                </a:solidFill>
-                <a:uFill>
-                  <a:solidFill>
-                    <a:srgbClr val="FFFFFF"/>
-                  </a:solidFill>
-                </a:uFill>
-                <a:latin typeface="Arial"/>
-              </a:rPr>
-              <a:t>P.S. Pedantry alert: This is really an </a:t>
-            </a:r>
-            <a:r>
-              <a:rPr lang="en-US" i="1" spc="-1" dirty="0">
-                <a:solidFill>
-                  <a:srgbClr val="000000"/>
-                </a:solidFill>
-                <a:uFill>
-                  <a:solidFill>
-                    <a:srgbClr val="FFFFFF"/>
-                  </a:solidFill>
-                </a:uFill>
-                <a:latin typeface="Arial"/>
-              </a:rPr>
-              <a:t>initialism</a:t>
-            </a:r>
-            <a:r>
-              <a:rPr lang="en-US" spc="-1" dirty="0">
-                <a:solidFill>
-                  <a:srgbClr val="000000"/>
-                </a:solidFill>
-                <a:uFill>
-                  <a:solidFill>
-                    <a:srgbClr val="FFFFFF"/>
-                  </a:solidFill>
-                </a:uFill>
-                <a:latin typeface="Arial"/>
-              </a:rPr>
-              <a:t> but that's rather annoying to say and type. </a:t>
-            </a:r>
-            <a:r>
-              <a:rPr lang="en-US" spc="-1" dirty="0">
-                <a:solidFill>
-                  <a:srgbClr val="000000"/>
-                </a:solidFill>
-                <a:uFill>
-                  <a:solidFill>
-                    <a:srgbClr val="FFFFFF"/>
-                  </a:solidFill>
-                </a:uFill>
-                <a:latin typeface="Arial"/>
-                <a:sym typeface="Wingdings" pitchFamily="2" charset="2"/>
-              </a:rPr>
-              <a:t> (However, the code we write is the same, the difference is in how you pronounce the result.) The more you know!</a:t>
-            </a:r>
-            <a:endParaRPr lang="en-US" spc="-1" dirty="0">
-              <a:solidFill>
-                <a:srgbClr val="000000"/>
-              </a:solidFill>
-              <a:uFill>
-                <a:solidFill>
-                  <a:srgbClr val="FFFFFF"/>
-                </a:solidFill>
-              </a:uFill>
-              <a:latin typeface="Arial"/>
-            </a:endParaRPr>
-          </a:p>
-        </p:txBody>
-      </p:sp>
     </p:spTree>
     <p:extLst>
       <p:ext uri="{BB962C8B-B14F-4D97-AF65-F5344CB8AC3E}">
-        <p14:creationId xmlns:p14="http://schemas.microsoft.com/office/powerpoint/2010/main" val="3338411237"/>
+        <p14:creationId xmlns:p14="http://schemas.microsoft.com/office/powerpoint/2010/main" val="3478770812"/>
       </p:ext>
     </p:extLst>
   </p:cSld>
@@ -16581,7 +15876,7 @@
           <p:cNvPr id="2" name="Title 1">
             <a:extLst>
               <a:ext uri="{FF2B5EF4-FFF2-40B4-BE49-F238E27FC236}">
-                <a16:creationId xmlns:a16="http://schemas.microsoft.com/office/drawing/2014/main" id="{4C391A7B-517B-1F28-7683-AA06AF06A49F}"/>
+                <a16:creationId xmlns:a16="http://schemas.microsoft.com/office/drawing/2014/main" id="{C3A57493-490E-6541-9973-A295DBF3E35F}"/>
               </a:ext>
             </a:extLst>
           </p:cNvPr>
@@ -16599,7 +15894,7 @@
           <a:p>
             <a:r>
               <a:rPr lang="en-US" dirty="0"/>
-              <a:t>Acronym With HOFs</a:t>
+              <a:t>Functional Sequence (List) Operations</a:t>
             </a:r>
           </a:p>
         </p:txBody>
@@ -16609,7 +15904,7 @@
           <p:cNvPr id="3" name="Content Placeholder 2">
             <a:extLst>
               <a:ext uri="{FF2B5EF4-FFF2-40B4-BE49-F238E27FC236}">
-                <a16:creationId xmlns:a16="http://schemas.microsoft.com/office/drawing/2014/main" id="{0EBA5618-B947-D60E-CA5F-2F85BE526602}"/>
+                <a16:creationId xmlns:a16="http://schemas.microsoft.com/office/drawing/2014/main" id="{AAAEACB3-3528-3B4E-9961-861C7DBB5CBC}"/>
               </a:ext>
             </a:extLst>
           </p:cNvPr>
@@ -16625,13 +15920,33 @@
           <a:bodyPr/>
           <a:lstStyle/>
           <a:p>
-            <a:pPr marL="0" indent="0">
-              <a:buNone/>
-            </a:pPr>
             <a:r>
               <a:rPr lang="en-US" dirty="0"/>
-              <a:t>What is we want to control the filtering method?</a:t>
-            </a:r>
+              <a:t>Goal: Transform a</a:t>
+            </a:r>
+            <a:r>
+              <a:rPr lang="en-US" i="1" dirty="0"/>
+              <a:t> sequence</a:t>
+            </a:r>
+            <a:r>
+              <a:rPr lang="en-US" dirty="0"/>
+              <a:t>, and return a new result</a:t>
+            </a:r>
+          </a:p>
+          <a:p>
+            <a:r>
+              <a:rPr lang="en-US" dirty="0"/>
+              <a:t>We'll use 3 functions that are hallmarks of functional programming</a:t>
+            </a:r>
+          </a:p>
+          <a:p>
+            <a:r>
+              <a:rPr lang="en-US" dirty="0"/>
+              <a:t>Each of these takes in a function and a sequence as arguments</a:t>
+            </a:r>
+          </a:p>
+          <a:p>
+            <a:endParaRPr lang="en-US" dirty="0"/>
           </a:p>
           <a:p>
             <a:pPr marL="0" indent="0">
@@ -16643,198 +15958,7 @@
             <a:pPr marL="0" indent="0">
               <a:buNone/>
             </a:pPr>
-            <a:r>
-              <a:rPr lang="en-US" dirty="0">
-                <a:latin typeface="Source Code Pro" panose="020B0509030403020204" pitchFamily="49" charset="77"/>
-              </a:rPr>
-              <a:t>def </a:t>
-            </a:r>
-            <a:r>
-              <a:rPr lang="en-US" dirty="0" err="1">
-                <a:latin typeface="Source Code Pro" panose="020B0509030403020204" pitchFamily="49" charset="77"/>
-              </a:rPr>
-              <a:t>keep_words</a:t>
-            </a:r>
-            <a:r>
-              <a:rPr lang="en-US" dirty="0">
-                <a:latin typeface="Source Code Pro" panose="020B0509030403020204" pitchFamily="49" charset="77"/>
-              </a:rPr>
-              <a:t>(word):</a:t>
-            </a:r>
-          </a:p>
-          <a:p>
-            <a:pPr marL="0" indent="0">
-              <a:buNone/>
-            </a:pPr>
-            <a:r>
-              <a:rPr lang="en-US" dirty="0">
-                <a:latin typeface="Source Code Pro" panose="020B0509030403020204" pitchFamily="49" charset="77"/>
-              </a:rPr>
-              <a:t>    specials = ['Los']</a:t>
-            </a:r>
-          </a:p>
-          <a:p>
-            <a:pPr marL="0" indent="0">
-              <a:buNone/>
-            </a:pPr>
-            <a:r>
-              <a:rPr lang="en-US" dirty="0">
-                <a:latin typeface="Source Code Pro" panose="020B0509030403020204" pitchFamily="49" charset="77"/>
-              </a:rPr>
-              <a:t>    return word in specials or </a:t>
-            </a:r>
-            <a:r>
-              <a:rPr lang="en-US" dirty="0" err="1">
-                <a:latin typeface="Source Code Pro" panose="020B0509030403020204" pitchFamily="49" charset="77"/>
-              </a:rPr>
-              <a:t>long_word</a:t>
-            </a:r>
-            <a:r>
-              <a:rPr lang="en-US" dirty="0">
-                <a:latin typeface="Source Code Pro" panose="020B0509030403020204" pitchFamily="49" charset="77"/>
-              </a:rPr>
-              <a:t>(word)</a:t>
-            </a:r>
-          </a:p>
-          <a:p>
-            <a:pPr marL="0" indent="0">
-              <a:buNone/>
-            </a:pPr>
-            <a:endParaRPr lang="en-US" dirty="0">
-              <a:latin typeface="Source Code Pro" panose="020B0509030403020204" pitchFamily="49" charset="77"/>
-            </a:endParaRPr>
-          </a:p>
-          <a:p>
-            <a:pPr marL="0" indent="0">
-              <a:buNone/>
-            </a:pPr>
-            <a:r>
-              <a:rPr lang="en-US" dirty="0">
-                <a:latin typeface="Source Code Pro" panose="020B0509030403020204" pitchFamily="49" charset="77"/>
-              </a:rPr>
-              <a:t>def </a:t>
-            </a:r>
-            <a:r>
-              <a:rPr lang="en-US" dirty="0" err="1">
-                <a:latin typeface="Source Code Pro" panose="020B0509030403020204" pitchFamily="49" charset="77"/>
-              </a:rPr>
-              <a:t>acronym_hof</a:t>
-            </a:r>
-            <a:r>
-              <a:rPr lang="en-US" dirty="0">
-                <a:latin typeface="Source Code Pro" panose="020B0509030403020204" pitchFamily="49" charset="77"/>
-              </a:rPr>
-              <a:t>(sentence, </a:t>
-            </a:r>
-            <a:r>
-              <a:rPr lang="en-US" b="1" dirty="0" err="1">
-                <a:latin typeface="Source Code Pro" panose="020B0509030403020204" pitchFamily="49" charset="77"/>
-              </a:rPr>
-              <a:t>filter_fn</a:t>
-            </a:r>
-            <a:r>
-              <a:rPr lang="en-US" dirty="0">
-                <a:latin typeface="Source Code Pro" panose="020B0509030403020204" pitchFamily="49" charset="77"/>
-              </a:rPr>
-              <a:t>):</a:t>
-            </a:r>
-          </a:p>
-          <a:p>
-            <a:pPr marL="0" indent="0">
-              <a:buNone/>
-            </a:pPr>
-            <a:r>
-              <a:rPr lang="en-US" dirty="0">
-                <a:latin typeface="Source Code Pro" panose="020B0509030403020204" pitchFamily="49" charset="77"/>
-              </a:rPr>
-              <a:t>    words = </a:t>
-            </a:r>
-            <a:r>
-              <a:rPr lang="en-US" dirty="0" err="1">
-                <a:latin typeface="Source Code Pro" panose="020B0509030403020204" pitchFamily="49" charset="77"/>
-              </a:rPr>
-              <a:t>sentence.split</a:t>
-            </a:r>
-            <a:r>
-              <a:rPr lang="en-US" dirty="0">
-                <a:latin typeface="Source Code Pro" panose="020B0509030403020204" pitchFamily="49" charset="77"/>
-              </a:rPr>
-              <a:t>()</a:t>
-            </a:r>
-          </a:p>
-          <a:p>
-            <a:pPr marL="0" indent="0">
-              <a:buNone/>
-            </a:pPr>
-            <a:r>
-              <a:rPr lang="en-US" dirty="0">
-                <a:latin typeface="Source Code Pro" panose="020B0509030403020204" pitchFamily="49" charset="77"/>
-              </a:rPr>
-              <a:t>    return reduce(add, map(</a:t>
-            </a:r>
-            <a:r>
-              <a:rPr lang="en-US" dirty="0" err="1">
-                <a:latin typeface="Source Code Pro" panose="020B0509030403020204" pitchFamily="49" charset="77"/>
-              </a:rPr>
-              <a:t>first_letter</a:t>
-            </a:r>
-            <a:r>
-              <a:rPr lang="en-US" dirty="0">
-                <a:latin typeface="Source Code Pro" panose="020B0509030403020204" pitchFamily="49" charset="77"/>
-              </a:rPr>
-              <a:t>, filter(</a:t>
-            </a:r>
-            <a:r>
-              <a:rPr lang="en-US" b="1" dirty="0" err="1">
-                <a:latin typeface="Source Code Pro" panose="020B0509030403020204" pitchFamily="49" charset="77"/>
-              </a:rPr>
-              <a:t>filter_fn</a:t>
-            </a:r>
-            <a:r>
-              <a:rPr lang="en-US" dirty="0">
-                <a:latin typeface="Source Code Pro" panose="020B0509030403020204" pitchFamily="49" charset="77"/>
-              </a:rPr>
-              <a:t>, words)))</a:t>
-            </a:r>
-          </a:p>
-          <a:p>
-            <a:pPr marL="0" indent="0">
-              <a:buNone/>
-            </a:pPr>
             <a:endParaRPr lang="en-US" dirty="0"/>
-          </a:p>
-          <a:p>
-            <a:pPr marL="0" indent="0">
-              <a:buNone/>
-            </a:pPr>
-            <a:r>
-              <a:rPr lang="en-US" dirty="0" err="1">
-                <a:latin typeface="Source Code Pro" panose="020B0309030403020204" pitchFamily="34" charset="0"/>
-                <a:ea typeface="Source Code Pro" panose="020B0309030403020204" pitchFamily="34" charset="0"/>
-              </a:rPr>
-              <a:t>acronym_hof</a:t>
-            </a:r>
-            <a:r>
-              <a:rPr lang="en-US" dirty="0">
-                <a:latin typeface="Source Code Pro" panose="020B0309030403020204" pitchFamily="34" charset="0"/>
-                <a:ea typeface="Source Code Pro" panose="020B0309030403020204" pitchFamily="34" charset="0"/>
-              </a:rPr>
-              <a:t>(copycats, </a:t>
-            </a:r>
-            <a:r>
-              <a:rPr lang="en-US" dirty="0" err="1">
-                <a:latin typeface="Source Code Pro" panose="020B0309030403020204" pitchFamily="34" charset="0"/>
-                <a:ea typeface="Source Code Pro" panose="020B0309030403020204" pitchFamily="34" charset="0"/>
-              </a:rPr>
-              <a:t>keep_words</a:t>
-            </a:r>
-            <a:r>
-              <a:rPr lang="en-US" dirty="0">
-                <a:latin typeface="Source Code Pro" panose="020B0309030403020204" pitchFamily="34" charset="0"/>
-                <a:ea typeface="Source Code Pro" panose="020B0309030403020204" pitchFamily="34" charset="0"/>
-              </a:rPr>
-              <a:t>)</a:t>
-            </a:r>
           </a:p>
         </p:txBody>
       </p:sp>
@@ -16843,7 +15967,7 @@
           <p:cNvPr id="4" name="Footer Placeholder 3">
             <a:extLst>
               <a:ext uri="{FF2B5EF4-FFF2-40B4-BE49-F238E27FC236}">
-                <a16:creationId xmlns:a16="http://schemas.microsoft.com/office/drawing/2014/main" id="{9190173E-420E-9A58-E65B-E03B8A83BE80}"/>
+                <a16:creationId xmlns:a16="http://schemas.microsoft.com/office/drawing/2014/main" id="{B4344FEE-E72B-B65D-1AD5-8C1189F1FACC}"/>
               </a:ext>
             </a:extLst>
           </p:cNvPr>
@@ -16871,10 +15995,467 @@
           </a:p>
         </p:txBody>
       </p:sp>
+      <p:graphicFrame>
+        <p:nvGraphicFramePr>
+          <p:cNvPr id="6" name="Table 6">
+            <a:extLst>
+              <a:ext uri="{FF2B5EF4-FFF2-40B4-BE49-F238E27FC236}">
+                <a16:creationId xmlns:a16="http://schemas.microsoft.com/office/drawing/2014/main" id="{25EBD1E5-B78E-72B6-6282-D80B13046B4F}"/>
+              </a:ext>
+            </a:extLst>
+          </p:cNvPr>
+          <p:cNvGraphicFramePr>
+            <a:graphicFrameLocks noGrp="1"/>
+          </p:cNvGraphicFramePr>
+          <p:nvPr/>
+        </p:nvGraphicFramePr>
+        <p:xfrm>
+          <a:off x="420415" y="2792760"/>
+          <a:ext cx="10594426" cy="3421927"/>
+        </p:xfrm>
+        <a:graphic>
+          <a:graphicData uri="http://schemas.openxmlformats.org/drawingml/2006/table">
+            <a:tbl>
+              <a:tblPr firstRow="1" bandRow="1">
+                <a:tableStyleId>{5C22544A-7EE6-4342-B048-85BDC9FD1C3A}</a:tableStyleId>
+              </a:tblPr>
+              <a:tblGrid>
+                <a:gridCol w="1692164">
+                  <a:extLst>
+                    <a:ext uri="{9D8B030D-6E8A-4147-A177-3AD203B41FA5}">
+                      <a16:colId xmlns:a16="http://schemas.microsoft.com/office/drawing/2014/main" val="2059777158"/>
+                    </a:ext>
+                  </a:extLst>
+                </a:gridCol>
+                <a:gridCol w="2333297">
+                  <a:extLst>
+                    <a:ext uri="{9D8B030D-6E8A-4147-A177-3AD203B41FA5}">
+                      <a16:colId xmlns:a16="http://schemas.microsoft.com/office/drawing/2014/main" val="2894650286"/>
+                    </a:ext>
+                  </a:extLst>
+                </a:gridCol>
+                <a:gridCol w="2280745">
+                  <a:extLst>
+                    <a:ext uri="{9D8B030D-6E8A-4147-A177-3AD203B41FA5}">
+                      <a16:colId xmlns:a16="http://schemas.microsoft.com/office/drawing/2014/main" val="3290081916"/>
+                    </a:ext>
+                  </a:extLst>
+                </a:gridCol>
+                <a:gridCol w="2007476">
+                  <a:extLst>
+                    <a:ext uri="{9D8B030D-6E8A-4147-A177-3AD203B41FA5}">
+                      <a16:colId xmlns:a16="http://schemas.microsoft.com/office/drawing/2014/main" val="2002986398"/>
+                    </a:ext>
+                  </a:extLst>
+                </a:gridCol>
+                <a:gridCol w="2280744">
+                  <a:extLst>
+                    <a:ext uri="{9D8B030D-6E8A-4147-A177-3AD203B41FA5}">
+                      <a16:colId xmlns:a16="http://schemas.microsoft.com/office/drawing/2014/main" val="756374945"/>
+                    </a:ext>
+                  </a:extLst>
+                </a:gridCol>
+              </a:tblGrid>
+              <a:tr h="678727">
+                <a:tc>
+                  <a:txBody>
+                    <a:bodyPr/>
+                    <a:lstStyle/>
+                    <a:p>
+                      <a:pPr algn="ctr"/>
+                      <a:r>
+                        <a:rPr lang="en-US" sz="2000" b="1" dirty="0">
+                          <a:latin typeface="FreightSans Pro Book" panose="02000606030000020004" pitchFamily="2" charset="0"/>
+                        </a:rPr>
+                        <a:t>Function</a:t>
+                      </a:r>
+                    </a:p>
+                  </a:txBody>
+                  <a:tcPr anchor="ctr"/>
+                </a:tc>
+                <a:tc>
+                  <a:txBody>
+                    <a:bodyPr/>
+                    <a:lstStyle/>
+                    <a:p>
+                      <a:pPr algn="ctr"/>
+                      <a:r>
+                        <a:rPr lang="en-US" sz="2000" dirty="0">
+                          <a:latin typeface="FreightSans Pro Book" panose="02000606030000020004" pitchFamily="2" charset="0"/>
+                        </a:rPr>
+                        <a:t>Action</a:t>
+                      </a:r>
+                    </a:p>
+                  </a:txBody>
+                  <a:tcPr anchor="ctr"/>
+                </a:tc>
+                <a:tc>
+                  <a:txBody>
+                    <a:bodyPr/>
+                    <a:lstStyle/>
+                    <a:p>
+                      <a:pPr algn="ctr"/>
+                      <a:r>
+                        <a:rPr lang="en-US" sz="2000" dirty="0">
+                          <a:latin typeface="FreightSans Pro Book" panose="02000606030000020004" pitchFamily="2" charset="0"/>
+                        </a:rPr>
+                        <a:t>Input arguments</a:t>
+                      </a:r>
+                    </a:p>
+                  </a:txBody>
+                  <a:tcPr anchor="ctr"/>
+                </a:tc>
+                <a:tc>
+                  <a:txBody>
+                    <a:bodyPr/>
+                    <a:lstStyle/>
+                    <a:p>
+                      <a:pPr algn="ctr"/>
+                      <a:r>
+                        <a:rPr lang="en-US" sz="2000" dirty="0">
+                          <a:latin typeface="FreightSans Pro Book" panose="02000606030000020004" pitchFamily="2" charset="0"/>
+                        </a:rPr>
+                        <a:t>Input Fn. Returns</a:t>
+                      </a:r>
+                    </a:p>
+                  </a:txBody>
+                  <a:tcPr anchor="ctr"/>
+                </a:tc>
+                <a:tc>
+                  <a:txBody>
+                    <a:bodyPr/>
+                    <a:lstStyle/>
+                    <a:p>
+                      <a:pPr marL="0" marR="0" lvl="0" indent="0" algn="ctr" defTabSz="342900" rtl="0" eaLnBrk="1" fontAlgn="auto" latinLnBrk="0" hangingPunct="1">
+                        <a:lnSpc>
+                          <a:spcPct val="100000"/>
+                        </a:lnSpc>
+                        <a:spcBef>
+                          <a:spcPts val="0"/>
+                        </a:spcBef>
+                        <a:spcAft>
+                          <a:spcPts val="0"/>
+                        </a:spcAft>
+                        <a:buClrTx/>
+                        <a:buSzTx/>
+                        <a:buFontTx/>
+                        <a:buNone/>
+                        <a:tabLst/>
+                        <a:defRPr/>
+                      </a:pPr>
+                      <a:r>
+                        <a:rPr lang="en-US" sz="2000" dirty="0">
+                          <a:latin typeface="FreightSans Pro Book" panose="02000606030000020004" pitchFamily="2" charset="0"/>
+                        </a:rPr>
+                        <a:t>Output</a:t>
+                      </a:r>
+                    </a:p>
+                  </a:txBody>
+                  <a:tcPr anchor="ctr"/>
+                </a:tc>
+                <a:extLst>
+                  <a:ext uri="{0D108BD9-81ED-4DB2-BD59-A6C34878D82A}">
+                    <a16:rowId xmlns:a16="http://schemas.microsoft.com/office/drawing/2014/main" val="1140645906"/>
+                  </a:ext>
+                </a:extLst>
+              </a:tr>
+              <a:tr h="678727">
+                <a:tc>
+                  <a:txBody>
+                    <a:bodyPr/>
+                    <a:lstStyle/>
+                    <a:p>
+                      <a:pPr algn="ctr"/>
+                      <a:r>
+                        <a:rPr lang="en-US" sz="1800" b="1" dirty="0">
+                          <a:latin typeface="Source Code Pro" panose="020B0509030403020204" pitchFamily="49" charset="77"/>
+                        </a:rPr>
+                        <a:t>map</a:t>
+                      </a:r>
+                    </a:p>
+                  </a:txBody>
+                  <a:tcPr anchor="ctr"/>
+                </a:tc>
+                <a:tc>
+                  <a:txBody>
+                    <a:bodyPr/>
+                    <a:lstStyle/>
+                    <a:p>
+                      <a:r>
+                        <a:rPr lang="en-US" sz="1800" b="0" i="0" dirty="0">
+                          <a:latin typeface="Open Sans Light" panose="020B0606030504020204" pitchFamily="34" charset="0"/>
+                          <a:ea typeface="Open Sans Light" panose="020B0606030504020204" pitchFamily="34" charset="0"/>
+                          <a:cs typeface="Open Sans Light" panose="020B0606030504020204" pitchFamily="34" charset="0"/>
+                        </a:rPr>
+                        <a:t>Transform every item</a:t>
+                      </a:r>
+                    </a:p>
+                  </a:txBody>
+                  <a:tcPr anchor="ctr"/>
+                </a:tc>
+                <a:tc>
+                  <a:txBody>
+                    <a:bodyPr/>
+                    <a:lstStyle/>
+                    <a:p>
+                      <a:r>
+                        <a:rPr lang="en-US" sz="1800" b="0" i="0" dirty="0">
+                          <a:latin typeface="Open Sans Light" panose="020B0606030504020204" pitchFamily="34" charset="0"/>
+                          <a:ea typeface="Open Sans Light" panose="020B0606030504020204" pitchFamily="34" charset="0"/>
+                          <a:cs typeface="Open Sans Light" panose="020B0606030504020204" pitchFamily="34" charset="0"/>
+                        </a:rPr>
+                        <a:t>1 (each item)</a:t>
+                      </a:r>
+                    </a:p>
+                  </a:txBody>
+                  <a:tcPr anchor="ctr"/>
+                </a:tc>
+                <a:tc>
+                  <a:txBody>
+                    <a:bodyPr/>
+                    <a:lstStyle/>
+                    <a:p>
+                      <a:r>
+                        <a:rPr lang="en-US" sz="1800" b="0" i="0" dirty="0">
+                          <a:latin typeface="Open Sans Light" panose="020B0606030504020204" pitchFamily="34" charset="0"/>
+                          <a:ea typeface="Open Sans Light" panose="020B0606030504020204" pitchFamily="34" charset="0"/>
+                          <a:cs typeface="Open Sans Light" panose="020B0606030504020204" pitchFamily="34" charset="0"/>
+                        </a:rPr>
+                        <a:t>"Anything", a new item</a:t>
+                      </a:r>
+                    </a:p>
+                  </a:txBody>
+                  <a:tcPr anchor="ctr"/>
+                </a:tc>
+                <a:tc>
+                  <a:txBody>
+                    <a:bodyPr/>
+                    <a:lstStyle/>
+                    <a:p>
+                      <a:r>
+                        <a:rPr lang="en-US" sz="1800" b="1" i="0" dirty="0">
+                          <a:latin typeface="Open Sans ExtraBold" panose="020B0606030504020204" pitchFamily="34" charset="0"/>
+                          <a:ea typeface="Open Sans ExtraBold" panose="020B0606030504020204" pitchFamily="34" charset="0"/>
+                          <a:cs typeface="Open Sans ExtraBold" panose="020B0606030504020204" pitchFamily="34" charset="0"/>
+                        </a:rPr>
+                        <a:t>List</a:t>
+                      </a:r>
+                      <a:r>
+                        <a:rPr lang="en-US" sz="1800" b="0" i="0" dirty="0">
+                          <a:latin typeface="Open Sans Light" panose="020B0606030504020204" pitchFamily="34" charset="0"/>
+                          <a:ea typeface="Open Sans Light" panose="020B0606030504020204" pitchFamily="34" charset="0"/>
+                          <a:cs typeface="Open Sans Light" panose="020B0606030504020204" pitchFamily="34" charset="0"/>
+                        </a:rPr>
+                        <a:t>: same length, but possibly new values</a:t>
+                      </a:r>
+                    </a:p>
+                  </a:txBody>
+                  <a:tcPr anchor="ctr"/>
+                </a:tc>
+                <a:extLst>
+                  <a:ext uri="{0D108BD9-81ED-4DB2-BD59-A6C34878D82A}">
+                    <a16:rowId xmlns:a16="http://schemas.microsoft.com/office/drawing/2014/main" val="1601251051"/>
+                  </a:ext>
+                </a:extLst>
+              </a:tr>
+              <a:tr h="678727">
+                <a:tc>
+                  <a:txBody>
+                    <a:bodyPr/>
+                    <a:lstStyle/>
+                    <a:p>
+                      <a:pPr algn="ctr"/>
+                      <a:r>
+                        <a:rPr lang="en-US" sz="1800" b="1" dirty="0">
+                          <a:latin typeface="Source Code Pro" panose="020B0509030403020204" pitchFamily="49" charset="77"/>
+                        </a:rPr>
+                        <a:t>filter</a:t>
+                      </a:r>
+                    </a:p>
+                  </a:txBody>
+                  <a:tcPr anchor="ctr"/>
+                </a:tc>
+                <a:tc>
+                  <a:txBody>
+                    <a:bodyPr/>
+                    <a:lstStyle/>
+                    <a:p>
+                      <a:r>
+                        <a:rPr lang="en-US" sz="1800" b="0" i="0" dirty="0">
+                          <a:latin typeface="Open Sans Light" panose="020B0606030504020204" pitchFamily="34" charset="0"/>
+                          <a:ea typeface="Open Sans Light" panose="020B0606030504020204" pitchFamily="34" charset="0"/>
+                          <a:cs typeface="Open Sans Light" panose="020B0606030504020204" pitchFamily="34" charset="0"/>
+                        </a:rPr>
+                        <a:t>Return a list with fewer items</a:t>
+                      </a:r>
+                    </a:p>
+                  </a:txBody>
+                  <a:tcPr anchor="ctr"/>
+                </a:tc>
+                <a:tc>
+                  <a:txBody>
+                    <a:bodyPr/>
+                    <a:lstStyle/>
+                    <a:p>
+                      <a:r>
+                        <a:rPr lang="en-US" sz="1800" b="0" i="0" dirty="0">
+                          <a:latin typeface="Open Sans Light" panose="020B0606030504020204" pitchFamily="34" charset="0"/>
+                          <a:ea typeface="Open Sans Light" panose="020B0606030504020204" pitchFamily="34" charset="0"/>
+                          <a:cs typeface="Open Sans Light" panose="020B0606030504020204" pitchFamily="34" charset="0"/>
+                        </a:rPr>
+                        <a:t>1 (each item)</a:t>
+                      </a:r>
+                    </a:p>
+                  </a:txBody>
+                  <a:tcPr anchor="ctr"/>
+                </a:tc>
+                <a:tc>
+                  <a:txBody>
+                    <a:bodyPr/>
+                    <a:lstStyle/>
+                    <a:p>
+                      <a:r>
+                        <a:rPr lang="en-US" sz="1800" b="0" i="0" dirty="0">
+                          <a:latin typeface="Open Sans Light" panose="020B0606030504020204" pitchFamily="34" charset="0"/>
+                          <a:ea typeface="Open Sans Light" panose="020B0606030504020204" pitchFamily="34" charset="0"/>
+                          <a:cs typeface="Open Sans Light" panose="020B0606030504020204" pitchFamily="34" charset="0"/>
+                        </a:rPr>
+                        <a:t>A Boolean</a:t>
+                      </a:r>
+                    </a:p>
+                  </a:txBody>
+                  <a:tcPr anchor="ctr"/>
+                </a:tc>
+                <a:tc>
+                  <a:txBody>
+                    <a:bodyPr/>
+                    <a:lstStyle/>
+                    <a:p>
+                      <a:r>
+                        <a:rPr lang="en-US" sz="1800" b="1" i="0" dirty="0">
+                          <a:latin typeface="Open Sans ExtraBold" panose="020B0606030504020204" pitchFamily="34" charset="0"/>
+                          <a:ea typeface="Open Sans ExtraBold" panose="020B0606030504020204" pitchFamily="34" charset="0"/>
+                          <a:cs typeface="Open Sans ExtraBold" panose="020B0606030504020204" pitchFamily="34" charset="0"/>
+                        </a:rPr>
+                        <a:t>List: </a:t>
+                      </a:r>
+                      <a:r>
+                        <a:rPr lang="en-US" sz="1800" b="0" i="0" dirty="0">
+                          <a:latin typeface="Open Sans Light" panose="020B0606030504020204" pitchFamily="34" charset="0"/>
+                          <a:ea typeface="Open Sans Light" panose="020B0606030504020204" pitchFamily="34" charset="0"/>
+                          <a:cs typeface="Open Sans Light" panose="020B0606030504020204" pitchFamily="34" charset="0"/>
+                        </a:rPr>
+                        <a:t>possibly fewer items, values are the same</a:t>
+                      </a:r>
+                    </a:p>
+                  </a:txBody>
+                  <a:tcPr anchor="ctr"/>
+                </a:tc>
+                <a:extLst>
+                  <a:ext uri="{0D108BD9-81ED-4DB2-BD59-A6C34878D82A}">
+                    <a16:rowId xmlns:a16="http://schemas.microsoft.com/office/drawing/2014/main" val="1639889719"/>
+                  </a:ext>
+                </a:extLst>
+              </a:tr>
+              <a:tr h="678727">
+                <a:tc>
+                  <a:txBody>
+                    <a:bodyPr/>
+                    <a:lstStyle/>
+                    <a:p>
+                      <a:pPr algn="ctr"/>
+                      <a:r>
+                        <a:rPr lang="en-US" sz="1800" b="1" dirty="0">
+                          <a:latin typeface="Source Code Pro" panose="020B0509030403020204" pitchFamily="49" charset="77"/>
+                        </a:rPr>
+                        <a:t>reduce</a:t>
+                      </a:r>
+                    </a:p>
+                  </a:txBody>
+                  <a:tcPr anchor="ctr"/>
+                </a:tc>
+                <a:tc>
+                  <a:txBody>
+                    <a:bodyPr/>
+                    <a:lstStyle/>
+                    <a:p>
+                      <a:r>
+                        <a:rPr lang="en-US" sz="1800" b="0" i="0" dirty="0">
+                          <a:latin typeface="Open Sans Light" panose="020B0606030504020204" pitchFamily="34" charset="0"/>
+                          <a:ea typeface="Open Sans Light" panose="020B0606030504020204" pitchFamily="34" charset="0"/>
+                          <a:cs typeface="Open Sans Light" panose="020B0606030504020204" pitchFamily="34" charset="0"/>
+                        </a:rPr>
+                        <a:t>"Combine" items together</a:t>
+                      </a:r>
+                    </a:p>
+                  </a:txBody>
+                  <a:tcPr anchor="ctr"/>
+                </a:tc>
+                <a:tc>
+                  <a:txBody>
+                    <a:bodyPr/>
+                    <a:lstStyle/>
+                    <a:p>
+                      <a:r>
+                        <a:rPr lang="en-US" sz="1800" b="0" i="0" dirty="0">
+                          <a:latin typeface="Open Sans Light" panose="020B0606030504020204" pitchFamily="34" charset="0"/>
+                          <a:ea typeface="Open Sans Light" panose="020B0606030504020204" pitchFamily="34" charset="0"/>
+                          <a:cs typeface="Open Sans Light" panose="020B0606030504020204" pitchFamily="34" charset="0"/>
+                        </a:rPr>
+                        <a:t>2 (current item, and the previous result)</a:t>
+                      </a:r>
+                    </a:p>
+                  </a:txBody>
+                  <a:tcPr anchor="ctr"/>
+                </a:tc>
+                <a:tc>
+                  <a:txBody>
+                    <a:bodyPr/>
+                    <a:lstStyle/>
+                    <a:p>
+                      <a:r>
+                        <a:rPr lang="en-US" sz="1800" b="0" i="0" dirty="0">
+                          <a:latin typeface="Open Sans Light" panose="020B0606030504020204" pitchFamily="34" charset="0"/>
+                          <a:ea typeface="Open Sans Light" panose="020B0606030504020204" pitchFamily="34" charset="0"/>
+                          <a:cs typeface="Open Sans Light" panose="020B0606030504020204" pitchFamily="34" charset="0"/>
+                        </a:rPr>
+                        <a:t>Type should match the type each item</a:t>
+                      </a:r>
+                    </a:p>
+                  </a:txBody>
+                  <a:tcPr anchor="ctr"/>
+                </a:tc>
+                <a:tc>
+                  <a:txBody>
+                    <a:bodyPr/>
+                    <a:lstStyle/>
+                    <a:p>
+                      <a:r>
+                        <a:rPr lang="en-US" sz="1800" b="0" i="0" dirty="0">
+                          <a:latin typeface="Open Sans Light" panose="020B0606030504020204" pitchFamily="34" charset="0"/>
+                          <a:ea typeface="Open Sans Light" panose="020B0606030504020204" pitchFamily="34" charset="0"/>
+                          <a:cs typeface="Open Sans Light" panose="020B0606030504020204" pitchFamily="34" charset="0"/>
+                        </a:rPr>
+                        <a:t>A "single" item</a:t>
+                      </a:r>
+                    </a:p>
+                  </a:txBody>
+                  <a:tcPr anchor="ctr"/>
+                </a:tc>
+                <a:extLst>
+                  <a:ext uri="{0D108BD9-81ED-4DB2-BD59-A6C34878D82A}">
+                    <a16:rowId xmlns:a16="http://schemas.microsoft.com/office/drawing/2014/main" val="2091545836"/>
+                  </a:ext>
+                </a:extLst>
+              </a:tr>
+            </a:tbl>
+          </a:graphicData>
+        </a:graphic>
+      </p:graphicFrame>
     </p:spTree>
     <p:extLst>
       <p:ext uri="{BB962C8B-B14F-4D97-AF65-F5344CB8AC3E}">
-        <p14:creationId xmlns:p14="http://schemas.microsoft.com/office/powerpoint/2010/main" val="3478770812"/>
+        <p14:creationId xmlns:p14="http://schemas.microsoft.com/office/powerpoint/2010/main" val="3998291529"/>
       </p:ext>
     </p:extLst>
   </p:cSld>

</xml_diff>

<commit_message>
Deploy website Wed Feb 21 13:48:59 PST 2024
</commit_message>
<xml_diff>
--- a/assets/slides/sp24/07-HOFs_Environments.pptx
+++ b/assets/slides/sp24/07-HOFs_Environments.pptx
@@ -5,7 +5,7 @@
     <p:sldMasterId id="2147483703" r:id="rId1"/>
   </p:sldMasterIdLst>
   <p:notesMasterIdLst>
-    <p:notesMasterId r:id="rId25"/>
+    <p:notesMasterId r:id="rId26"/>
   </p:notesMasterIdLst>
   <p:sldIdLst>
     <p:sldId id="256" r:id="rId2"/>
@@ -14,23 +14,24 @@
     <p:sldId id="392" r:id="rId5"/>
     <p:sldId id="396" r:id="rId6"/>
     <p:sldId id="402" r:id="rId7"/>
-    <p:sldId id="397" r:id="rId8"/>
-    <p:sldId id="398" r:id="rId9"/>
-    <p:sldId id="399" r:id="rId10"/>
-    <p:sldId id="286" r:id="rId11"/>
-    <p:sldId id="291" r:id="rId12"/>
-    <p:sldId id="285" r:id="rId13"/>
-    <p:sldId id="268" r:id="rId14"/>
-    <p:sldId id="287" r:id="rId15"/>
-    <p:sldId id="401" r:id="rId16"/>
-    <p:sldId id="289" r:id="rId17"/>
-    <p:sldId id="265" r:id="rId18"/>
-    <p:sldId id="390" r:id="rId19"/>
-    <p:sldId id="389" r:id="rId20"/>
-    <p:sldId id="387" r:id="rId21"/>
-    <p:sldId id="388" r:id="rId22"/>
-    <p:sldId id="288" r:id="rId23"/>
-    <p:sldId id="400" r:id="rId24"/>
+    <p:sldId id="435" r:id="rId8"/>
+    <p:sldId id="397" r:id="rId9"/>
+    <p:sldId id="398" r:id="rId10"/>
+    <p:sldId id="399" r:id="rId11"/>
+    <p:sldId id="286" r:id="rId12"/>
+    <p:sldId id="291" r:id="rId13"/>
+    <p:sldId id="285" r:id="rId14"/>
+    <p:sldId id="268" r:id="rId15"/>
+    <p:sldId id="287" r:id="rId16"/>
+    <p:sldId id="401" r:id="rId17"/>
+    <p:sldId id="289" r:id="rId18"/>
+    <p:sldId id="265" r:id="rId19"/>
+    <p:sldId id="390" r:id="rId20"/>
+    <p:sldId id="389" r:id="rId21"/>
+    <p:sldId id="387" r:id="rId22"/>
+    <p:sldId id="388" r:id="rId23"/>
+    <p:sldId id="288" r:id="rId24"/>
+    <p:sldId id="400" r:id="rId25"/>
   </p:sldIdLst>
   <p:sldSz cx="12192000" cy="6858000"/>
   <p:notesSz cx="6997700" cy="9194800"/>
@@ -797,7 +798,7 @@
                 <a:latin typeface="Times New Roman"/>
                 <a:ea typeface="ＭＳ Ｐゴシック"/>
               </a:rPr>
-              <a:t>10</a:t>
+              <a:t>11</a:t>
             </a:fld>
             <a:endParaRPr lang="en-US" sz="2400" b="0" strike="noStrike" spc="-1">
               <a:solidFill>
@@ -921,7 +922,7 @@
                 <a:latin typeface="Times New Roman"/>
                 <a:ea typeface="ＭＳ Ｐゴシック"/>
               </a:rPr>
-              <a:t>14</a:t>
+              <a:t>15</a:t>
             </a:fld>
             <a:endParaRPr lang="en-US" sz="2400" b="0" strike="noStrike" spc="-1">
               <a:solidFill>
@@ -1077,7 +1078,7 @@
                 </a:uFill>
                 <a:latin typeface="Times New Roman"/>
               </a:rPr>
-              <a:t>17</a:t>
+              <a:t>18</a:t>
             </a:fld>
             <a:endParaRPr lang="en-US" sz="1400" b="0" strike="noStrike" spc="-1">
               <a:solidFill>
@@ -1196,7 +1197,7 @@
                 </a:uFill>
                 <a:latin typeface="Times New Roman"/>
               </a:rPr>
-              <a:t>20</a:t>
+              <a:t>21</a:t>
             </a:fld>
             <a:endParaRPr lang="en-US" sz="1400" b="0" strike="noStrike" spc="-1">
               <a:solidFill>
@@ -1315,7 +1316,7 @@
                 </a:uFill>
                 <a:latin typeface="Times New Roman"/>
               </a:rPr>
-              <a:t>22</a:t>
+              <a:t>23</a:t>
             </a:fld>
             <a:endParaRPr lang="en-US" sz="1400" b="0" strike="noStrike" spc="-1">
               <a:solidFill>
@@ -4101,7 +4102,7 @@
           </a:ln>
           <a:extLst>
             <a:ext uri="{909E8E84-426E-40dd-AFC4-6F175D3DCCD1}">
-              <a14:hiddenFill xmlns:a14="http://schemas.microsoft.com/office/drawing/2010/main" xmlns="">
+              <a14:hiddenFill xmlns="" xmlns:a14="http://schemas.microsoft.com/office/drawing/2010/main">
                 <a:noFill/>
               </a14:hiddenFill>
             </a:ext>
@@ -4223,14 +4224,14 @@
           </a:ln>
           <a:extLst>
             <a:ext uri="{909E8E84-426E-40dd-AFC4-6F175D3DCCD1}">
-              <a14:hiddenFill xmlns:a14="http://schemas.microsoft.com/office/drawing/2010/main" xmlns="">
+              <a14:hiddenFill xmlns="" xmlns:a14="http://schemas.microsoft.com/office/drawing/2010/main">
                 <a:solidFill>
                   <a:srgbClr val="FFFFFF"/>
                 </a:solidFill>
               </a14:hiddenFill>
             </a:ext>
             <a:ext uri="{91240B29-F687-4f45-9708-019B960494DF}">
-              <a14:hiddenLine xmlns:a14="http://schemas.microsoft.com/office/drawing/2010/main" xmlns="" w="9525">
+              <a14:hiddenLine xmlns="" xmlns:a14="http://schemas.microsoft.com/office/drawing/2010/main" w="9525">
                 <a:solidFill>
                   <a:srgbClr val="000000"/>
                 </a:solidFill>
@@ -4240,7 +4241,7 @@
               </a14:hiddenLine>
             </a:ext>
             <a:ext uri="{FAA26D3D-D897-4be2-8F04-BA451C77F1D7}">
-              <ma14:placeholderFlag xmlns:ma14="http://schemas.microsoft.com/office/mac/drawingml/2011/main" xmlns="" val="1"/>
+              <ma14:placeholderFlag xmlns="" xmlns:ma14="http://schemas.microsoft.com/office/mac/drawingml/2011/main" val="1"/>
             </a:ext>
           </a:extLst>
         </p:spPr>
@@ -4798,7 +4799,7 @@
           </a:ln>
           <a:extLst>
             <a:ext uri="{909E8E84-426E-40dd-AFC4-6F175D3DCCD1}">
-              <a14:hiddenFill xmlns:a14="http://schemas.microsoft.com/office/drawing/2010/main" xmlns="">
+              <a14:hiddenFill xmlns="" xmlns:a14="http://schemas.microsoft.com/office/drawing/2010/main">
                 <a:noFill/>
               </a14:hiddenFill>
             </a:ext>
@@ -4843,14 +4844,14 @@
           </a:ln>
           <a:extLst>
             <a:ext uri="{909E8E84-426E-40dd-AFC4-6F175D3DCCD1}">
-              <a14:hiddenFill xmlns:a14="http://schemas.microsoft.com/office/drawing/2010/main" xmlns="">
+              <a14:hiddenFill xmlns="" xmlns:a14="http://schemas.microsoft.com/office/drawing/2010/main">
                 <a:solidFill>
                   <a:srgbClr val="FFFFFF"/>
                 </a:solidFill>
               </a14:hiddenFill>
             </a:ext>
             <a:ext uri="{91240B29-F687-4f45-9708-019B960494DF}">
-              <a14:hiddenLine xmlns:a14="http://schemas.microsoft.com/office/drawing/2010/main" xmlns="" w="9525">
+              <a14:hiddenLine xmlns="" xmlns:a14="http://schemas.microsoft.com/office/drawing/2010/main" w="9525">
                 <a:solidFill>
                   <a:srgbClr val="000000"/>
                 </a:solidFill>
@@ -4958,14 +4959,14 @@
           </a:ln>
           <a:extLst>
             <a:ext uri="{909E8E84-426E-40dd-AFC4-6F175D3DCCD1}">
-              <a14:hiddenFill xmlns:a14="http://schemas.microsoft.com/office/drawing/2010/main" xmlns="">
+              <a14:hiddenFill xmlns="" xmlns:a14="http://schemas.microsoft.com/office/drawing/2010/main">
                 <a:solidFill>
                   <a:srgbClr val="FFFFFF"/>
                 </a:solidFill>
               </a14:hiddenFill>
             </a:ext>
             <a:ext uri="{91240B29-F687-4f45-9708-019B960494DF}">
-              <a14:hiddenLine xmlns:a14="http://schemas.microsoft.com/office/drawing/2010/main" xmlns="" w="9525">
+              <a14:hiddenLine xmlns="" xmlns:a14="http://schemas.microsoft.com/office/drawing/2010/main" w="9525">
                 <a:solidFill>
                   <a:srgbClr val="000000"/>
                 </a:solidFill>
@@ -4975,7 +4976,7 @@
               </a14:hiddenLine>
             </a:ext>
             <a:ext uri="{FAA26D3D-D897-4be2-8F04-BA451C77F1D7}">
-              <ma14:placeholderFlag xmlns:ma14="http://schemas.microsoft.com/office/mac/drawingml/2011/main" xmlns="" val="1"/>
+              <ma14:placeholderFlag xmlns="" xmlns:ma14="http://schemas.microsoft.com/office/mac/drawingml/2011/main" val="1"/>
             </a:ext>
           </a:extLst>
         </p:spPr>
@@ -5323,14 +5324,14 @@
           </a:ln>
           <a:extLst>
             <a:ext uri="{909E8E84-426E-40dd-AFC4-6F175D3DCCD1}">
-              <a14:hiddenFill xmlns:a14="http://schemas.microsoft.com/office/drawing/2010/main" xmlns="">
+              <a14:hiddenFill xmlns="" xmlns:a14="http://schemas.microsoft.com/office/drawing/2010/main">
                 <a:solidFill>
                   <a:srgbClr val="FFFFFF"/>
                 </a:solidFill>
               </a14:hiddenFill>
             </a:ext>
             <a:ext uri="{91240B29-F687-4f45-9708-019B960494DF}">
-              <a14:hiddenLine xmlns:a14="http://schemas.microsoft.com/office/drawing/2010/main" xmlns="" w="9525">
+              <a14:hiddenLine xmlns="" xmlns:a14="http://schemas.microsoft.com/office/drawing/2010/main" w="9525">
                 <a:solidFill>
                   <a:srgbClr val="000000"/>
                 </a:solidFill>
@@ -5340,7 +5341,7 @@
               </a14:hiddenLine>
             </a:ext>
             <a:ext uri="{FAA26D3D-D897-4be2-8F04-BA451C77F1D7}">
-              <ma14:placeholderFlag xmlns:ma14="http://schemas.microsoft.com/office/mac/drawingml/2011/main" xmlns="" val="1"/>
+              <ma14:placeholderFlag xmlns="" xmlns:ma14="http://schemas.microsoft.com/office/mac/drawingml/2011/main" val="1"/>
             </a:ext>
           </a:extLst>
         </p:spPr>
@@ -6401,7 +6402,7 @@
           </a:ln>
           <a:extLst>
             <a:ext uri="{909E8E84-426E-40dd-AFC4-6F175D3DCCD1}">
-              <a14:hiddenFill xmlns="" xmlns:a14="http://schemas.microsoft.com/office/drawing/2010/main">
+              <a14:hiddenFill xmlns:a14="http://schemas.microsoft.com/office/drawing/2010/main" xmlns="">
                 <a:noFill/>
               </a14:hiddenFill>
             </a:ext>
@@ -6526,14 +6527,14 @@
           </a:ln>
           <a:extLst>
             <a:ext uri="{909E8E84-426E-40dd-AFC4-6F175D3DCCD1}">
-              <a14:hiddenFill xmlns="" xmlns:a14="http://schemas.microsoft.com/office/drawing/2010/main">
+              <a14:hiddenFill xmlns:a14="http://schemas.microsoft.com/office/drawing/2010/main" xmlns="">
                 <a:solidFill>
                   <a:srgbClr val="FFFFFF"/>
                 </a:solidFill>
               </a14:hiddenFill>
             </a:ext>
             <a:ext uri="{91240B29-F687-4f45-9708-019B960494DF}">
-              <a14:hiddenLine xmlns="" xmlns:a14="http://schemas.microsoft.com/office/drawing/2010/main" w="9525">
+              <a14:hiddenLine xmlns:a14="http://schemas.microsoft.com/office/drawing/2010/main" xmlns="" w="9525">
                 <a:solidFill>
                   <a:srgbClr val="000000"/>
                 </a:solidFill>
@@ -6543,7 +6544,7 @@
               </a14:hiddenLine>
             </a:ext>
             <a:ext uri="{FAA26D3D-D897-4be2-8F04-BA451C77F1D7}">
-              <ma14:placeholderFlag xmlns="" xmlns:ma14="http://schemas.microsoft.com/office/mac/drawingml/2011/main" val="1"/>
+              <ma14:placeholderFlag xmlns:ma14="http://schemas.microsoft.com/office/mac/drawingml/2011/main" xmlns="" val="1"/>
             </a:ext>
           </a:extLst>
         </p:spPr>
@@ -8686,14 +8687,14 @@
           </a:ln>
           <a:extLst>
             <a:ext uri="{909E8E84-426E-40dd-AFC4-6F175D3DCCD1}">
-              <a14:hiddenFill xmlns="" xmlns:a14="http://schemas.microsoft.com/office/drawing/2010/main">
+              <a14:hiddenFill xmlns:a14="http://schemas.microsoft.com/office/drawing/2010/main" xmlns="">
                 <a:solidFill>
                   <a:srgbClr val="FFFFFF"/>
                 </a:solidFill>
               </a14:hiddenFill>
             </a:ext>
             <a:ext uri="{91240B29-F687-4f45-9708-019B960494DF}">
-              <a14:hiddenLine xmlns="" xmlns:a14="http://schemas.microsoft.com/office/drawing/2010/main" w="9525">
+              <a14:hiddenLine xmlns:a14="http://schemas.microsoft.com/office/drawing/2010/main" xmlns="" w="9525">
                 <a:solidFill>
                   <a:srgbClr val="000000"/>
                 </a:solidFill>
@@ -8703,7 +8704,7 @@
               </a14:hiddenLine>
             </a:ext>
             <a:ext uri="{FAA26D3D-D897-4be2-8F04-BA451C77F1D7}">
-              <ma14:placeholderFlag xmlns="" xmlns:ma14="http://schemas.microsoft.com/office/mac/drawingml/2011/main" val="1"/>
+              <ma14:placeholderFlag xmlns:ma14="http://schemas.microsoft.com/office/mac/drawingml/2011/main" xmlns="" val="1"/>
             </a:ext>
           </a:extLst>
         </p:spPr>
@@ -8748,14 +8749,14 @@
           </a:ln>
           <a:extLst>
             <a:ext uri="{909E8E84-426E-40dd-AFC4-6F175D3DCCD1}">
-              <a14:hiddenFill xmlns="" xmlns:a14="http://schemas.microsoft.com/office/drawing/2010/main">
+              <a14:hiddenFill xmlns:a14="http://schemas.microsoft.com/office/drawing/2010/main" xmlns="">
                 <a:solidFill>
                   <a:srgbClr val="FFFFFF"/>
                 </a:solidFill>
               </a14:hiddenFill>
             </a:ext>
             <a:ext uri="{91240B29-F687-4f45-9708-019B960494DF}">
-              <a14:hiddenLine xmlns="" xmlns:a14="http://schemas.microsoft.com/office/drawing/2010/main" w="9525">
+              <a14:hiddenLine xmlns:a14="http://schemas.microsoft.com/office/drawing/2010/main" xmlns="" w="9525">
                 <a:solidFill>
                   <a:srgbClr val="000000"/>
                 </a:solidFill>
@@ -8765,7 +8766,7 @@
               </a14:hiddenLine>
             </a:ext>
             <a:ext uri="{FAA26D3D-D897-4be2-8F04-BA451C77F1D7}">
-              <ma14:placeholderFlag xmlns="" xmlns:ma14="http://schemas.microsoft.com/office/mac/drawingml/2011/main" val="1"/>
+              <ma14:placeholderFlag xmlns:ma14="http://schemas.microsoft.com/office/mac/drawingml/2011/main" xmlns="" val="1"/>
             </a:ext>
           </a:extLst>
         </p:spPr>
@@ -9516,6 +9517,617 @@
           <p:cNvPr id="2" name="Title 1">
             <a:extLst>
               <a:ext uri="{FF2B5EF4-FFF2-40B4-BE49-F238E27FC236}">
+                <a16:creationId xmlns:a16="http://schemas.microsoft.com/office/drawing/2014/main" id="{C3A57493-490E-6541-9973-A295DBF3E35F}"/>
+              </a:ext>
+            </a:extLst>
+          </p:cNvPr>
+          <p:cNvSpPr>
+            <a:spLocks noGrp="1"/>
+          </p:cNvSpPr>
+          <p:nvPr>
+            <p:ph type="title"/>
+          </p:nvPr>
+        </p:nvSpPr>
+        <p:spPr/>
+        <p:txBody>
+          <a:bodyPr/>
+          <a:lstStyle/>
+          <a:p>
+            <a:r>
+              <a:rPr lang="en-US" dirty="0"/>
+              <a:t>Functional Sequence (List) Operations</a:t>
+            </a:r>
+          </a:p>
+        </p:txBody>
+      </p:sp>
+      <p:sp>
+        <p:nvSpPr>
+          <p:cNvPr id="3" name="Content Placeholder 2">
+            <a:extLst>
+              <a:ext uri="{FF2B5EF4-FFF2-40B4-BE49-F238E27FC236}">
+                <a16:creationId xmlns:a16="http://schemas.microsoft.com/office/drawing/2014/main" id="{AAAEACB3-3528-3B4E-9961-861C7DBB5CBC}"/>
+              </a:ext>
+            </a:extLst>
+          </p:cNvPr>
+          <p:cNvSpPr>
+            <a:spLocks noGrp="1"/>
+          </p:cNvSpPr>
+          <p:nvPr>
+            <p:ph idx="1"/>
+          </p:nvPr>
+        </p:nvSpPr>
+        <p:spPr/>
+        <p:txBody>
+          <a:bodyPr/>
+          <a:lstStyle/>
+          <a:p>
+            <a:r>
+              <a:rPr lang="en-US" dirty="0"/>
+              <a:t>Goal: Transform a</a:t>
+            </a:r>
+            <a:r>
+              <a:rPr lang="en-US" i="1" dirty="0"/>
+              <a:t> sequence</a:t>
+            </a:r>
+            <a:r>
+              <a:rPr lang="en-US" dirty="0"/>
+              <a:t>, and return a new result</a:t>
+            </a:r>
+          </a:p>
+          <a:p>
+            <a:r>
+              <a:rPr lang="en-US" dirty="0"/>
+              <a:t>We'll use 3 functions that are hallmarks of functional programming</a:t>
+            </a:r>
+          </a:p>
+          <a:p>
+            <a:r>
+              <a:rPr lang="en-US" dirty="0"/>
+              <a:t>Each of these takes in a function and a sequence as arguments</a:t>
+            </a:r>
+          </a:p>
+          <a:p>
+            <a:endParaRPr lang="en-US" dirty="0"/>
+          </a:p>
+          <a:p>
+            <a:pPr marL="0" indent="0">
+              <a:buNone/>
+            </a:pPr>
+            <a:endParaRPr lang="en-US" dirty="0"/>
+          </a:p>
+          <a:p>
+            <a:pPr marL="0" indent="0">
+              <a:buNone/>
+            </a:pPr>
+            <a:endParaRPr lang="en-US" dirty="0"/>
+          </a:p>
+        </p:txBody>
+      </p:sp>
+      <p:sp>
+        <p:nvSpPr>
+          <p:cNvPr id="4" name="Footer Placeholder 3">
+            <a:extLst>
+              <a:ext uri="{FF2B5EF4-FFF2-40B4-BE49-F238E27FC236}">
+                <a16:creationId xmlns:a16="http://schemas.microsoft.com/office/drawing/2014/main" id="{B4344FEE-E72B-B65D-1AD5-8C1189F1FACC}"/>
+              </a:ext>
+            </a:extLst>
+          </p:cNvPr>
+          <p:cNvSpPr>
+            <a:spLocks noGrp="1"/>
+          </p:cNvSpPr>
+          <p:nvPr>
+            <p:ph type="ftr" sz="quarter" idx="10"/>
+          </p:nvPr>
+        </p:nvSpPr>
+        <p:spPr>
+          <a:xfrm>
+            <a:off x="4038599" y="6356350"/>
+            <a:ext cx="4348655" cy="365125"/>
+          </a:xfrm>
+        </p:spPr>
+        <p:txBody>
+          <a:bodyPr/>
+          <a:lstStyle/>
+          <a:p>
+            <a:r>
+              <a:rPr lang="en-US" dirty="0"/>
+              <a:t>Michael Ball | UC Berkeley | https://c88c.org | © CC BY-NC-SA</a:t>
+            </a:r>
+          </a:p>
+        </p:txBody>
+      </p:sp>
+      <p:graphicFrame>
+        <p:nvGraphicFramePr>
+          <p:cNvPr id="6" name="Table 6">
+            <a:extLst>
+              <a:ext uri="{FF2B5EF4-FFF2-40B4-BE49-F238E27FC236}">
+                <a16:creationId xmlns:a16="http://schemas.microsoft.com/office/drawing/2014/main" id="{25EBD1E5-B78E-72B6-6282-D80B13046B4F}"/>
+              </a:ext>
+            </a:extLst>
+          </p:cNvPr>
+          <p:cNvGraphicFramePr>
+            <a:graphicFrameLocks noGrp="1"/>
+          </p:cNvGraphicFramePr>
+          <p:nvPr/>
+        </p:nvGraphicFramePr>
+        <p:xfrm>
+          <a:off x="420415" y="2792760"/>
+          <a:ext cx="10594426" cy="3421927"/>
+        </p:xfrm>
+        <a:graphic>
+          <a:graphicData uri="http://schemas.openxmlformats.org/drawingml/2006/table">
+            <a:tbl>
+              <a:tblPr firstRow="1" bandRow="1">
+                <a:tableStyleId>{5C22544A-7EE6-4342-B048-85BDC9FD1C3A}</a:tableStyleId>
+              </a:tblPr>
+              <a:tblGrid>
+                <a:gridCol w="1692164">
+                  <a:extLst>
+                    <a:ext uri="{9D8B030D-6E8A-4147-A177-3AD203B41FA5}">
+                      <a16:colId xmlns:a16="http://schemas.microsoft.com/office/drawing/2014/main" val="2059777158"/>
+                    </a:ext>
+                  </a:extLst>
+                </a:gridCol>
+                <a:gridCol w="2333297">
+                  <a:extLst>
+                    <a:ext uri="{9D8B030D-6E8A-4147-A177-3AD203B41FA5}">
+                      <a16:colId xmlns:a16="http://schemas.microsoft.com/office/drawing/2014/main" val="2894650286"/>
+                    </a:ext>
+                  </a:extLst>
+                </a:gridCol>
+                <a:gridCol w="2280745">
+                  <a:extLst>
+                    <a:ext uri="{9D8B030D-6E8A-4147-A177-3AD203B41FA5}">
+                      <a16:colId xmlns:a16="http://schemas.microsoft.com/office/drawing/2014/main" val="3290081916"/>
+                    </a:ext>
+                  </a:extLst>
+                </a:gridCol>
+                <a:gridCol w="2007476">
+                  <a:extLst>
+                    <a:ext uri="{9D8B030D-6E8A-4147-A177-3AD203B41FA5}">
+                      <a16:colId xmlns:a16="http://schemas.microsoft.com/office/drawing/2014/main" val="2002986398"/>
+                    </a:ext>
+                  </a:extLst>
+                </a:gridCol>
+                <a:gridCol w="2280744">
+                  <a:extLst>
+                    <a:ext uri="{9D8B030D-6E8A-4147-A177-3AD203B41FA5}">
+                      <a16:colId xmlns:a16="http://schemas.microsoft.com/office/drawing/2014/main" val="756374945"/>
+                    </a:ext>
+                  </a:extLst>
+                </a:gridCol>
+              </a:tblGrid>
+              <a:tr h="678727">
+                <a:tc>
+                  <a:txBody>
+                    <a:bodyPr/>
+                    <a:lstStyle/>
+                    <a:p>
+                      <a:pPr algn="ctr"/>
+                      <a:r>
+                        <a:rPr lang="en-US" sz="2000" b="1" dirty="0">
+                          <a:latin typeface="FreightSans Pro Book" panose="02000606030000020004" pitchFamily="2" charset="0"/>
+                        </a:rPr>
+                        <a:t>Function</a:t>
+                      </a:r>
+                    </a:p>
+                  </a:txBody>
+                  <a:tcPr anchor="ctr"/>
+                </a:tc>
+                <a:tc>
+                  <a:txBody>
+                    <a:bodyPr/>
+                    <a:lstStyle/>
+                    <a:p>
+                      <a:pPr algn="ctr"/>
+                      <a:r>
+                        <a:rPr lang="en-US" sz="2000" dirty="0">
+                          <a:latin typeface="FreightSans Pro Book" panose="02000606030000020004" pitchFamily="2" charset="0"/>
+                        </a:rPr>
+                        <a:t>Action</a:t>
+                      </a:r>
+                    </a:p>
+                  </a:txBody>
+                  <a:tcPr anchor="ctr"/>
+                </a:tc>
+                <a:tc>
+                  <a:txBody>
+                    <a:bodyPr/>
+                    <a:lstStyle/>
+                    <a:p>
+                      <a:pPr algn="ctr"/>
+                      <a:r>
+                        <a:rPr lang="en-US" sz="2000" dirty="0">
+                          <a:latin typeface="FreightSans Pro Book" panose="02000606030000020004" pitchFamily="2" charset="0"/>
+                        </a:rPr>
+                        <a:t>Input arguments</a:t>
+                      </a:r>
+                    </a:p>
+                  </a:txBody>
+                  <a:tcPr anchor="ctr"/>
+                </a:tc>
+                <a:tc>
+                  <a:txBody>
+                    <a:bodyPr/>
+                    <a:lstStyle/>
+                    <a:p>
+                      <a:pPr algn="ctr"/>
+                      <a:r>
+                        <a:rPr lang="en-US" sz="2000" dirty="0">
+                          <a:latin typeface="FreightSans Pro Book" panose="02000606030000020004" pitchFamily="2" charset="0"/>
+                        </a:rPr>
+                        <a:t>Input Fn. Returns</a:t>
+                      </a:r>
+                    </a:p>
+                  </a:txBody>
+                  <a:tcPr anchor="ctr"/>
+                </a:tc>
+                <a:tc>
+                  <a:txBody>
+                    <a:bodyPr/>
+                    <a:lstStyle/>
+                    <a:p>
+                      <a:pPr marL="0" marR="0" lvl="0" indent="0" algn="ctr" defTabSz="342900" rtl="0" eaLnBrk="1" fontAlgn="auto" latinLnBrk="0" hangingPunct="1">
+                        <a:lnSpc>
+                          <a:spcPct val="100000"/>
+                        </a:lnSpc>
+                        <a:spcBef>
+                          <a:spcPts val="0"/>
+                        </a:spcBef>
+                        <a:spcAft>
+                          <a:spcPts val="0"/>
+                        </a:spcAft>
+                        <a:buClrTx/>
+                        <a:buSzTx/>
+                        <a:buFontTx/>
+                        <a:buNone/>
+                        <a:tabLst/>
+                        <a:defRPr/>
+                      </a:pPr>
+                      <a:r>
+                        <a:rPr lang="en-US" sz="2000" dirty="0">
+                          <a:latin typeface="FreightSans Pro Book" panose="02000606030000020004" pitchFamily="2" charset="0"/>
+                        </a:rPr>
+                        <a:t>Output</a:t>
+                      </a:r>
+                    </a:p>
+                  </a:txBody>
+                  <a:tcPr anchor="ctr"/>
+                </a:tc>
+                <a:extLst>
+                  <a:ext uri="{0D108BD9-81ED-4DB2-BD59-A6C34878D82A}">
+                    <a16:rowId xmlns:a16="http://schemas.microsoft.com/office/drawing/2014/main" val="1140645906"/>
+                  </a:ext>
+                </a:extLst>
+              </a:tr>
+              <a:tr h="678727">
+                <a:tc>
+                  <a:txBody>
+                    <a:bodyPr/>
+                    <a:lstStyle/>
+                    <a:p>
+                      <a:pPr algn="ctr"/>
+                      <a:r>
+                        <a:rPr lang="en-US" sz="1800" b="1" dirty="0">
+                          <a:latin typeface="Source Code Pro" panose="020B0509030403020204" pitchFamily="49" charset="77"/>
+                        </a:rPr>
+                        <a:t>map</a:t>
+                      </a:r>
+                    </a:p>
+                  </a:txBody>
+                  <a:tcPr anchor="ctr"/>
+                </a:tc>
+                <a:tc>
+                  <a:txBody>
+                    <a:bodyPr/>
+                    <a:lstStyle/>
+                    <a:p>
+                      <a:r>
+                        <a:rPr lang="en-US" sz="1800" b="0" i="0" dirty="0">
+                          <a:latin typeface="Open Sans Light" panose="020B0606030504020204" pitchFamily="34" charset="0"/>
+                          <a:ea typeface="Open Sans Light" panose="020B0606030504020204" pitchFamily="34" charset="0"/>
+                          <a:cs typeface="Open Sans Light" panose="020B0606030504020204" pitchFamily="34" charset="0"/>
+                        </a:rPr>
+                        <a:t>Transform every item</a:t>
+                      </a:r>
+                    </a:p>
+                  </a:txBody>
+                  <a:tcPr anchor="ctr"/>
+                </a:tc>
+                <a:tc>
+                  <a:txBody>
+                    <a:bodyPr/>
+                    <a:lstStyle/>
+                    <a:p>
+                      <a:r>
+                        <a:rPr lang="en-US" sz="1800" b="0" i="0" dirty="0">
+                          <a:latin typeface="Open Sans Light" panose="020B0606030504020204" pitchFamily="34" charset="0"/>
+                          <a:ea typeface="Open Sans Light" panose="020B0606030504020204" pitchFamily="34" charset="0"/>
+                          <a:cs typeface="Open Sans Light" panose="020B0606030504020204" pitchFamily="34" charset="0"/>
+                        </a:rPr>
+                        <a:t>1 (each item)</a:t>
+                      </a:r>
+                    </a:p>
+                  </a:txBody>
+                  <a:tcPr anchor="ctr"/>
+                </a:tc>
+                <a:tc>
+                  <a:txBody>
+                    <a:bodyPr/>
+                    <a:lstStyle/>
+                    <a:p>
+                      <a:r>
+                        <a:rPr lang="en-US" sz="1800" b="0" i="0" dirty="0">
+                          <a:latin typeface="Open Sans Light" panose="020B0606030504020204" pitchFamily="34" charset="0"/>
+                          <a:ea typeface="Open Sans Light" panose="020B0606030504020204" pitchFamily="34" charset="0"/>
+                          <a:cs typeface="Open Sans Light" panose="020B0606030504020204" pitchFamily="34" charset="0"/>
+                        </a:rPr>
+                        <a:t>"Anything", a new item</a:t>
+                      </a:r>
+                    </a:p>
+                  </a:txBody>
+                  <a:tcPr anchor="ctr"/>
+                </a:tc>
+                <a:tc>
+                  <a:txBody>
+                    <a:bodyPr/>
+                    <a:lstStyle/>
+                    <a:p>
+                      <a:r>
+                        <a:rPr lang="en-US" sz="1800" b="1" i="0" dirty="0">
+                          <a:latin typeface="Open Sans ExtraBold" panose="020B0606030504020204" pitchFamily="34" charset="0"/>
+                          <a:ea typeface="Open Sans ExtraBold" panose="020B0606030504020204" pitchFamily="34" charset="0"/>
+                          <a:cs typeface="Open Sans ExtraBold" panose="020B0606030504020204" pitchFamily="34" charset="0"/>
+                        </a:rPr>
+                        <a:t>List</a:t>
+                      </a:r>
+                      <a:r>
+                        <a:rPr lang="en-US" sz="1800" b="0" i="0" dirty="0">
+                          <a:latin typeface="Open Sans Light" panose="020B0606030504020204" pitchFamily="34" charset="0"/>
+                          <a:ea typeface="Open Sans Light" panose="020B0606030504020204" pitchFamily="34" charset="0"/>
+                          <a:cs typeface="Open Sans Light" panose="020B0606030504020204" pitchFamily="34" charset="0"/>
+                        </a:rPr>
+                        <a:t>: same length, but possibly new values</a:t>
+                      </a:r>
+                    </a:p>
+                  </a:txBody>
+                  <a:tcPr anchor="ctr"/>
+                </a:tc>
+                <a:extLst>
+                  <a:ext uri="{0D108BD9-81ED-4DB2-BD59-A6C34878D82A}">
+                    <a16:rowId xmlns:a16="http://schemas.microsoft.com/office/drawing/2014/main" val="1601251051"/>
+                  </a:ext>
+                </a:extLst>
+              </a:tr>
+              <a:tr h="678727">
+                <a:tc>
+                  <a:txBody>
+                    <a:bodyPr/>
+                    <a:lstStyle/>
+                    <a:p>
+                      <a:pPr algn="ctr"/>
+                      <a:r>
+                        <a:rPr lang="en-US" sz="1800" b="1" dirty="0">
+                          <a:latin typeface="Source Code Pro" panose="020B0509030403020204" pitchFamily="49" charset="77"/>
+                        </a:rPr>
+                        <a:t>filter</a:t>
+                      </a:r>
+                    </a:p>
+                  </a:txBody>
+                  <a:tcPr anchor="ctr"/>
+                </a:tc>
+                <a:tc>
+                  <a:txBody>
+                    <a:bodyPr/>
+                    <a:lstStyle/>
+                    <a:p>
+                      <a:r>
+                        <a:rPr lang="en-US" sz="1800" b="0" i="0" dirty="0">
+                          <a:latin typeface="Open Sans Light" panose="020B0606030504020204" pitchFamily="34" charset="0"/>
+                          <a:ea typeface="Open Sans Light" panose="020B0606030504020204" pitchFamily="34" charset="0"/>
+                          <a:cs typeface="Open Sans Light" panose="020B0606030504020204" pitchFamily="34" charset="0"/>
+                        </a:rPr>
+                        <a:t>Return a list with fewer items</a:t>
+                      </a:r>
+                    </a:p>
+                  </a:txBody>
+                  <a:tcPr anchor="ctr"/>
+                </a:tc>
+                <a:tc>
+                  <a:txBody>
+                    <a:bodyPr/>
+                    <a:lstStyle/>
+                    <a:p>
+                      <a:r>
+                        <a:rPr lang="en-US" sz="1800" b="0" i="0" dirty="0">
+                          <a:latin typeface="Open Sans Light" panose="020B0606030504020204" pitchFamily="34" charset="0"/>
+                          <a:ea typeface="Open Sans Light" panose="020B0606030504020204" pitchFamily="34" charset="0"/>
+                          <a:cs typeface="Open Sans Light" panose="020B0606030504020204" pitchFamily="34" charset="0"/>
+                        </a:rPr>
+                        <a:t>1 (each item)</a:t>
+                      </a:r>
+                    </a:p>
+                  </a:txBody>
+                  <a:tcPr anchor="ctr"/>
+                </a:tc>
+                <a:tc>
+                  <a:txBody>
+                    <a:bodyPr/>
+                    <a:lstStyle/>
+                    <a:p>
+                      <a:r>
+                        <a:rPr lang="en-US" sz="1800" b="0" i="0" dirty="0">
+                          <a:latin typeface="Open Sans Light" panose="020B0606030504020204" pitchFamily="34" charset="0"/>
+                          <a:ea typeface="Open Sans Light" panose="020B0606030504020204" pitchFamily="34" charset="0"/>
+                          <a:cs typeface="Open Sans Light" panose="020B0606030504020204" pitchFamily="34" charset="0"/>
+                        </a:rPr>
+                        <a:t>A Boolean</a:t>
+                      </a:r>
+                    </a:p>
+                  </a:txBody>
+                  <a:tcPr anchor="ctr"/>
+                </a:tc>
+                <a:tc>
+                  <a:txBody>
+                    <a:bodyPr/>
+                    <a:lstStyle/>
+                    <a:p>
+                      <a:r>
+                        <a:rPr lang="en-US" sz="1800" b="1" i="0" dirty="0">
+                          <a:latin typeface="Open Sans ExtraBold" panose="020B0606030504020204" pitchFamily="34" charset="0"/>
+                          <a:ea typeface="Open Sans ExtraBold" panose="020B0606030504020204" pitchFamily="34" charset="0"/>
+                          <a:cs typeface="Open Sans ExtraBold" panose="020B0606030504020204" pitchFamily="34" charset="0"/>
+                        </a:rPr>
+                        <a:t>List: </a:t>
+                      </a:r>
+                      <a:r>
+                        <a:rPr lang="en-US" sz="1800" b="0" i="0" dirty="0">
+                          <a:latin typeface="Open Sans Light" panose="020B0606030504020204" pitchFamily="34" charset="0"/>
+                          <a:ea typeface="Open Sans Light" panose="020B0606030504020204" pitchFamily="34" charset="0"/>
+                          <a:cs typeface="Open Sans Light" panose="020B0606030504020204" pitchFamily="34" charset="0"/>
+                        </a:rPr>
+                        <a:t>possibly fewer items, values are the same</a:t>
+                      </a:r>
+                    </a:p>
+                  </a:txBody>
+                  <a:tcPr anchor="ctr"/>
+                </a:tc>
+                <a:extLst>
+                  <a:ext uri="{0D108BD9-81ED-4DB2-BD59-A6C34878D82A}">
+                    <a16:rowId xmlns:a16="http://schemas.microsoft.com/office/drawing/2014/main" val="1639889719"/>
+                  </a:ext>
+                </a:extLst>
+              </a:tr>
+              <a:tr h="678727">
+                <a:tc>
+                  <a:txBody>
+                    <a:bodyPr/>
+                    <a:lstStyle/>
+                    <a:p>
+                      <a:pPr algn="ctr"/>
+                      <a:r>
+                        <a:rPr lang="en-US" sz="1800" b="1" dirty="0">
+                          <a:latin typeface="Source Code Pro" panose="020B0509030403020204" pitchFamily="49" charset="77"/>
+                        </a:rPr>
+                        <a:t>reduce</a:t>
+                      </a:r>
+                    </a:p>
+                  </a:txBody>
+                  <a:tcPr anchor="ctr"/>
+                </a:tc>
+                <a:tc>
+                  <a:txBody>
+                    <a:bodyPr/>
+                    <a:lstStyle/>
+                    <a:p>
+                      <a:r>
+                        <a:rPr lang="en-US" sz="1800" b="0" i="0" dirty="0">
+                          <a:latin typeface="Open Sans Light" panose="020B0606030504020204" pitchFamily="34" charset="0"/>
+                          <a:ea typeface="Open Sans Light" panose="020B0606030504020204" pitchFamily="34" charset="0"/>
+                          <a:cs typeface="Open Sans Light" panose="020B0606030504020204" pitchFamily="34" charset="0"/>
+                        </a:rPr>
+                        <a:t>"Combine" items together</a:t>
+                      </a:r>
+                    </a:p>
+                  </a:txBody>
+                  <a:tcPr anchor="ctr"/>
+                </a:tc>
+                <a:tc>
+                  <a:txBody>
+                    <a:bodyPr/>
+                    <a:lstStyle/>
+                    <a:p>
+                      <a:r>
+                        <a:rPr lang="en-US" sz="1800" b="0" i="0" dirty="0">
+                          <a:latin typeface="Open Sans Light" panose="020B0606030504020204" pitchFamily="34" charset="0"/>
+                          <a:ea typeface="Open Sans Light" panose="020B0606030504020204" pitchFamily="34" charset="0"/>
+                          <a:cs typeface="Open Sans Light" panose="020B0606030504020204" pitchFamily="34" charset="0"/>
+                        </a:rPr>
+                        <a:t>2 (current item, and the previous result)</a:t>
+                      </a:r>
+                    </a:p>
+                  </a:txBody>
+                  <a:tcPr anchor="ctr"/>
+                </a:tc>
+                <a:tc>
+                  <a:txBody>
+                    <a:bodyPr/>
+                    <a:lstStyle/>
+                    <a:p>
+                      <a:r>
+                        <a:rPr lang="en-US" sz="1800" b="0" i="0" dirty="0">
+                          <a:latin typeface="Open Sans Light" panose="020B0606030504020204" pitchFamily="34" charset="0"/>
+                          <a:ea typeface="Open Sans Light" panose="020B0606030504020204" pitchFamily="34" charset="0"/>
+                          <a:cs typeface="Open Sans Light" panose="020B0606030504020204" pitchFamily="34" charset="0"/>
+                        </a:rPr>
+                        <a:t>Type should match the type each item</a:t>
+                      </a:r>
+                    </a:p>
+                  </a:txBody>
+                  <a:tcPr anchor="ctr"/>
+                </a:tc>
+                <a:tc>
+                  <a:txBody>
+                    <a:bodyPr/>
+                    <a:lstStyle/>
+                    <a:p>
+                      <a:r>
+                        <a:rPr lang="en-US" sz="1800" b="0" i="0" dirty="0">
+                          <a:latin typeface="Open Sans Light" panose="020B0606030504020204" pitchFamily="34" charset="0"/>
+                          <a:ea typeface="Open Sans Light" panose="020B0606030504020204" pitchFamily="34" charset="0"/>
+                          <a:cs typeface="Open Sans Light" panose="020B0606030504020204" pitchFamily="34" charset="0"/>
+                        </a:rPr>
+                        <a:t>A "single" item</a:t>
+                      </a:r>
+                    </a:p>
+                  </a:txBody>
+                  <a:tcPr anchor="ctr"/>
+                </a:tc>
+                <a:extLst>
+                  <a:ext uri="{0D108BD9-81ED-4DB2-BD59-A6C34878D82A}">
+                    <a16:rowId xmlns:a16="http://schemas.microsoft.com/office/drawing/2014/main" val="2091545836"/>
+                  </a:ext>
+                </a:extLst>
+              </a:tr>
+            </a:tbl>
+          </a:graphicData>
+        </a:graphic>
+      </p:graphicFrame>
+    </p:spTree>
+    <p:extLst>
+      <p:ext uri="{BB962C8B-B14F-4D97-AF65-F5344CB8AC3E}">
+        <p14:creationId xmlns:p14="http://schemas.microsoft.com/office/powerpoint/2010/main" val="3998291529"/>
+      </p:ext>
+    </p:extLst>
+  </p:cSld>
+  <p:clrMapOvr>
+    <a:masterClrMapping/>
+  </p:clrMapOvr>
+</p:sld>
+</file>
+
+<file path=ppt/slides/slide11.xml><?xml version="1.0" encoding="utf-8"?>
+<p:sld xmlns:a="http://schemas.openxmlformats.org/drawingml/2006/main" xmlns:r="http://schemas.openxmlformats.org/officeDocument/2006/relationships" xmlns:p="http://schemas.openxmlformats.org/presentationml/2006/main">
+  <p:cSld>
+    <p:spTree>
+      <p:nvGrpSpPr>
+        <p:cNvPr id="1" name=""/>
+        <p:cNvGrpSpPr/>
+        <p:nvPr/>
+      </p:nvGrpSpPr>
+      <p:grpSpPr>
+        <a:xfrm>
+          <a:off x="0" y="0"/>
+          <a:ext cx="0" cy="0"/>
+          <a:chOff x="0" y="0"/>
+          <a:chExt cx="0" cy="0"/>
+        </a:xfrm>
+      </p:grpSpPr>
+      <p:sp>
+        <p:nvSpPr>
+          <p:cNvPr id="2" name="Title 1">
+            <a:extLst>
+              <a:ext uri="{FF2B5EF4-FFF2-40B4-BE49-F238E27FC236}">
                 <a16:creationId xmlns:a16="http://schemas.microsoft.com/office/drawing/2014/main" id="{D2340843-39A8-4E4A-A923-FEDC64A7AE32}"/>
               </a:ext>
             </a:extLst>
@@ -9579,143 +10191,6 @@
 </p:sld>
 </file>
 
-<file path=ppt/slides/slide11.xml><?xml version="1.0" encoding="utf-8"?>
-<p:sld xmlns:a="http://schemas.openxmlformats.org/drawingml/2006/main" xmlns:r="http://schemas.openxmlformats.org/officeDocument/2006/relationships" xmlns:p="http://schemas.openxmlformats.org/presentationml/2006/main">
-  <p:cSld>
-    <p:spTree>
-      <p:nvGrpSpPr>
-        <p:cNvPr id="1" name=""/>
-        <p:cNvGrpSpPr/>
-        <p:nvPr/>
-      </p:nvGrpSpPr>
-      <p:grpSpPr>
-        <a:xfrm>
-          <a:off x="0" y="0"/>
-          <a:ext cx="0" cy="0"/>
-          <a:chOff x="0" y="0"/>
-          <a:chExt cx="0" cy="0"/>
-        </a:xfrm>
-      </p:grpSpPr>
-      <p:sp>
-        <p:nvSpPr>
-          <p:cNvPr id="2" name="Title 1">
-            <a:extLst>
-              <a:ext uri="{FF2B5EF4-FFF2-40B4-BE49-F238E27FC236}">
-                <a16:creationId xmlns:a16="http://schemas.microsoft.com/office/drawing/2014/main" id="{100B1421-7577-D94A-A03F-9746321D9D5E}"/>
-              </a:ext>
-            </a:extLst>
-          </p:cNvPr>
-          <p:cNvSpPr>
-            <a:spLocks noGrp="1"/>
-          </p:cNvSpPr>
-          <p:nvPr>
-            <p:ph type="title"/>
-          </p:nvPr>
-        </p:nvSpPr>
-        <p:spPr/>
-        <p:txBody>
-          <a:bodyPr/>
-          <a:lstStyle/>
-          <a:p>
-            <a:r>
-              <a:rPr lang="en-US" dirty="0"/>
-              <a:t>Learning Objectives</a:t>
-            </a:r>
-          </a:p>
-        </p:txBody>
-      </p:sp>
-      <p:sp>
-        <p:nvSpPr>
-          <p:cNvPr id="3" name="Content Placeholder 2">
-            <a:extLst>
-              <a:ext uri="{FF2B5EF4-FFF2-40B4-BE49-F238E27FC236}">
-                <a16:creationId xmlns:a16="http://schemas.microsoft.com/office/drawing/2014/main" id="{86019B6B-B854-7643-924E-9BF51C8B86D3}"/>
-              </a:ext>
-            </a:extLst>
-          </p:cNvPr>
-          <p:cNvSpPr>
-            <a:spLocks noGrp="1"/>
-          </p:cNvSpPr>
-          <p:nvPr>
-            <p:ph idx="1"/>
-          </p:nvPr>
-        </p:nvSpPr>
-        <p:spPr/>
-        <p:txBody>
-          <a:bodyPr/>
-          <a:lstStyle/>
-          <a:p>
-            <a:r>
-              <a:rPr lang="en-US" dirty="0"/>
-              <a:t>Learn how to use and create higher order functions:</a:t>
-            </a:r>
-          </a:p>
-          <a:p>
-            <a:r>
-              <a:rPr lang="en-US" dirty="0"/>
-              <a:t>Functions can be used as data</a:t>
-            </a:r>
-          </a:p>
-          <a:p>
-            <a:r>
-              <a:rPr lang="en-US" dirty="0"/>
-              <a:t>Functions can accept a function as an argument</a:t>
-            </a:r>
-          </a:p>
-          <a:p>
-            <a:r>
-              <a:rPr lang="en-US" b="1" dirty="0"/>
-              <a:t>Functions can return a new function</a:t>
-            </a:r>
-          </a:p>
-        </p:txBody>
-      </p:sp>
-      <p:sp>
-        <p:nvSpPr>
-          <p:cNvPr id="5" name="Footer Placeholder 3">
-            <a:extLst>
-              <a:ext uri="{FF2B5EF4-FFF2-40B4-BE49-F238E27FC236}">
-                <a16:creationId xmlns:a16="http://schemas.microsoft.com/office/drawing/2014/main" id="{0AB8D426-819A-7542-8C8B-D59D3E625434}"/>
-              </a:ext>
-            </a:extLst>
-          </p:cNvPr>
-          <p:cNvSpPr>
-            <a:spLocks noGrp="1"/>
-          </p:cNvSpPr>
-          <p:nvPr>
-            <p:ph type="ftr" sz="quarter" idx="10"/>
-          </p:nvPr>
-        </p:nvSpPr>
-        <p:spPr>
-          <a:xfrm>
-            <a:off x="4038599" y="6356350"/>
-            <a:ext cx="4348655" cy="365125"/>
-          </a:xfrm>
-        </p:spPr>
-        <p:txBody>
-          <a:bodyPr/>
-          <a:lstStyle/>
-          <a:p>
-            <a:r>
-              <a:rPr lang="en-US" dirty="0"/>
-              <a:t>Michael Ball | UC Berkeley | https://c88c.org | © CC BY-NC-SA</a:t>
-            </a:r>
-          </a:p>
-        </p:txBody>
-      </p:sp>
-    </p:spTree>
-    <p:extLst>
-      <p:ext uri="{BB962C8B-B14F-4D97-AF65-F5344CB8AC3E}">
-        <p14:creationId xmlns:p14="http://schemas.microsoft.com/office/powerpoint/2010/main" val="1593238648"/>
-      </p:ext>
-    </p:extLst>
-  </p:cSld>
-  <p:clrMapOvr>
-    <a:masterClrMapping/>
-  </p:clrMapOvr>
-</p:sld>
-</file>
-
 <file path=ppt/slides/slide12.xml><?xml version="1.0" encoding="utf-8"?>
 <p:sld xmlns:a="http://schemas.openxmlformats.org/drawingml/2006/main" xmlns:r="http://schemas.openxmlformats.org/officeDocument/2006/relationships" xmlns:p="http://schemas.openxmlformats.org/presentationml/2006/main">
   <p:cSld>
@@ -9738,6 +10213,143 @@
           <p:cNvPr id="2" name="Title 1">
             <a:extLst>
               <a:ext uri="{FF2B5EF4-FFF2-40B4-BE49-F238E27FC236}">
+                <a16:creationId xmlns:a16="http://schemas.microsoft.com/office/drawing/2014/main" id="{100B1421-7577-D94A-A03F-9746321D9D5E}"/>
+              </a:ext>
+            </a:extLst>
+          </p:cNvPr>
+          <p:cNvSpPr>
+            <a:spLocks noGrp="1"/>
+          </p:cNvSpPr>
+          <p:nvPr>
+            <p:ph type="title"/>
+          </p:nvPr>
+        </p:nvSpPr>
+        <p:spPr/>
+        <p:txBody>
+          <a:bodyPr/>
+          <a:lstStyle/>
+          <a:p>
+            <a:r>
+              <a:rPr lang="en-US" dirty="0"/>
+              <a:t>Learning Objectives</a:t>
+            </a:r>
+          </a:p>
+        </p:txBody>
+      </p:sp>
+      <p:sp>
+        <p:nvSpPr>
+          <p:cNvPr id="3" name="Content Placeholder 2">
+            <a:extLst>
+              <a:ext uri="{FF2B5EF4-FFF2-40B4-BE49-F238E27FC236}">
+                <a16:creationId xmlns:a16="http://schemas.microsoft.com/office/drawing/2014/main" id="{86019B6B-B854-7643-924E-9BF51C8B86D3}"/>
+              </a:ext>
+            </a:extLst>
+          </p:cNvPr>
+          <p:cNvSpPr>
+            <a:spLocks noGrp="1"/>
+          </p:cNvSpPr>
+          <p:nvPr>
+            <p:ph idx="1"/>
+          </p:nvPr>
+        </p:nvSpPr>
+        <p:spPr/>
+        <p:txBody>
+          <a:bodyPr/>
+          <a:lstStyle/>
+          <a:p>
+            <a:r>
+              <a:rPr lang="en-US" dirty="0"/>
+              <a:t>Learn how to use and create higher order functions:</a:t>
+            </a:r>
+          </a:p>
+          <a:p>
+            <a:r>
+              <a:rPr lang="en-US" dirty="0"/>
+              <a:t>Functions can be used as data</a:t>
+            </a:r>
+          </a:p>
+          <a:p>
+            <a:r>
+              <a:rPr lang="en-US" dirty="0"/>
+              <a:t>Functions can accept a function as an argument</a:t>
+            </a:r>
+          </a:p>
+          <a:p>
+            <a:r>
+              <a:rPr lang="en-US" b="1" dirty="0"/>
+              <a:t>Functions can return a new function</a:t>
+            </a:r>
+          </a:p>
+        </p:txBody>
+      </p:sp>
+      <p:sp>
+        <p:nvSpPr>
+          <p:cNvPr id="5" name="Footer Placeholder 3">
+            <a:extLst>
+              <a:ext uri="{FF2B5EF4-FFF2-40B4-BE49-F238E27FC236}">
+                <a16:creationId xmlns:a16="http://schemas.microsoft.com/office/drawing/2014/main" id="{0AB8D426-819A-7542-8C8B-D59D3E625434}"/>
+              </a:ext>
+            </a:extLst>
+          </p:cNvPr>
+          <p:cNvSpPr>
+            <a:spLocks noGrp="1"/>
+          </p:cNvSpPr>
+          <p:nvPr>
+            <p:ph type="ftr" sz="quarter" idx="10"/>
+          </p:nvPr>
+        </p:nvSpPr>
+        <p:spPr>
+          <a:xfrm>
+            <a:off x="4038599" y="6356350"/>
+            <a:ext cx="4348655" cy="365125"/>
+          </a:xfrm>
+        </p:spPr>
+        <p:txBody>
+          <a:bodyPr/>
+          <a:lstStyle/>
+          <a:p>
+            <a:r>
+              <a:rPr lang="en-US" dirty="0"/>
+              <a:t>Michael Ball | UC Berkeley | https://c88c.org | © CC BY-NC-SA</a:t>
+            </a:r>
+          </a:p>
+        </p:txBody>
+      </p:sp>
+    </p:spTree>
+    <p:extLst>
+      <p:ext uri="{BB962C8B-B14F-4D97-AF65-F5344CB8AC3E}">
+        <p14:creationId xmlns:p14="http://schemas.microsoft.com/office/powerpoint/2010/main" val="1593238648"/>
+      </p:ext>
+    </p:extLst>
+  </p:cSld>
+  <p:clrMapOvr>
+    <a:masterClrMapping/>
+  </p:clrMapOvr>
+</p:sld>
+</file>
+
+<file path=ppt/slides/slide13.xml><?xml version="1.0" encoding="utf-8"?>
+<p:sld xmlns:a="http://schemas.openxmlformats.org/drawingml/2006/main" xmlns:r="http://schemas.openxmlformats.org/officeDocument/2006/relationships" xmlns:p="http://schemas.openxmlformats.org/presentationml/2006/main">
+  <p:cSld>
+    <p:spTree>
+      <p:nvGrpSpPr>
+        <p:cNvPr id="1" name=""/>
+        <p:cNvGrpSpPr/>
+        <p:nvPr/>
+      </p:nvGrpSpPr>
+      <p:grpSpPr>
+        <a:xfrm>
+          <a:off x="0" y="0"/>
+          <a:ext cx="0" cy="0"/>
+          <a:chOff x="0" y="0"/>
+          <a:chExt cx="0" cy="0"/>
+        </a:xfrm>
+      </p:grpSpPr>
+      <p:sp>
+        <p:nvSpPr>
+          <p:cNvPr id="2" name="Title 1">
+            <a:extLst>
+              <a:ext uri="{FF2B5EF4-FFF2-40B4-BE49-F238E27FC236}">
                 <a16:creationId xmlns:a16="http://schemas.microsoft.com/office/drawing/2014/main" id="{E6F99501-F0C7-EC42-A944-CAC24ED1FA0A}"/>
               </a:ext>
             </a:extLst>
@@ -9857,7 +10469,7 @@
 </p:sld>
 </file>
 
-<file path=ppt/slides/slide13.xml><?xml version="1.0" encoding="utf-8"?>
+<file path=ppt/slides/slide14.xml><?xml version="1.0" encoding="utf-8"?>
 <p:sld xmlns:a="http://schemas.openxmlformats.org/drawingml/2006/main" xmlns:r="http://schemas.openxmlformats.org/officeDocument/2006/relationships" xmlns:p="http://schemas.openxmlformats.org/presentationml/2006/main">
   <p:cSld>
     <p:spTree>
@@ -10819,7 +11431,7 @@
 </p:sld>
 </file>
 
-<file path=ppt/slides/slide14.xml><?xml version="1.0" encoding="utf-8"?>
+<file path=ppt/slides/slide15.xml><?xml version="1.0" encoding="utf-8"?>
 <p:sld xmlns:a="http://schemas.openxmlformats.org/drawingml/2006/main" xmlns:r="http://schemas.openxmlformats.org/officeDocument/2006/relationships" xmlns:p="http://schemas.openxmlformats.org/presentationml/2006/main">
   <p:cSld>
     <p:spTree>
@@ -10904,7 +11516,7 @@
 </p:sld>
 </file>
 
-<file path=ppt/slides/slide15.xml><?xml version="1.0" encoding="utf-8"?>
+<file path=ppt/slides/slide16.xml><?xml version="1.0" encoding="utf-8"?>
 <p:sld xmlns:a="http://schemas.openxmlformats.org/drawingml/2006/main" xmlns:r="http://schemas.openxmlformats.org/officeDocument/2006/relationships" xmlns:p="http://schemas.openxmlformats.org/presentationml/2006/main">
   <p:cSld>
     <p:spTree>
@@ -11078,7 +11690,7 @@
 </p:sld>
 </file>
 
-<file path=ppt/slides/slide16.xml><?xml version="1.0" encoding="utf-8"?>
+<file path=ppt/slides/slide17.xml><?xml version="1.0" encoding="utf-8"?>
 <p:sld xmlns:a="http://schemas.openxmlformats.org/drawingml/2006/main" xmlns:r="http://schemas.openxmlformats.org/officeDocument/2006/relationships" xmlns:p="http://schemas.openxmlformats.org/presentationml/2006/main">
   <p:cSld>
     <p:spTree>
@@ -11661,7 +12273,7 @@
 </p:sld>
 </file>
 
-<file path=ppt/slides/slide17.xml><?xml version="1.0" encoding="utf-8"?>
+<file path=ppt/slides/slide18.xml><?xml version="1.0" encoding="utf-8"?>
 <p:sld xmlns:a="http://schemas.openxmlformats.org/drawingml/2006/main" xmlns:r="http://schemas.openxmlformats.org/officeDocument/2006/relationships" xmlns:p="http://schemas.openxmlformats.org/presentationml/2006/main">
   <p:cSld>
     <p:spTree>
@@ -12347,254 +12959,6 @@
 </p:sld>
 </file>
 
-<file path=ppt/slides/slide18.xml><?xml version="1.0" encoding="utf-8"?>
-<p:sld xmlns:a="http://schemas.openxmlformats.org/drawingml/2006/main" xmlns:r="http://schemas.openxmlformats.org/officeDocument/2006/relationships" xmlns:p="http://schemas.openxmlformats.org/presentationml/2006/main">
-  <p:cSld>
-    <p:spTree>
-      <p:nvGrpSpPr>
-        <p:cNvPr id="1" name=""/>
-        <p:cNvGrpSpPr/>
-        <p:nvPr/>
-      </p:nvGrpSpPr>
-      <p:grpSpPr>
-        <a:xfrm>
-          <a:off x="0" y="0"/>
-          <a:ext cx="0" cy="0"/>
-          <a:chOff x="0" y="0"/>
-          <a:chExt cx="0" cy="0"/>
-        </a:xfrm>
-      </p:grpSpPr>
-      <p:sp>
-        <p:nvSpPr>
-          <p:cNvPr id="2" name="Title 1">
-            <a:extLst>
-              <a:ext uri="{FF2B5EF4-FFF2-40B4-BE49-F238E27FC236}">
-                <a16:creationId xmlns:a16="http://schemas.microsoft.com/office/drawing/2014/main" id="{3240DA3F-5262-644A-8A04-EDF80650B9C2}"/>
-              </a:ext>
-            </a:extLst>
-          </p:cNvPr>
-          <p:cNvSpPr>
-            <a:spLocks noGrp="1"/>
-          </p:cNvSpPr>
-          <p:nvPr>
-            <p:ph type="title"/>
-          </p:nvPr>
-        </p:nvSpPr>
-        <p:spPr/>
-        <p:txBody>
-          <a:bodyPr/>
-          <a:lstStyle/>
-          <a:p>
-            <a:r>
-              <a:rPr lang="en-US" dirty="0"/>
-              <a:t>Python Tutor Example #1</a:t>
-            </a:r>
-          </a:p>
-        </p:txBody>
-      </p:sp>
-      <p:sp>
-        <p:nvSpPr>
-          <p:cNvPr id="3" name="Content Placeholder 2">
-            <a:extLst>
-              <a:ext uri="{FF2B5EF4-FFF2-40B4-BE49-F238E27FC236}">
-                <a16:creationId xmlns:a16="http://schemas.microsoft.com/office/drawing/2014/main" id="{284F9A36-1B36-EA49-B322-395902ACCA87}"/>
-              </a:ext>
-            </a:extLst>
-          </p:cNvPr>
-          <p:cNvSpPr>
-            <a:spLocks noGrp="1"/>
-          </p:cNvSpPr>
-          <p:nvPr>
-            <p:ph idx="1"/>
-          </p:nvPr>
-        </p:nvSpPr>
-        <p:spPr>
-          <a:xfrm>
-            <a:off x="533399" y="1066800"/>
-            <a:ext cx="11225011" cy="5257800"/>
-          </a:xfrm>
-        </p:spPr>
-        <p:txBody>
-          <a:bodyPr/>
-          <a:lstStyle/>
-          <a:p>
-            <a:pPr marL="0" indent="0">
-              <a:buNone/>
-            </a:pPr>
-            <a:r>
-              <a:rPr lang="en-US" sz="2200" dirty="0">
-                <a:latin typeface="Source Code Pro" panose="020B0509030403020204" pitchFamily="49" charset="0"/>
-                <a:ea typeface="Source Code Pro" panose="020B0509030403020204" pitchFamily="49" charset="0"/>
-              </a:rPr>
-              <a:t>def </a:t>
-            </a:r>
-            <a:r>
-              <a:rPr lang="en-US" sz="2200" dirty="0" err="1">
-                <a:latin typeface="Source Code Pro" panose="020B0509030403020204" pitchFamily="49" charset="0"/>
-                <a:ea typeface="Source Code Pro" panose="020B0509030403020204" pitchFamily="49" charset="0"/>
-              </a:rPr>
-              <a:t>make_adder</a:t>
-            </a:r>
-            <a:r>
-              <a:rPr lang="en-US" sz="2200" dirty="0">
-                <a:latin typeface="Source Code Pro" panose="020B0509030403020204" pitchFamily="49" charset="0"/>
-                <a:ea typeface="Source Code Pro" panose="020B0509030403020204" pitchFamily="49" charset="0"/>
-              </a:rPr>
-              <a:t>(n):</a:t>
-            </a:r>
-          </a:p>
-          <a:p>
-            <a:pPr marL="0" indent="0">
-              <a:buNone/>
-            </a:pPr>
-            <a:r>
-              <a:rPr lang="en-US" sz="2200" dirty="0">
-                <a:latin typeface="Source Code Pro" panose="020B0509030403020204" pitchFamily="49" charset="0"/>
-                <a:ea typeface="Source Code Pro" panose="020B0509030403020204" pitchFamily="49" charset="0"/>
-              </a:rPr>
-              <a:t>    def adder(k):</a:t>
-            </a:r>
-          </a:p>
-          <a:p>
-            <a:pPr marL="0" indent="0">
-              <a:buNone/>
-            </a:pPr>
-            <a:r>
-              <a:rPr lang="en-US" sz="2200" dirty="0">
-                <a:latin typeface="Source Code Pro" panose="020B0509030403020204" pitchFamily="49" charset="0"/>
-                <a:ea typeface="Source Code Pro" panose="020B0509030403020204" pitchFamily="49" charset="0"/>
-              </a:rPr>
-              <a:t>        return k + n</a:t>
-            </a:r>
-          </a:p>
-          <a:p>
-            <a:pPr marL="0" indent="0">
-              <a:buNone/>
-            </a:pPr>
-            <a:r>
-              <a:rPr lang="en-US" sz="2200" dirty="0">
-                <a:latin typeface="Source Code Pro" panose="020B0509030403020204" pitchFamily="49" charset="0"/>
-                <a:ea typeface="Source Code Pro" panose="020B0509030403020204" pitchFamily="49" charset="0"/>
-              </a:rPr>
-              <a:t>    return adder</a:t>
-            </a:r>
-          </a:p>
-          <a:p>
-            <a:pPr marL="0" indent="0">
-              <a:buNone/>
-            </a:pPr>
-            <a:endParaRPr lang="en-US" sz="2200" dirty="0">
-              <a:latin typeface="Source Code Pro" panose="020B0509030403020204" pitchFamily="49" charset="0"/>
-              <a:ea typeface="Source Code Pro" panose="020B0509030403020204" pitchFamily="49" charset="0"/>
-            </a:endParaRPr>
-          </a:p>
-          <a:p>
-            <a:pPr marL="0" indent="0">
-              <a:buNone/>
-            </a:pPr>
-            <a:r>
-              <a:rPr lang="en-US" sz="2200" dirty="0">
-                <a:latin typeface="Source Code Pro" panose="020B0509030403020204" pitchFamily="49" charset="0"/>
-                <a:ea typeface="Source Code Pro" panose="020B0509030403020204" pitchFamily="49" charset="0"/>
-              </a:rPr>
-              <a:t>n = 10    </a:t>
-            </a:r>
-          </a:p>
-          <a:p>
-            <a:pPr marL="0" indent="0">
-              <a:buNone/>
-            </a:pPr>
-            <a:r>
-              <a:rPr lang="en-US" sz="2200" dirty="0">
-                <a:latin typeface="Source Code Pro" panose="020B0509030403020204" pitchFamily="49" charset="0"/>
-                <a:ea typeface="Source Code Pro" panose="020B0509030403020204" pitchFamily="49" charset="0"/>
-              </a:rPr>
-              <a:t>add_2 = </a:t>
-            </a:r>
-            <a:r>
-              <a:rPr lang="en-US" sz="2200" dirty="0" err="1">
-                <a:latin typeface="Source Code Pro" panose="020B0509030403020204" pitchFamily="49" charset="0"/>
-                <a:ea typeface="Source Code Pro" panose="020B0509030403020204" pitchFamily="49" charset="0"/>
-              </a:rPr>
-              <a:t>make_adder</a:t>
-            </a:r>
-            <a:r>
-              <a:rPr lang="en-US" sz="2200" dirty="0">
-                <a:latin typeface="Source Code Pro" panose="020B0509030403020204" pitchFamily="49" charset="0"/>
-                <a:ea typeface="Source Code Pro" panose="020B0509030403020204" pitchFamily="49" charset="0"/>
-              </a:rPr>
-              <a:t>(2)</a:t>
-            </a:r>
-          </a:p>
-          <a:p>
-            <a:pPr marL="0" indent="0">
-              <a:buNone/>
-            </a:pPr>
-            <a:r>
-              <a:rPr lang="en-US" sz="2200" dirty="0">
-                <a:latin typeface="Source Code Pro" panose="020B0509030403020204" pitchFamily="49" charset="0"/>
-                <a:ea typeface="Source Code Pro" panose="020B0509030403020204" pitchFamily="49" charset="0"/>
-              </a:rPr>
-              <a:t>x = add_2(5)</a:t>
-            </a:r>
-            <a:endParaRPr lang="en-US" sz="2200" dirty="0">
-              <a:solidFill>
-                <a:schemeClr val="bg1">
-                  <a:lumMod val="50000"/>
-                </a:schemeClr>
-              </a:solidFill>
-              <a:latin typeface="Source Code Pro" panose="020B0509030403020204" pitchFamily="49" charset="0"/>
-              <a:ea typeface="Source Code Pro" panose="020B0509030403020204" pitchFamily="49" charset="0"/>
-            </a:endParaRPr>
-          </a:p>
-        </p:txBody>
-      </p:sp>
-      <p:sp>
-        <p:nvSpPr>
-          <p:cNvPr id="5" name="Footer Placeholder 3">
-            <a:extLst>
-              <a:ext uri="{FF2B5EF4-FFF2-40B4-BE49-F238E27FC236}">
-                <a16:creationId xmlns:a16="http://schemas.microsoft.com/office/drawing/2014/main" id="{677B590B-530D-43F7-EACB-A4315211A94E}"/>
-              </a:ext>
-            </a:extLst>
-          </p:cNvPr>
-          <p:cNvSpPr>
-            <a:spLocks noGrp="1"/>
-          </p:cNvSpPr>
-          <p:nvPr>
-            <p:ph type="ftr" sz="quarter" idx="10"/>
-          </p:nvPr>
-        </p:nvSpPr>
-        <p:spPr>
-          <a:xfrm>
-            <a:off x="4038599" y="6356350"/>
-            <a:ext cx="4348655" cy="365125"/>
-          </a:xfrm>
-        </p:spPr>
-        <p:txBody>
-          <a:bodyPr/>
-          <a:lstStyle/>
-          <a:p>
-            <a:r>
-              <a:rPr lang="en-US" dirty="0"/>
-              <a:t>Michael Ball | UC Berkeley | https://c88c.org | © CC BY-NC-SA</a:t>
-            </a:r>
-          </a:p>
-        </p:txBody>
-      </p:sp>
-    </p:spTree>
-    <p:extLst>
-      <p:ext uri="{BB962C8B-B14F-4D97-AF65-F5344CB8AC3E}">
-        <p14:creationId xmlns:p14="http://schemas.microsoft.com/office/powerpoint/2010/main" val="1613526114"/>
-      </p:ext>
-    </p:extLst>
-  </p:cSld>
-  <p:clrMapOvr>
-    <a:masterClrMapping/>
-  </p:clrMapOvr>
-</p:sld>
-</file>
-
 <file path=ppt/slides/slide19.xml><?xml version="1.0" encoding="utf-8"?>
 <p:sld xmlns:a="http://schemas.openxmlformats.org/drawingml/2006/main" xmlns:r="http://schemas.openxmlformats.org/officeDocument/2006/relationships" xmlns:p="http://schemas.openxmlformats.org/presentationml/2006/main">
   <p:cSld>
@@ -12635,7 +12999,7 @@
           <a:p>
             <a:r>
               <a:rPr lang="en-US" dirty="0"/>
-              <a:t>Python Tutor Example #2</a:t>
+              <a:t>Python Tutor Example #1</a:t>
             </a:r>
           </a:p>
         </p:txBody>
@@ -12656,7 +13020,12 @@
             <p:ph idx="1"/>
           </p:nvPr>
         </p:nvSpPr>
-        <p:spPr/>
+        <p:spPr>
+          <a:xfrm>
+            <a:off x="533399" y="1066800"/>
+            <a:ext cx="11225011" cy="5257800"/>
+          </a:xfrm>
+        </p:spPr>
         <p:txBody>
           <a:bodyPr/>
           <a:lstStyle/>
@@ -12669,19 +13038,21 @@
                 <a:latin typeface="Source Code Pro" panose="020B0509030403020204" pitchFamily="49" charset="0"/>
                 <a:ea typeface="Source Code Pro" panose="020B0509030403020204" pitchFamily="49" charset="0"/>
               </a:rPr>
-              <a:t>a = "chipotle"</a:t>
-            </a:r>
-          </a:p>
-          <a:p>
-            <a:pPr marL="0" indent="0">
-              <a:buNone/>
-            </a:pPr>
+              <a:t>def </a:t>
+            </a:r>
+            <a:r>
+              <a:rPr lang="en-US" sz="2200" dirty="0" err="1">
+                <a:latin typeface="Source Code Pro" panose="020B0509030403020204" pitchFamily="49" charset="0"/>
+                <a:ea typeface="Source Code Pro" panose="020B0509030403020204" pitchFamily="49" charset="0"/>
+              </a:rPr>
+              <a:t>make_adder</a:t>
+            </a:r>
             <a:r>
               <a:rPr lang="en-US" sz="2200" dirty="0">
                 <a:latin typeface="Source Code Pro" panose="020B0509030403020204" pitchFamily="49" charset="0"/>
                 <a:ea typeface="Source Code Pro" panose="020B0509030403020204" pitchFamily="49" charset="0"/>
               </a:rPr>
-              <a:t>b = 5 &gt; 3</a:t>
+              <a:t>(n):</a:t>
             </a:r>
           </a:p>
           <a:p>
@@ -12693,7 +13064,31 @@
                 <a:latin typeface="Source Code Pro" panose="020B0509030403020204" pitchFamily="49" charset="0"/>
                 <a:ea typeface="Source Code Pro" panose="020B0509030403020204" pitchFamily="49" charset="0"/>
               </a:rPr>
-              <a:t>c = 8</a:t>
+              <a:t>    def adder(k):</a:t>
+            </a:r>
+          </a:p>
+          <a:p>
+            <a:pPr marL="0" indent="0">
+              <a:buNone/>
+            </a:pPr>
+            <a:r>
+              <a:rPr lang="en-US" sz="2200" dirty="0">
+                <a:latin typeface="Source Code Pro" panose="020B0509030403020204" pitchFamily="49" charset="0"/>
+                <a:ea typeface="Source Code Pro" panose="020B0509030403020204" pitchFamily="49" charset="0"/>
+              </a:rPr>
+              <a:t>        return k + n</a:t>
+            </a:r>
+          </a:p>
+          <a:p>
+            <a:pPr marL="0" indent="0">
+              <a:buNone/>
+            </a:pPr>
+            <a:r>
+              <a:rPr lang="en-US" sz="2200" dirty="0">
+                <a:latin typeface="Source Code Pro" panose="020B0509030403020204" pitchFamily="49" charset="0"/>
+                <a:ea typeface="Source Code Pro" panose="020B0509030403020204" pitchFamily="49" charset="0"/>
+              </a:rPr>
+              <a:t>    return adder</a:t>
             </a:r>
           </a:p>
           <a:p>
@@ -12714,7 +13109,7 @@
                 <a:latin typeface="Source Code Pro" panose="020B0509030403020204" pitchFamily="49" charset="0"/>
                 <a:ea typeface="Source Code Pro" panose="020B0509030403020204" pitchFamily="49" charset="0"/>
               </a:rPr>
-              <a:t>def foo(c):</a:t>
+              <a:t>n = 10    </a:t>
             </a:r>
           </a:p>
           <a:p>
@@ -12726,87 +13121,44 @@
                 <a:latin typeface="Source Code Pro" panose="020B0509030403020204" pitchFamily="49" charset="0"/>
                 <a:ea typeface="Source Code Pro" panose="020B0509030403020204" pitchFamily="49" charset="0"/>
               </a:rPr>
-              <a:t>    return c - 5</a:t>
+              <a:t>add_2 = </a:t>
+            </a:r>
+            <a:r>
+              <a:rPr lang="en-US" sz="2200" dirty="0" err="1">
+                <a:latin typeface="Source Code Pro" panose="020B0509030403020204" pitchFamily="49" charset="0"/>
+                <a:ea typeface="Source Code Pro" panose="020B0509030403020204" pitchFamily="49" charset="0"/>
+              </a:rPr>
+              <a:t>make_adder</a:t>
+            </a:r>
+            <a:r>
+              <a:rPr lang="en-US" sz="2200" dirty="0">
+                <a:latin typeface="Source Code Pro" panose="020B0509030403020204" pitchFamily="49" charset="0"/>
+                <a:ea typeface="Source Code Pro" panose="020B0509030403020204" pitchFamily="49" charset="0"/>
+              </a:rPr>
+              <a:t>(2)</a:t>
             </a:r>
           </a:p>
           <a:p>
             <a:pPr marL="0" indent="0">
               <a:buNone/>
             </a:pPr>
+            <a:r>
+              <a:rPr lang="en-US" sz="2200" dirty="0">
+                <a:latin typeface="Source Code Pro" panose="020B0509030403020204" pitchFamily="49" charset="0"/>
+                <a:ea typeface="Source Code Pro" panose="020B0509030403020204" pitchFamily="49" charset="0"/>
+              </a:rPr>
+              <a:t>x = add_2(5)</a:t>
+            </a:r>
             <a:endParaRPr lang="en-US" sz="2200" dirty="0">
+              <a:solidFill>
+                <a:schemeClr val="bg1">
+                  <a:lumMod val="50000"/>
+                </a:schemeClr>
+              </a:solidFill>
               <a:latin typeface="Source Code Pro" panose="020B0509030403020204" pitchFamily="49" charset="0"/>
               <a:ea typeface="Source Code Pro" panose="020B0509030403020204" pitchFamily="49" charset="0"/>
             </a:endParaRPr>
           </a:p>
-          <a:p>
-            <a:pPr marL="0" indent="0">
-              <a:buNone/>
-            </a:pPr>
-            <a:r>
-              <a:rPr lang="en-US" sz="2200" dirty="0">
-                <a:latin typeface="Source Code Pro" panose="020B0509030403020204" pitchFamily="49" charset="0"/>
-                <a:ea typeface="Source Code Pro" panose="020B0509030403020204" pitchFamily="49" charset="0"/>
-              </a:rPr>
-              <a:t>def bar():</a:t>
-            </a:r>
-          </a:p>
-          <a:p>
-            <a:pPr marL="0" indent="0">
-              <a:buNone/>
-            </a:pPr>
-            <a:r>
-              <a:rPr lang="en-US" sz="2200" dirty="0">
-                <a:latin typeface="Source Code Pro" panose="020B0509030403020204" pitchFamily="49" charset="0"/>
-                <a:ea typeface="Source Code Pro" panose="020B0509030403020204" pitchFamily="49" charset="0"/>
-              </a:rPr>
-              <a:t>    if b:</a:t>
-            </a:r>
-          </a:p>
-          <a:p>
-            <a:pPr marL="0" indent="0">
-              <a:buNone/>
-            </a:pPr>
-            <a:r>
-              <a:rPr lang="en-US" sz="2200" dirty="0">
-                <a:latin typeface="Source Code Pro" panose="020B0509030403020204" pitchFamily="49" charset="0"/>
-                <a:ea typeface="Source Code Pro" panose="020B0509030403020204" pitchFamily="49" charset="0"/>
-              </a:rPr>
-              <a:t>        a = "taco bell"</a:t>
-            </a:r>
-          </a:p>
-          <a:p>
-            <a:pPr marL="0" indent="0">
-              <a:buNone/>
-            </a:pPr>
-            <a:endParaRPr lang="en-US" sz="2200" dirty="0">
-              <a:latin typeface="Source Code Pro" panose="020B0509030403020204" pitchFamily="49" charset="0"/>
-              <a:ea typeface="Source Code Pro" panose="020B0509030403020204" pitchFamily="49" charset="0"/>
-            </a:endParaRPr>
-          </a:p>
-          <a:p>
-            <a:pPr marL="0" indent="0">
-              <a:buNone/>
-            </a:pPr>
-            <a:r>
-              <a:rPr lang="en-US" sz="2200" dirty="0">
-                <a:latin typeface="Source Code Pro" panose="020B0509030403020204" pitchFamily="49" charset="0"/>
-                <a:ea typeface="Source Code Pro" panose="020B0509030403020204" pitchFamily="49" charset="0"/>
-              </a:rPr>
-              <a:t>result1 = foo(10)</a:t>
-            </a:r>
-          </a:p>
-          <a:p>
-            <a:pPr marL="0" indent="0">
-              <a:buNone/>
-            </a:pPr>
-            <a:r>
-              <a:rPr lang="en-US" sz="2200" dirty="0">
-                <a:latin typeface="Source Code Pro" panose="020B0509030403020204" pitchFamily="49" charset="0"/>
-                <a:ea typeface="Source Code Pro" panose="020B0509030403020204" pitchFamily="49" charset="0"/>
-              </a:rPr>
-              <a:t>result2 = bar()</a:t>
-            </a:r>
-          </a:p>
         </p:txBody>
       </p:sp>
       <p:sp>
@@ -12814,7 +13166,7 @@
           <p:cNvPr id="5" name="Footer Placeholder 3">
             <a:extLst>
               <a:ext uri="{FF2B5EF4-FFF2-40B4-BE49-F238E27FC236}">
-                <a16:creationId xmlns:a16="http://schemas.microsoft.com/office/drawing/2014/main" id="{063CC9AD-AB85-ED1A-8BBF-11586ADBA2A7}"/>
+                <a16:creationId xmlns:a16="http://schemas.microsoft.com/office/drawing/2014/main" id="{677B590B-530D-43F7-EACB-A4315211A94E}"/>
               </a:ext>
             </a:extLst>
           </p:cNvPr>
@@ -12845,7 +13197,7 @@
     </p:spTree>
     <p:extLst>
       <p:ext uri="{BB962C8B-B14F-4D97-AF65-F5344CB8AC3E}">
-        <p14:creationId xmlns:p14="http://schemas.microsoft.com/office/powerpoint/2010/main" val="3096584794"/>
+        <p14:creationId xmlns:p14="http://schemas.microsoft.com/office/powerpoint/2010/main" val="1613526114"/>
       </p:ext>
     </p:extLst>
   </p:cSld>
@@ -13118,7 +13470,7 @@
           <p:cNvPr id="2" name="Title 1">
             <a:extLst>
               <a:ext uri="{FF2B5EF4-FFF2-40B4-BE49-F238E27FC236}">
-                <a16:creationId xmlns:a16="http://schemas.microsoft.com/office/drawing/2014/main" id="{80893AED-AB1E-9F40-BE86-23A4ED91A56E}"/>
+                <a16:creationId xmlns:a16="http://schemas.microsoft.com/office/drawing/2014/main" id="{3240DA3F-5262-644A-8A04-EDF80650B9C2}"/>
               </a:ext>
             </a:extLst>
           </p:cNvPr>
@@ -13136,7 +13488,7 @@
           <a:p>
             <a:r>
               <a:rPr lang="en-US" dirty="0"/>
-              <a:t>Python Tutor Example #3</a:t>
+              <a:t>Python Tutor Example #2</a:t>
             </a:r>
           </a:p>
         </p:txBody>
@@ -13146,7 +13498,7 @@
           <p:cNvPr id="3" name="Content Placeholder 2">
             <a:extLst>
               <a:ext uri="{FF2B5EF4-FFF2-40B4-BE49-F238E27FC236}">
-                <a16:creationId xmlns:a16="http://schemas.microsoft.com/office/drawing/2014/main" id="{96930B3E-847A-CF45-BFCB-5C129A38C53F}"/>
+                <a16:creationId xmlns:a16="http://schemas.microsoft.com/office/drawing/2014/main" id="{284F9A36-1B36-EA49-B322-395902ACCA87}"/>
               </a:ext>
             </a:extLst>
           </p:cNvPr>
@@ -13166,22 +13518,11 @@
               <a:buNone/>
             </a:pPr>
             <a:r>
-              <a:rPr lang="en-US" dirty="0">
-                <a:latin typeface="Source Code Pro" panose="020B0509030403020204" pitchFamily="49" charset="77"/>
-              </a:rPr>
-              <a:t>add_2 = </a:t>
-            </a:r>
-            <a:r>
-              <a:rPr lang="en-US" dirty="0" err="1">
-                <a:latin typeface="Source Code Pro" panose="020B0509030403020204" pitchFamily="49" charset="77"/>
-              </a:rPr>
-              <a:t>make_adder</a:t>
-            </a:r>
-            <a:r>
-              <a:rPr lang="en-US" dirty="0">
-                <a:latin typeface="Source Code Pro" panose="020B0509030403020204" pitchFamily="49" charset="77"/>
-              </a:rPr>
-              <a:t>(2)</a:t>
+              <a:rPr lang="en-US" sz="2200" dirty="0">
+                <a:latin typeface="Source Code Pro" panose="020B0509030403020204" pitchFamily="49" charset="0"/>
+                <a:ea typeface="Source Code Pro" panose="020B0509030403020204" pitchFamily="49" charset="0"/>
+              </a:rPr>
+              <a:t>a = "chipotle"</a:t>
             </a:r>
           </a:p>
           <a:p>
@@ -13189,30 +13530,32 @@
               <a:buNone/>
             </a:pPr>
             <a:r>
-              <a:rPr lang="en-US" dirty="0">
-                <a:latin typeface="Source Code Pro" panose="020B0509030403020204" pitchFamily="49" charset="77"/>
-              </a:rPr>
-              <a:t>add_3 = </a:t>
-            </a:r>
-            <a:r>
-              <a:rPr lang="en-US" dirty="0" err="1">
-                <a:latin typeface="Source Code Pro" panose="020B0509030403020204" pitchFamily="49" charset="77"/>
-              </a:rPr>
-              <a:t>make_adder</a:t>
-            </a:r>
-            <a:r>
-              <a:rPr lang="en-US" dirty="0">
-                <a:latin typeface="Source Code Pro" panose="020B0509030403020204" pitchFamily="49" charset="77"/>
-              </a:rPr>
-              <a:t>(3)</a:t>
+              <a:rPr lang="en-US" sz="2200" dirty="0">
+                <a:latin typeface="Source Code Pro" panose="020B0509030403020204" pitchFamily="49" charset="0"/>
+                <a:ea typeface="Source Code Pro" panose="020B0509030403020204" pitchFamily="49" charset="0"/>
+              </a:rPr>
+              <a:t>b = 5 &gt; 3</a:t>
             </a:r>
           </a:p>
           <a:p>
             <a:pPr marL="0" indent="0">
               <a:buNone/>
             </a:pPr>
-            <a:endParaRPr lang="en-US" dirty="0">
-              <a:latin typeface="Source Code Pro" panose="020B0509030403020204" pitchFamily="49" charset="77"/>
+            <a:r>
+              <a:rPr lang="en-US" sz="2200" dirty="0">
+                <a:latin typeface="Source Code Pro" panose="020B0509030403020204" pitchFamily="49" charset="0"/>
+                <a:ea typeface="Source Code Pro" panose="020B0509030403020204" pitchFamily="49" charset="0"/>
+              </a:rPr>
+              <a:t>c = 8</a:t>
+            </a:r>
+          </a:p>
+          <a:p>
+            <a:pPr marL="0" indent="0">
+              <a:buNone/>
+            </a:pPr>
+            <a:endParaRPr lang="en-US" sz="2200" dirty="0">
+              <a:latin typeface="Source Code Pro" panose="020B0509030403020204" pitchFamily="49" charset="0"/>
+              <a:ea typeface="Source Code Pro" panose="020B0509030403020204" pitchFamily="49" charset="0"/>
             </a:endParaRPr>
           </a:p>
           <a:p>
@@ -13220,10 +13563,11 @@
               <a:buNone/>
             </a:pPr>
             <a:r>
-              <a:rPr lang="en-US" dirty="0">
-                <a:latin typeface="Source Code Pro" panose="020B0509030403020204" pitchFamily="49" charset="77"/>
-              </a:rPr>
-              <a:t>x = add_2(2)</a:t>
+              <a:rPr lang="en-US" sz="2200" dirty="0">
+                <a:latin typeface="Source Code Pro" panose="020B0509030403020204" pitchFamily="49" charset="0"/>
+                <a:ea typeface="Source Code Pro" panose="020B0509030403020204" pitchFamily="49" charset="0"/>
+              </a:rPr>
+              <a:t>def foo(c):</a:t>
             </a:r>
           </a:p>
           <a:p>
@@ -13231,32 +13575,32 @@
               <a:buNone/>
             </a:pPr>
             <a:r>
-              <a:rPr lang="en-US" dirty="0">
-                <a:latin typeface="Source Code Pro" panose="020B0509030403020204" pitchFamily="49" charset="77"/>
-              </a:rPr>
-              <a:t>def compose(f, g):</a:t>
+              <a:rPr lang="en-US" sz="2200" dirty="0">
+                <a:latin typeface="Source Code Pro" panose="020B0509030403020204" pitchFamily="49" charset="0"/>
+                <a:ea typeface="Source Code Pro" panose="020B0509030403020204" pitchFamily="49" charset="0"/>
+              </a:rPr>
+              <a:t>    return c - 5</a:t>
             </a:r>
           </a:p>
           <a:p>
             <a:pPr marL="0" indent="0">
               <a:buNone/>
             </a:pPr>
-            <a:r>
-              <a:rPr lang="en-US" dirty="0">
-                <a:latin typeface="Source Code Pro" panose="020B0509030403020204" pitchFamily="49" charset="77"/>
-              </a:rPr>
-              <a:t>    def h(x):</a:t>
-            </a:r>
+            <a:endParaRPr lang="en-US" sz="2200" dirty="0">
+              <a:latin typeface="Source Code Pro" panose="020B0509030403020204" pitchFamily="49" charset="0"/>
+              <a:ea typeface="Source Code Pro" panose="020B0509030403020204" pitchFamily="49" charset="0"/>
+            </a:endParaRPr>
           </a:p>
           <a:p>
             <a:pPr marL="0" indent="0">
               <a:buNone/>
             </a:pPr>
             <a:r>
-              <a:rPr lang="en-US" dirty="0">
-                <a:latin typeface="Source Code Pro" panose="020B0509030403020204" pitchFamily="49" charset="77"/>
-              </a:rPr>
-              <a:t>        return f(g(x))</a:t>
+              <a:rPr lang="en-US" sz="2200" dirty="0">
+                <a:latin typeface="Source Code Pro" panose="020B0509030403020204" pitchFamily="49" charset="0"/>
+                <a:ea typeface="Source Code Pro" panose="020B0509030403020204" pitchFamily="49" charset="0"/>
+              </a:rPr>
+              <a:t>def bar():</a:t>
             </a:r>
           </a:p>
           <a:p>
@@ -13264,10 +13608,11 @@
               <a:buNone/>
             </a:pPr>
             <a:r>
-              <a:rPr lang="en-US" dirty="0">
-                <a:latin typeface="Source Code Pro" panose="020B0509030403020204" pitchFamily="49" charset="77"/>
-              </a:rPr>
-              <a:t>    return h</a:t>
+              <a:rPr lang="en-US" sz="2200" dirty="0">
+                <a:latin typeface="Source Code Pro" panose="020B0509030403020204" pitchFamily="49" charset="0"/>
+                <a:ea typeface="Source Code Pro" panose="020B0509030403020204" pitchFamily="49" charset="0"/>
+              </a:rPr>
+              <a:t>    if b:</a:t>
             </a:r>
           </a:p>
           <a:p>
@@ -13275,21 +13620,44 @@
               <a:buNone/>
             </a:pPr>
             <a:r>
-              <a:rPr lang="en-US" dirty="0">
-                <a:latin typeface="Source Code Pro" panose="020B0509030403020204" pitchFamily="49" charset="77"/>
-              </a:rPr>
-              <a:t>add_5 = compose(add_2, add_3)</a:t>
+              <a:rPr lang="en-US" sz="2200" dirty="0">
+                <a:latin typeface="Source Code Pro" panose="020B0509030403020204" pitchFamily="49" charset="0"/>
+                <a:ea typeface="Source Code Pro" panose="020B0509030403020204" pitchFamily="49" charset="0"/>
+              </a:rPr>
+              <a:t>        a = "taco bell"</a:t>
             </a:r>
           </a:p>
           <a:p>
             <a:pPr marL="0" indent="0">
               <a:buNone/>
             </a:pPr>
-            <a:r>
-              <a:rPr lang="en-US" dirty="0">
-                <a:latin typeface="Source Code Pro" panose="020B0509030403020204" pitchFamily="49" charset="77"/>
-              </a:rPr>
-              <a:t>z = add_5(x)</a:t>
+            <a:endParaRPr lang="en-US" sz="2200" dirty="0">
+              <a:latin typeface="Source Code Pro" panose="020B0509030403020204" pitchFamily="49" charset="0"/>
+              <a:ea typeface="Source Code Pro" panose="020B0509030403020204" pitchFamily="49" charset="0"/>
+            </a:endParaRPr>
+          </a:p>
+          <a:p>
+            <a:pPr marL="0" indent="0">
+              <a:buNone/>
+            </a:pPr>
+            <a:r>
+              <a:rPr lang="en-US" sz="2200" dirty="0">
+                <a:latin typeface="Source Code Pro" panose="020B0509030403020204" pitchFamily="49" charset="0"/>
+                <a:ea typeface="Source Code Pro" panose="020B0509030403020204" pitchFamily="49" charset="0"/>
+              </a:rPr>
+              <a:t>result1 = foo(10)</a:t>
+            </a:r>
+          </a:p>
+          <a:p>
+            <a:pPr marL="0" indent="0">
+              <a:buNone/>
+            </a:pPr>
+            <a:r>
+              <a:rPr lang="en-US" sz="2200" dirty="0">
+                <a:latin typeface="Source Code Pro" panose="020B0509030403020204" pitchFamily="49" charset="0"/>
+                <a:ea typeface="Source Code Pro" panose="020B0509030403020204" pitchFamily="49" charset="0"/>
+              </a:rPr>
+              <a:t>result2 = bar()</a:t>
             </a:r>
           </a:p>
         </p:txBody>
@@ -13299,7 +13667,7 @@
           <p:cNvPr id="5" name="Footer Placeholder 3">
             <a:extLst>
               <a:ext uri="{FF2B5EF4-FFF2-40B4-BE49-F238E27FC236}">
-                <a16:creationId xmlns:a16="http://schemas.microsoft.com/office/drawing/2014/main" id="{3AF96BFF-6AF9-AFF8-E585-7AA7162824BC}"/>
+                <a16:creationId xmlns:a16="http://schemas.microsoft.com/office/drawing/2014/main" id="{063CC9AD-AB85-ED1A-8BBF-11586ADBA2A7}"/>
               </a:ext>
             </a:extLst>
           </p:cNvPr>
@@ -13330,7 +13698,7 @@
     </p:spTree>
     <p:extLst>
       <p:ext uri="{BB962C8B-B14F-4D97-AF65-F5344CB8AC3E}">
-        <p14:creationId xmlns:p14="http://schemas.microsoft.com/office/powerpoint/2010/main" val="3318854379"/>
+        <p14:creationId xmlns:p14="http://schemas.microsoft.com/office/powerpoint/2010/main" val="3096584794"/>
       </p:ext>
     </p:extLst>
   </p:cSld>
@@ -13362,7 +13730,7 @@
           <p:cNvPr id="2" name="Title 1">
             <a:extLst>
               <a:ext uri="{FF2B5EF4-FFF2-40B4-BE49-F238E27FC236}">
-                <a16:creationId xmlns:a16="http://schemas.microsoft.com/office/drawing/2014/main" id="{3240DA3F-5262-644A-8A04-EDF80650B9C2}"/>
+                <a16:creationId xmlns:a16="http://schemas.microsoft.com/office/drawing/2014/main" id="{80893AED-AB1E-9F40-BE86-23A4ED91A56E}"/>
               </a:ext>
             </a:extLst>
           </p:cNvPr>
@@ -13380,7 +13748,7 @@
           <a:p>
             <a:r>
               <a:rPr lang="en-US" dirty="0"/>
-              <a:t>Demo</a:t>
+              <a:t>Python Tutor Example #3</a:t>
             </a:r>
           </a:p>
         </p:txBody>
@@ -13390,7 +13758,7 @@
           <p:cNvPr id="3" name="Content Placeholder 2">
             <a:extLst>
               <a:ext uri="{FF2B5EF4-FFF2-40B4-BE49-F238E27FC236}">
-                <a16:creationId xmlns:a16="http://schemas.microsoft.com/office/drawing/2014/main" id="{284F9A36-1B36-EA49-B322-395902ACCA87}"/>
+                <a16:creationId xmlns:a16="http://schemas.microsoft.com/office/drawing/2014/main" id="{96930B3E-847A-CF45-BFCB-5C129A38C53F}"/>
               </a:ext>
             </a:extLst>
           </p:cNvPr>
@@ -13401,12 +13769,7 @@
             <p:ph idx="1"/>
           </p:nvPr>
         </p:nvSpPr>
-        <p:spPr>
-          <a:xfrm>
-            <a:off x="533399" y="1066800"/>
-            <a:ext cx="11225011" cy="5257800"/>
-          </a:xfrm>
-        </p:spPr>
+        <p:spPr/>
         <p:txBody>
           <a:bodyPr/>
           <a:lstStyle/>
@@ -13415,19 +13778,53 @@
               <a:buNone/>
             </a:pPr>
             <a:r>
-              <a:rPr lang="en-US" sz="2400" dirty="0"/>
-              <a:t>Example 1:</a:t>
-            </a:r>
-          </a:p>
-          <a:p>
-            <a:r>
-              <a:rPr lang="en-US" sz="2400" dirty="0">
-                <a:hlinkClick r:id="rId2"/>
-              </a:rPr>
-              <a:t>make_adder Higher Order Function: Environment Diagram Python Tutor Link</a:t>
-            </a:r>
-            <a:endParaRPr lang="en-US" sz="2400" dirty="0">
-              <a:hlinkClick r:id="rId3"/>
+              <a:rPr lang="en-US" dirty="0">
+                <a:latin typeface="Source Code Pro" panose="020B0509030403020204" pitchFamily="49" charset="77"/>
+              </a:rPr>
+              <a:t>add_2 = </a:t>
+            </a:r>
+            <a:r>
+              <a:rPr lang="en-US" dirty="0" err="1">
+                <a:latin typeface="Source Code Pro" panose="020B0509030403020204" pitchFamily="49" charset="77"/>
+              </a:rPr>
+              <a:t>make_adder</a:t>
+            </a:r>
+            <a:r>
+              <a:rPr lang="en-US" dirty="0">
+                <a:latin typeface="Source Code Pro" panose="020B0509030403020204" pitchFamily="49" charset="77"/>
+              </a:rPr>
+              <a:t>(2)</a:t>
+            </a:r>
+          </a:p>
+          <a:p>
+            <a:pPr marL="0" indent="0">
+              <a:buNone/>
+            </a:pPr>
+            <a:r>
+              <a:rPr lang="en-US" dirty="0">
+                <a:latin typeface="Source Code Pro" panose="020B0509030403020204" pitchFamily="49" charset="77"/>
+              </a:rPr>
+              <a:t>add_3 = </a:t>
+            </a:r>
+            <a:r>
+              <a:rPr lang="en-US" dirty="0" err="1">
+                <a:latin typeface="Source Code Pro" panose="020B0509030403020204" pitchFamily="49" charset="77"/>
+              </a:rPr>
+              <a:t>make_adder</a:t>
+            </a:r>
+            <a:r>
+              <a:rPr lang="en-US" dirty="0">
+                <a:latin typeface="Source Code Pro" panose="020B0509030403020204" pitchFamily="49" charset="77"/>
+              </a:rPr>
+              <a:t>(3)</a:t>
+            </a:r>
+          </a:p>
+          <a:p>
+            <a:pPr marL="0" indent="0">
+              <a:buNone/>
+            </a:pPr>
+            <a:endParaRPr lang="en-US" dirty="0">
+              <a:latin typeface="Source Code Pro" panose="020B0509030403020204" pitchFamily="49" charset="77"/>
             </a:endParaRPr>
           </a:p>
           <a:p>
@@ -13435,60 +13832,86 @@
               <a:buNone/>
             </a:pPr>
             <a:r>
-              <a:rPr lang="en-US" sz="2400" dirty="0"/>
-              <a:t>Example 2:</a:t>
-            </a:r>
-            <a:endParaRPr lang="en-US" sz="2400" dirty="0">
-              <a:hlinkClick r:id="rId3"/>
-            </a:endParaRPr>
-          </a:p>
-          <a:p>
-            <a:r>
-              <a:rPr lang="en-US" sz="2400" dirty="0">
-                <a:solidFill>
-                  <a:schemeClr val="tx1">
-                    <a:lumMod val="95000"/>
-                    <a:lumOff val="5000"/>
-                  </a:schemeClr>
-                </a:solidFill>
-                <a:hlinkClick r:id="rId4"/>
-              </a:rPr>
-              <a:t>Primitives and Functions: Environment Diagram Python Tutor</a:t>
-            </a:r>
-            <a:r>
-              <a:rPr lang="en-US" sz="2400" dirty="0">
-                <a:hlinkClick r:id="rId4"/>
-              </a:rPr>
-              <a:t>:</a:t>
-            </a:r>
-            <a:endParaRPr lang="en-US" sz="2400" dirty="0"/>
+              <a:rPr lang="en-US" dirty="0">
+                <a:latin typeface="Source Code Pro" panose="020B0509030403020204" pitchFamily="49" charset="77"/>
+              </a:rPr>
+              <a:t>x = add_2(2)</a:t>
+            </a:r>
           </a:p>
           <a:p>
             <a:pPr marL="0" indent="0">
               <a:buNone/>
             </a:pPr>
             <a:r>
-              <a:rPr lang="en-US" sz="2400" dirty="0"/>
-              <a:t>Example 3:</a:t>
-            </a:r>
-          </a:p>
-          <a:p>
-            <a:r>
-              <a:rPr lang="en-US" sz="2400" dirty="0">
-                <a:hlinkClick r:id="rId5"/>
-              </a:rPr>
-              <a:t>Compose Python Tutor Link</a:t>
-            </a:r>
-            <a:endParaRPr lang="en-US" sz="2400" dirty="0"/>
-          </a:p>
-        </p:txBody>
-      </p:sp>
-      <p:sp>
-        <p:nvSpPr>
-          <p:cNvPr id="4" name="Footer Placeholder 3">
+              <a:rPr lang="en-US" dirty="0">
+                <a:latin typeface="Source Code Pro" panose="020B0509030403020204" pitchFamily="49" charset="77"/>
+              </a:rPr>
+              <a:t>def compose(f, g):</a:t>
+            </a:r>
+          </a:p>
+          <a:p>
+            <a:pPr marL="0" indent="0">
+              <a:buNone/>
+            </a:pPr>
+            <a:r>
+              <a:rPr lang="en-US" dirty="0">
+                <a:latin typeface="Source Code Pro" panose="020B0509030403020204" pitchFamily="49" charset="77"/>
+              </a:rPr>
+              <a:t>    def h(x):</a:t>
+            </a:r>
+          </a:p>
+          <a:p>
+            <a:pPr marL="0" indent="0">
+              <a:buNone/>
+            </a:pPr>
+            <a:r>
+              <a:rPr lang="en-US" dirty="0">
+                <a:latin typeface="Source Code Pro" panose="020B0509030403020204" pitchFamily="49" charset="77"/>
+              </a:rPr>
+              <a:t>        return f(g(x))</a:t>
+            </a:r>
+          </a:p>
+          <a:p>
+            <a:pPr marL="0" indent="0">
+              <a:buNone/>
+            </a:pPr>
+            <a:r>
+              <a:rPr lang="en-US" dirty="0">
+                <a:latin typeface="Source Code Pro" panose="020B0509030403020204" pitchFamily="49" charset="77"/>
+              </a:rPr>
+              <a:t>    return h</a:t>
+            </a:r>
+          </a:p>
+          <a:p>
+            <a:pPr marL="0" indent="0">
+              <a:buNone/>
+            </a:pPr>
+            <a:r>
+              <a:rPr lang="en-US" dirty="0">
+                <a:latin typeface="Source Code Pro" panose="020B0509030403020204" pitchFamily="49" charset="77"/>
+              </a:rPr>
+              <a:t>add_5 = compose(add_2, add_3)</a:t>
+            </a:r>
+          </a:p>
+          <a:p>
+            <a:pPr marL="0" indent="0">
+              <a:buNone/>
+            </a:pPr>
+            <a:r>
+              <a:rPr lang="en-US" dirty="0">
+                <a:latin typeface="Source Code Pro" panose="020B0509030403020204" pitchFamily="49" charset="77"/>
+              </a:rPr>
+              <a:t>z = add_5(x)</a:t>
+            </a:r>
+          </a:p>
+        </p:txBody>
+      </p:sp>
+      <p:sp>
+        <p:nvSpPr>
+          <p:cNvPr id="5" name="Footer Placeholder 3">
             <a:extLst>
               <a:ext uri="{FF2B5EF4-FFF2-40B4-BE49-F238E27FC236}">
-                <a16:creationId xmlns:a16="http://schemas.microsoft.com/office/drawing/2014/main" id="{F98321EF-8CA7-4B88-C14F-0290A39B3BC4}"/>
+                <a16:creationId xmlns:a16="http://schemas.microsoft.com/office/drawing/2014/main" id="{3AF96BFF-6AF9-AFF8-E585-7AA7162824BC}"/>
               </a:ext>
             </a:extLst>
           </p:cNvPr>
@@ -13519,7 +13942,7 @@
     </p:spTree>
     <p:extLst>
       <p:ext uri="{BB962C8B-B14F-4D97-AF65-F5344CB8AC3E}">
-        <p14:creationId xmlns:p14="http://schemas.microsoft.com/office/powerpoint/2010/main" val="776121693"/>
+        <p14:creationId xmlns:p14="http://schemas.microsoft.com/office/powerpoint/2010/main" val="3318854379"/>
       </p:ext>
     </p:extLst>
   </p:cSld>
@@ -13551,6 +13974,195 @@
           <p:cNvPr id="2" name="Title 1">
             <a:extLst>
               <a:ext uri="{FF2B5EF4-FFF2-40B4-BE49-F238E27FC236}">
+                <a16:creationId xmlns:a16="http://schemas.microsoft.com/office/drawing/2014/main" id="{3240DA3F-5262-644A-8A04-EDF80650B9C2}"/>
+              </a:ext>
+            </a:extLst>
+          </p:cNvPr>
+          <p:cNvSpPr>
+            <a:spLocks noGrp="1"/>
+          </p:cNvSpPr>
+          <p:nvPr>
+            <p:ph type="title"/>
+          </p:nvPr>
+        </p:nvSpPr>
+        <p:spPr/>
+        <p:txBody>
+          <a:bodyPr/>
+          <a:lstStyle/>
+          <a:p>
+            <a:r>
+              <a:rPr lang="en-US" dirty="0"/>
+              <a:t>Demo</a:t>
+            </a:r>
+          </a:p>
+        </p:txBody>
+      </p:sp>
+      <p:sp>
+        <p:nvSpPr>
+          <p:cNvPr id="3" name="Content Placeholder 2">
+            <a:extLst>
+              <a:ext uri="{FF2B5EF4-FFF2-40B4-BE49-F238E27FC236}">
+                <a16:creationId xmlns:a16="http://schemas.microsoft.com/office/drawing/2014/main" id="{284F9A36-1B36-EA49-B322-395902ACCA87}"/>
+              </a:ext>
+            </a:extLst>
+          </p:cNvPr>
+          <p:cNvSpPr>
+            <a:spLocks noGrp="1"/>
+          </p:cNvSpPr>
+          <p:nvPr>
+            <p:ph idx="1"/>
+          </p:nvPr>
+        </p:nvSpPr>
+        <p:spPr>
+          <a:xfrm>
+            <a:off x="533399" y="1066800"/>
+            <a:ext cx="11225011" cy="5257800"/>
+          </a:xfrm>
+        </p:spPr>
+        <p:txBody>
+          <a:bodyPr/>
+          <a:lstStyle/>
+          <a:p>
+            <a:pPr marL="0" indent="0">
+              <a:buNone/>
+            </a:pPr>
+            <a:r>
+              <a:rPr lang="en-US" sz="2400" dirty="0"/>
+              <a:t>Example 1:</a:t>
+            </a:r>
+          </a:p>
+          <a:p>
+            <a:r>
+              <a:rPr lang="en-US" sz="2400" dirty="0">
+                <a:hlinkClick r:id="rId2"/>
+              </a:rPr>
+              <a:t>make_adder Higher Order Function: Environment Diagram Python Tutor Link</a:t>
+            </a:r>
+            <a:endParaRPr lang="en-US" sz="2400" dirty="0">
+              <a:hlinkClick r:id="rId3"/>
+            </a:endParaRPr>
+          </a:p>
+          <a:p>
+            <a:pPr marL="0" indent="0">
+              <a:buNone/>
+            </a:pPr>
+            <a:r>
+              <a:rPr lang="en-US" sz="2400" dirty="0"/>
+              <a:t>Example 2:</a:t>
+            </a:r>
+            <a:endParaRPr lang="en-US" sz="2400" dirty="0">
+              <a:hlinkClick r:id="rId3"/>
+            </a:endParaRPr>
+          </a:p>
+          <a:p>
+            <a:r>
+              <a:rPr lang="en-US" sz="2400" dirty="0">
+                <a:solidFill>
+                  <a:schemeClr val="tx1">
+                    <a:lumMod val="95000"/>
+                    <a:lumOff val="5000"/>
+                  </a:schemeClr>
+                </a:solidFill>
+                <a:hlinkClick r:id="rId4"/>
+              </a:rPr>
+              <a:t>Primitives and Functions: Environment Diagram Python Tutor</a:t>
+            </a:r>
+            <a:r>
+              <a:rPr lang="en-US" sz="2400" dirty="0">
+                <a:hlinkClick r:id="rId4"/>
+              </a:rPr>
+              <a:t>:</a:t>
+            </a:r>
+            <a:endParaRPr lang="en-US" sz="2400" dirty="0"/>
+          </a:p>
+          <a:p>
+            <a:pPr marL="0" indent="0">
+              <a:buNone/>
+            </a:pPr>
+            <a:r>
+              <a:rPr lang="en-US" sz="2400" dirty="0"/>
+              <a:t>Example 3:</a:t>
+            </a:r>
+          </a:p>
+          <a:p>
+            <a:r>
+              <a:rPr lang="en-US" sz="2400" dirty="0">
+                <a:hlinkClick r:id="rId5"/>
+              </a:rPr>
+              <a:t>Compose Python Tutor Link</a:t>
+            </a:r>
+            <a:endParaRPr lang="en-US" sz="2400" dirty="0"/>
+          </a:p>
+        </p:txBody>
+      </p:sp>
+      <p:sp>
+        <p:nvSpPr>
+          <p:cNvPr id="4" name="Footer Placeholder 3">
+            <a:extLst>
+              <a:ext uri="{FF2B5EF4-FFF2-40B4-BE49-F238E27FC236}">
+                <a16:creationId xmlns:a16="http://schemas.microsoft.com/office/drawing/2014/main" id="{F98321EF-8CA7-4B88-C14F-0290A39B3BC4}"/>
+              </a:ext>
+            </a:extLst>
+          </p:cNvPr>
+          <p:cNvSpPr>
+            <a:spLocks noGrp="1"/>
+          </p:cNvSpPr>
+          <p:nvPr>
+            <p:ph type="ftr" sz="quarter" idx="10"/>
+          </p:nvPr>
+        </p:nvSpPr>
+        <p:spPr>
+          <a:xfrm>
+            <a:off x="4038599" y="6356350"/>
+            <a:ext cx="4348655" cy="365125"/>
+          </a:xfrm>
+        </p:spPr>
+        <p:txBody>
+          <a:bodyPr/>
+          <a:lstStyle/>
+          <a:p>
+            <a:r>
+              <a:rPr lang="en-US" dirty="0"/>
+              <a:t>Michael Ball | UC Berkeley | https://c88c.org | © CC BY-NC-SA</a:t>
+            </a:r>
+          </a:p>
+        </p:txBody>
+      </p:sp>
+    </p:spTree>
+    <p:extLst>
+      <p:ext uri="{BB962C8B-B14F-4D97-AF65-F5344CB8AC3E}">
+        <p14:creationId xmlns:p14="http://schemas.microsoft.com/office/powerpoint/2010/main" val="776121693"/>
+      </p:ext>
+    </p:extLst>
+  </p:cSld>
+  <p:clrMapOvr>
+    <a:masterClrMapping/>
+  </p:clrMapOvr>
+</p:sld>
+</file>
+
+<file path=ppt/slides/slide23.xml><?xml version="1.0" encoding="utf-8"?>
+<p:sld xmlns:a="http://schemas.openxmlformats.org/drawingml/2006/main" xmlns:r="http://schemas.openxmlformats.org/officeDocument/2006/relationships" xmlns:p="http://schemas.openxmlformats.org/presentationml/2006/main">
+  <p:cSld>
+    <p:spTree>
+      <p:nvGrpSpPr>
+        <p:cNvPr id="1" name=""/>
+        <p:cNvGrpSpPr/>
+        <p:nvPr/>
+      </p:nvGrpSpPr>
+      <p:grpSpPr>
+        <a:xfrm>
+          <a:off x="0" y="0"/>
+          <a:ext cx="0" cy="0"/>
+          <a:chOff x="0" y="0"/>
+          <a:chExt cx="0" cy="0"/>
+        </a:xfrm>
+      </p:grpSpPr>
+      <p:sp>
+        <p:nvSpPr>
+          <p:cNvPr id="2" name="Title 1">
+            <a:extLst>
+              <a:ext uri="{FF2B5EF4-FFF2-40B4-BE49-F238E27FC236}">
                 <a16:creationId xmlns:a16="http://schemas.microsoft.com/office/drawing/2014/main" id="{3D058CAE-0705-B045-AD80-3D6241BFCD42}"/>
               </a:ext>
             </a:extLst>
@@ -13708,7 +14320,7 @@
 </p:sld>
 </file>
 
-<file path=ppt/slides/slide23.xml><?xml version="1.0" encoding="utf-8"?>
+<file path=ppt/slides/slide24.xml><?xml version="1.0" encoding="utf-8"?>
 <p:sld xmlns:a="http://schemas.openxmlformats.org/drawingml/2006/main" xmlns:r="http://schemas.openxmlformats.org/officeDocument/2006/relationships" xmlns:p="http://schemas.openxmlformats.org/presentationml/2006/main">
   <p:cSld>
     <p:spTree>
@@ -15002,7 +15614,13 @@
   <p:cSld>
     <p:spTree>
       <p:nvGrpSpPr>
-        <p:cNvPr id="1" name=""/>
+        <p:cNvPr id="1" name="">
+          <a:extLst>
+            <a:ext uri="{FF2B5EF4-FFF2-40B4-BE49-F238E27FC236}">
+              <a16:creationId xmlns:a16="http://schemas.microsoft.com/office/drawing/2014/main" id="{093AC4AF-5E4D-9A43-727C-9C63AF68E378}"/>
+            </a:ext>
+          </a:extLst>
+        </p:cNvPr>
         <p:cNvGrpSpPr/>
         <p:nvPr/>
       </p:nvGrpSpPr>
@@ -15019,7 +15637,7 @@
           <p:cNvPr id="2" name="Title 1">
             <a:extLst>
               <a:ext uri="{FF2B5EF4-FFF2-40B4-BE49-F238E27FC236}">
-                <a16:creationId xmlns:a16="http://schemas.microsoft.com/office/drawing/2014/main" id="{D78DEC67-149D-7747-87F3-D940F8EF2C93}"/>
+                <a16:creationId xmlns:a16="http://schemas.microsoft.com/office/drawing/2014/main" id="{D5EDDD8D-F7A6-87EB-D7CF-451F58884030}"/>
               </a:ext>
             </a:extLst>
           </p:cNvPr>
@@ -15047,7 +15665,7 @@
           <p:cNvPr id="3" name="Footer Placeholder 3">
             <a:extLst>
               <a:ext uri="{FF2B5EF4-FFF2-40B4-BE49-F238E27FC236}">
-                <a16:creationId xmlns:a16="http://schemas.microsoft.com/office/drawing/2014/main" id="{945EF9C5-F59D-F53F-E807-CF0E2DF60EA6}"/>
+                <a16:creationId xmlns:a16="http://schemas.microsoft.com/office/drawing/2014/main" id="{55666DC2-17A3-DA6B-9BFE-036E767F5A13}"/>
               </a:ext>
             </a:extLst>
           </p:cNvPr>
@@ -15080,7 +15698,7 @@
           <p:cNvPr id="5" name="Rectangle 4">
             <a:extLst>
               <a:ext uri="{FF2B5EF4-FFF2-40B4-BE49-F238E27FC236}">
-                <a16:creationId xmlns:a16="http://schemas.microsoft.com/office/drawing/2014/main" id="{F4E01054-B4B8-BC41-8667-60CEB7A01846}"/>
+                <a16:creationId xmlns:a16="http://schemas.microsoft.com/office/drawing/2014/main" id="{76FBC101-3046-6855-59CA-2963E80BEBF6}"/>
               </a:ext>
             </a:extLst>
           </p:cNvPr>
@@ -15090,7 +15708,7 @@
         <p:spPr>
           <a:xfrm>
             <a:off x="533400" y="1081668"/>
-            <a:ext cx="8610600" cy="3139321"/>
+            <a:ext cx="8610600" cy="2308324"/>
           </a:xfrm>
           <a:prstGeom prst="rect">
             <a:avLst/>
@@ -15101,6 +15719,181 @@
             <a:spAutoFit/>
           </a:bodyPr>
           <a:lstStyle/>
+          <a:p>
+            <a:pPr>
+              <a:lnSpc>
+                <a:spcPct val="100000"/>
+              </a:lnSpc>
+            </a:pPr>
+            <a:r>
+              <a:rPr lang="en-US" spc="-1" dirty="0">
+                <a:solidFill>
+                  <a:srgbClr val="000000"/>
+                </a:solidFill>
+                <a:uFill>
+                  <a:solidFill>
+                    <a:srgbClr val="FFFFFF"/>
+                  </a:solidFill>
+                </a:uFill>
+                <a:latin typeface="Source Code Pro" panose="020B0509030403020204" pitchFamily="49" charset="77"/>
+              </a:rPr>
+              <a:t>def acronym(sentence):</a:t>
+            </a:r>
+          </a:p>
+          <a:p>
+            <a:pPr>
+              <a:lnSpc>
+                <a:spcPct val="100000"/>
+              </a:lnSpc>
+            </a:pPr>
+            <a:r>
+              <a:rPr lang="en-US" spc="-1" dirty="0">
+                <a:solidFill>
+                  <a:srgbClr val="000000"/>
+                </a:solidFill>
+                <a:uFill>
+                  <a:solidFill>
+                    <a:srgbClr val="FFFFFF"/>
+                  </a:solidFill>
+                </a:uFill>
+                <a:latin typeface="Source Code Pro" panose="020B0509030403020204" pitchFamily="49" charset="77"/>
+              </a:rPr>
+              <a:t>    """</a:t>
+            </a:r>
+          </a:p>
+          <a:p>
+            <a:pPr>
+              <a:lnSpc>
+                <a:spcPct val="100000"/>
+              </a:lnSpc>
+            </a:pPr>
+            <a:r>
+              <a:rPr lang="en-US" spc="-1" dirty="0">
+                <a:solidFill>
+                  <a:srgbClr val="000000"/>
+                </a:solidFill>
+                <a:uFill>
+                  <a:solidFill>
+                    <a:srgbClr val="FFFFFF"/>
+                  </a:solidFill>
+                </a:uFill>
+                <a:latin typeface="Source Code Pro" panose="020B0509030403020204" pitchFamily="49" charset="77"/>
+              </a:rPr>
+              <a:t>    &gt;&gt;&gt; acronym("The University of California at Berkeley")</a:t>
+            </a:r>
+          </a:p>
+          <a:p>
+            <a:pPr>
+              <a:lnSpc>
+                <a:spcPct val="100000"/>
+              </a:lnSpc>
+            </a:pPr>
+            <a:r>
+              <a:rPr lang="en-US" spc="-1" dirty="0">
+                <a:solidFill>
+                  <a:srgbClr val="000000"/>
+                </a:solidFill>
+                <a:uFill>
+                  <a:solidFill>
+                    <a:srgbClr val="FFFFFF"/>
+                  </a:solidFill>
+                </a:uFill>
+                <a:latin typeface="Source Code Pro" panose="020B0509030403020204" pitchFamily="49" charset="77"/>
+              </a:rPr>
+              <a:t>    "UCB"</a:t>
+            </a:r>
+          </a:p>
+          <a:p>
+            <a:pPr>
+              <a:lnSpc>
+                <a:spcPct val="100000"/>
+              </a:lnSpc>
+            </a:pPr>
+            <a:r>
+              <a:rPr lang="en-US" spc="-1" dirty="0">
+                <a:solidFill>
+                  <a:srgbClr val="000000"/>
+                </a:solidFill>
+                <a:uFill>
+                  <a:solidFill>
+                    <a:srgbClr val="FFFFFF"/>
+                  </a:solidFill>
+                </a:uFill>
+                <a:latin typeface="Source Code Pro" panose="020B0509030403020204" pitchFamily="49" charset="77"/>
+              </a:rPr>
+              <a:t>    """</a:t>
+            </a:r>
+          </a:p>
+          <a:p>
+            <a:pPr>
+              <a:lnSpc>
+                <a:spcPct val="100000"/>
+              </a:lnSpc>
+            </a:pPr>
+            <a:r>
+              <a:rPr lang="en-US" spc="-1" dirty="0">
+                <a:solidFill>
+                  <a:srgbClr val="000000"/>
+                </a:solidFill>
+                <a:uFill>
+                  <a:solidFill>
+                    <a:srgbClr val="FFFFFF"/>
+                  </a:solidFill>
+                </a:uFill>
+                <a:latin typeface="Source Code Pro" panose="020B0509030403020204" pitchFamily="49" charset="77"/>
+              </a:rPr>
+              <a:t>    words = </a:t>
+            </a:r>
+            <a:r>
+              <a:rPr lang="en-US" spc="-1" dirty="0" err="1">
+                <a:solidFill>
+                  <a:srgbClr val="000000"/>
+                </a:solidFill>
+                <a:uFill>
+                  <a:solidFill>
+                    <a:srgbClr val="FFFFFF"/>
+                  </a:solidFill>
+                </a:uFill>
+                <a:latin typeface="Source Code Pro" panose="020B0509030403020204" pitchFamily="49" charset="77"/>
+              </a:rPr>
+              <a:t>sentence.split</a:t>
+            </a:r>
+            <a:r>
+              <a:rPr lang="en-US" spc="-1" dirty="0">
+                <a:solidFill>
+                  <a:srgbClr val="000000"/>
+                </a:solidFill>
+                <a:uFill>
+                  <a:solidFill>
+                    <a:srgbClr val="FFFFFF"/>
+                  </a:solidFill>
+                </a:uFill>
+                <a:latin typeface="Source Code Pro" panose="020B0509030403020204" pitchFamily="49" charset="77"/>
+              </a:rPr>
+              <a:t>()</a:t>
+            </a:r>
+          </a:p>
+          <a:p>
+            <a:pPr>
+              <a:lnSpc>
+                <a:spcPct val="100000"/>
+              </a:lnSpc>
+            </a:pPr>
+            <a:r>
+              <a:rPr lang="en-US" spc="-1" dirty="0">
+                <a:solidFill>
+                  <a:srgbClr val="000000"/>
+                </a:solidFill>
+                <a:uFill>
+                  <a:solidFill>
+                    <a:srgbClr val="FFFFFF"/>
+                  </a:solidFill>
+                </a:uFill>
+                <a:latin typeface="Source Code Pro" panose="020B0509030403020204" pitchFamily="49" charset="77"/>
+              </a:rPr>
+              <a:t>    return "YOUR CODE HERE"</a:t>
+            </a:r>
+          </a:p>
           <a:p>
             <a:pPr>
               <a:lnSpc>
@@ -15119,301 +15912,6 @@
               <a:latin typeface="Source Code Pro" panose="020B0509030403020204" pitchFamily="49" charset="77"/>
             </a:endParaRPr>
           </a:p>
-          <a:p>
-            <a:pPr>
-              <a:lnSpc>
-                <a:spcPct val="100000"/>
-              </a:lnSpc>
-            </a:pPr>
-            <a:r>
-              <a:rPr lang="en-US" spc="-1" dirty="0">
-                <a:solidFill>
-                  <a:srgbClr val="000000"/>
-                </a:solidFill>
-                <a:uFill>
-                  <a:solidFill>
-                    <a:srgbClr val="FFFFFF"/>
-                  </a:solidFill>
-                </a:uFill>
-                <a:latin typeface="Source Code Pro" panose="020B0509030403020204" pitchFamily="49" charset="77"/>
-              </a:rPr>
-              <a:t>Input: "The University of California at Berkeley"</a:t>
-            </a:r>
-          </a:p>
-          <a:p>
-            <a:pPr>
-              <a:lnSpc>
-                <a:spcPct val="100000"/>
-              </a:lnSpc>
-            </a:pPr>
-            <a:endParaRPr lang="en-US" spc="-1" dirty="0">
-              <a:solidFill>
-                <a:srgbClr val="000000"/>
-              </a:solidFill>
-              <a:uFill>
-                <a:solidFill>
-                  <a:srgbClr val="FFFFFF"/>
-                </a:solidFill>
-              </a:uFill>
-              <a:latin typeface="Source Code Pro" panose="020B0509030403020204" pitchFamily="49" charset="77"/>
-            </a:endParaRPr>
-          </a:p>
-          <a:p>
-            <a:pPr>
-              <a:lnSpc>
-                <a:spcPct val="100000"/>
-              </a:lnSpc>
-            </a:pPr>
-            <a:r>
-              <a:rPr lang="en-US" spc="-1" dirty="0">
-                <a:solidFill>
-                  <a:srgbClr val="000000"/>
-                </a:solidFill>
-                <a:uFill>
-                  <a:solidFill>
-                    <a:srgbClr val="FFFFFF"/>
-                  </a:solidFill>
-                </a:uFill>
-                <a:latin typeface="Source Code Pro" panose="020B0509030403020204" pitchFamily="49" charset="77"/>
-              </a:rPr>
-              <a:t>Output: "UCB"</a:t>
-            </a:r>
-          </a:p>
-          <a:p>
-            <a:pPr>
-              <a:lnSpc>
-                <a:spcPct val="100000"/>
-              </a:lnSpc>
-            </a:pPr>
-            <a:r>
-              <a:rPr lang="en-US" spc="-1" dirty="0">
-                <a:solidFill>
-                  <a:srgbClr val="000000"/>
-                </a:solidFill>
-                <a:uFill>
-                  <a:solidFill>
-                    <a:srgbClr val="FFFFFF"/>
-                  </a:solidFill>
-                </a:uFill>
-                <a:latin typeface="Source Code Pro" panose="020B0509030403020204" pitchFamily="49" charset="77"/>
-              </a:rPr>
-              <a:t>def acronym(sentence):</a:t>
-            </a:r>
-          </a:p>
-          <a:p>
-            <a:pPr>
-              <a:lnSpc>
-                <a:spcPct val="100000"/>
-              </a:lnSpc>
-            </a:pPr>
-            <a:r>
-              <a:rPr lang="en-US" spc="-1" dirty="0">
-                <a:solidFill>
-                  <a:srgbClr val="000000"/>
-                </a:solidFill>
-                <a:uFill>
-                  <a:solidFill>
-                    <a:srgbClr val="FFFFFF"/>
-                  </a:solidFill>
-                </a:uFill>
-                <a:latin typeface="Source Code Pro" panose="020B0509030403020204" pitchFamily="49" charset="77"/>
-              </a:rPr>
-              <a:t>    """ (Some </a:t>
-            </a:r>
-            <a:r>
-              <a:rPr lang="en-US" spc="-1" dirty="0" err="1">
-                <a:solidFill>
-                  <a:srgbClr val="000000"/>
-                </a:solidFill>
-                <a:uFill>
-                  <a:solidFill>
-                    <a:srgbClr val="FFFFFF"/>
-                  </a:solidFill>
-                </a:uFill>
-                <a:latin typeface="Source Code Pro" panose="020B0509030403020204" pitchFamily="49" charset="77"/>
-              </a:rPr>
-              <a:t>doctests</a:t>
-            </a:r>
-            <a:r>
-              <a:rPr lang="en-US" spc="-1" dirty="0">
-                <a:solidFill>
-                  <a:srgbClr val="000000"/>
-                </a:solidFill>
-                <a:uFill>
-                  <a:solidFill>
-                    <a:srgbClr val="FFFFFF"/>
-                  </a:solidFill>
-                </a:uFill>
-                <a:latin typeface="Source Code Pro" panose="020B0509030403020204" pitchFamily="49" charset="77"/>
-              </a:rPr>
-              <a:t>)</a:t>
-            </a:r>
-          </a:p>
-          <a:p>
-            <a:pPr>
-              <a:lnSpc>
-                <a:spcPct val="100000"/>
-              </a:lnSpc>
-            </a:pPr>
-            <a:r>
-              <a:rPr lang="en-US" spc="-1" dirty="0">
-                <a:solidFill>
-                  <a:srgbClr val="000000"/>
-                </a:solidFill>
-                <a:uFill>
-                  <a:solidFill>
-                    <a:srgbClr val="FFFFFF"/>
-                  </a:solidFill>
-                </a:uFill>
-                <a:latin typeface="Source Code Pro" panose="020B0509030403020204" pitchFamily="49" charset="77"/>
-              </a:rPr>
-              <a:t>    """</a:t>
-            </a:r>
-          </a:p>
-          <a:p>
-            <a:pPr>
-              <a:lnSpc>
-                <a:spcPct val="100000"/>
-              </a:lnSpc>
-            </a:pPr>
-            <a:r>
-              <a:rPr lang="en-US" spc="-1" dirty="0">
-                <a:solidFill>
-                  <a:srgbClr val="000000"/>
-                </a:solidFill>
-                <a:uFill>
-                  <a:solidFill>
-                    <a:srgbClr val="FFFFFF"/>
-                  </a:solidFill>
-                </a:uFill>
-                <a:latin typeface="Source Code Pro" panose="020B0509030403020204" pitchFamily="49" charset="77"/>
-              </a:rPr>
-              <a:t>    words = </a:t>
-            </a:r>
-            <a:r>
-              <a:rPr lang="en-US" spc="-1" dirty="0" err="1">
-                <a:solidFill>
-                  <a:srgbClr val="000000"/>
-                </a:solidFill>
-                <a:uFill>
-                  <a:solidFill>
-                    <a:srgbClr val="FFFFFF"/>
-                  </a:solidFill>
-                </a:uFill>
-                <a:latin typeface="Source Code Pro" panose="020B0509030403020204" pitchFamily="49" charset="77"/>
-              </a:rPr>
-              <a:t>sentence.split</a:t>
-            </a:r>
-            <a:r>
-              <a:rPr lang="en-US" spc="-1" dirty="0">
-                <a:solidFill>
-                  <a:srgbClr val="000000"/>
-                </a:solidFill>
-                <a:uFill>
-                  <a:solidFill>
-                    <a:srgbClr val="FFFFFF"/>
-                  </a:solidFill>
-                </a:uFill>
-                <a:latin typeface="Source Code Pro" panose="020B0509030403020204" pitchFamily="49" charset="77"/>
-              </a:rPr>
-              <a:t>()</a:t>
-            </a:r>
-          </a:p>
-          <a:p>
-            <a:pPr>
-              <a:lnSpc>
-                <a:spcPct val="100000"/>
-              </a:lnSpc>
-            </a:pPr>
-            <a:r>
-              <a:rPr lang="en-US" spc="-1" dirty="0">
-                <a:solidFill>
-                  <a:srgbClr val="000000"/>
-                </a:solidFill>
-                <a:uFill>
-                  <a:solidFill>
-                    <a:srgbClr val="FFFFFF"/>
-                  </a:solidFill>
-                </a:uFill>
-                <a:latin typeface="Source Code Pro" panose="020B0509030403020204" pitchFamily="49" charset="77"/>
-              </a:rPr>
-              <a:t>    return reduce(add, map(</a:t>
-            </a:r>
-            <a:r>
-              <a:rPr lang="en-US" spc="-1" dirty="0" err="1">
-                <a:solidFill>
-                  <a:srgbClr val="000000"/>
-                </a:solidFill>
-                <a:uFill>
-                  <a:solidFill>
-                    <a:srgbClr val="FFFFFF"/>
-                  </a:solidFill>
-                </a:uFill>
-                <a:latin typeface="Source Code Pro" panose="020B0509030403020204" pitchFamily="49" charset="77"/>
-              </a:rPr>
-              <a:t>first_letter</a:t>
-            </a:r>
-            <a:r>
-              <a:rPr lang="en-US" spc="-1" dirty="0">
-                <a:solidFill>
-                  <a:srgbClr val="000000"/>
-                </a:solidFill>
-                <a:uFill>
-                  <a:solidFill>
-                    <a:srgbClr val="FFFFFF"/>
-                  </a:solidFill>
-                </a:uFill>
-                <a:latin typeface="Source Code Pro" panose="020B0509030403020204" pitchFamily="49" charset="77"/>
-              </a:rPr>
-              <a:t>, filter(</a:t>
-            </a:r>
-            <a:r>
-              <a:rPr lang="en-US" spc="-1" dirty="0" err="1">
-                <a:solidFill>
-                  <a:srgbClr val="000000"/>
-                </a:solidFill>
-                <a:uFill>
-                  <a:solidFill>
-                    <a:srgbClr val="FFFFFF"/>
-                  </a:solidFill>
-                </a:uFill>
-                <a:latin typeface="Source Code Pro" panose="020B0509030403020204" pitchFamily="49" charset="77"/>
-              </a:rPr>
-              <a:t>long_word</a:t>
-            </a:r>
-            <a:r>
-              <a:rPr lang="en-US" spc="-1" dirty="0">
-                <a:solidFill>
-                  <a:srgbClr val="000000"/>
-                </a:solidFill>
-                <a:uFill>
-                  <a:solidFill>
-                    <a:srgbClr val="FFFFFF"/>
-                  </a:solidFill>
-                </a:uFill>
-                <a:latin typeface="Source Code Pro" panose="020B0509030403020204" pitchFamily="49" charset="77"/>
-              </a:rPr>
-              <a:t>, words)))</a:t>
-            </a:r>
-          </a:p>
-          <a:p>
-            <a:pPr>
-              <a:lnSpc>
-                <a:spcPct val="100000"/>
-              </a:lnSpc>
-            </a:pPr>
-            <a:endParaRPr lang="en-US" spc="-1" dirty="0">
-              <a:solidFill>
-                <a:srgbClr val="000000"/>
-              </a:solidFill>
-              <a:uFill>
-                <a:solidFill>
-                  <a:srgbClr val="FFFFFF"/>
-                </a:solidFill>
-              </a:uFill>
-              <a:latin typeface="Source Code Pro" panose="020B0509030403020204" pitchFamily="49" charset="77"/>
-            </a:endParaRPr>
-          </a:p>
         </p:txBody>
       </p:sp>
       <p:sp>
@@ -15421,7 +15919,7 @@
           <p:cNvPr id="7" name="TextShape 11">
             <a:extLst>
               <a:ext uri="{FF2B5EF4-FFF2-40B4-BE49-F238E27FC236}">
-                <a16:creationId xmlns:a16="http://schemas.microsoft.com/office/drawing/2014/main" id="{55609106-671F-E84E-8744-3B2453668F27}"/>
+                <a16:creationId xmlns:a16="http://schemas.microsoft.com/office/drawing/2014/main" id="{FBB37F23-03A0-B7ED-65E5-CFFF81253EE7}"/>
               </a:ext>
             </a:extLst>
           </p:cNvPr>
@@ -15519,7 +16017,7 @@
     </p:spTree>
     <p:extLst>
       <p:ext uri="{BB962C8B-B14F-4D97-AF65-F5344CB8AC3E}">
-        <p14:creationId xmlns:p14="http://schemas.microsoft.com/office/powerpoint/2010/main" val="3338411237"/>
+        <p14:creationId xmlns:p14="http://schemas.microsoft.com/office/powerpoint/2010/main" val="251180740"/>
       </p:ext>
     </p:extLst>
   </p:cSld>
@@ -15551,7 +16049,7 @@
           <p:cNvPr id="2" name="Title 1">
             <a:extLst>
               <a:ext uri="{FF2B5EF4-FFF2-40B4-BE49-F238E27FC236}">
-                <a16:creationId xmlns:a16="http://schemas.microsoft.com/office/drawing/2014/main" id="{4C391A7B-517B-1F28-7683-AA06AF06A49F}"/>
+                <a16:creationId xmlns:a16="http://schemas.microsoft.com/office/drawing/2014/main" id="{D78DEC67-149D-7747-87F3-D940F8EF2C93}"/>
               </a:ext>
             </a:extLst>
           </p:cNvPr>
@@ -15569,251 +16067,17 @@
           <a:p>
             <a:r>
               <a:rPr lang="en-US" dirty="0"/>
-              <a:t>Acronym With HOFs</a:t>
-            </a:r>
-          </a:p>
-        </p:txBody>
-      </p:sp>
-      <p:sp>
-        <p:nvSpPr>
-          <p:cNvPr id="3" name="Content Placeholder 2">
+              <a:t>Today’s Task: Acronym</a:t>
+            </a:r>
+          </a:p>
+        </p:txBody>
+      </p:sp>
+      <p:sp>
+        <p:nvSpPr>
+          <p:cNvPr id="3" name="Footer Placeholder 3">
             <a:extLst>
               <a:ext uri="{FF2B5EF4-FFF2-40B4-BE49-F238E27FC236}">
-                <a16:creationId xmlns:a16="http://schemas.microsoft.com/office/drawing/2014/main" id="{0EBA5618-B947-D60E-CA5F-2F85BE526602}"/>
-              </a:ext>
-            </a:extLst>
-          </p:cNvPr>
-          <p:cNvSpPr>
-            <a:spLocks noGrp="1"/>
-          </p:cNvSpPr>
-          <p:nvPr>
-            <p:ph idx="1"/>
-          </p:nvPr>
-        </p:nvSpPr>
-        <p:spPr/>
-        <p:txBody>
-          <a:bodyPr/>
-          <a:lstStyle/>
-          <a:p>
-            <a:pPr marL="0" indent="0">
-              <a:buNone/>
-            </a:pPr>
-            <a:r>
-              <a:rPr lang="en-US" dirty="0"/>
-              <a:t>What is we want to control the filtering method?</a:t>
-            </a:r>
-          </a:p>
-          <a:p>
-            <a:pPr marL="0" indent="0">
-              <a:buNone/>
-            </a:pPr>
-            <a:endParaRPr lang="en-US" dirty="0"/>
-          </a:p>
-          <a:p>
-            <a:pPr marL="0" indent="0">
-              <a:buNone/>
-            </a:pPr>
-            <a:r>
-              <a:rPr lang="en-US" dirty="0">
-                <a:latin typeface="Source Code Pro" panose="020B0509030403020204" pitchFamily="49" charset="77"/>
-              </a:rPr>
-              <a:t>def </a:t>
-            </a:r>
-            <a:r>
-              <a:rPr lang="en-US" dirty="0" err="1">
-                <a:latin typeface="Source Code Pro" panose="020B0509030403020204" pitchFamily="49" charset="77"/>
-              </a:rPr>
-              <a:t>keep_words</a:t>
-            </a:r>
-            <a:r>
-              <a:rPr lang="en-US" dirty="0">
-                <a:latin typeface="Source Code Pro" panose="020B0509030403020204" pitchFamily="49" charset="77"/>
-              </a:rPr>
-              <a:t>(word):</a:t>
-            </a:r>
-          </a:p>
-          <a:p>
-            <a:pPr marL="0" indent="0">
-              <a:buNone/>
-            </a:pPr>
-            <a:r>
-              <a:rPr lang="en-US" dirty="0">
-                <a:latin typeface="Source Code Pro" panose="020B0509030403020204" pitchFamily="49" charset="77"/>
-              </a:rPr>
-              <a:t>    specials = ['Los']</a:t>
-            </a:r>
-          </a:p>
-          <a:p>
-            <a:pPr marL="0" indent="0">
-              <a:buNone/>
-            </a:pPr>
-            <a:r>
-              <a:rPr lang="en-US" dirty="0">
-                <a:latin typeface="Source Code Pro" panose="020B0509030403020204" pitchFamily="49" charset="77"/>
-              </a:rPr>
-              <a:t>    return word in specials or </a:t>
-            </a:r>
-            <a:r>
-              <a:rPr lang="en-US" dirty="0" err="1">
-                <a:latin typeface="Source Code Pro" panose="020B0509030403020204" pitchFamily="49" charset="77"/>
-              </a:rPr>
-              <a:t>long_word</a:t>
-            </a:r>
-            <a:r>
-              <a:rPr lang="en-US" dirty="0">
-                <a:latin typeface="Source Code Pro" panose="020B0509030403020204" pitchFamily="49" charset="77"/>
-              </a:rPr>
-              <a:t>(word)</a:t>
-            </a:r>
-          </a:p>
-          <a:p>
-            <a:pPr marL="0" indent="0">
-              <a:buNone/>
-            </a:pPr>
-            <a:endParaRPr lang="en-US" dirty="0">
-              <a:latin typeface="Source Code Pro" panose="020B0509030403020204" pitchFamily="49" charset="77"/>
-            </a:endParaRPr>
-          </a:p>
-          <a:p>
-            <a:pPr marL="0" indent="0">
-              <a:buNone/>
-            </a:pPr>
-            <a:r>
-              <a:rPr lang="en-US" dirty="0">
-                <a:latin typeface="Source Code Pro" panose="020B0509030403020204" pitchFamily="49" charset="77"/>
-              </a:rPr>
-              <a:t>def </a:t>
-            </a:r>
-            <a:r>
-              <a:rPr lang="en-US" dirty="0" err="1">
-                <a:latin typeface="Source Code Pro" panose="020B0509030403020204" pitchFamily="49" charset="77"/>
-              </a:rPr>
-              <a:t>acronym_hof</a:t>
-            </a:r>
-            <a:r>
-              <a:rPr lang="en-US" dirty="0">
-                <a:latin typeface="Source Code Pro" panose="020B0509030403020204" pitchFamily="49" charset="77"/>
-              </a:rPr>
-              <a:t>(sentence, </a:t>
-            </a:r>
-            <a:r>
-              <a:rPr lang="en-US" b="1" dirty="0" err="1">
-                <a:latin typeface="Source Code Pro" panose="020B0509030403020204" pitchFamily="49" charset="77"/>
-              </a:rPr>
-              <a:t>filter_fn</a:t>
-            </a:r>
-            <a:r>
-              <a:rPr lang="en-US" dirty="0">
-                <a:latin typeface="Source Code Pro" panose="020B0509030403020204" pitchFamily="49" charset="77"/>
-              </a:rPr>
-              <a:t>):</a:t>
-            </a:r>
-          </a:p>
-          <a:p>
-            <a:pPr marL="0" indent="0">
-              <a:buNone/>
-            </a:pPr>
-            <a:r>
-              <a:rPr lang="en-US" dirty="0">
-                <a:latin typeface="Source Code Pro" panose="020B0509030403020204" pitchFamily="49" charset="77"/>
-              </a:rPr>
-              <a:t>    words = </a:t>
-            </a:r>
-            <a:r>
-              <a:rPr lang="en-US" dirty="0" err="1">
-                <a:latin typeface="Source Code Pro" panose="020B0509030403020204" pitchFamily="49" charset="77"/>
-              </a:rPr>
-              <a:t>sentence.split</a:t>
-            </a:r>
-            <a:r>
-              <a:rPr lang="en-US" dirty="0">
-                <a:latin typeface="Source Code Pro" panose="020B0509030403020204" pitchFamily="49" charset="77"/>
-              </a:rPr>
-              <a:t>()</a:t>
-            </a:r>
-          </a:p>
-          <a:p>
-            <a:pPr marL="0" indent="0">
-              <a:buNone/>
-            </a:pPr>
-            <a:r>
-              <a:rPr lang="en-US" dirty="0">
-                <a:latin typeface="Source Code Pro" panose="020B0509030403020204" pitchFamily="49" charset="77"/>
-              </a:rPr>
-              <a:t>    return reduce(add, map(</a:t>
-            </a:r>
-            <a:r>
-              <a:rPr lang="en-US" dirty="0" err="1">
-                <a:latin typeface="Source Code Pro" panose="020B0509030403020204" pitchFamily="49" charset="77"/>
-              </a:rPr>
-              <a:t>first_letter</a:t>
-            </a:r>
-            <a:r>
-              <a:rPr lang="en-US" dirty="0">
-                <a:latin typeface="Source Code Pro" panose="020B0509030403020204" pitchFamily="49" charset="77"/>
-              </a:rPr>
-              <a:t>, filter(</a:t>
-            </a:r>
-            <a:r>
-              <a:rPr lang="en-US" b="1" dirty="0" err="1">
-                <a:latin typeface="Source Code Pro" panose="020B0509030403020204" pitchFamily="49" charset="77"/>
-              </a:rPr>
-              <a:t>filter_fn</a:t>
-            </a:r>
-            <a:r>
-              <a:rPr lang="en-US" dirty="0">
-                <a:latin typeface="Source Code Pro" panose="020B0509030403020204" pitchFamily="49" charset="77"/>
-              </a:rPr>
-              <a:t>, words)))</a:t>
-            </a:r>
-          </a:p>
-          <a:p>
-            <a:pPr marL="0" indent="0">
-              <a:buNone/>
-            </a:pPr>
-            <a:endParaRPr lang="en-US" dirty="0"/>
-          </a:p>
-          <a:p>
-            <a:pPr marL="0" indent="0">
-              <a:buNone/>
-            </a:pPr>
-            <a:r>
-              <a:rPr lang="en-US" dirty="0" err="1">
-                <a:latin typeface="Source Code Pro" panose="020B0309030403020204" pitchFamily="34" charset="0"/>
-                <a:ea typeface="Source Code Pro" panose="020B0309030403020204" pitchFamily="34" charset="0"/>
-              </a:rPr>
-              <a:t>acronym_hof</a:t>
-            </a:r>
-            <a:r>
-              <a:rPr lang="en-US" dirty="0">
-                <a:latin typeface="Source Code Pro" panose="020B0309030403020204" pitchFamily="34" charset="0"/>
-                <a:ea typeface="Source Code Pro" panose="020B0309030403020204" pitchFamily="34" charset="0"/>
-              </a:rPr>
-              <a:t>(copycats, </a:t>
-            </a:r>
-            <a:r>
-              <a:rPr lang="en-US" dirty="0" err="1">
-                <a:latin typeface="Source Code Pro" panose="020B0309030403020204" pitchFamily="34" charset="0"/>
-                <a:ea typeface="Source Code Pro" panose="020B0309030403020204" pitchFamily="34" charset="0"/>
-              </a:rPr>
-              <a:t>keep_words</a:t>
-            </a:r>
-            <a:r>
-              <a:rPr lang="en-US" dirty="0">
-                <a:latin typeface="Source Code Pro" panose="020B0309030403020204" pitchFamily="34" charset="0"/>
-                <a:ea typeface="Source Code Pro" panose="020B0309030403020204" pitchFamily="34" charset="0"/>
-              </a:rPr>
-              <a:t>)</a:t>
-            </a:r>
-          </a:p>
-        </p:txBody>
-      </p:sp>
-      <p:sp>
-        <p:nvSpPr>
-          <p:cNvPr id="4" name="Footer Placeholder 3">
-            <a:extLst>
-              <a:ext uri="{FF2B5EF4-FFF2-40B4-BE49-F238E27FC236}">
-                <a16:creationId xmlns:a16="http://schemas.microsoft.com/office/drawing/2014/main" id="{9190173E-420E-9A58-E65B-E03B8A83BE80}"/>
+                <a16:creationId xmlns:a16="http://schemas.microsoft.com/office/drawing/2014/main" id="{945EF9C5-F59D-F53F-E807-CF0E2DF60EA6}"/>
               </a:ext>
             </a:extLst>
           </p:cNvPr>
@@ -15841,10 +16105,451 @@
           </a:p>
         </p:txBody>
       </p:sp>
+      <p:sp>
+        <p:nvSpPr>
+          <p:cNvPr id="5" name="Rectangle 4">
+            <a:extLst>
+              <a:ext uri="{FF2B5EF4-FFF2-40B4-BE49-F238E27FC236}">
+                <a16:creationId xmlns:a16="http://schemas.microsoft.com/office/drawing/2014/main" id="{F4E01054-B4B8-BC41-8667-60CEB7A01846}"/>
+              </a:ext>
+            </a:extLst>
+          </p:cNvPr>
+          <p:cNvSpPr/>
+          <p:nvPr/>
+        </p:nvSpPr>
+        <p:spPr>
+          <a:xfrm>
+            <a:off x="533400" y="1081668"/>
+            <a:ext cx="8610600" cy="3139321"/>
+          </a:xfrm>
+          <a:prstGeom prst="rect">
+            <a:avLst/>
+          </a:prstGeom>
+        </p:spPr>
+        <p:txBody>
+          <a:bodyPr wrap="square">
+            <a:spAutoFit/>
+          </a:bodyPr>
+          <a:lstStyle/>
+          <a:p>
+            <a:pPr>
+              <a:lnSpc>
+                <a:spcPct val="100000"/>
+              </a:lnSpc>
+            </a:pPr>
+            <a:endParaRPr lang="en-US" spc="-1" dirty="0">
+              <a:solidFill>
+                <a:srgbClr val="000000"/>
+              </a:solidFill>
+              <a:uFill>
+                <a:solidFill>
+                  <a:srgbClr val="FFFFFF"/>
+                </a:solidFill>
+              </a:uFill>
+              <a:latin typeface="Source Code Pro" panose="020B0509030403020204" pitchFamily="49" charset="77"/>
+            </a:endParaRPr>
+          </a:p>
+          <a:p>
+            <a:pPr>
+              <a:lnSpc>
+                <a:spcPct val="100000"/>
+              </a:lnSpc>
+            </a:pPr>
+            <a:r>
+              <a:rPr lang="en-US" spc="-1" dirty="0">
+                <a:solidFill>
+                  <a:srgbClr val="000000"/>
+                </a:solidFill>
+                <a:uFill>
+                  <a:solidFill>
+                    <a:srgbClr val="FFFFFF"/>
+                  </a:solidFill>
+                </a:uFill>
+                <a:latin typeface="Source Code Pro" panose="020B0509030403020204" pitchFamily="49" charset="77"/>
+              </a:rPr>
+              <a:t>Input: "The University of California at Berkeley"</a:t>
+            </a:r>
+          </a:p>
+          <a:p>
+            <a:pPr>
+              <a:lnSpc>
+                <a:spcPct val="100000"/>
+              </a:lnSpc>
+            </a:pPr>
+            <a:endParaRPr lang="en-US" spc="-1" dirty="0">
+              <a:solidFill>
+                <a:srgbClr val="000000"/>
+              </a:solidFill>
+              <a:uFill>
+                <a:solidFill>
+                  <a:srgbClr val="FFFFFF"/>
+                </a:solidFill>
+              </a:uFill>
+              <a:latin typeface="Source Code Pro" panose="020B0509030403020204" pitchFamily="49" charset="77"/>
+            </a:endParaRPr>
+          </a:p>
+          <a:p>
+            <a:pPr>
+              <a:lnSpc>
+                <a:spcPct val="100000"/>
+              </a:lnSpc>
+            </a:pPr>
+            <a:r>
+              <a:rPr lang="en-US" spc="-1" dirty="0">
+                <a:solidFill>
+                  <a:srgbClr val="000000"/>
+                </a:solidFill>
+                <a:uFill>
+                  <a:solidFill>
+                    <a:srgbClr val="FFFFFF"/>
+                  </a:solidFill>
+                </a:uFill>
+                <a:latin typeface="Source Code Pro" panose="020B0509030403020204" pitchFamily="49" charset="77"/>
+              </a:rPr>
+              <a:t>Output: "UCB"</a:t>
+            </a:r>
+          </a:p>
+          <a:p>
+            <a:pPr>
+              <a:lnSpc>
+                <a:spcPct val="100000"/>
+              </a:lnSpc>
+            </a:pPr>
+            <a:r>
+              <a:rPr lang="en-US" spc="-1" dirty="0">
+                <a:solidFill>
+                  <a:srgbClr val="000000"/>
+                </a:solidFill>
+                <a:uFill>
+                  <a:solidFill>
+                    <a:srgbClr val="FFFFFF"/>
+                  </a:solidFill>
+                </a:uFill>
+                <a:latin typeface="Source Code Pro" panose="020B0509030403020204" pitchFamily="49" charset="77"/>
+              </a:rPr>
+              <a:t>def acronym(sentence):</a:t>
+            </a:r>
+          </a:p>
+          <a:p>
+            <a:pPr>
+              <a:lnSpc>
+                <a:spcPct val="100000"/>
+              </a:lnSpc>
+            </a:pPr>
+            <a:r>
+              <a:rPr lang="en-US" spc="-1" dirty="0">
+                <a:solidFill>
+                  <a:srgbClr val="000000"/>
+                </a:solidFill>
+                <a:uFill>
+                  <a:solidFill>
+                    <a:srgbClr val="FFFFFF"/>
+                  </a:solidFill>
+                </a:uFill>
+                <a:latin typeface="Source Code Pro" panose="020B0509030403020204" pitchFamily="49" charset="77"/>
+              </a:rPr>
+              <a:t>    """ (Some </a:t>
+            </a:r>
+            <a:r>
+              <a:rPr lang="en-US" spc="-1" dirty="0" err="1">
+                <a:solidFill>
+                  <a:srgbClr val="000000"/>
+                </a:solidFill>
+                <a:uFill>
+                  <a:solidFill>
+                    <a:srgbClr val="FFFFFF"/>
+                  </a:solidFill>
+                </a:uFill>
+                <a:latin typeface="Source Code Pro" panose="020B0509030403020204" pitchFamily="49" charset="77"/>
+              </a:rPr>
+              <a:t>doctests</a:t>
+            </a:r>
+            <a:r>
+              <a:rPr lang="en-US" spc="-1" dirty="0">
+                <a:solidFill>
+                  <a:srgbClr val="000000"/>
+                </a:solidFill>
+                <a:uFill>
+                  <a:solidFill>
+                    <a:srgbClr val="FFFFFF"/>
+                  </a:solidFill>
+                </a:uFill>
+                <a:latin typeface="Source Code Pro" panose="020B0509030403020204" pitchFamily="49" charset="77"/>
+              </a:rPr>
+              <a:t>)</a:t>
+            </a:r>
+          </a:p>
+          <a:p>
+            <a:pPr>
+              <a:lnSpc>
+                <a:spcPct val="100000"/>
+              </a:lnSpc>
+            </a:pPr>
+            <a:r>
+              <a:rPr lang="en-US" spc="-1" dirty="0">
+                <a:solidFill>
+                  <a:srgbClr val="000000"/>
+                </a:solidFill>
+                <a:uFill>
+                  <a:solidFill>
+                    <a:srgbClr val="FFFFFF"/>
+                  </a:solidFill>
+                </a:uFill>
+                <a:latin typeface="Source Code Pro" panose="020B0509030403020204" pitchFamily="49" charset="77"/>
+              </a:rPr>
+              <a:t>    """</a:t>
+            </a:r>
+          </a:p>
+          <a:p>
+            <a:pPr>
+              <a:lnSpc>
+                <a:spcPct val="100000"/>
+              </a:lnSpc>
+            </a:pPr>
+            <a:r>
+              <a:rPr lang="en-US" spc="-1" dirty="0">
+                <a:solidFill>
+                  <a:srgbClr val="000000"/>
+                </a:solidFill>
+                <a:uFill>
+                  <a:solidFill>
+                    <a:srgbClr val="FFFFFF"/>
+                  </a:solidFill>
+                </a:uFill>
+                <a:latin typeface="Source Code Pro" panose="020B0509030403020204" pitchFamily="49" charset="77"/>
+              </a:rPr>
+              <a:t>    words = </a:t>
+            </a:r>
+            <a:r>
+              <a:rPr lang="en-US" spc="-1" dirty="0" err="1">
+                <a:solidFill>
+                  <a:srgbClr val="000000"/>
+                </a:solidFill>
+                <a:uFill>
+                  <a:solidFill>
+                    <a:srgbClr val="FFFFFF"/>
+                  </a:solidFill>
+                </a:uFill>
+                <a:latin typeface="Source Code Pro" panose="020B0509030403020204" pitchFamily="49" charset="77"/>
+              </a:rPr>
+              <a:t>sentence.split</a:t>
+            </a:r>
+            <a:r>
+              <a:rPr lang="en-US" spc="-1" dirty="0">
+                <a:solidFill>
+                  <a:srgbClr val="000000"/>
+                </a:solidFill>
+                <a:uFill>
+                  <a:solidFill>
+                    <a:srgbClr val="FFFFFF"/>
+                  </a:solidFill>
+                </a:uFill>
+                <a:latin typeface="Source Code Pro" panose="020B0509030403020204" pitchFamily="49" charset="77"/>
+              </a:rPr>
+              <a:t>()</a:t>
+            </a:r>
+          </a:p>
+          <a:p>
+            <a:pPr>
+              <a:lnSpc>
+                <a:spcPct val="100000"/>
+              </a:lnSpc>
+            </a:pPr>
+            <a:r>
+              <a:rPr lang="en-US" spc="-1" dirty="0">
+                <a:solidFill>
+                  <a:srgbClr val="000000"/>
+                </a:solidFill>
+                <a:uFill>
+                  <a:solidFill>
+                    <a:srgbClr val="FFFFFF"/>
+                  </a:solidFill>
+                </a:uFill>
+                <a:latin typeface="Source Code Pro" panose="020B0509030403020204" pitchFamily="49" charset="77"/>
+              </a:rPr>
+              <a:t>    return reduce(add, map(</a:t>
+            </a:r>
+            <a:r>
+              <a:rPr lang="en-US" spc="-1" dirty="0" err="1">
+                <a:solidFill>
+                  <a:srgbClr val="000000"/>
+                </a:solidFill>
+                <a:uFill>
+                  <a:solidFill>
+                    <a:srgbClr val="FFFFFF"/>
+                  </a:solidFill>
+                </a:uFill>
+                <a:latin typeface="Source Code Pro" panose="020B0509030403020204" pitchFamily="49" charset="77"/>
+              </a:rPr>
+              <a:t>first_letter</a:t>
+            </a:r>
+            <a:r>
+              <a:rPr lang="en-US" spc="-1" dirty="0">
+                <a:solidFill>
+                  <a:srgbClr val="000000"/>
+                </a:solidFill>
+                <a:uFill>
+                  <a:solidFill>
+                    <a:srgbClr val="FFFFFF"/>
+                  </a:solidFill>
+                </a:uFill>
+                <a:latin typeface="Source Code Pro" panose="020B0509030403020204" pitchFamily="49" charset="77"/>
+              </a:rPr>
+              <a:t>, filter(</a:t>
+            </a:r>
+            <a:r>
+              <a:rPr lang="en-US" spc="-1" dirty="0" err="1">
+                <a:solidFill>
+                  <a:srgbClr val="000000"/>
+                </a:solidFill>
+                <a:uFill>
+                  <a:solidFill>
+                    <a:srgbClr val="FFFFFF"/>
+                  </a:solidFill>
+                </a:uFill>
+                <a:latin typeface="Source Code Pro" panose="020B0509030403020204" pitchFamily="49" charset="77"/>
+              </a:rPr>
+              <a:t>long_word</a:t>
+            </a:r>
+            <a:r>
+              <a:rPr lang="en-US" spc="-1" dirty="0">
+                <a:solidFill>
+                  <a:srgbClr val="000000"/>
+                </a:solidFill>
+                <a:uFill>
+                  <a:solidFill>
+                    <a:srgbClr val="FFFFFF"/>
+                  </a:solidFill>
+                </a:uFill>
+                <a:latin typeface="Source Code Pro" panose="020B0509030403020204" pitchFamily="49" charset="77"/>
+              </a:rPr>
+              <a:t>, words)))</a:t>
+            </a:r>
+          </a:p>
+          <a:p>
+            <a:pPr>
+              <a:lnSpc>
+                <a:spcPct val="100000"/>
+              </a:lnSpc>
+            </a:pPr>
+            <a:endParaRPr lang="en-US" spc="-1" dirty="0">
+              <a:solidFill>
+                <a:srgbClr val="000000"/>
+              </a:solidFill>
+              <a:uFill>
+                <a:solidFill>
+                  <a:srgbClr val="FFFFFF"/>
+                </a:solidFill>
+              </a:uFill>
+              <a:latin typeface="Source Code Pro" panose="020B0509030403020204" pitchFamily="49" charset="77"/>
+            </a:endParaRPr>
+          </a:p>
+        </p:txBody>
+      </p:sp>
+      <p:sp>
+        <p:nvSpPr>
+          <p:cNvPr id="7" name="TextShape 11">
+            <a:extLst>
+              <a:ext uri="{FF2B5EF4-FFF2-40B4-BE49-F238E27FC236}">
+                <a16:creationId xmlns:a16="http://schemas.microsoft.com/office/drawing/2014/main" id="{55609106-671F-E84E-8744-3B2453668F27}"/>
+              </a:ext>
+            </a:extLst>
+          </p:cNvPr>
+          <p:cNvSpPr txBox="1"/>
+          <p:nvPr/>
+        </p:nvSpPr>
+        <p:spPr>
+          <a:xfrm>
+            <a:off x="2281080" y="5012456"/>
+            <a:ext cx="7171560" cy="602280"/>
+          </a:xfrm>
+          <a:prstGeom prst="rect">
+            <a:avLst/>
+          </a:prstGeom>
+          <a:noFill/>
+          <a:ln>
+            <a:noFill/>
+          </a:ln>
+        </p:spPr>
+        <p:txBody>
+          <a:bodyPr lIns="90000" tIns="45000" rIns="90000" bIns="45000"/>
+          <a:lstStyle/>
+          <a:p>
+            <a:r>
+              <a:rPr lang="en-US" spc="-1" dirty="0">
+                <a:solidFill>
+                  <a:srgbClr val="000000"/>
+                </a:solidFill>
+                <a:uFill>
+                  <a:solidFill>
+                    <a:srgbClr val="FFFFFF"/>
+                  </a:solidFill>
+                </a:uFill>
+                <a:latin typeface="Arial"/>
+              </a:rPr>
+              <a:t>P.S. Pedantry alert: This is really an </a:t>
+            </a:r>
+            <a:r>
+              <a:rPr lang="en-US" i="1" spc="-1" dirty="0">
+                <a:solidFill>
+                  <a:srgbClr val="000000"/>
+                </a:solidFill>
+                <a:uFill>
+                  <a:solidFill>
+                    <a:srgbClr val="FFFFFF"/>
+                  </a:solidFill>
+                </a:uFill>
+                <a:latin typeface="Arial"/>
+              </a:rPr>
+              <a:t>initialism</a:t>
+            </a:r>
+            <a:r>
+              <a:rPr lang="en-US" spc="-1" dirty="0">
+                <a:solidFill>
+                  <a:srgbClr val="000000"/>
+                </a:solidFill>
+                <a:uFill>
+                  <a:solidFill>
+                    <a:srgbClr val="FFFFFF"/>
+                  </a:solidFill>
+                </a:uFill>
+                <a:latin typeface="Arial"/>
+              </a:rPr>
+              <a:t> but that's rather annoying to say and type. </a:t>
+            </a:r>
+            <a:r>
+              <a:rPr lang="en-US" spc="-1" dirty="0">
+                <a:solidFill>
+                  <a:srgbClr val="000000"/>
+                </a:solidFill>
+                <a:uFill>
+                  <a:solidFill>
+                    <a:srgbClr val="FFFFFF"/>
+                  </a:solidFill>
+                </a:uFill>
+                <a:latin typeface="Arial"/>
+                <a:sym typeface="Wingdings" pitchFamily="2" charset="2"/>
+              </a:rPr>
+              <a:t> (However, the code we write is the same, the difference is in how you pronounce the result.) The more you know!</a:t>
+            </a:r>
+            <a:endParaRPr lang="en-US" spc="-1" dirty="0">
+              <a:solidFill>
+                <a:srgbClr val="000000"/>
+              </a:solidFill>
+              <a:uFill>
+                <a:solidFill>
+                  <a:srgbClr val="FFFFFF"/>
+                </a:solidFill>
+              </a:uFill>
+              <a:latin typeface="Arial"/>
+            </a:endParaRPr>
+          </a:p>
+        </p:txBody>
+      </p:sp>
     </p:spTree>
     <p:extLst>
       <p:ext uri="{BB962C8B-B14F-4D97-AF65-F5344CB8AC3E}">
-        <p14:creationId xmlns:p14="http://schemas.microsoft.com/office/powerpoint/2010/main" val="3478770812"/>
+        <p14:creationId xmlns:p14="http://schemas.microsoft.com/office/powerpoint/2010/main" val="3338411237"/>
       </p:ext>
     </p:extLst>
   </p:cSld>
@@ -15876,7 +16581,7 @@
           <p:cNvPr id="2" name="Title 1">
             <a:extLst>
               <a:ext uri="{FF2B5EF4-FFF2-40B4-BE49-F238E27FC236}">
-                <a16:creationId xmlns:a16="http://schemas.microsoft.com/office/drawing/2014/main" id="{C3A57493-490E-6541-9973-A295DBF3E35F}"/>
+                <a16:creationId xmlns:a16="http://schemas.microsoft.com/office/drawing/2014/main" id="{4C391A7B-517B-1F28-7683-AA06AF06A49F}"/>
               </a:ext>
             </a:extLst>
           </p:cNvPr>
@@ -15894,7 +16599,7 @@
           <a:p>
             <a:r>
               <a:rPr lang="en-US" dirty="0"/>
-              <a:t>Functional Sequence (List) Operations</a:t>
+              <a:t>Acronym With HOFs</a:t>
             </a:r>
           </a:p>
         </p:txBody>
@@ -15904,7 +16609,7 @@
           <p:cNvPr id="3" name="Content Placeholder 2">
             <a:extLst>
               <a:ext uri="{FF2B5EF4-FFF2-40B4-BE49-F238E27FC236}">
-                <a16:creationId xmlns:a16="http://schemas.microsoft.com/office/drawing/2014/main" id="{AAAEACB3-3528-3B4E-9961-861C7DBB5CBC}"/>
+                <a16:creationId xmlns:a16="http://schemas.microsoft.com/office/drawing/2014/main" id="{0EBA5618-B947-D60E-CA5F-2F85BE526602}"/>
               </a:ext>
             </a:extLst>
           </p:cNvPr>
@@ -15920,33 +16625,13 @@
           <a:bodyPr/>
           <a:lstStyle/>
           <a:p>
+            <a:pPr marL="0" indent="0">
+              <a:buNone/>
+            </a:pPr>
             <a:r>
               <a:rPr lang="en-US" dirty="0"/>
-              <a:t>Goal: Transform a</a:t>
-            </a:r>
-            <a:r>
-              <a:rPr lang="en-US" i="1" dirty="0"/>
-              <a:t> sequence</a:t>
-            </a:r>
-            <a:r>
-              <a:rPr lang="en-US" dirty="0"/>
-              <a:t>, and return a new result</a:t>
-            </a:r>
-          </a:p>
-          <a:p>
-            <a:r>
-              <a:rPr lang="en-US" dirty="0"/>
-              <a:t>We'll use 3 functions that are hallmarks of functional programming</a:t>
-            </a:r>
-          </a:p>
-          <a:p>
-            <a:r>
-              <a:rPr lang="en-US" dirty="0"/>
-              <a:t>Each of these takes in a function and a sequence as arguments</a:t>
-            </a:r>
-          </a:p>
-          <a:p>
-            <a:endParaRPr lang="en-US" dirty="0"/>
+              <a:t>What is we want to control the filtering method?</a:t>
+            </a:r>
           </a:p>
           <a:p>
             <a:pPr marL="0" indent="0">
@@ -15958,7 +16643,198 @@
             <a:pPr marL="0" indent="0">
               <a:buNone/>
             </a:pPr>
+            <a:r>
+              <a:rPr lang="en-US" dirty="0">
+                <a:latin typeface="Source Code Pro" panose="020B0509030403020204" pitchFamily="49" charset="77"/>
+              </a:rPr>
+              <a:t>def </a:t>
+            </a:r>
+            <a:r>
+              <a:rPr lang="en-US" dirty="0" err="1">
+                <a:latin typeface="Source Code Pro" panose="020B0509030403020204" pitchFamily="49" charset="77"/>
+              </a:rPr>
+              <a:t>keep_words</a:t>
+            </a:r>
+            <a:r>
+              <a:rPr lang="en-US" dirty="0">
+                <a:latin typeface="Source Code Pro" panose="020B0509030403020204" pitchFamily="49" charset="77"/>
+              </a:rPr>
+              <a:t>(word):</a:t>
+            </a:r>
+          </a:p>
+          <a:p>
+            <a:pPr marL="0" indent="0">
+              <a:buNone/>
+            </a:pPr>
+            <a:r>
+              <a:rPr lang="en-US" dirty="0">
+                <a:latin typeface="Source Code Pro" panose="020B0509030403020204" pitchFamily="49" charset="77"/>
+              </a:rPr>
+              <a:t>    specials = ['Los']</a:t>
+            </a:r>
+          </a:p>
+          <a:p>
+            <a:pPr marL="0" indent="0">
+              <a:buNone/>
+            </a:pPr>
+            <a:r>
+              <a:rPr lang="en-US" dirty="0">
+                <a:latin typeface="Source Code Pro" panose="020B0509030403020204" pitchFamily="49" charset="77"/>
+              </a:rPr>
+              <a:t>    return word in specials or </a:t>
+            </a:r>
+            <a:r>
+              <a:rPr lang="en-US" dirty="0" err="1">
+                <a:latin typeface="Source Code Pro" panose="020B0509030403020204" pitchFamily="49" charset="77"/>
+              </a:rPr>
+              <a:t>long_word</a:t>
+            </a:r>
+            <a:r>
+              <a:rPr lang="en-US" dirty="0">
+                <a:latin typeface="Source Code Pro" panose="020B0509030403020204" pitchFamily="49" charset="77"/>
+              </a:rPr>
+              <a:t>(word)</a:t>
+            </a:r>
+          </a:p>
+          <a:p>
+            <a:pPr marL="0" indent="0">
+              <a:buNone/>
+            </a:pPr>
+            <a:endParaRPr lang="en-US" dirty="0">
+              <a:latin typeface="Source Code Pro" panose="020B0509030403020204" pitchFamily="49" charset="77"/>
+            </a:endParaRPr>
+          </a:p>
+          <a:p>
+            <a:pPr marL="0" indent="0">
+              <a:buNone/>
+            </a:pPr>
+            <a:r>
+              <a:rPr lang="en-US" dirty="0">
+                <a:latin typeface="Source Code Pro" panose="020B0509030403020204" pitchFamily="49" charset="77"/>
+              </a:rPr>
+              <a:t>def </a:t>
+            </a:r>
+            <a:r>
+              <a:rPr lang="en-US" dirty="0" err="1">
+                <a:latin typeface="Source Code Pro" panose="020B0509030403020204" pitchFamily="49" charset="77"/>
+              </a:rPr>
+              <a:t>acronym_hof</a:t>
+            </a:r>
+            <a:r>
+              <a:rPr lang="en-US" dirty="0">
+                <a:latin typeface="Source Code Pro" panose="020B0509030403020204" pitchFamily="49" charset="77"/>
+              </a:rPr>
+              <a:t>(sentence, </a:t>
+            </a:r>
+            <a:r>
+              <a:rPr lang="en-US" b="1" dirty="0" err="1">
+                <a:latin typeface="Source Code Pro" panose="020B0509030403020204" pitchFamily="49" charset="77"/>
+              </a:rPr>
+              <a:t>filter_fn</a:t>
+            </a:r>
+            <a:r>
+              <a:rPr lang="en-US" dirty="0">
+                <a:latin typeface="Source Code Pro" panose="020B0509030403020204" pitchFamily="49" charset="77"/>
+              </a:rPr>
+              <a:t>):</a:t>
+            </a:r>
+          </a:p>
+          <a:p>
+            <a:pPr marL="0" indent="0">
+              <a:buNone/>
+            </a:pPr>
+            <a:r>
+              <a:rPr lang="en-US" dirty="0">
+                <a:latin typeface="Source Code Pro" panose="020B0509030403020204" pitchFamily="49" charset="77"/>
+              </a:rPr>
+              <a:t>    words = </a:t>
+            </a:r>
+            <a:r>
+              <a:rPr lang="en-US" dirty="0" err="1">
+                <a:latin typeface="Source Code Pro" panose="020B0509030403020204" pitchFamily="49" charset="77"/>
+              </a:rPr>
+              <a:t>sentence.split</a:t>
+            </a:r>
+            <a:r>
+              <a:rPr lang="en-US" dirty="0">
+                <a:latin typeface="Source Code Pro" panose="020B0509030403020204" pitchFamily="49" charset="77"/>
+              </a:rPr>
+              <a:t>()</a:t>
+            </a:r>
+          </a:p>
+          <a:p>
+            <a:pPr marL="0" indent="0">
+              <a:buNone/>
+            </a:pPr>
+            <a:r>
+              <a:rPr lang="en-US" dirty="0">
+                <a:latin typeface="Source Code Pro" panose="020B0509030403020204" pitchFamily="49" charset="77"/>
+              </a:rPr>
+              <a:t>    return reduce(add, map(</a:t>
+            </a:r>
+            <a:r>
+              <a:rPr lang="en-US" dirty="0" err="1">
+                <a:latin typeface="Source Code Pro" panose="020B0509030403020204" pitchFamily="49" charset="77"/>
+              </a:rPr>
+              <a:t>first_letter</a:t>
+            </a:r>
+            <a:r>
+              <a:rPr lang="en-US" dirty="0">
+                <a:latin typeface="Source Code Pro" panose="020B0509030403020204" pitchFamily="49" charset="77"/>
+              </a:rPr>
+              <a:t>, filter(</a:t>
+            </a:r>
+            <a:r>
+              <a:rPr lang="en-US" b="1" dirty="0" err="1">
+                <a:latin typeface="Source Code Pro" panose="020B0509030403020204" pitchFamily="49" charset="77"/>
+              </a:rPr>
+              <a:t>filter_fn</a:t>
+            </a:r>
+            <a:r>
+              <a:rPr lang="en-US" dirty="0">
+                <a:latin typeface="Source Code Pro" panose="020B0509030403020204" pitchFamily="49" charset="77"/>
+              </a:rPr>
+              <a:t>, words)))</a:t>
+            </a:r>
+          </a:p>
+          <a:p>
+            <a:pPr marL="0" indent="0">
+              <a:buNone/>
+            </a:pPr>
             <a:endParaRPr lang="en-US" dirty="0"/>
+          </a:p>
+          <a:p>
+            <a:pPr marL="0" indent="0">
+              <a:buNone/>
+            </a:pPr>
+            <a:r>
+              <a:rPr lang="en-US" dirty="0" err="1">
+                <a:latin typeface="Source Code Pro" panose="020B0309030403020204" pitchFamily="34" charset="0"/>
+                <a:ea typeface="Source Code Pro" panose="020B0309030403020204" pitchFamily="34" charset="0"/>
+              </a:rPr>
+              <a:t>acronym_hof</a:t>
+            </a:r>
+            <a:r>
+              <a:rPr lang="en-US" dirty="0">
+                <a:latin typeface="Source Code Pro" panose="020B0309030403020204" pitchFamily="34" charset="0"/>
+                <a:ea typeface="Source Code Pro" panose="020B0309030403020204" pitchFamily="34" charset="0"/>
+              </a:rPr>
+              <a:t>(copycats, </a:t>
+            </a:r>
+            <a:r>
+              <a:rPr lang="en-US" dirty="0" err="1">
+                <a:latin typeface="Source Code Pro" panose="020B0309030403020204" pitchFamily="34" charset="0"/>
+                <a:ea typeface="Source Code Pro" panose="020B0309030403020204" pitchFamily="34" charset="0"/>
+              </a:rPr>
+              <a:t>keep_words</a:t>
+            </a:r>
+            <a:r>
+              <a:rPr lang="en-US" dirty="0">
+                <a:latin typeface="Source Code Pro" panose="020B0309030403020204" pitchFamily="34" charset="0"/>
+                <a:ea typeface="Source Code Pro" panose="020B0309030403020204" pitchFamily="34" charset="0"/>
+              </a:rPr>
+              <a:t>)</a:t>
+            </a:r>
           </a:p>
         </p:txBody>
       </p:sp>
@@ -15967,7 +16843,7 @@
           <p:cNvPr id="4" name="Footer Placeholder 3">
             <a:extLst>
               <a:ext uri="{FF2B5EF4-FFF2-40B4-BE49-F238E27FC236}">
-                <a16:creationId xmlns:a16="http://schemas.microsoft.com/office/drawing/2014/main" id="{B4344FEE-E72B-B65D-1AD5-8C1189F1FACC}"/>
+                <a16:creationId xmlns:a16="http://schemas.microsoft.com/office/drawing/2014/main" id="{9190173E-420E-9A58-E65B-E03B8A83BE80}"/>
               </a:ext>
             </a:extLst>
           </p:cNvPr>
@@ -15995,467 +16871,10 @@
           </a:p>
         </p:txBody>
       </p:sp>
-      <p:graphicFrame>
-        <p:nvGraphicFramePr>
-          <p:cNvPr id="6" name="Table 6">
-            <a:extLst>
-              <a:ext uri="{FF2B5EF4-FFF2-40B4-BE49-F238E27FC236}">
-                <a16:creationId xmlns:a16="http://schemas.microsoft.com/office/drawing/2014/main" id="{25EBD1E5-B78E-72B6-6282-D80B13046B4F}"/>
-              </a:ext>
-            </a:extLst>
-          </p:cNvPr>
-          <p:cNvGraphicFramePr>
-            <a:graphicFrameLocks noGrp="1"/>
-          </p:cNvGraphicFramePr>
-          <p:nvPr/>
-        </p:nvGraphicFramePr>
-        <p:xfrm>
-          <a:off x="420415" y="2792760"/>
-          <a:ext cx="10594426" cy="3421927"/>
-        </p:xfrm>
-        <a:graphic>
-          <a:graphicData uri="http://schemas.openxmlformats.org/drawingml/2006/table">
-            <a:tbl>
-              <a:tblPr firstRow="1" bandRow="1">
-                <a:tableStyleId>{5C22544A-7EE6-4342-B048-85BDC9FD1C3A}</a:tableStyleId>
-              </a:tblPr>
-              <a:tblGrid>
-                <a:gridCol w="1692164">
-                  <a:extLst>
-                    <a:ext uri="{9D8B030D-6E8A-4147-A177-3AD203B41FA5}">
-                      <a16:colId xmlns:a16="http://schemas.microsoft.com/office/drawing/2014/main" val="2059777158"/>
-                    </a:ext>
-                  </a:extLst>
-                </a:gridCol>
-                <a:gridCol w="2333297">
-                  <a:extLst>
-                    <a:ext uri="{9D8B030D-6E8A-4147-A177-3AD203B41FA5}">
-                      <a16:colId xmlns:a16="http://schemas.microsoft.com/office/drawing/2014/main" val="2894650286"/>
-                    </a:ext>
-                  </a:extLst>
-                </a:gridCol>
-                <a:gridCol w="2280745">
-                  <a:extLst>
-                    <a:ext uri="{9D8B030D-6E8A-4147-A177-3AD203B41FA5}">
-                      <a16:colId xmlns:a16="http://schemas.microsoft.com/office/drawing/2014/main" val="3290081916"/>
-                    </a:ext>
-                  </a:extLst>
-                </a:gridCol>
-                <a:gridCol w="2007476">
-                  <a:extLst>
-                    <a:ext uri="{9D8B030D-6E8A-4147-A177-3AD203B41FA5}">
-                      <a16:colId xmlns:a16="http://schemas.microsoft.com/office/drawing/2014/main" val="2002986398"/>
-                    </a:ext>
-                  </a:extLst>
-                </a:gridCol>
-                <a:gridCol w="2280744">
-                  <a:extLst>
-                    <a:ext uri="{9D8B030D-6E8A-4147-A177-3AD203B41FA5}">
-                      <a16:colId xmlns:a16="http://schemas.microsoft.com/office/drawing/2014/main" val="756374945"/>
-                    </a:ext>
-                  </a:extLst>
-                </a:gridCol>
-              </a:tblGrid>
-              <a:tr h="678727">
-                <a:tc>
-                  <a:txBody>
-                    <a:bodyPr/>
-                    <a:lstStyle/>
-                    <a:p>
-                      <a:pPr algn="ctr"/>
-                      <a:r>
-                        <a:rPr lang="en-US" sz="2000" b="1" dirty="0">
-                          <a:latin typeface="FreightSans Pro Book" panose="02000606030000020004" pitchFamily="2" charset="0"/>
-                        </a:rPr>
-                        <a:t>Function</a:t>
-                      </a:r>
-                    </a:p>
-                  </a:txBody>
-                  <a:tcPr anchor="ctr"/>
-                </a:tc>
-                <a:tc>
-                  <a:txBody>
-                    <a:bodyPr/>
-                    <a:lstStyle/>
-                    <a:p>
-                      <a:pPr algn="ctr"/>
-                      <a:r>
-                        <a:rPr lang="en-US" sz="2000" dirty="0">
-                          <a:latin typeface="FreightSans Pro Book" panose="02000606030000020004" pitchFamily="2" charset="0"/>
-                        </a:rPr>
-                        <a:t>Action</a:t>
-                      </a:r>
-                    </a:p>
-                  </a:txBody>
-                  <a:tcPr anchor="ctr"/>
-                </a:tc>
-                <a:tc>
-                  <a:txBody>
-                    <a:bodyPr/>
-                    <a:lstStyle/>
-                    <a:p>
-                      <a:pPr algn="ctr"/>
-                      <a:r>
-                        <a:rPr lang="en-US" sz="2000" dirty="0">
-                          <a:latin typeface="FreightSans Pro Book" panose="02000606030000020004" pitchFamily="2" charset="0"/>
-                        </a:rPr>
-                        <a:t>Input arguments</a:t>
-                      </a:r>
-                    </a:p>
-                  </a:txBody>
-                  <a:tcPr anchor="ctr"/>
-                </a:tc>
-                <a:tc>
-                  <a:txBody>
-                    <a:bodyPr/>
-                    <a:lstStyle/>
-                    <a:p>
-                      <a:pPr algn="ctr"/>
-                      <a:r>
-                        <a:rPr lang="en-US" sz="2000" dirty="0">
-                          <a:latin typeface="FreightSans Pro Book" panose="02000606030000020004" pitchFamily="2" charset="0"/>
-                        </a:rPr>
-                        <a:t>Input Fn. Returns</a:t>
-                      </a:r>
-                    </a:p>
-                  </a:txBody>
-                  <a:tcPr anchor="ctr"/>
-                </a:tc>
-                <a:tc>
-                  <a:txBody>
-                    <a:bodyPr/>
-                    <a:lstStyle/>
-                    <a:p>
-                      <a:pPr marL="0" marR="0" lvl="0" indent="0" algn="ctr" defTabSz="342900" rtl="0" eaLnBrk="1" fontAlgn="auto" latinLnBrk="0" hangingPunct="1">
-                        <a:lnSpc>
-                          <a:spcPct val="100000"/>
-                        </a:lnSpc>
-                        <a:spcBef>
-                          <a:spcPts val="0"/>
-                        </a:spcBef>
-                        <a:spcAft>
-                          <a:spcPts val="0"/>
-                        </a:spcAft>
-                        <a:buClrTx/>
-                        <a:buSzTx/>
-                        <a:buFontTx/>
-                        <a:buNone/>
-                        <a:tabLst/>
-                        <a:defRPr/>
-                      </a:pPr>
-                      <a:r>
-                        <a:rPr lang="en-US" sz="2000" dirty="0">
-                          <a:latin typeface="FreightSans Pro Book" panose="02000606030000020004" pitchFamily="2" charset="0"/>
-                        </a:rPr>
-                        <a:t>Output</a:t>
-                      </a:r>
-                    </a:p>
-                  </a:txBody>
-                  <a:tcPr anchor="ctr"/>
-                </a:tc>
-                <a:extLst>
-                  <a:ext uri="{0D108BD9-81ED-4DB2-BD59-A6C34878D82A}">
-                    <a16:rowId xmlns:a16="http://schemas.microsoft.com/office/drawing/2014/main" val="1140645906"/>
-                  </a:ext>
-                </a:extLst>
-              </a:tr>
-              <a:tr h="678727">
-                <a:tc>
-                  <a:txBody>
-                    <a:bodyPr/>
-                    <a:lstStyle/>
-                    <a:p>
-                      <a:pPr algn="ctr"/>
-                      <a:r>
-                        <a:rPr lang="en-US" sz="1800" b="1" dirty="0">
-                          <a:latin typeface="Source Code Pro" panose="020B0509030403020204" pitchFamily="49" charset="77"/>
-                        </a:rPr>
-                        <a:t>map</a:t>
-                      </a:r>
-                    </a:p>
-                  </a:txBody>
-                  <a:tcPr anchor="ctr"/>
-                </a:tc>
-                <a:tc>
-                  <a:txBody>
-                    <a:bodyPr/>
-                    <a:lstStyle/>
-                    <a:p>
-                      <a:r>
-                        <a:rPr lang="en-US" sz="1800" b="0" i="0" dirty="0">
-                          <a:latin typeface="Open Sans Light" panose="020B0606030504020204" pitchFamily="34" charset="0"/>
-                          <a:ea typeface="Open Sans Light" panose="020B0606030504020204" pitchFamily="34" charset="0"/>
-                          <a:cs typeface="Open Sans Light" panose="020B0606030504020204" pitchFamily="34" charset="0"/>
-                        </a:rPr>
-                        <a:t>Transform every item</a:t>
-                      </a:r>
-                    </a:p>
-                  </a:txBody>
-                  <a:tcPr anchor="ctr"/>
-                </a:tc>
-                <a:tc>
-                  <a:txBody>
-                    <a:bodyPr/>
-                    <a:lstStyle/>
-                    <a:p>
-                      <a:r>
-                        <a:rPr lang="en-US" sz="1800" b="0" i="0" dirty="0">
-                          <a:latin typeface="Open Sans Light" panose="020B0606030504020204" pitchFamily="34" charset="0"/>
-                          <a:ea typeface="Open Sans Light" panose="020B0606030504020204" pitchFamily="34" charset="0"/>
-                          <a:cs typeface="Open Sans Light" panose="020B0606030504020204" pitchFamily="34" charset="0"/>
-                        </a:rPr>
-                        <a:t>1 (each item)</a:t>
-                      </a:r>
-                    </a:p>
-                  </a:txBody>
-                  <a:tcPr anchor="ctr"/>
-                </a:tc>
-                <a:tc>
-                  <a:txBody>
-                    <a:bodyPr/>
-                    <a:lstStyle/>
-                    <a:p>
-                      <a:r>
-                        <a:rPr lang="en-US" sz="1800" b="0" i="0" dirty="0">
-                          <a:latin typeface="Open Sans Light" panose="020B0606030504020204" pitchFamily="34" charset="0"/>
-                          <a:ea typeface="Open Sans Light" panose="020B0606030504020204" pitchFamily="34" charset="0"/>
-                          <a:cs typeface="Open Sans Light" panose="020B0606030504020204" pitchFamily="34" charset="0"/>
-                        </a:rPr>
-                        <a:t>"Anything", a new item</a:t>
-                      </a:r>
-                    </a:p>
-                  </a:txBody>
-                  <a:tcPr anchor="ctr"/>
-                </a:tc>
-                <a:tc>
-                  <a:txBody>
-                    <a:bodyPr/>
-                    <a:lstStyle/>
-                    <a:p>
-                      <a:r>
-                        <a:rPr lang="en-US" sz="1800" b="1" i="0" dirty="0">
-                          <a:latin typeface="Open Sans ExtraBold" panose="020B0606030504020204" pitchFamily="34" charset="0"/>
-                          <a:ea typeface="Open Sans ExtraBold" panose="020B0606030504020204" pitchFamily="34" charset="0"/>
-                          <a:cs typeface="Open Sans ExtraBold" panose="020B0606030504020204" pitchFamily="34" charset="0"/>
-                        </a:rPr>
-                        <a:t>List</a:t>
-                      </a:r>
-                      <a:r>
-                        <a:rPr lang="en-US" sz="1800" b="0" i="0" dirty="0">
-                          <a:latin typeface="Open Sans Light" panose="020B0606030504020204" pitchFamily="34" charset="0"/>
-                          <a:ea typeface="Open Sans Light" panose="020B0606030504020204" pitchFamily="34" charset="0"/>
-                          <a:cs typeface="Open Sans Light" panose="020B0606030504020204" pitchFamily="34" charset="0"/>
-                        </a:rPr>
-                        <a:t>: same length, but possibly new values</a:t>
-                      </a:r>
-                    </a:p>
-                  </a:txBody>
-                  <a:tcPr anchor="ctr"/>
-                </a:tc>
-                <a:extLst>
-                  <a:ext uri="{0D108BD9-81ED-4DB2-BD59-A6C34878D82A}">
-                    <a16:rowId xmlns:a16="http://schemas.microsoft.com/office/drawing/2014/main" val="1601251051"/>
-                  </a:ext>
-                </a:extLst>
-              </a:tr>
-              <a:tr h="678727">
-                <a:tc>
-                  <a:txBody>
-                    <a:bodyPr/>
-                    <a:lstStyle/>
-                    <a:p>
-                      <a:pPr algn="ctr"/>
-                      <a:r>
-                        <a:rPr lang="en-US" sz="1800" b="1" dirty="0">
-                          <a:latin typeface="Source Code Pro" panose="020B0509030403020204" pitchFamily="49" charset="77"/>
-                        </a:rPr>
-                        <a:t>filter</a:t>
-                      </a:r>
-                    </a:p>
-                  </a:txBody>
-                  <a:tcPr anchor="ctr"/>
-                </a:tc>
-                <a:tc>
-                  <a:txBody>
-                    <a:bodyPr/>
-                    <a:lstStyle/>
-                    <a:p>
-                      <a:r>
-                        <a:rPr lang="en-US" sz="1800" b="0" i="0" dirty="0">
-                          <a:latin typeface="Open Sans Light" panose="020B0606030504020204" pitchFamily="34" charset="0"/>
-                          <a:ea typeface="Open Sans Light" panose="020B0606030504020204" pitchFamily="34" charset="0"/>
-                          <a:cs typeface="Open Sans Light" panose="020B0606030504020204" pitchFamily="34" charset="0"/>
-                        </a:rPr>
-                        <a:t>Return a list with fewer items</a:t>
-                      </a:r>
-                    </a:p>
-                  </a:txBody>
-                  <a:tcPr anchor="ctr"/>
-                </a:tc>
-                <a:tc>
-                  <a:txBody>
-                    <a:bodyPr/>
-                    <a:lstStyle/>
-                    <a:p>
-                      <a:r>
-                        <a:rPr lang="en-US" sz="1800" b="0" i="0" dirty="0">
-                          <a:latin typeface="Open Sans Light" panose="020B0606030504020204" pitchFamily="34" charset="0"/>
-                          <a:ea typeface="Open Sans Light" panose="020B0606030504020204" pitchFamily="34" charset="0"/>
-                          <a:cs typeface="Open Sans Light" panose="020B0606030504020204" pitchFamily="34" charset="0"/>
-                        </a:rPr>
-                        <a:t>1 (each item)</a:t>
-                      </a:r>
-                    </a:p>
-                  </a:txBody>
-                  <a:tcPr anchor="ctr"/>
-                </a:tc>
-                <a:tc>
-                  <a:txBody>
-                    <a:bodyPr/>
-                    <a:lstStyle/>
-                    <a:p>
-                      <a:r>
-                        <a:rPr lang="en-US" sz="1800" b="0" i="0" dirty="0">
-                          <a:latin typeface="Open Sans Light" panose="020B0606030504020204" pitchFamily="34" charset="0"/>
-                          <a:ea typeface="Open Sans Light" panose="020B0606030504020204" pitchFamily="34" charset="0"/>
-                          <a:cs typeface="Open Sans Light" panose="020B0606030504020204" pitchFamily="34" charset="0"/>
-                        </a:rPr>
-                        <a:t>A Boolean</a:t>
-                      </a:r>
-                    </a:p>
-                  </a:txBody>
-                  <a:tcPr anchor="ctr"/>
-                </a:tc>
-                <a:tc>
-                  <a:txBody>
-                    <a:bodyPr/>
-                    <a:lstStyle/>
-                    <a:p>
-                      <a:r>
-                        <a:rPr lang="en-US" sz="1800" b="1" i="0" dirty="0">
-                          <a:latin typeface="Open Sans ExtraBold" panose="020B0606030504020204" pitchFamily="34" charset="0"/>
-                          <a:ea typeface="Open Sans ExtraBold" panose="020B0606030504020204" pitchFamily="34" charset="0"/>
-                          <a:cs typeface="Open Sans ExtraBold" panose="020B0606030504020204" pitchFamily="34" charset="0"/>
-                        </a:rPr>
-                        <a:t>List: </a:t>
-                      </a:r>
-                      <a:r>
-                        <a:rPr lang="en-US" sz="1800" b="0" i="0" dirty="0">
-                          <a:latin typeface="Open Sans Light" panose="020B0606030504020204" pitchFamily="34" charset="0"/>
-                          <a:ea typeface="Open Sans Light" panose="020B0606030504020204" pitchFamily="34" charset="0"/>
-                          <a:cs typeface="Open Sans Light" panose="020B0606030504020204" pitchFamily="34" charset="0"/>
-                        </a:rPr>
-                        <a:t>possibly fewer items, values are the same</a:t>
-                      </a:r>
-                    </a:p>
-                  </a:txBody>
-                  <a:tcPr anchor="ctr"/>
-                </a:tc>
-                <a:extLst>
-                  <a:ext uri="{0D108BD9-81ED-4DB2-BD59-A6C34878D82A}">
-                    <a16:rowId xmlns:a16="http://schemas.microsoft.com/office/drawing/2014/main" val="1639889719"/>
-                  </a:ext>
-                </a:extLst>
-              </a:tr>
-              <a:tr h="678727">
-                <a:tc>
-                  <a:txBody>
-                    <a:bodyPr/>
-                    <a:lstStyle/>
-                    <a:p>
-                      <a:pPr algn="ctr"/>
-                      <a:r>
-                        <a:rPr lang="en-US" sz="1800" b="1" dirty="0">
-                          <a:latin typeface="Source Code Pro" panose="020B0509030403020204" pitchFamily="49" charset="77"/>
-                        </a:rPr>
-                        <a:t>reduce</a:t>
-                      </a:r>
-                    </a:p>
-                  </a:txBody>
-                  <a:tcPr anchor="ctr"/>
-                </a:tc>
-                <a:tc>
-                  <a:txBody>
-                    <a:bodyPr/>
-                    <a:lstStyle/>
-                    <a:p>
-                      <a:r>
-                        <a:rPr lang="en-US" sz="1800" b="0" i="0" dirty="0">
-                          <a:latin typeface="Open Sans Light" panose="020B0606030504020204" pitchFamily="34" charset="0"/>
-                          <a:ea typeface="Open Sans Light" panose="020B0606030504020204" pitchFamily="34" charset="0"/>
-                          <a:cs typeface="Open Sans Light" panose="020B0606030504020204" pitchFamily="34" charset="0"/>
-                        </a:rPr>
-                        <a:t>"Combine" items together</a:t>
-                      </a:r>
-                    </a:p>
-                  </a:txBody>
-                  <a:tcPr anchor="ctr"/>
-                </a:tc>
-                <a:tc>
-                  <a:txBody>
-                    <a:bodyPr/>
-                    <a:lstStyle/>
-                    <a:p>
-                      <a:r>
-                        <a:rPr lang="en-US" sz="1800" b="0" i="0" dirty="0">
-                          <a:latin typeface="Open Sans Light" panose="020B0606030504020204" pitchFamily="34" charset="0"/>
-                          <a:ea typeface="Open Sans Light" panose="020B0606030504020204" pitchFamily="34" charset="0"/>
-                          <a:cs typeface="Open Sans Light" panose="020B0606030504020204" pitchFamily="34" charset="0"/>
-                        </a:rPr>
-                        <a:t>2 (current item, and the previous result)</a:t>
-                      </a:r>
-                    </a:p>
-                  </a:txBody>
-                  <a:tcPr anchor="ctr"/>
-                </a:tc>
-                <a:tc>
-                  <a:txBody>
-                    <a:bodyPr/>
-                    <a:lstStyle/>
-                    <a:p>
-                      <a:r>
-                        <a:rPr lang="en-US" sz="1800" b="0" i="0" dirty="0">
-                          <a:latin typeface="Open Sans Light" panose="020B0606030504020204" pitchFamily="34" charset="0"/>
-                          <a:ea typeface="Open Sans Light" panose="020B0606030504020204" pitchFamily="34" charset="0"/>
-                          <a:cs typeface="Open Sans Light" panose="020B0606030504020204" pitchFamily="34" charset="0"/>
-                        </a:rPr>
-                        <a:t>Type should match the type each item</a:t>
-                      </a:r>
-                    </a:p>
-                  </a:txBody>
-                  <a:tcPr anchor="ctr"/>
-                </a:tc>
-                <a:tc>
-                  <a:txBody>
-                    <a:bodyPr/>
-                    <a:lstStyle/>
-                    <a:p>
-                      <a:r>
-                        <a:rPr lang="en-US" sz="1800" b="0" i="0" dirty="0">
-                          <a:latin typeface="Open Sans Light" panose="020B0606030504020204" pitchFamily="34" charset="0"/>
-                          <a:ea typeface="Open Sans Light" panose="020B0606030504020204" pitchFamily="34" charset="0"/>
-                          <a:cs typeface="Open Sans Light" panose="020B0606030504020204" pitchFamily="34" charset="0"/>
-                        </a:rPr>
-                        <a:t>A "single" item</a:t>
-                      </a:r>
-                    </a:p>
-                  </a:txBody>
-                  <a:tcPr anchor="ctr"/>
-                </a:tc>
-                <a:extLst>
-                  <a:ext uri="{0D108BD9-81ED-4DB2-BD59-A6C34878D82A}">
-                    <a16:rowId xmlns:a16="http://schemas.microsoft.com/office/drawing/2014/main" val="2091545836"/>
-                  </a:ext>
-                </a:extLst>
-              </a:tr>
-            </a:tbl>
-          </a:graphicData>
-        </a:graphic>
-      </p:graphicFrame>
     </p:spTree>
     <p:extLst>
       <p:ext uri="{BB962C8B-B14F-4D97-AF65-F5344CB8AC3E}">
-        <p14:creationId xmlns:p14="http://schemas.microsoft.com/office/powerpoint/2010/main" val="3998291529"/>
+        <p14:creationId xmlns:p14="http://schemas.microsoft.com/office/powerpoint/2010/main" val="3478770812"/>
       </p:ext>
     </p:extLst>
   </p:cSld>

</xml_diff>